<commit_message>
changed the arch ppt
</commit_message>
<xml_diff>
--- a/resource/dubbo-go-arch.pptx
+++ b/resource/dubbo-go-arch.pptx
@@ -2233,7 +2233,7 @@
           </a:ln>
           <a:extLst>
             <a:ext uri="{C572A759-6A51-4108-AA02-DFA0A04FC94B}">
-              <ma14:wrappingTextBoxFlag xmlns="" xmlns:m="http://schemas.openxmlformats.org/officeDocument/2006/math" xmlns:a14="http://schemas.microsoft.com/office/drawing/2010/main" xmlns:ma14="http://schemas.microsoft.com/office/mac/drawingml/2011/main" val="1"/>
+              <ma14:wrappingTextBoxFlag xmlns:ma14="http://schemas.microsoft.com/office/mac/drawingml/2011/main" xmlns:a14="http://schemas.microsoft.com/office/drawing/2010/main" xmlns:m="http://schemas.openxmlformats.org/officeDocument/2006/math" xmlns="" val="1"/>
             </a:ext>
           </a:extLst>
         </p:spPr>
@@ -2272,7 +2272,7 @@
           </a:ln>
           <a:extLst>
             <a:ext uri="{C572A759-6A51-4108-AA02-DFA0A04FC94B}">
-              <ma14:wrappingTextBoxFlag xmlns="" xmlns:m="http://schemas.openxmlformats.org/officeDocument/2006/math" xmlns:a14="http://schemas.microsoft.com/office/drawing/2010/main" xmlns:ma14="http://schemas.microsoft.com/office/mac/drawingml/2011/main" val="1"/>
+              <ma14:wrappingTextBoxFlag xmlns:ma14="http://schemas.microsoft.com/office/mac/drawingml/2011/main" xmlns:a14="http://schemas.microsoft.com/office/drawing/2010/main" xmlns:m="http://schemas.openxmlformats.org/officeDocument/2006/math" xmlns="" val="1"/>
             </a:ext>
           </a:extLst>
         </p:spPr>
@@ -3088,8 +3088,21 @@
 </file>
 
 <file path=ppt/slides/slide1.xml><?xml version="1.0" encoding="utf-8"?>
-<p:sld xmlns:a="http://schemas.openxmlformats.org/drawingml/2006/main" xmlns:r="http://schemas.openxmlformats.org/officeDocument/2006/relationships" xmlns:p="http://schemas.openxmlformats.org/presentationml/2006/main">
+<p:sld xmlns:a="http://schemas.openxmlformats.org/drawingml/2006/main" xmlns:r="http://schemas.openxmlformats.org/officeDocument/2006/relationships" xmlns:p="http://schemas.openxmlformats.org/presentationml/2006/main" showMasterSp="0">
   <p:cSld>
+    <p:bg>
+      <p:bgPr>
+        <a:pattFill prst="pct5">
+          <a:fgClr>
+            <a:srgbClr val="FFFFFF"/>
+          </a:fgClr>
+          <a:bgClr>
+            <a:schemeClr val="bg1"/>
+          </a:bgClr>
+        </a:pattFill>
+        <a:effectLst/>
+      </p:bgPr>
+    </p:bg>
     <p:spTree>
       <p:nvGrpSpPr>
         <p:cNvPr id="1" name=""/>
@@ -3142,7 +3155,7 @@
           </a:effectLst>
           <a:extLst>
             <a:ext uri="{C572A759-6A51-4108-AA02-DFA0A04FC94B}">
-              <ma14:wrappingTextBoxFlag xmlns="" xmlns:m="http://schemas.openxmlformats.org/officeDocument/2006/math" xmlns:a14="http://schemas.microsoft.com/office/drawing/2010/main" xmlns:ma14="http://schemas.microsoft.com/office/mac/drawingml/2011/main" val="1"/>
+              <ma14:wrappingTextBoxFlag xmlns:ma14="http://schemas.microsoft.com/office/mac/drawingml/2011/main" xmlns:a14="http://schemas.microsoft.com/office/drawing/2010/main" xmlns:m="http://schemas.openxmlformats.org/officeDocument/2006/math" xmlns="" val="1"/>
             </a:ext>
           </a:extLst>
         </p:spPr>
@@ -3242,7 +3255,7 @@
           </a:effectLst>
           <a:extLst>
             <a:ext uri="{C572A759-6A51-4108-AA02-DFA0A04FC94B}">
-              <ma14:wrappingTextBoxFlag xmlns="" xmlns:m="http://schemas.openxmlformats.org/officeDocument/2006/math" xmlns:a14="http://schemas.microsoft.com/office/drawing/2010/main" xmlns:ma14="http://schemas.microsoft.com/office/mac/drawingml/2011/main" val="1"/>
+              <ma14:wrappingTextBoxFlag xmlns:ma14="http://schemas.microsoft.com/office/mac/drawingml/2011/main" xmlns:a14="http://schemas.microsoft.com/office/drawing/2010/main" xmlns:m="http://schemas.openxmlformats.org/officeDocument/2006/math" xmlns="" val="1"/>
             </a:ext>
           </a:extLst>
         </p:spPr>
@@ -3277,281 +3290,239 @@
           </a:p>
         </p:txBody>
       </p:sp>
-      <p:grpSp>
-        <p:nvGrpSpPr>
-          <p:cNvPr id="32" name="Group 31">
-            <a:extLst>
-              <a:ext uri="{FF2B5EF4-FFF2-40B4-BE49-F238E27FC236}">
-                <a16:creationId xmlns:a16="http://schemas.microsoft.com/office/drawing/2014/main" id="{72DE8F5F-525F-3A43-B149-4CFD6BD22A22}"/>
-              </a:ext>
-            </a:extLst>
-          </p:cNvPr>
-          <p:cNvGrpSpPr/>
+      <p:sp>
+        <p:nvSpPr>
+          <p:cNvPr id="125" name="filter"/>
+          <p:cNvSpPr/>
           <p:nvPr/>
-        </p:nvGrpSpPr>
-        <p:grpSpPr>
+        </p:nvSpPr>
+        <p:spPr>
           <a:xfrm>
             <a:off x="6388017" y="2852422"/>
             <a:ext cx="1083600" cy="2880000"/>
-            <a:chOff x="6416912" y="3174922"/>
-            <a:chExt cx="1083600" cy="2880000"/>
           </a:xfrm>
-        </p:grpSpPr>
-        <p:sp>
-          <p:nvSpPr>
-            <p:cNvPr id="125" name="filter"/>
-            <p:cNvSpPr/>
-            <p:nvPr/>
-          </p:nvSpPr>
-          <p:spPr>
-            <a:xfrm>
-              <a:off x="6416912" y="3174922"/>
-              <a:ext cx="1083600" cy="2880000"/>
-            </a:xfrm>
-            <a:prstGeom prst="roundRect">
-              <a:avLst>
-                <a:gd name="adj" fmla="val 5299"/>
-              </a:avLst>
-            </a:prstGeom>
-            <a:solidFill>
-              <a:schemeClr val="bg1">
-                <a:lumMod val="75000"/>
-              </a:schemeClr>
-            </a:solidFill>
-            <a:ln w="12700" cap="flat">
-              <a:noFill/>
-              <a:prstDash val="solid"/>
-              <a:miter lim="400000"/>
-            </a:ln>
-            <a:effectLst>
-              <a:outerShdw blurRad="50800" dist="38100" dir="5400000" algn="t" rotWithShape="0">
-                <a:prstClr val="black">
-                  <a:alpha val="40000"/>
-                </a:prstClr>
-              </a:outerShdw>
-            </a:effectLst>
-            <a:extLst>
-              <a:ext uri="{C572A759-6A51-4108-AA02-DFA0A04FC94B}">
-                <ma14:wrappingTextBoxFlag xmlns="" xmlns:m="http://schemas.openxmlformats.org/officeDocument/2006/math" xmlns:a14="http://schemas.microsoft.com/office/drawing/2010/main" xmlns:ma14="http://schemas.microsoft.com/office/mac/drawingml/2011/main" val="1"/>
-              </a:ext>
-            </a:extLst>
-          </p:spPr>
-          <p:txBody>
-            <a:bodyPr wrap="square" lIns="50800" tIns="50800" rIns="50800" bIns="50800" numCol="1" anchor="t">
-              <a:noAutofit/>
-            </a:bodyPr>
-            <a:lstStyle/>
-            <a:p>
-              <a:r>
-                <a:rPr sz="1700" b="0" dirty="0">
-                  <a:latin typeface="微软雅黑" panose="020B0503020204020204" pitchFamily="34" charset="-122"/>
-                  <a:ea typeface="微软雅黑" panose="020B0503020204020204" pitchFamily="34" charset="-122"/>
-                  <a:cs typeface="Helvetica Light"/>
-                </a:rPr>
-                <a:t>filter</a:t>
-              </a:r>
-            </a:p>
-          </p:txBody>
-        </p:sp>
-        <p:grpSp>
-          <p:nvGrpSpPr>
-            <p:cNvPr id="26" name="Group 25">
-              <a:extLst>
-                <a:ext uri="{FF2B5EF4-FFF2-40B4-BE49-F238E27FC236}">
-                  <a16:creationId xmlns:a16="http://schemas.microsoft.com/office/drawing/2014/main" id="{81C10D66-1047-9B43-937B-37F23F0FA1CA}"/>
-                </a:ext>
-              </a:extLst>
-            </p:cNvPr>
-            <p:cNvGrpSpPr/>
-            <p:nvPr/>
-          </p:nvGrpSpPr>
-          <p:grpSpPr>
-            <a:xfrm>
-              <a:off x="6444818" y="3716035"/>
-              <a:ext cx="952963" cy="1713266"/>
-              <a:chOff x="6430181" y="3498659"/>
-              <a:chExt cx="952963" cy="1713266"/>
-            </a:xfrm>
-          </p:grpSpPr>
-          <p:sp>
-            <p:nvSpPr>
-              <p:cNvPr id="126" name="generic…"/>
-              <p:cNvSpPr/>
-              <p:nvPr/>
-            </p:nvSpPr>
-            <p:spPr>
-              <a:xfrm>
-                <a:off x="6437358" y="4144051"/>
-                <a:ext cx="945786" cy="408330"/>
-              </a:xfrm>
-              <a:prstGeom prst="roundRect">
-                <a:avLst>
-                  <a:gd name="adj" fmla="val 11868"/>
-                </a:avLst>
-              </a:prstGeom>
-              <a:solidFill>
-                <a:schemeClr val="accent4"/>
-              </a:solidFill>
-              <a:ln w="12700" cap="flat">
-                <a:noFill/>
-                <a:miter lim="400000"/>
-              </a:ln>
-              <a:effectLst>
-                <a:outerShdw blurRad="38100" dist="25400" dir="5400000" rotWithShape="0">
-                  <a:srgbClr val="000000">
-                    <a:alpha val="50000"/>
-                  </a:srgbClr>
-                </a:outerShdw>
-              </a:effectLst>
-              <a:extLst>
-                <a:ext uri="{C572A759-6A51-4108-AA02-DFA0A04FC94B}">
-                  <ma14:wrappingTextBoxFlag xmlns="" xmlns:m="http://schemas.openxmlformats.org/officeDocument/2006/math" xmlns:a14="http://schemas.microsoft.com/office/drawing/2010/main" xmlns:ma14="http://schemas.microsoft.com/office/mac/drawingml/2011/main" val="1"/>
-                </a:ext>
-              </a:extLst>
-            </p:spPr>
-            <p:txBody>
-              <a:bodyPr wrap="square" lIns="50800" tIns="50800" rIns="50800" bIns="50800" numCol="1" anchor="ctr">
-                <a:noAutofit/>
-              </a:bodyPr>
-              <a:lstStyle/>
-              <a:p>
-                <a:r>
-                  <a:rPr sz="1500" b="0" dirty="0">
-                    <a:solidFill>
-                      <a:sysClr val="windowText" lastClr="000000"/>
-                    </a:solidFill>
-                    <a:latin typeface="微软雅黑" panose="020B0503020204020204" pitchFamily="34" charset="-122"/>
-                    <a:ea typeface="微软雅黑" panose="020B0503020204020204" pitchFamily="34" charset="-122"/>
-                    <a:cs typeface="Helvetica Light"/>
-                  </a:rPr>
-                  <a:t>generic</a:t>
-                </a:r>
-              </a:p>
-              <a:p>
-                <a:r>
-                  <a:rPr sz="1500" b="0" dirty="0">
-                    <a:solidFill>
-                      <a:sysClr val="windowText" lastClr="000000"/>
-                    </a:solidFill>
-                    <a:latin typeface="微软雅黑" panose="020B0503020204020204" pitchFamily="34" charset="-122"/>
-                    <a:ea typeface="微软雅黑" panose="020B0503020204020204" pitchFamily="34" charset="-122"/>
-                    <a:cs typeface="Helvetica Light"/>
-                  </a:rPr>
-                  <a:t>invoke</a:t>
-                </a:r>
-              </a:p>
-            </p:txBody>
-          </p:sp>
-          <p:sp>
-            <p:nvSpPr>
-              <p:cNvPr id="127" name="tps limit"/>
-              <p:cNvSpPr/>
-              <p:nvPr/>
-            </p:nvSpPr>
-            <p:spPr>
-              <a:xfrm>
-                <a:off x="6430181" y="3498659"/>
-                <a:ext cx="945786" cy="228628"/>
-              </a:xfrm>
-              <a:prstGeom prst="roundRect">
-                <a:avLst/>
-              </a:prstGeom>
-              <a:solidFill>
-                <a:schemeClr val="accent4"/>
-              </a:solidFill>
-              <a:ln w="12700" cap="flat">
-                <a:noFill/>
-                <a:miter lim="400000"/>
-              </a:ln>
-              <a:effectLst>
-                <a:outerShdw blurRad="38100" dist="25400" dir="5400000" rotWithShape="0">
-                  <a:srgbClr val="000000">
-                    <a:alpha val="50000"/>
-                  </a:srgbClr>
-                </a:outerShdw>
-              </a:effectLst>
-              <a:extLst>
-                <a:ext uri="{C572A759-6A51-4108-AA02-DFA0A04FC94B}">
-                  <ma14:wrappingTextBoxFlag xmlns="" xmlns:m="http://schemas.openxmlformats.org/officeDocument/2006/math" xmlns:a14="http://schemas.microsoft.com/office/drawing/2010/main" xmlns:ma14="http://schemas.microsoft.com/office/mac/drawingml/2011/main" val="1"/>
-                </a:ext>
-              </a:extLst>
-            </p:spPr>
-            <p:txBody>
-              <a:bodyPr wrap="square" lIns="50800" tIns="50800" rIns="50800" bIns="50800" numCol="1" anchor="ctr">
-                <a:noAutofit/>
-              </a:bodyPr>
-              <a:lstStyle/>
-              <a:p>
-                <a:r>
-                  <a:rPr sz="1500" b="0" dirty="0">
-                    <a:solidFill>
-                      <a:sysClr val="windowText" lastClr="000000"/>
-                    </a:solidFill>
-                    <a:latin typeface="微软雅黑" panose="020B0503020204020204" pitchFamily="34" charset="-122"/>
-                    <a:ea typeface="微软雅黑" panose="020B0503020204020204" pitchFamily="34" charset="-122"/>
-                    <a:cs typeface="Helvetica Light"/>
-                  </a:rPr>
-                  <a:t>tps limit</a:t>
-                </a:r>
-              </a:p>
-            </p:txBody>
-          </p:sp>
-          <p:sp>
-            <p:nvSpPr>
-              <p:cNvPr id="128" name="…"/>
-              <p:cNvSpPr/>
-              <p:nvPr/>
-            </p:nvSpPr>
-            <p:spPr>
-              <a:xfrm>
-                <a:off x="6430181" y="4969145"/>
-                <a:ext cx="945786" cy="242780"/>
-              </a:xfrm>
-              <a:prstGeom prst="roundRect">
-                <a:avLst/>
-              </a:prstGeom>
-              <a:solidFill>
-                <a:schemeClr val="accent4"/>
-              </a:solidFill>
-              <a:ln w="12700" cap="flat">
-                <a:noFill/>
-                <a:miter lim="400000"/>
-              </a:ln>
-              <a:effectLst>
-                <a:outerShdw blurRad="38100" dist="25400" dir="5400000" rotWithShape="0">
-                  <a:srgbClr val="000000">
-                    <a:alpha val="50000"/>
-                  </a:srgbClr>
-                </a:outerShdw>
-              </a:effectLst>
-              <a:extLst>
-                <a:ext uri="{C572A759-6A51-4108-AA02-DFA0A04FC94B}">
-                  <ma14:wrappingTextBoxFlag xmlns="" xmlns:m="http://schemas.openxmlformats.org/officeDocument/2006/math" xmlns:a14="http://schemas.microsoft.com/office/drawing/2010/main" xmlns:ma14="http://schemas.microsoft.com/office/mac/drawingml/2011/main" val="1"/>
-                </a:ext>
-              </a:extLst>
-            </p:spPr>
-            <p:txBody>
-              <a:bodyPr wrap="square" lIns="50800" tIns="50800" rIns="50800" bIns="50800" numCol="1" anchor="ctr">
-                <a:noAutofit/>
-              </a:bodyPr>
-              <a:lstStyle/>
-              <a:p>
-                <a:r>
-                  <a:rPr sz="1500" b="0" dirty="0">
-                    <a:solidFill>
-                      <a:sysClr val="windowText" lastClr="000000"/>
-                    </a:solidFill>
-                    <a:latin typeface="微软雅黑" panose="020B0503020204020204" pitchFamily="34" charset="-122"/>
-                    <a:ea typeface="微软雅黑" panose="020B0503020204020204" pitchFamily="34" charset="-122"/>
-                    <a:cs typeface="Helvetica Light"/>
-                  </a:rPr>
-                  <a:t>…</a:t>
-                </a:r>
-              </a:p>
-            </p:txBody>
-          </p:sp>
-        </p:grpSp>
-      </p:grpSp>
+          <a:prstGeom prst="roundRect">
+            <a:avLst>
+              <a:gd name="adj" fmla="val 5299"/>
+            </a:avLst>
+          </a:prstGeom>
+          <a:solidFill>
+            <a:schemeClr val="bg1">
+              <a:lumMod val="75000"/>
+            </a:schemeClr>
+          </a:solidFill>
+          <a:ln w="12700" cap="flat">
+            <a:noFill/>
+            <a:prstDash val="solid"/>
+            <a:miter lim="400000"/>
+          </a:ln>
+          <a:effectLst>
+            <a:outerShdw blurRad="50800" dist="38100" dir="5400000" algn="t" rotWithShape="0">
+              <a:prstClr val="black">
+                <a:alpha val="40000"/>
+              </a:prstClr>
+            </a:outerShdw>
+          </a:effectLst>
+          <a:extLst>
+            <a:ext uri="{C572A759-6A51-4108-AA02-DFA0A04FC94B}">
+              <ma14:wrappingTextBoxFlag xmlns:ma14="http://schemas.microsoft.com/office/mac/drawingml/2011/main" xmlns:a14="http://schemas.microsoft.com/office/drawing/2010/main" xmlns:m="http://schemas.openxmlformats.org/officeDocument/2006/math" xmlns="" val="1"/>
+            </a:ext>
+          </a:extLst>
+        </p:spPr>
+        <p:txBody>
+          <a:bodyPr wrap="square" lIns="50800" tIns="50800" rIns="50800" bIns="50800" numCol="1" anchor="t">
+            <a:noAutofit/>
+          </a:bodyPr>
+          <a:lstStyle/>
+          <a:p>
+            <a:r>
+              <a:rPr sz="1700" b="0" dirty="0">
+                <a:latin typeface="微软雅黑" panose="020B0503020204020204" pitchFamily="34" charset="-122"/>
+                <a:ea typeface="微软雅黑" panose="020B0503020204020204" pitchFamily="34" charset="-122"/>
+                <a:cs typeface="Helvetica Light"/>
+              </a:rPr>
+              <a:t>filter</a:t>
+            </a:r>
+          </a:p>
+        </p:txBody>
+      </p:sp>
+      <p:sp>
+        <p:nvSpPr>
+          <p:cNvPr id="126" name="generic…"/>
+          <p:cNvSpPr/>
+          <p:nvPr/>
+        </p:nvSpPr>
+        <p:spPr>
+          <a:xfrm>
+            <a:off x="6460797" y="4039511"/>
+            <a:ext cx="945786" cy="507307"/>
+          </a:xfrm>
+          <a:prstGeom prst="roundRect">
+            <a:avLst>
+              <a:gd name="adj" fmla="val 11868"/>
+            </a:avLst>
+          </a:prstGeom>
+          <a:solidFill>
+            <a:schemeClr val="accent4"/>
+          </a:solidFill>
+          <a:ln w="12700" cap="flat">
+            <a:noFill/>
+            <a:miter lim="400000"/>
+          </a:ln>
+          <a:effectLst>
+            <a:outerShdw blurRad="38100" dist="25400" dir="5400000" rotWithShape="0">
+              <a:srgbClr val="000000">
+                <a:alpha val="50000"/>
+              </a:srgbClr>
+            </a:outerShdw>
+          </a:effectLst>
+          <a:extLst>
+            <a:ext uri="{C572A759-6A51-4108-AA02-DFA0A04FC94B}">
+              <ma14:wrappingTextBoxFlag xmlns:ma14="http://schemas.microsoft.com/office/mac/drawingml/2011/main" xmlns:a14="http://schemas.microsoft.com/office/drawing/2010/main" xmlns:m="http://schemas.openxmlformats.org/officeDocument/2006/math" xmlns="" val="1"/>
+            </a:ext>
+          </a:extLst>
+        </p:spPr>
+        <p:txBody>
+          <a:bodyPr wrap="square" lIns="50800" tIns="50800" rIns="50800" bIns="50800" numCol="1" anchor="ctr">
+            <a:noAutofit/>
+          </a:bodyPr>
+          <a:lstStyle/>
+          <a:p>
+            <a:r>
+              <a:rPr sz="1500" b="0" dirty="0">
+                <a:solidFill>
+                  <a:sysClr val="windowText" lastClr="000000"/>
+                </a:solidFill>
+                <a:latin typeface="微软雅黑" panose="020B0503020204020204" pitchFamily="34" charset="-122"/>
+                <a:ea typeface="微软雅黑" panose="020B0503020204020204" pitchFamily="34" charset="-122"/>
+                <a:cs typeface="Helvetica Light"/>
+              </a:rPr>
+              <a:t>generic</a:t>
+            </a:r>
+          </a:p>
+          <a:p>
+            <a:r>
+              <a:rPr sz="1500" b="0" dirty="0">
+                <a:solidFill>
+                  <a:sysClr val="windowText" lastClr="000000"/>
+                </a:solidFill>
+                <a:latin typeface="微软雅黑" panose="020B0503020204020204" pitchFamily="34" charset="-122"/>
+                <a:ea typeface="微软雅黑" panose="020B0503020204020204" pitchFamily="34" charset="-122"/>
+                <a:cs typeface="Helvetica Light"/>
+              </a:rPr>
+              <a:t>invoke</a:t>
+            </a:r>
+          </a:p>
+        </p:txBody>
+      </p:sp>
+      <p:sp>
+        <p:nvSpPr>
+          <p:cNvPr id="127" name="tps limit"/>
+          <p:cNvSpPr/>
+          <p:nvPr/>
+        </p:nvSpPr>
+        <p:spPr>
+          <a:xfrm>
+            <a:off x="6460797" y="3334513"/>
+            <a:ext cx="945786" cy="284046"/>
+          </a:xfrm>
+          <a:prstGeom prst="roundRect">
+            <a:avLst/>
+          </a:prstGeom>
+          <a:solidFill>
+            <a:schemeClr val="accent4"/>
+          </a:solidFill>
+          <a:ln w="12700" cap="flat">
+            <a:noFill/>
+            <a:miter lim="400000"/>
+          </a:ln>
+          <a:effectLst>
+            <a:outerShdw blurRad="38100" dist="25400" dir="5400000" rotWithShape="0">
+              <a:srgbClr val="000000">
+                <a:alpha val="50000"/>
+              </a:srgbClr>
+            </a:outerShdw>
+          </a:effectLst>
+          <a:extLst>
+            <a:ext uri="{C572A759-6A51-4108-AA02-DFA0A04FC94B}">
+              <ma14:wrappingTextBoxFlag xmlns:ma14="http://schemas.microsoft.com/office/mac/drawingml/2011/main" xmlns:a14="http://schemas.microsoft.com/office/drawing/2010/main" xmlns:m="http://schemas.openxmlformats.org/officeDocument/2006/math" xmlns="" val="1"/>
+            </a:ext>
+          </a:extLst>
+        </p:spPr>
+        <p:txBody>
+          <a:bodyPr wrap="square" lIns="50800" tIns="50800" rIns="50800" bIns="50800" numCol="1" anchor="ctr">
+            <a:noAutofit/>
+          </a:bodyPr>
+          <a:lstStyle/>
+          <a:p>
+            <a:r>
+              <a:rPr sz="1500" b="0" dirty="0">
+                <a:solidFill>
+                  <a:sysClr val="windowText" lastClr="000000"/>
+                </a:solidFill>
+                <a:latin typeface="微软雅黑" panose="020B0503020204020204" pitchFamily="34" charset="-122"/>
+                <a:ea typeface="微软雅黑" panose="020B0503020204020204" pitchFamily="34" charset="-122"/>
+                <a:cs typeface="Helvetica Light"/>
+              </a:rPr>
+              <a:t>tps limit</a:t>
+            </a:r>
+          </a:p>
+        </p:txBody>
+      </p:sp>
+      <p:sp>
+        <p:nvSpPr>
+          <p:cNvPr id="128" name="…"/>
+          <p:cNvSpPr/>
+          <p:nvPr/>
+        </p:nvSpPr>
+        <p:spPr>
+          <a:xfrm>
+            <a:off x="6460797" y="4967769"/>
+            <a:ext cx="945786" cy="301629"/>
+          </a:xfrm>
+          <a:prstGeom prst="roundRect">
+            <a:avLst/>
+          </a:prstGeom>
+          <a:solidFill>
+            <a:schemeClr val="accent4"/>
+          </a:solidFill>
+          <a:ln w="12700" cap="flat">
+            <a:noFill/>
+            <a:miter lim="400000"/>
+          </a:ln>
+          <a:effectLst>
+            <a:outerShdw blurRad="38100" dist="25400" dir="5400000" rotWithShape="0">
+              <a:srgbClr val="000000">
+                <a:alpha val="50000"/>
+              </a:srgbClr>
+            </a:outerShdw>
+          </a:effectLst>
+          <a:extLst>
+            <a:ext uri="{C572A759-6A51-4108-AA02-DFA0A04FC94B}">
+              <ma14:wrappingTextBoxFlag xmlns:ma14="http://schemas.microsoft.com/office/mac/drawingml/2011/main" xmlns:a14="http://schemas.microsoft.com/office/drawing/2010/main" xmlns:m="http://schemas.openxmlformats.org/officeDocument/2006/math" xmlns="" val="1"/>
+            </a:ext>
+          </a:extLst>
+        </p:spPr>
+        <p:txBody>
+          <a:bodyPr wrap="square" lIns="50800" tIns="50800" rIns="50800" bIns="50800" numCol="1" anchor="ctr">
+            <a:noAutofit/>
+          </a:bodyPr>
+          <a:lstStyle/>
+          <a:p>
+            <a:r>
+              <a:rPr sz="1500" b="0" dirty="0">
+                <a:solidFill>
+                  <a:sysClr val="windowText" lastClr="000000"/>
+                </a:solidFill>
+                <a:latin typeface="微软雅黑" panose="020B0503020204020204" pitchFamily="34" charset="-122"/>
+                <a:ea typeface="微软雅黑" panose="020B0503020204020204" pitchFamily="34" charset="-122"/>
+                <a:cs typeface="Helvetica Light"/>
+              </a:rPr>
+              <a:t>…</a:t>
+            </a:r>
+          </a:p>
+        </p:txBody>
+      </p:sp>
       <p:grpSp>
         <p:nvGrpSpPr>
           <p:cNvPr id="29" name="Group 28">
@@ -3607,7 +3578,7 @@
             </a:effectLst>
             <a:extLst>
               <a:ext uri="{C572A759-6A51-4108-AA02-DFA0A04FC94B}">
-                <ma14:wrappingTextBoxFlag xmlns="" xmlns:m="http://schemas.openxmlformats.org/officeDocument/2006/math" xmlns:a14="http://schemas.microsoft.com/office/drawing/2010/main" xmlns:ma14="http://schemas.microsoft.com/office/mac/drawingml/2011/main" val="1"/>
+                <ma14:wrappingTextBoxFlag xmlns:ma14="http://schemas.microsoft.com/office/mac/drawingml/2011/main" xmlns:a14="http://schemas.microsoft.com/office/drawing/2010/main" xmlns:m="http://schemas.openxmlformats.org/officeDocument/2006/math" xmlns="" val="1"/>
               </a:ext>
             </a:extLst>
           </p:spPr>
@@ -3658,7 +3629,7 @@
             </a:effectLst>
             <a:extLst>
               <a:ext uri="{C572A759-6A51-4108-AA02-DFA0A04FC94B}">
-                <ma14:wrappingTextBoxFlag xmlns="" xmlns:m="http://schemas.openxmlformats.org/officeDocument/2006/math" xmlns:a14="http://schemas.microsoft.com/office/drawing/2010/main" xmlns:ma14="http://schemas.microsoft.com/office/mac/drawingml/2011/main" val="1"/>
+                <ma14:wrappingTextBoxFlag xmlns:ma14="http://schemas.microsoft.com/office/mac/drawingml/2011/main" xmlns:a14="http://schemas.microsoft.com/office/drawing/2010/main" xmlns:m="http://schemas.openxmlformats.org/officeDocument/2006/math" xmlns="" val="1"/>
               </a:ext>
             </a:extLst>
           </p:spPr>
@@ -3712,7 +3683,7 @@
             </a:effectLst>
             <a:extLst>
               <a:ext uri="{C572A759-6A51-4108-AA02-DFA0A04FC94B}">
-                <ma14:wrappingTextBoxFlag xmlns="" xmlns:m="http://schemas.openxmlformats.org/officeDocument/2006/math" xmlns:a14="http://schemas.microsoft.com/office/drawing/2010/main" xmlns:ma14="http://schemas.microsoft.com/office/mac/drawingml/2011/main" val="1"/>
+                <ma14:wrappingTextBoxFlag xmlns:ma14="http://schemas.microsoft.com/office/mac/drawingml/2011/main" xmlns:a14="http://schemas.microsoft.com/office/drawing/2010/main" xmlns:m="http://schemas.openxmlformats.org/officeDocument/2006/math" xmlns="" val="1"/>
               </a:ext>
             </a:extLst>
           </p:spPr>
@@ -3766,7 +3737,7 @@
             </a:effectLst>
             <a:extLst>
               <a:ext uri="{C572A759-6A51-4108-AA02-DFA0A04FC94B}">
-                <ma14:wrappingTextBoxFlag xmlns="" xmlns:m="http://schemas.openxmlformats.org/officeDocument/2006/math" xmlns:a14="http://schemas.microsoft.com/office/drawing/2010/main" xmlns:ma14="http://schemas.microsoft.com/office/mac/drawingml/2011/main" val="1"/>
+                <ma14:wrappingTextBoxFlag xmlns:ma14="http://schemas.microsoft.com/office/mac/drawingml/2011/main" xmlns:a14="http://schemas.microsoft.com/office/drawing/2010/main" xmlns:m="http://schemas.openxmlformats.org/officeDocument/2006/math" xmlns="" val="1"/>
               </a:ext>
             </a:extLst>
           </p:spPr>
@@ -3820,7 +3791,7 @@
             </a:effectLst>
             <a:extLst>
               <a:ext uri="{C572A759-6A51-4108-AA02-DFA0A04FC94B}">
-                <ma14:wrappingTextBoxFlag xmlns="" xmlns:m="http://schemas.openxmlformats.org/officeDocument/2006/math" xmlns:a14="http://schemas.microsoft.com/office/drawing/2010/main" xmlns:ma14="http://schemas.microsoft.com/office/mac/drawingml/2011/main" val="1"/>
+                <ma14:wrappingTextBoxFlag xmlns:ma14="http://schemas.microsoft.com/office/mac/drawingml/2011/main" xmlns:a14="http://schemas.microsoft.com/office/drawing/2010/main" xmlns:m="http://schemas.openxmlformats.org/officeDocument/2006/math" xmlns="" val="1"/>
               </a:ext>
             </a:extLst>
           </p:spPr>
@@ -3875,7 +3846,7 @@
           </a:effectLst>
           <a:extLst>
             <a:ext uri="{C572A759-6A51-4108-AA02-DFA0A04FC94B}">
-              <ma14:wrappingTextBoxFlag xmlns="" xmlns:m="http://schemas.openxmlformats.org/officeDocument/2006/math" xmlns:a14="http://schemas.microsoft.com/office/drawing/2010/main" xmlns:ma14="http://schemas.microsoft.com/office/mac/drawingml/2011/main" val="1"/>
+              <ma14:wrappingTextBoxFlag xmlns:ma14="http://schemas.microsoft.com/office/mac/drawingml/2011/main" xmlns:a14="http://schemas.microsoft.com/office/drawing/2010/main" xmlns:m="http://schemas.openxmlformats.org/officeDocument/2006/math" xmlns="" val="1"/>
             </a:ext>
           </a:extLst>
         </p:spPr>
@@ -4051,7 +4022,7 @@
           </a:effectLst>
           <a:extLst>
             <a:ext uri="{C572A759-6A51-4108-AA02-DFA0A04FC94B}">
-              <ma14:wrappingTextBoxFlag xmlns="" xmlns:m="http://schemas.openxmlformats.org/officeDocument/2006/math" xmlns:a14="http://schemas.microsoft.com/office/drawing/2010/main" xmlns:ma14="http://schemas.microsoft.com/office/mac/drawingml/2011/main" val="1"/>
+              <ma14:wrappingTextBoxFlag xmlns:ma14="http://schemas.microsoft.com/office/mac/drawingml/2011/main" xmlns:a14="http://schemas.microsoft.com/office/drawing/2010/main" xmlns:m="http://schemas.openxmlformats.org/officeDocument/2006/math" xmlns="" val="1"/>
             </a:ext>
           </a:extLst>
         </p:spPr>
@@ -4175,7 +4146,7 @@
           </a:effectLst>
           <a:extLst>
             <a:ext uri="{C572A759-6A51-4108-AA02-DFA0A04FC94B}">
-              <ma14:wrappingTextBoxFlag xmlns="" xmlns:m="http://schemas.openxmlformats.org/officeDocument/2006/math" xmlns:a14="http://schemas.microsoft.com/office/drawing/2010/main" xmlns:ma14="http://schemas.microsoft.com/office/mac/drawingml/2011/main" val="1"/>
+              <ma14:wrappingTextBoxFlag xmlns:ma14="http://schemas.microsoft.com/office/mac/drawingml/2011/main" xmlns:a14="http://schemas.microsoft.com/office/drawing/2010/main" xmlns:m="http://schemas.openxmlformats.org/officeDocument/2006/math" xmlns="" val="1"/>
             </a:ext>
           </a:extLst>
         </p:spPr>
@@ -4254,7 +4225,7 @@
             </a:effectLst>
             <a:extLst>
               <a:ext uri="{C572A759-6A51-4108-AA02-DFA0A04FC94B}">
-                <ma14:wrappingTextBoxFlag xmlns="" xmlns:m="http://schemas.openxmlformats.org/officeDocument/2006/math" xmlns:a14="http://schemas.microsoft.com/office/drawing/2010/main" xmlns:ma14="http://schemas.microsoft.com/office/mac/drawingml/2011/main" val="1"/>
+                <ma14:wrappingTextBoxFlag xmlns:ma14="http://schemas.microsoft.com/office/mac/drawingml/2011/main" xmlns:a14="http://schemas.microsoft.com/office/drawing/2010/main" xmlns:m="http://schemas.openxmlformats.org/officeDocument/2006/math" xmlns="" val="1"/>
               </a:ext>
             </a:extLst>
           </p:spPr>
@@ -4319,7 +4290,7 @@
             </a:effectLst>
             <a:extLst>
               <a:ext uri="{C572A759-6A51-4108-AA02-DFA0A04FC94B}">
-                <ma14:wrappingTextBoxFlag xmlns="" xmlns:m="http://schemas.openxmlformats.org/officeDocument/2006/math" xmlns:a14="http://schemas.microsoft.com/office/drawing/2010/main" xmlns:ma14="http://schemas.microsoft.com/office/mac/drawingml/2011/main" val="1"/>
+                <ma14:wrappingTextBoxFlag xmlns:ma14="http://schemas.microsoft.com/office/mac/drawingml/2011/main" xmlns:a14="http://schemas.microsoft.com/office/drawing/2010/main" xmlns:m="http://schemas.openxmlformats.org/officeDocument/2006/math" xmlns="" val="1"/>
               </a:ext>
             </a:extLst>
           </p:spPr>
@@ -4384,7 +4355,7 @@
             </a:effectLst>
             <a:extLst>
               <a:ext uri="{C572A759-6A51-4108-AA02-DFA0A04FC94B}">
-                <ma14:wrappingTextBoxFlag xmlns="" xmlns:m="http://schemas.openxmlformats.org/officeDocument/2006/math" xmlns:a14="http://schemas.microsoft.com/office/drawing/2010/main" xmlns:ma14="http://schemas.microsoft.com/office/mac/drawingml/2011/main" val="1"/>
+                <ma14:wrappingTextBoxFlag xmlns:ma14="http://schemas.microsoft.com/office/mac/drawingml/2011/main" xmlns:a14="http://schemas.microsoft.com/office/drawing/2010/main" xmlns:m="http://schemas.openxmlformats.org/officeDocument/2006/math" xmlns="" val="1"/>
               </a:ext>
             </a:extLst>
           </p:spPr>
@@ -4449,7 +4420,7 @@
             </a:effectLst>
             <a:extLst>
               <a:ext uri="{C572A759-6A51-4108-AA02-DFA0A04FC94B}">
-                <ma14:wrappingTextBoxFlag xmlns="" xmlns:m="http://schemas.openxmlformats.org/officeDocument/2006/math" xmlns:a14="http://schemas.microsoft.com/office/drawing/2010/main" xmlns:ma14="http://schemas.microsoft.com/office/mac/drawingml/2011/main" val="1"/>
+                <ma14:wrappingTextBoxFlag xmlns:ma14="http://schemas.microsoft.com/office/mac/drawingml/2011/main" xmlns:a14="http://schemas.microsoft.com/office/drawing/2010/main" xmlns:m="http://schemas.openxmlformats.org/officeDocument/2006/math" xmlns="" val="1"/>
               </a:ext>
             </a:extLst>
           </p:spPr>
@@ -4736,7 +4707,7 @@
           </a:effectLst>
           <a:extLst>
             <a:ext uri="{C572A759-6A51-4108-AA02-DFA0A04FC94B}">
-              <ma14:wrappingTextBoxFlag xmlns="" xmlns:m="http://schemas.openxmlformats.org/officeDocument/2006/math" xmlns:a14="http://schemas.microsoft.com/office/drawing/2010/main" xmlns:ma14="http://schemas.microsoft.com/office/mac/drawingml/2011/main" val="1"/>
+              <ma14:wrappingTextBoxFlag xmlns:ma14="http://schemas.microsoft.com/office/mac/drawingml/2011/main" xmlns:a14="http://schemas.microsoft.com/office/drawing/2010/main" xmlns:m="http://schemas.openxmlformats.org/officeDocument/2006/math" xmlns="" val="1"/>
             </a:ext>
           </a:extLst>
         </p:spPr>
@@ -4795,7 +4766,7 @@
           </a:effectLst>
           <a:extLst>
             <a:ext uri="{C572A759-6A51-4108-AA02-DFA0A04FC94B}">
-              <ma14:wrappingTextBoxFlag xmlns="" xmlns:m="http://schemas.openxmlformats.org/officeDocument/2006/math" xmlns:a14="http://schemas.microsoft.com/office/drawing/2010/main" xmlns:ma14="http://schemas.microsoft.com/office/mac/drawingml/2011/main" val="1"/>
+              <ma14:wrappingTextBoxFlag xmlns:ma14="http://schemas.microsoft.com/office/mac/drawingml/2011/main" xmlns:a14="http://schemas.microsoft.com/office/drawing/2010/main" xmlns:m="http://schemas.openxmlformats.org/officeDocument/2006/math" xmlns="" val="1"/>
             </a:ext>
           </a:extLst>
         </p:spPr>
@@ -4860,7 +4831,7 @@
           </a:effectLst>
           <a:extLst>
             <a:ext uri="{C572A759-6A51-4108-AA02-DFA0A04FC94B}">
-              <ma14:wrappingTextBoxFlag xmlns="" xmlns:m="http://schemas.openxmlformats.org/officeDocument/2006/math" xmlns:a14="http://schemas.microsoft.com/office/drawing/2010/main" xmlns:ma14="http://schemas.microsoft.com/office/mac/drawingml/2011/main" val="1"/>
+              <ma14:wrappingTextBoxFlag xmlns:ma14="http://schemas.microsoft.com/office/mac/drawingml/2011/main" xmlns:a14="http://schemas.microsoft.com/office/drawing/2010/main" xmlns:m="http://schemas.openxmlformats.org/officeDocument/2006/math" xmlns="" val="1"/>
             </a:ext>
           </a:extLst>
         </p:spPr>
@@ -4925,7 +4896,7 @@
           </a:effectLst>
           <a:extLst>
             <a:ext uri="{C572A759-6A51-4108-AA02-DFA0A04FC94B}">
-              <ma14:wrappingTextBoxFlag xmlns="" xmlns:m="http://schemas.openxmlformats.org/officeDocument/2006/math" xmlns:a14="http://schemas.microsoft.com/office/drawing/2010/main" xmlns:ma14="http://schemas.microsoft.com/office/mac/drawingml/2011/main" val="1"/>
+              <ma14:wrappingTextBoxFlag xmlns:ma14="http://schemas.microsoft.com/office/mac/drawingml/2011/main" xmlns:a14="http://schemas.microsoft.com/office/drawing/2010/main" xmlns:m="http://schemas.openxmlformats.org/officeDocument/2006/math" xmlns="" val="1"/>
             </a:ext>
           </a:extLst>
         </p:spPr>
@@ -4990,7 +4961,7 @@
           </a:effectLst>
           <a:extLst>
             <a:ext uri="{C572A759-6A51-4108-AA02-DFA0A04FC94B}">
-              <ma14:wrappingTextBoxFlag xmlns="" xmlns:m="http://schemas.openxmlformats.org/officeDocument/2006/math" xmlns:a14="http://schemas.microsoft.com/office/drawing/2010/main" xmlns:ma14="http://schemas.microsoft.com/office/mac/drawingml/2011/main" val="1"/>
+              <ma14:wrappingTextBoxFlag xmlns:ma14="http://schemas.microsoft.com/office/mac/drawingml/2011/main" xmlns:a14="http://schemas.microsoft.com/office/drawing/2010/main" xmlns:m="http://schemas.openxmlformats.org/officeDocument/2006/math" xmlns="" val="1"/>
             </a:ext>
           </a:extLst>
         </p:spPr>
@@ -5121,7 +5092,7 @@
             <a:effectLst/>
             <a:extLst>
               <a:ext uri="{C572A759-6A51-4108-AA02-DFA0A04FC94B}">
-                <ma14:wrappingTextBoxFlag xmlns="" xmlns:m="http://schemas.openxmlformats.org/officeDocument/2006/math" xmlns:a14="http://schemas.microsoft.com/office/drawing/2010/main" xmlns:ma14="http://schemas.microsoft.com/office/mac/drawingml/2011/main" val="1"/>
+                <ma14:wrappingTextBoxFlag xmlns:ma14="http://schemas.microsoft.com/office/mac/drawingml/2011/main" xmlns:a14="http://schemas.microsoft.com/office/drawing/2010/main" xmlns:m="http://schemas.openxmlformats.org/officeDocument/2006/math" xmlns="" val="1"/>
               </a:ext>
             </a:extLst>
           </p:spPr>
@@ -5250,7 +5221,7 @@
             <a:effectLst/>
             <a:extLst>
               <a:ext uri="{C572A759-6A51-4108-AA02-DFA0A04FC94B}">
-                <ma14:wrappingTextBoxFlag xmlns="" xmlns:m="http://schemas.openxmlformats.org/officeDocument/2006/math" xmlns:a14="http://schemas.microsoft.com/office/drawing/2010/main" xmlns:ma14="http://schemas.microsoft.com/office/mac/drawingml/2011/main" val="1"/>
+                <ma14:wrappingTextBoxFlag xmlns:ma14="http://schemas.microsoft.com/office/mac/drawingml/2011/main" xmlns:a14="http://schemas.microsoft.com/office/drawing/2010/main" xmlns:m="http://schemas.openxmlformats.org/officeDocument/2006/math" xmlns="" val="1"/>
               </a:ext>
             </a:extLst>
           </p:spPr>
@@ -5301,7 +5272,7 @@
             </a:ln>
             <a:extLst>
               <a:ext uri="{C572A759-6A51-4108-AA02-DFA0A04FC94B}">
-                <ma14:wrappingTextBoxFlag xmlns="" xmlns:m="http://schemas.openxmlformats.org/officeDocument/2006/math" xmlns:a14="http://schemas.microsoft.com/office/drawing/2010/main" xmlns:ma14="http://schemas.microsoft.com/office/mac/drawingml/2011/main" val="1"/>
+                <ma14:wrappingTextBoxFlag xmlns:ma14="http://schemas.microsoft.com/office/mac/drawingml/2011/main" xmlns:a14="http://schemas.microsoft.com/office/drawing/2010/main" xmlns:m="http://schemas.openxmlformats.org/officeDocument/2006/math" xmlns="" val="1"/>
               </a:ext>
             </a:extLst>
           </p:spPr>
@@ -5495,7 +5466,7 @@
             </a:effectLst>
             <a:extLst>
               <a:ext uri="{C572A759-6A51-4108-AA02-DFA0A04FC94B}">
-                <ma14:wrappingTextBoxFlag xmlns="" xmlns:m="http://schemas.openxmlformats.org/officeDocument/2006/math" xmlns:a14="http://schemas.microsoft.com/office/drawing/2010/main" xmlns:ma14="http://schemas.microsoft.com/office/mac/drawingml/2011/main" val="1"/>
+                <ma14:wrappingTextBoxFlag xmlns:ma14="http://schemas.microsoft.com/office/mac/drawingml/2011/main" xmlns:a14="http://schemas.microsoft.com/office/drawing/2010/main" xmlns:m="http://schemas.openxmlformats.org/officeDocument/2006/math" xmlns="" val="1"/>
               </a:ext>
             </a:extLst>
           </p:spPr>
@@ -5565,7 +5536,7 @@
             </a:effectLst>
             <a:extLst>
               <a:ext uri="{C572A759-6A51-4108-AA02-DFA0A04FC94B}">
-                <ma14:wrappingTextBoxFlag xmlns="" xmlns:m="http://schemas.openxmlformats.org/officeDocument/2006/math" xmlns:a14="http://schemas.microsoft.com/office/drawing/2010/main" xmlns:ma14="http://schemas.microsoft.com/office/mac/drawingml/2011/main" val="1"/>
+                <ma14:wrappingTextBoxFlag xmlns:ma14="http://schemas.microsoft.com/office/mac/drawingml/2011/main" xmlns:a14="http://schemas.microsoft.com/office/drawing/2010/main" xmlns:m="http://schemas.openxmlformats.org/officeDocument/2006/math" xmlns="" val="1"/>
               </a:ext>
             </a:extLst>
           </p:spPr>
@@ -5602,150 +5573,129 @@
           </p:txBody>
         </p:sp>
       </p:grpSp>
-      <p:grpSp>
-        <p:nvGrpSpPr>
-          <p:cNvPr id="33" name="Group 32">
+      <p:sp>
+        <p:nvSpPr>
+          <p:cNvPr id="83" name="Line">
             <a:extLst>
               <a:ext uri="{FF2B5EF4-FFF2-40B4-BE49-F238E27FC236}">
-                <a16:creationId xmlns:a16="http://schemas.microsoft.com/office/drawing/2014/main" id="{A511ECD1-D00E-6246-B9E4-E82EEB2F1515}"/>
+                <a16:creationId xmlns:a16="http://schemas.microsoft.com/office/drawing/2014/main" id="{3077DAEC-1021-4FDD-9040-DB33A2ACA9D4}"/>
               </a:ext>
             </a:extLst>
           </p:cNvPr>
-          <p:cNvGrpSpPr/>
+          <p:cNvSpPr/>
           <p:nvPr/>
-        </p:nvGrpSpPr>
-        <p:grpSpPr>
-          <a:xfrm>
-            <a:off x="8693530" y="6295705"/>
-            <a:ext cx="2635772" cy="527582"/>
-            <a:chOff x="8606867" y="6592416"/>
-            <a:chExt cx="2635772" cy="527582"/>
+        </p:nvSpPr>
+        <p:spPr>
+          <a:xfrm flipV="1">
+            <a:off x="8693529" y="6788727"/>
+            <a:ext cx="2653343" cy="1799"/>
           </a:xfrm>
-        </p:grpSpPr>
-        <p:sp>
-          <p:nvSpPr>
-            <p:cNvPr id="83" name="Line">
-              <a:extLst>
-                <a:ext uri="{FF2B5EF4-FFF2-40B4-BE49-F238E27FC236}">
-                  <a16:creationId xmlns:a16="http://schemas.microsoft.com/office/drawing/2014/main" id="{3077DAEC-1021-4FDD-9040-DB33A2ACA9D4}"/>
-                </a:ext>
-              </a:extLst>
-            </p:cNvPr>
-            <p:cNvSpPr/>
-            <p:nvPr/>
-          </p:nvSpPr>
-          <p:spPr>
-            <a:xfrm>
-              <a:off x="8606867" y="7087237"/>
-              <a:ext cx="2635772" cy="32761"/>
-            </a:xfrm>
-            <a:prstGeom prst="line">
-              <a:avLst/>
-            </a:prstGeom>
-            <a:ln w="38100">
+          <a:prstGeom prst="line">
+            <a:avLst/>
+          </a:prstGeom>
+          <a:ln w="38100">
+            <a:solidFill>
+              <a:schemeClr val="bg2">
+                <a:lumMod val="50000"/>
+              </a:schemeClr>
+            </a:solidFill>
+            <a:prstDash val="sysDash"/>
+            <a:tailEnd type="triangle" w="med" len="med"/>
+          </a:ln>
+        </p:spPr>
+        <p:style>
+          <a:lnRef idx="1">
+            <a:schemeClr val="accent1"/>
+          </a:lnRef>
+          <a:fillRef idx="0">
+            <a:schemeClr val="accent1"/>
+          </a:fillRef>
+          <a:effectRef idx="0">
+            <a:schemeClr val="accent1"/>
+          </a:effectRef>
+          <a:fontRef idx="minor">
+            <a:schemeClr val="tx1"/>
+          </a:fontRef>
+        </p:style>
+        <p:txBody>
+          <a:bodyPr wrap="square" lIns="50800" tIns="50800" rIns="50800" bIns="50800" numCol="1" anchor="ctr">
+            <a:noAutofit/>
+          </a:bodyPr>
+          <a:lstStyle/>
+          <a:p>
+            <a:endParaRPr b="0" dirty="0">
               <a:solidFill>
-                <a:schemeClr val="bg2">
-                  <a:lumMod val="50000"/>
-                </a:schemeClr>
+                <a:schemeClr val="tx1"/>
               </a:solidFill>
-              <a:prstDash val="sysDash"/>
-              <a:tailEnd type="triangle" w="med" len="med"/>
-            </a:ln>
-          </p:spPr>
-          <p:style>
-            <a:lnRef idx="1">
-              <a:schemeClr val="accent1"/>
-            </a:lnRef>
-            <a:fillRef idx="0">
-              <a:schemeClr val="accent1"/>
-            </a:fillRef>
-            <a:effectRef idx="0">
-              <a:schemeClr val="accent1"/>
-            </a:effectRef>
-            <a:fontRef idx="minor">
-              <a:schemeClr val="tx1"/>
-            </a:fontRef>
-          </p:style>
-          <p:txBody>
-            <a:bodyPr wrap="square" lIns="50800" tIns="50800" rIns="50800" bIns="50800" numCol="1" anchor="ctr">
-              <a:noAutofit/>
-            </a:bodyPr>
-            <a:lstStyle/>
-            <a:p>
-              <a:endParaRPr b="0" dirty="0">
-                <a:solidFill>
-                  <a:schemeClr val="tx1"/>
-                </a:solidFill>
-                <a:latin typeface="微软雅黑" panose="020B0503020204020204" pitchFamily="34" charset="-122"/>
-                <a:ea typeface="微软雅黑" panose="020B0503020204020204" pitchFamily="34" charset="-122"/>
-                <a:cs typeface="Helvetica Light"/>
-              </a:endParaRPr>
-            </a:p>
-          </p:txBody>
-        </p:sp>
-        <p:sp>
-          <p:nvSpPr>
-            <p:cNvPr id="84" name="tcp">
-              <a:extLst>
-                <a:ext uri="{FF2B5EF4-FFF2-40B4-BE49-F238E27FC236}">
-                  <a16:creationId xmlns:a16="http://schemas.microsoft.com/office/drawing/2014/main" id="{607CC97C-3C18-4338-880D-69C597A9A55C}"/>
-                </a:ext>
-              </a:extLst>
-            </p:cNvPr>
-            <p:cNvSpPr txBox="1"/>
-            <p:nvPr/>
-          </p:nvSpPr>
-          <p:spPr>
-            <a:xfrm>
-              <a:off x="9204079" y="6592416"/>
-              <a:ext cx="1327599" cy="421818"/>
-            </a:xfrm>
-            <a:prstGeom prst="rect">
-              <a:avLst/>
-            </a:prstGeom>
-            <a:ln w="12700">
-              <a:miter lim="400000"/>
-            </a:ln>
+              <a:latin typeface="微软雅黑" panose="020B0503020204020204" pitchFamily="34" charset="-122"/>
+              <a:ea typeface="微软雅黑" panose="020B0503020204020204" pitchFamily="34" charset="-122"/>
+              <a:cs typeface="Helvetica Light"/>
+            </a:endParaRPr>
+          </a:p>
+        </p:txBody>
+      </p:sp>
+      <p:sp>
+        <p:nvSpPr>
+          <p:cNvPr id="84" name="tcp">
             <a:extLst>
-              <a:ext uri="{C572A759-6A51-4108-AA02-DFA0A04FC94B}">
-                <ma14:wrappingTextBoxFlag xmlns="" xmlns:m="http://schemas.openxmlformats.org/officeDocument/2006/math" xmlns:a14="http://schemas.microsoft.com/office/drawing/2010/main" xmlns:ma14="http://schemas.microsoft.com/office/mac/drawingml/2011/main" val="1"/>
+              <a:ext uri="{FF2B5EF4-FFF2-40B4-BE49-F238E27FC236}">
+                <a16:creationId xmlns:a16="http://schemas.microsoft.com/office/drawing/2014/main" id="{607CC97C-3C18-4338-880D-69C597A9A55C}"/>
               </a:ext>
             </a:extLst>
-          </p:spPr>
-          <p:txBody>
-            <a:bodyPr lIns="50800" tIns="50800" rIns="50800" bIns="50800" anchor="ctr"/>
-            <a:lstStyle>
-              <a:lvl1pPr>
-                <a:defRPr sz="2800" b="0">
-                  <a:latin typeface="Helvetica Light"/>
-                  <a:ea typeface="Helvetica Light"/>
-                  <a:cs typeface="Helvetica Light"/>
-                  <a:sym typeface="Helvetica Light"/>
-                </a:defRPr>
-              </a:lvl1pPr>
-            </a:lstStyle>
-            <a:p>
-              <a:r>
-                <a:rPr lang="en-US" sz="1800" b="1" dirty="0">
-                  <a:solidFill>
-                    <a:srgbClr val="6C6969"/>
-                  </a:solidFill>
-                  <a:latin typeface="微软雅黑" panose="020B0503020204020204" pitchFamily="34" charset="-122"/>
-                  <a:ea typeface="微软雅黑" panose="020B0503020204020204" pitchFamily="34" charset="-122"/>
-                </a:rPr>
-                <a:t>chain</a:t>
-              </a:r>
-              <a:endParaRPr sz="1800" b="1" dirty="0">
+          </p:cNvPr>
+          <p:cNvSpPr txBox="1"/>
+          <p:nvPr/>
+        </p:nvSpPr>
+        <p:spPr>
+          <a:xfrm>
+            <a:off x="9290742" y="6295705"/>
+            <a:ext cx="1327599" cy="421818"/>
+          </a:xfrm>
+          <a:prstGeom prst="rect">
+            <a:avLst/>
+          </a:prstGeom>
+          <a:ln w="12700">
+            <a:miter lim="400000"/>
+          </a:ln>
+          <a:extLst>
+            <a:ext uri="{C572A759-6A51-4108-AA02-DFA0A04FC94B}">
+              <ma14:wrappingTextBoxFlag xmlns:ma14="http://schemas.microsoft.com/office/mac/drawingml/2011/main" xmlns:a14="http://schemas.microsoft.com/office/drawing/2010/main" xmlns:m="http://schemas.openxmlformats.org/officeDocument/2006/math" xmlns="" val="1"/>
+            </a:ext>
+          </a:extLst>
+        </p:spPr>
+        <p:txBody>
+          <a:bodyPr lIns="50800" tIns="50800" rIns="50800" bIns="50800" anchor="ctr"/>
+          <a:lstStyle>
+            <a:lvl1pPr>
+              <a:defRPr sz="2800" b="0">
+                <a:latin typeface="Helvetica Light"/>
+                <a:ea typeface="Helvetica Light"/>
+                <a:cs typeface="Helvetica Light"/>
+                <a:sym typeface="Helvetica Light"/>
+              </a:defRPr>
+            </a:lvl1pPr>
+          </a:lstStyle>
+          <a:p>
+            <a:r>
+              <a:rPr lang="en-US" sz="1800" b="1" dirty="0">
                 <a:solidFill>
                   <a:srgbClr val="6C6969"/>
                 </a:solidFill>
                 <a:latin typeface="微软雅黑" panose="020B0503020204020204" pitchFamily="34" charset="-122"/>
                 <a:ea typeface="微软雅黑" panose="020B0503020204020204" pitchFamily="34" charset="-122"/>
-              </a:endParaRPr>
-            </a:p>
-          </p:txBody>
-        </p:sp>
-      </p:grpSp>
+              </a:rPr>
+              <a:t>chain</a:t>
+            </a:r>
+            <a:endParaRPr sz="1800" b="1" dirty="0">
+              <a:solidFill>
+                <a:srgbClr val="6C6969"/>
+              </a:solidFill>
+              <a:latin typeface="微软雅黑" panose="020B0503020204020204" pitchFamily="34" charset="-122"/>
+              <a:ea typeface="微软雅黑" panose="020B0503020204020204" pitchFamily="34" charset="-122"/>
+            </a:endParaRPr>
+          </a:p>
+        </p:txBody>
+      </p:sp>
       <p:grpSp>
         <p:nvGrpSpPr>
           <p:cNvPr id="17" name="Group 16">
@@ -5798,7 +5748,7 @@
             </a:effectLst>
             <a:extLst>
               <a:ext uri="{C572A759-6A51-4108-AA02-DFA0A04FC94B}">
-                <ma14:wrappingTextBoxFlag xmlns="" xmlns:m="http://schemas.openxmlformats.org/officeDocument/2006/math" xmlns:a14="http://schemas.microsoft.com/office/drawing/2010/main" xmlns:ma14="http://schemas.microsoft.com/office/mac/drawingml/2011/main" val="1"/>
+                <ma14:wrappingTextBoxFlag xmlns:ma14="http://schemas.microsoft.com/office/mac/drawingml/2011/main" xmlns:a14="http://schemas.microsoft.com/office/drawing/2010/main" xmlns:m="http://schemas.openxmlformats.org/officeDocument/2006/math" xmlns="" val="1"/>
               </a:ext>
             </a:extLst>
           </p:spPr>
@@ -5892,7 +5842,7 @@
                 </a:effectLst>
                 <a:extLst>
                   <a:ext uri="{C572A759-6A51-4108-AA02-DFA0A04FC94B}">
-                    <ma14:wrappingTextBoxFlag xmlns="" xmlns:m="http://schemas.openxmlformats.org/officeDocument/2006/math" xmlns:a14="http://schemas.microsoft.com/office/drawing/2010/main" xmlns:ma14="http://schemas.microsoft.com/office/mac/drawingml/2011/main" val="1"/>
+                    <ma14:wrappingTextBoxFlag xmlns:ma14="http://schemas.microsoft.com/office/mac/drawingml/2011/main" xmlns:a14="http://schemas.microsoft.com/office/drawing/2010/main" xmlns:m="http://schemas.openxmlformats.org/officeDocument/2006/math" xmlns="" val="1"/>
                   </a:ext>
                 </a:extLst>
               </p:spPr>
@@ -5959,7 +5909,7 @@
                 </a:effectLst>
                 <a:extLst>
                   <a:ext uri="{C572A759-6A51-4108-AA02-DFA0A04FC94B}">
-                    <ma14:wrappingTextBoxFlag xmlns="" xmlns:m="http://schemas.openxmlformats.org/officeDocument/2006/math" xmlns:a14="http://schemas.microsoft.com/office/drawing/2010/main" xmlns:ma14="http://schemas.microsoft.com/office/mac/drawingml/2011/main" val="1"/>
+                    <ma14:wrappingTextBoxFlag xmlns:ma14="http://schemas.microsoft.com/office/mac/drawingml/2011/main" xmlns:a14="http://schemas.microsoft.com/office/drawing/2010/main" xmlns:m="http://schemas.openxmlformats.org/officeDocument/2006/math" xmlns="" val="1"/>
                   </a:ext>
                 </a:extLst>
               </p:spPr>
@@ -6044,7 +5994,7 @@
                 </a:effectLst>
                 <a:extLst>
                   <a:ext uri="{C572A759-6A51-4108-AA02-DFA0A04FC94B}">
-                    <ma14:wrappingTextBoxFlag xmlns="" xmlns:m="http://schemas.openxmlformats.org/officeDocument/2006/math" xmlns:a14="http://schemas.microsoft.com/office/drawing/2010/main" xmlns:ma14="http://schemas.microsoft.com/office/mac/drawingml/2011/main" val="1"/>
+                    <ma14:wrappingTextBoxFlag xmlns:ma14="http://schemas.microsoft.com/office/mac/drawingml/2011/main" xmlns:a14="http://schemas.microsoft.com/office/drawing/2010/main" xmlns:m="http://schemas.openxmlformats.org/officeDocument/2006/math" xmlns="" val="1"/>
                   </a:ext>
                 </a:extLst>
               </p:spPr>
@@ -6111,7 +6061,7 @@
                 </a:effectLst>
                 <a:extLst>
                   <a:ext uri="{C572A759-6A51-4108-AA02-DFA0A04FC94B}">
-                    <ma14:wrappingTextBoxFlag xmlns="" xmlns:m="http://schemas.openxmlformats.org/officeDocument/2006/math" xmlns:a14="http://schemas.microsoft.com/office/drawing/2010/main" xmlns:ma14="http://schemas.microsoft.com/office/mac/drawingml/2011/main" val="1"/>
+                    <ma14:wrappingTextBoxFlag xmlns:ma14="http://schemas.microsoft.com/office/mac/drawingml/2011/main" xmlns:a14="http://schemas.microsoft.com/office/drawing/2010/main" xmlns:m="http://schemas.openxmlformats.org/officeDocument/2006/math" xmlns="" val="1"/>
                   </a:ext>
                 </a:extLst>
               </p:spPr>
@@ -6200,7 +6150,7 @@
                 </a:effectLst>
                 <a:extLst>
                   <a:ext uri="{C572A759-6A51-4108-AA02-DFA0A04FC94B}">
-                    <ma14:wrappingTextBoxFlag xmlns="" xmlns:m="http://schemas.openxmlformats.org/officeDocument/2006/math" xmlns:a14="http://schemas.microsoft.com/office/drawing/2010/main" xmlns:ma14="http://schemas.microsoft.com/office/mac/drawingml/2011/main" val="1"/>
+                    <ma14:wrappingTextBoxFlag xmlns:ma14="http://schemas.microsoft.com/office/mac/drawingml/2011/main" xmlns:a14="http://schemas.microsoft.com/office/drawing/2010/main" xmlns:m="http://schemas.openxmlformats.org/officeDocument/2006/math" xmlns="" val="1"/>
                   </a:ext>
                 </a:extLst>
               </p:spPr>
@@ -6267,7 +6217,7 @@
                 </a:effectLst>
                 <a:extLst>
                   <a:ext uri="{C572A759-6A51-4108-AA02-DFA0A04FC94B}">
-                    <ma14:wrappingTextBoxFlag xmlns="" xmlns:m="http://schemas.openxmlformats.org/officeDocument/2006/math" xmlns:a14="http://schemas.microsoft.com/office/drawing/2010/main" xmlns:ma14="http://schemas.microsoft.com/office/mac/drawingml/2011/main" val="1"/>
+                    <ma14:wrappingTextBoxFlag xmlns:ma14="http://schemas.microsoft.com/office/mac/drawingml/2011/main" xmlns:a14="http://schemas.microsoft.com/office/drawing/2010/main" xmlns:m="http://schemas.openxmlformats.org/officeDocument/2006/math" xmlns="" val="1"/>
                   </a:ext>
                 </a:extLst>
               </p:spPr>
@@ -6352,7 +6302,7 @@
                 </a:effectLst>
                 <a:extLst>
                   <a:ext uri="{C572A759-6A51-4108-AA02-DFA0A04FC94B}">
-                    <ma14:wrappingTextBoxFlag xmlns="" xmlns:m="http://schemas.openxmlformats.org/officeDocument/2006/math" xmlns:a14="http://schemas.microsoft.com/office/drawing/2010/main" xmlns:ma14="http://schemas.microsoft.com/office/mac/drawingml/2011/main" val="1"/>
+                    <ma14:wrappingTextBoxFlag xmlns:ma14="http://schemas.microsoft.com/office/mac/drawingml/2011/main" xmlns:a14="http://schemas.microsoft.com/office/drawing/2010/main" xmlns:m="http://schemas.openxmlformats.org/officeDocument/2006/math" xmlns="" val="1"/>
                   </a:ext>
                 </a:extLst>
               </p:spPr>
@@ -6419,7 +6369,7 @@
                 </a:effectLst>
                 <a:extLst>
                   <a:ext uri="{C572A759-6A51-4108-AA02-DFA0A04FC94B}">
-                    <ma14:wrappingTextBoxFlag xmlns="" xmlns:m="http://schemas.openxmlformats.org/officeDocument/2006/math" xmlns:a14="http://schemas.microsoft.com/office/drawing/2010/main" xmlns:ma14="http://schemas.microsoft.com/office/mac/drawingml/2011/main" val="1"/>
+                    <ma14:wrappingTextBoxFlag xmlns:ma14="http://schemas.microsoft.com/office/mac/drawingml/2011/main" xmlns:a14="http://schemas.microsoft.com/office/drawing/2010/main" xmlns:m="http://schemas.openxmlformats.org/officeDocument/2006/math" xmlns="" val="1"/>
                   </a:ext>
                 </a:extLst>
               </p:spPr>
@@ -6510,7 +6460,7 @@
                 </a:effectLst>
                 <a:extLst>
                   <a:ext uri="{C572A759-6A51-4108-AA02-DFA0A04FC94B}">
-                    <ma14:wrappingTextBoxFlag xmlns="" xmlns:m="http://schemas.openxmlformats.org/officeDocument/2006/math" xmlns:a14="http://schemas.microsoft.com/office/drawing/2010/main" xmlns:ma14="http://schemas.microsoft.com/office/mac/drawingml/2011/main" val="1"/>
+                    <ma14:wrappingTextBoxFlag xmlns:ma14="http://schemas.microsoft.com/office/mac/drawingml/2011/main" xmlns:a14="http://schemas.microsoft.com/office/drawing/2010/main" xmlns:m="http://schemas.openxmlformats.org/officeDocument/2006/math" xmlns="" val="1"/>
                   </a:ext>
                 </a:extLst>
               </p:spPr>
@@ -6600,7 +6550,7 @@
                 </a:effectLst>
                 <a:extLst>
                   <a:ext uri="{C572A759-6A51-4108-AA02-DFA0A04FC94B}">
-                    <ma14:wrappingTextBoxFlag xmlns="" xmlns:m="http://schemas.openxmlformats.org/officeDocument/2006/math" xmlns:a14="http://schemas.microsoft.com/office/drawing/2010/main" xmlns:ma14="http://schemas.microsoft.com/office/mac/drawingml/2011/main" val="1"/>
+                    <ma14:wrappingTextBoxFlag xmlns:ma14="http://schemas.microsoft.com/office/mac/drawingml/2011/main" xmlns:a14="http://schemas.microsoft.com/office/drawing/2010/main" xmlns:m="http://schemas.openxmlformats.org/officeDocument/2006/math" xmlns="" val="1"/>
                   </a:ext>
                 </a:extLst>
               </p:spPr>
@@ -6711,7 +6661,7 @@
               </a:effectLst>
               <a:extLst>
                 <a:ext uri="{C572A759-6A51-4108-AA02-DFA0A04FC94B}">
-                  <ma14:wrappingTextBoxFlag xmlns="" xmlns:m="http://schemas.openxmlformats.org/officeDocument/2006/math" xmlns:a14="http://schemas.microsoft.com/office/drawing/2010/main" xmlns:ma14="http://schemas.microsoft.com/office/mac/drawingml/2011/main" val="1"/>
+                  <ma14:wrappingTextBoxFlag xmlns:ma14="http://schemas.microsoft.com/office/mac/drawingml/2011/main" xmlns:a14="http://schemas.microsoft.com/office/drawing/2010/main" xmlns:m="http://schemas.openxmlformats.org/officeDocument/2006/math" xmlns="" val="1"/>
                 </a:ext>
               </a:extLst>
             </p:spPr>
@@ -6797,7 +6747,7 @@
               </a:effectLst>
               <a:extLst>
                 <a:ext uri="{C572A759-6A51-4108-AA02-DFA0A04FC94B}">
-                  <ma14:wrappingTextBoxFlag xmlns="" xmlns:m="http://schemas.openxmlformats.org/officeDocument/2006/math" xmlns:a14="http://schemas.microsoft.com/office/drawing/2010/main" xmlns:ma14="http://schemas.microsoft.com/office/mac/drawingml/2011/main" val="1"/>
+                  <ma14:wrappingTextBoxFlag xmlns:ma14="http://schemas.microsoft.com/office/mac/drawingml/2011/main" xmlns:a14="http://schemas.microsoft.com/office/drawing/2010/main" xmlns:m="http://schemas.openxmlformats.org/officeDocument/2006/math" xmlns="" val="1"/>
                 </a:ext>
               </a:extLst>
             </p:spPr>
@@ -6861,7 +6811,7 @@
               </a:effectLst>
               <a:extLst>
                 <a:ext uri="{C572A759-6A51-4108-AA02-DFA0A04FC94B}">
-                  <ma14:wrappingTextBoxFlag xmlns="" xmlns:m="http://schemas.openxmlformats.org/officeDocument/2006/math" xmlns:a14="http://schemas.microsoft.com/office/drawing/2010/main" xmlns:ma14="http://schemas.microsoft.com/office/mac/drawingml/2011/main" val="1"/>
+                  <ma14:wrappingTextBoxFlag xmlns:ma14="http://schemas.microsoft.com/office/mac/drawingml/2011/main" xmlns:a14="http://schemas.microsoft.com/office/drawing/2010/main" xmlns:m="http://schemas.openxmlformats.org/officeDocument/2006/math" xmlns="" val="1"/>
                 </a:ext>
               </a:extLst>
             </p:spPr>
@@ -6935,7 +6885,7 @@
               </a:effectLst>
               <a:extLst>
                 <a:ext uri="{C572A759-6A51-4108-AA02-DFA0A04FC94B}">
-                  <ma14:wrappingTextBoxFlag xmlns="" xmlns:m="http://schemas.openxmlformats.org/officeDocument/2006/math" xmlns:a14="http://schemas.microsoft.com/office/drawing/2010/main" xmlns:ma14="http://schemas.microsoft.com/office/mac/drawingml/2011/main" val="1"/>
+                  <ma14:wrappingTextBoxFlag xmlns:ma14="http://schemas.microsoft.com/office/mac/drawingml/2011/main" xmlns:a14="http://schemas.microsoft.com/office/drawing/2010/main" xmlns:m="http://schemas.openxmlformats.org/officeDocument/2006/math" xmlns="" val="1"/>
                 </a:ext>
               </a:extLst>
             </p:spPr>
@@ -7030,7 +6980,7 @@
               </a:effectLst>
               <a:extLst>
                 <a:ext uri="{C572A759-6A51-4108-AA02-DFA0A04FC94B}">
-                  <ma14:wrappingTextBoxFlag xmlns="" xmlns:m="http://schemas.openxmlformats.org/officeDocument/2006/math" xmlns:a14="http://schemas.microsoft.com/office/drawing/2010/main" xmlns:ma14="http://schemas.microsoft.com/office/mac/drawingml/2011/main" val="1"/>
+                  <ma14:wrappingTextBoxFlag xmlns:ma14="http://schemas.microsoft.com/office/mac/drawingml/2011/main" xmlns:a14="http://schemas.microsoft.com/office/drawing/2010/main" xmlns:m="http://schemas.openxmlformats.org/officeDocument/2006/math" xmlns="" val="1"/>
                 </a:ext>
               </a:extLst>
             </p:spPr>
@@ -7060,18 +7010,7 @@
                     <a:ea typeface="微软雅黑" panose="020B0503020204020204" pitchFamily="34" charset="-122"/>
                     <a:cs typeface="Helvetica Light"/>
                   </a:rPr>
-                  <a:t>(</a:t>
-                </a:r>
-                <a:r>
-                  <a:rPr lang="en-US" altLang="zh-CN" dirty="0" err="1">
-                    <a:solidFill>
-                      <a:schemeClr val="tx1"/>
-                    </a:solidFill>
-                    <a:latin typeface="微软雅黑" panose="020B0503020204020204" pitchFamily="34" charset="-122"/>
-                    <a:ea typeface="微软雅黑" panose="020B0503020204020204" pitchFamily="34" charset="-122"/>
-                    <a:cs typeface="Helvetica Light"/>
-                  </a:rPr>
-                  <a:t>opentracing</a:t>
+                  <a:t>(opentracing</a:t>
                 </a:r>
                 <a:r>
                   <a:rPr lang="zh-CN" altLang="en-US" dirty="0">
@@ -7144,7 +7083,7 @@
               </a:effectLst>
               <a:extLst>
                 <a:ext uri="{C572A759-6A51-4108-AA02-DFA0A04FC94B}">
-                  <ma14:wrappingTextBoxFlag xmlns="" xmlns:m="http://schemas.openxmlformats.org/officeDocument/2006/math" xmlns:a14="http://schemas.microsoft.com/office/drawing/2010/main" xmlns:ma14="http://schemas.microsoft.com/office/mac/drawingml/2011/main" val="1"/>
+                  <ma14:wrappingTextBoxFlag xmlns:ma14="http://schemas.microsoft.com/office/mac/drawingml/2011/main" xmlns:a14="http://schemas.microsoft.com/office/drawing/2010/main" xmlns:m="http://schemas.openxmlformats.org/officeDocument/2006/math" xmlns="" val="1"/>
                 </a:ext>
               </a:extLst>
             </p:spPr>
@@ -7218,7 +7157,7 @@
               </a:effectLst>
               <a:extLst>
                 <a:ext uri="{C572A759-6A51-4108-AA02-DFA0A04FC94B}">
-                  <ma14:wrappingTextBoxFlag xmlns="" xmlns:m="http://schemas.openxmlformats.org/officeDocument/2006/math" xmlns:a14="http://schemas.microsoft.com/office/drawing/2010/main" xmlns:ma14="http://schemas.microsoft.com/office/mac/drawingml/2011/main" val="1"/>
+                  <ma14:wrappingTextBoxFlag xmlns:ma14="http://schemas.microsoft.com/office/mac/drawingml/2011/main" xmlns:a14="http://schemas.microsoft.com/office/drawing/2010/main" xmlns:m="http://schemas.openxmlformats.org/officeDocument/2006/math" xmlns="" val="1"/>
                 </a:ext>
               </a:extLst>
             </p:spPr>
@@ -7292,7 +7231,7 @@
               </a:effectLst>
               <a:extLst>
                 <a:ext uri="{C572A759-6A51-4108-AA02-DFA0A04FC94B}">
-                  <ma14:wrappingTextBoxFlag xmlns="" xmlns:m="http://schemas.openxmlformats.org/officeDocument/2006/math" xmlns:a14="http://schemas.microsoft.com/office/drawing/2010/main" xmlns:ma14="http://schemas.microsoft.com/office/mac/drawingml/2011/main" val="1"/>
+                  <ma14:wrappingTextBoxFlag xmlns:ma14="http://schemas.microsoft.com/office/mac/drawingml/2011/main" xmlns:a14="http://schemas.microsoft.com/office/drawing/2010/main" xmlns:m="http://schemas.openxmlformats.org/officeDocument/2006/math" xmlns="" val="1"/>
                 </a:ext>
               </a:extLst>
             </p:spPr>
@@ -7385,7 +7324,7 @@
             </a:effectLst>
             <a:extLst>
               <a:ext uri="{C572A759-6A51-4108-AA02-DFA0A04FC94B}">
-                <ma14:wrappingTextBoxFlag xmlns="" xmlns:m="http://schemas.openxmlformats.org/officeDocument/2006/math" xmlns:a14="http://schemas.microsoft.com/office/drawing/2010/main" xmlns:ma14="http://schemas.microsoft.com/office/mac/drawingml/2011/main" val="1"/>
+                <ma14:wrappingTextBoxFlag xmlns:ma14="http://schemas.microsoft.com/office/mac/drawingml/2011/main" xmlns:a14="http://schemas.microsoft.com/office/drawing/2010/main" xmlns:m="http://schemas.openxmlformats.org/officeDocument/2006/math" xmlns="" val="1"/>
               </a:ext>
             </a:extLst>
           </p:spPr>
@@ -7443,7 +7382,7 @@
             </a:effectLst>
             <a:extLst>
               <a:ext uri="{C572A759-6A51-4108-AA02-DFA0A04FC94B}">
-                <ma14:wrappingTextBoxFlag xmlns="" xmlns:m="http://schemas.openxmlformats.org/officeDocument/2006/math" xmlns:a14="http://schemas.microsoft.com/office/drawing/2010/main" xmlns:ma14="http://schemas.microsoft.com/office/mac/drawingml/2011/main" val="1"/>
+                <ma14:wrappingTextBoxFlag xmlns:ma14="http://schemas.microsoft.com/office/mac/drawingml/2011/main" xmlns:a14="http://schemas.microsoft.com/office/drawing/2010/main" xmlns:m="http://schemas.openxmlformats.org/officeDocument/2006/math" xmlns="" val="1"/>
               </a:ext>
             </a:extLst>
           </p:spPr>
@@ -7513,7 +7452,7 @@
             </a:effectLst>
             <a:extLst>
               <a:ext uri="{C572A759-6A51-4108-AA02-DFA0A04FC94B}">
-                <ma14:wrappingTextBoxFlag xmlns="" xmlns:m="http://schemas.openxmlformats.org/officeDocument/2006/math" xmlns:a14="http://schemas.microsoft.com/office/drawing/2010/main" xmlns:ma14="http://schemas.microsoft.com/office/mac/drawingml/2011/main" val="1"/>
+                <ma14:wrappingTextBoxFlag xmlns:ma14="http://schemas.microsoft.com/office/mac/drawingml/2011/main" xmlns:a14="http://schemas.microsoft.com/office/drawing/2010/main" xmlns:m="http://schemas.openxmlformats.org/officeDocument/2006/math" xmlns="" val="1"/>
               </a:ext>
             </a:extLst>
           </p:spPr>
@@ -7583,7 +7522,7 @@
             </a:effectLst>
             <a:extLst>
               <a:ext uri="{C572A759-6A51-4108-AA02-DFA0A04FC94B}">
-                <ma14:wrappingTextBoxFlag xmlns="" xmlns:m="http://schemas.openxmlformats.org/officeDocument/2006/math" xmlns:a14="http://schemas.microsoft.com/office/drawing/2010/main" xmlns:ma14="http://schemas.microsoft.com/office/mac/drawingml/2011/main" val="1"/>
+                <ma14:wrappingTextBoxFlag xmlns:ma14="http://schemas.microsoft.com/office/mac/drawingml/2011/main" xmlns:a14="http://schemas.microsoft.com/office/drawing/2010/main" xmlns:m="http://schemas.openxmlformats.org/officeDocument/2006/math" xmlns="" val="1"/>
               </a:ext>
             </a:extLst>
           </p:spPr>
@@ -7653,7 +7592,7 @@
             </a:effectLst>
             <a:extLst>
               <a:ext uri="{C572A759-6A51-4108-AA02-DFA0A04FC94B}">
-                <ma14:wrappingTextBoxFlag xmlns="" xmlns:m="http://schemas.openxmlformats.org/officeDocument/2006/math" xmlns:a14="http://schemas.microsoft.com/office/drawing/2010/main" xmlns:ma14="http://schemas.microsoft.com/office/mac/drawingml/2011/main" val="1"/>
+                <ma14:wrappingTextBoxFlag xmlns:ma14="http://schemas.microsoft.com/office/mac/drawingml/2011/main" xmlns:a14="http://schemas.microsoft.com/office/drawing/2010/main" xmlns:m="http://schemas.openxmlformats.org/officeDocument/2006/math" xmlns="" val="1"/>
               </a:ext>
             </a:extLst>
           </p:spPr>
@@ -7880,7 +7819,7 @@
           </a:effectLst>
           <a:extLst>
             <a:ext uri="{C572A759-6A51-4108-AA02-DFA0A04FC94B}">
-              <ma14:wrappingTextBoxFlag xmlns="" xmlns:m="http://schemas.openxmlformats.org/officeDocument/2006/math" xmlns:a14="http://schemas.microsoft.com/office/drawing/2010/main" xmlns:ma14="http://schemas.microsoft.com/office/mac/drawingml/2011/main" val="1"/>
+              <ma14:wrappingTextBoxFlag xmlns:ma14="http://schemas.microsoft.com/office/mac/drawingml/2011/main" xmlns:a14="http://schemas.microsoft.com/office/drawing/2010/main" xmlns:m="http://schemas.openxmlformats.org/officeDocument/2006/math" xmlns="" val="1"/>
             </a:ext>
           </a:extLst>
         </p:spPr>
@@ -7912,294 +7851,177 @@
           </a:p>
         </p:txBody>
       </p:sp>
-      <p:grpSp>
-        <p:nvGrpSpPr>
-          <p:cNvPr id="23" name="Group 22">
+      <p:sp>
+        <p:nvSpPr>
+          <p:cNvPr id="188" name="http"/>
+          <p:cNvSpPr txBox="1"/>
+          <p:nvPr/>
+        </p:nvSpPr>
+        <p:spPr>
+          <a:xfrm>
+            <a:off x="8577972" y="3269362"/>
+            <a:ext cx="2633254" cy="417378"/>
+          </a:xfrm>
+          <a:prstGeom prst="rect">
+            <a:avLst/>
+          </a:prstGeom>
+          <a:ln w="12700">
+            <a:miter lim="400000"/>
+          </a:ln>
+          <a:extLst>
+            <a:ext uri="{C572A759-6A51-4108-AA02-DFA0A04FC94B}">
+              <ma14:wrappingTextBoxFlag xmlns:ma14="http://schemas.microsoft.com/office/mac/drawingml/2011/main" xmlns:a14="http://schemas.microsoft.com/office/drawing/2010/main" xmlns:m="http://schemas.openxmlformats.org/officeDocument/2006/math" xmlns="" val="1"/>
+            </a:ext>
+          </a:extLst>
+        </p:spPr>
+        <p:txBody>
+          <a:bodyPr lIns="50800" tIns="50800" rIns="50800" bIns="50800" anchor="ctr"/>
+          <a:lstStyle>
+            <a:lvl1pPr>
+              <a:defRPr sz="2800" b="0">
+                <a:latin typeface="Helvetica Light"/>
+                <a:ea typeface="Helvetica Light"/>
+                <a:cs typeface="Helvetica Light"/>
+                <a:sym typeface="Helvetica Light"/>
+              </a:defRPr>
+            </a:lvl1pPr>
+          </a:lstStyle>
+          <a:p>
+            <a:r>
+              <a:rPr sz="1800" b="1" dirty="0">
+                <a:solidFill>
+                  <a:srgbClr val="6C6969"/>
+                </a:solidFill>
+                <a:latin typeface="微软雅黑" panose="020B0503020204020204" pitchFamily="34" charset="-122"/>
+                <a:ea typeface="微软雅黑" panose="020B0503020204020204" pitchFamily="34" charset="-122"/>
+              </a:rPr>
+              <a:t>http</a:t>
+            </a:r>
+          </a:p>
+        </p:txBody>
+      </p:sp>
+      <p:sp>
+        <p:nvSpPr>
+          <p:cNvPr id="153" name="http">
             <a:extLst>
               <a:ext uri="{FF2B5EF4-FFF2-40B4-BE49-F238E27FC236}">
-                <a16:creationId xmlns:a16="http://schemas.microsoft.com/office/drawing/2014/main" id="{35AA70E8-E69C-0643-88BE-0CBBA209AA87}"/>
+                <a16:creationId xmlns:a16="http://schemas.microsoft.com/office/drawing/2014/main" id="{78FE8375-9D23-C24E-8A3A-D2D86C4DF751}"/>
               </a:ext>
             </a:extLst>
           </p:cNvPr>
-          <p:cNvGrpSpPr/>
+          <p:cNvSpPr txBox="1"/>
           <p:nvPr/>
-        </p:nvGrpSpPr>
-        <p:grpSpPr>
+        </p:nvSpPr>
+        <p:spPr>
           <a:xfrm>
-            <a:off x="8577972" y="3269362"/>
-            <a:ext cx="2641572" cy="2094654"/>
-            <a:chOff x="7841020" y="3626173"/>
-            <a:chExt cx="2641572" cy="2094654"/>
+            <a:off x="8586290" y="4844255"/>
+            <a:ext cx="2633254" cy="417378"/>
           </a:xfrm>
-        </p:grpSpPr>
-        <p:grpSp>
-          <p:nvGrpSpPr>
-            <p:cNvPr id="20" name="Group 19">
-              <a:extLst>
-                <a:ext uri="{FF2B5EF4-FFF2-40B4-BE49-F238E27FC236}">
-                  <a16:creationId xmlns:a16="http://schemas.microsoft.com/office/drawing/2014/main" id="{D46ACC89-7C4C-B145-8E8A-8A3EDA33559D}"/>
-                </a:ext>
-              </a:extLst>
-            </p:cNvPr>
-            <p:cNvGrpSpPr/>
-            <p:nvPr/>
-          </p:nvGrpSpPr>
-          <p:grpSpPr>
-            <a:xfrm>
-              <a:off x="7841020" y="3626173"/>
-              <a:ext cx="2633254" cy="519761"/>
-              <a:chOff x="7841020" y="3626173"/>
-              <a:chExt cx="2633254" cy="519761"/>
-            </a:xfrm>
-          </p:grpSpPr>
-          <p:sp>
-            <p:nvSpPr>
-              <p:cNvPr id="188" name="http"/>
-              <p:cNvSpPr txBox="1"/>
-              <p:nvPr/>
-            </p:nvSpPr>
-            <p:spPr>
-              <a:xfrm>
-                <a:off x="7841020" y="3626173"/>
-                <a:ext cx="2633254" cy="417378"/>
-              </a:xfrm>
-              <a:prstGeom prst="rect">
-                <a:avLst/>
-              </a:prstGeom>
-              <a:ln w="12700">
-                <a:miter lim="400000"/>
-              </a:ln>
-              <a:extLst>
-                <a:ext uri="{C572A759-6A51-4108-AA02-DFA0A04FC94B}">
-                  <ma14:wrappingTextBoxFlag xmlns="" xmlns:m="http://schemas.openxmlformats.org/officeDocument/2006/math" xmlns:a14="http://schemas.microsoft.com/office/drawing/2010/main" xmlns:ma14="http://schemas.microsoft.com/office/mac/drawingml/2011/main" val="1"/>
-                </a:ext>
-              </a:extLst>
-            </p:spPr>
-            <p:txBody>
-              <a:bodyPr lIns="50800" tIns="50800" rIns="50800" bIns="50800" anchor="ctr"/>
-              <a:lstStyle>
-                <a:lvl1pPr>
-                  <a:defRPr sz="2800" b="0">
-                    <a:latin typeface="Helvetica Light"/>
-                    <a:ea typeface="Helvetica Light"/>
-                    <a:cs typeface="Helvetica Light"/>
-                    <a:sym typeface="Helvetica Light"/>
-                  </a:defRPr>
-                </a:lvl1pPr>
-              </a:lstStyle>
-              <a:p>
-                <a:r>
-                  <a:rPr sz="1800" b="1" dirty="0">
-                    <a:solidFill>
-                      <a:srgbClr val="6C6969"/>
-                    </a:solidFill>
-                    <a:latin typeface="微软雅黑" panose="020B0503020204020204" pitchFamily="34" charset="-122"/>
-                    <a:ea typeface="微软雅黑" panose="020B0503020204020204" pitchFamily="34" charset="-122"/>
-                  </a:rPr>
-                  <a:t>http</a:t>
-                </a:r>
-              </a:p>
-            </p:txBody>
-          </p:sp>
-          <p:sp>
-            <p:nvSpPr>
-              <p:cNvPr id="204" name="Line"/>
-              <p:cNvSpPr/>
-              <p:nvPr/>
-            </p:nvSpPr>
-            <p:spPr>
-              <a:xfrm>
-                <a:off x="8547312" y="4118799"/>
-                <a:ext cx="1353430" cy="27135"/>
-              </a:xfrm>
-              <a:prstGeom prst="line">
-                <a:avLst/>
-              </a:prstGeom>
-              <a:ln w="38100">
+          <a:prstGeom prst="rect">
+            <a:avLst/>
+          </a:prstGeom>
+          <a:ln w="12700">
+            <a:miter lim="400000"/>
+          </a:ln>
+          <a:extLst>
+            <a:ext uri="{C572A759-6A51-4108-AA02-DFA0A04FC94B}">
+              <ma14:wrappingTextBoxFlag xmlns:ma14="http://schemas.microsoft.com/office/mac/drawingml/2011/main" xmlns:a14="http://schemas.microsoft.com/office/drawing/2010/main" xmlns:m="http://schemas.openxmlformats.org/officeDocument/2006/math" xmlns="" val="1"/>
+            </a:ext>
+          </a:extLst>
+        </p:spPr>
+        <p:txBody>
+          <a:bodyPr lIns="50800" tIns="50800" rIns="50800" bIns="50800" anchor="ctr"/>
+          <a:lstStyle>
+            <a:lvl1pPr>
+              <a:defRPr sz="2800" b="0">
+                <a:latin typeface="Helvetica Light"/>
+                <a:ea typeface="Helvetica Light"/>
+                <a:cs typeface="Helvetica Light"/>
+                <a:sym typeface="Helvetica Light"/>
+              </a:defRPr>
+            </a:lvl1pPr>
+          </a:lstStyle>
+          <a:p>
+            <a:r>
+              <a:rPr lang="en-US" altLang="zh-CN" sz="1800" b="1" dirty="0">
                 <a:solidFill>
-                  <a:schemeClr val="bg2">
-                    <a:lumMod val="50000"/>
-                  </a:schemeClr>
+                  <a:srgbClr val="6C6969"/>
                 </a:solidFill>
-                <a:tailEnd type="triangle" w="med" len="med"/>
-              </a:ln>
-            </p:spPr>
-            <p:style>
-              <a:lnRef idx="1">
-                <a:schemeClr val="accent1"/>
-              </a:lnRef>
-              <a:fillRef idx="0">
-                <a:schemeClr val="accent1"/>
-              </a:fillRef>
-              <a:effectRef idx="0">
-                <a:schemeClr val="accent1"/>
-              </a:effectRef>
-              <a:fontRef idx="minor">
+                <a:latin typeface="微软雅黑" panose="020B0503020204020204" pitchFamily="34" charset="-122"/>
+                <a:ea typeface="微软雅黑" panose="020B0503020204020204" pitchFamily="34" charset="-122"/>
+              </a:rPr>
+              <a:t>tcp</a:t>
+            </a:r>
+            <a:endParaRPr sz="1800" b="1" dirty="0">
+              <a:solidFill>
+                <a:srgbClr val="6C6969"/>
+              </a:solidFill>
+              <a:latin typeface="微软雅黑" panose="020B0503020204020204" pitchFamily="34" charset="-122"/>
+              <a:ea typeface="微软雅黑" panose="020B0503020204020204" pitchFamily="34" charset="-122"/>
+            </a:endParaRPr>
+          </a:p>
+        </p:txBody>
+      </p:sp>
+      <p:sp>
+        <p:nvSpPr>
+          <p:cNvPr id="154" name="Line">
+            <a:extLst>
+              <a:ext uri="{FF2B5EF4-FFF2-40B4-BE49-F238E27FC236}">
+                <a16:creationId xmlns:a16="http://schemas.microsoft.com/office/drawing/2014/main" id="{7CD7CDA5-AFBB-3F4C-883D-778914E6934D}"/>
+              </a:ext>
+            </a:extLst>
+          </p:cNvPr>
+          <p:cNvSpPr/>
+          <p:nvPr/>
+        </p:nvSpPr>
+        <p:spPr>
+          <a:xfrm>
+            <a:off x="9292582" y="5336882"/>
+            <a:ext cx="1325759" cy="0"/>
+          </a:xfrm>
+          <a:prstGeom prst="line">
+            <a:avLst/>
+          </a:prstGeom>
+          <a:ln w="38100">
+            <a:solidFill>
+              <a:schemeClr val="bg2">
+                <a:lumMod val="50000"/>
+              </a:schemeClr>
+            </a:solidFill>
+            <a:tailEnd type="triangle" w="med" len="med"/>
+          </a:ln>
+        </p:spPr>
+        <p:style>
+          <a:lnRef idx="1">
+            <a:schemeClr val="accent1"/>
+          </a:lnRef>
+          <a:fillRef idx="0">
+            <a:schemeClr val="accent1"/>
+          </a:fillRef>
+          <a:effectRef idx="0">
+            <a:schemeClr val="accent1"/>
+          </a:effectRef>
+          <a:fontRef idx="minor">
+            <a:schemeClr val="tx1"/>
+          </a:fontRef>
+        </p:style>
+        <p:txBody>
+          <a:bodyPr wrap="square" lIns="50800" tIns="50800" rIns="50800" bIns="50800" numCol="1" anchor="ctr">
+            <a:noAutofit/>
+          </a:bodyPr>
+          <a:lstStyle/>
+          <a:p>
+            <a:endParaRPr b="0">
+              <a:solidFill>
                 <a:schemeClr val="tx1"/>
-              </a:fontRef>
-            </p:style>
-            <p:txBody>
-              <a:bodyPr wrap="square" lIns="50800" tIns="50800" rIns="50800" bIns="50800" numCol="1" anchor="ctr">
-                <a:noAutofit/>
-              </a:bodyPr>
-              <a:lstStyle/>
-              <a:p>
-                <a:endParaRPr b="0">
-                  <a:solidFill>
-                    <a:schemeClr val="tx1"/>
-                  </a:solidFill>
-                  <a:latin typeface="微软雅黑" panose="020B0503020204020204" pitchFamily="34" charset="-122"/>
-                  <a:ea typeface="微软雅黑" panose="020B0503020204020204" pitchFamily="34" charset="-122"/>
-                  <a:cs typeface="Helvetica Light"/>
-                </a:endParaRPr>
-              </a:p>
-            </p:txBody>
-          </p:sp>
-        </p:grpSp>
-        <p:grpSp>
-          <p:nvGrpSpPr>
-            <p:cNvPr id="152" name="Group 151">
-              <a:extLst>
-                <a:ext uri="{FF2B5EF4-FFF2-40B4-BE49-F238E27FC236}">
-                  <a16:creationId xmlns:a16="http://schemas.microsoft.com/office/drawing/2014/main" id="{4275FB0C-1C26-E743-82A2-D88B9DC788A1}"/>
-                </a:ext>
-              </a:extLst>
-            </p:cNvPr>
-            <p:cNvGrpSpPr/>
-            <p:nvPr/>
-          </p:nvGrpSpPr>
-          <p:grpSpPr>
-            <a:xfrm>
-              <a:off x="7849338" y="5201066"/>
-              <a:ext cx="2633254" cy="519761"/>
-              <a:chOff x="7841020" y="3626173"/>
-              <a:chExt cx="2633254" cy="519761"/>
-            </a:xfrm>
-          </p:grpSpPr>
-          <p:sp>
-            <p:nvSpPr>
-              <p:cNvPr id="153" name="http">
-                <a:extLst>
-                  <a:ext uri="{FF2B5EF4-FFF2-40B4-BE49-F238E27FC236}">
-                    <a16:creationId xmlns:a16="http://schemas.microsoft.com/office/drawing/2014/main" id="{78FE8375-9D23-C24E-8A3A-D2D86C4DF751}"/>
-                  </a:ext>
-                </a:extLst>
-              </p:cNvPr>
-              <p:cNvSpPr txBox="1"/>
-              <p:nvPr/>
-            </p:nvSpPr>
-            <p:spPr>
-              <a:xfrm>
-                <a:off x="7841020" y="3626173"/>
-                <a:ext cx="2633254" cy="417378"/>
-              </a:xfrm>
-              <a:prstGeom prst="rect">
-                <a:avLst/>
-              </a:prstGeom>
-              <a:ln w="12700">
-                <a:miter lim="400000"/>
-              </a:ln>
-              <a:extLst>
-                <a:ext uri="{C572A759-6A51-4108-AA02-DFA0A04FC94B}">
-                  <ma14:wrappingTextBoxFlag xmlns="" xmlns:m="http://schemas.openxmlformats.org/officeDocument/2006/math" xmlns:a14="http://schemas.microsoft.com/office/drawing/2010/main" xmlns:ma14="http://schemas.microsoft.com/office/mac/drawingml/2011/main" val="1"/>
-                </a:ext>
-              </a:extLst>
-            </p:spPr>
-            <p:txBody>
-              <a:bodyPr lIns="50800" tIns="50800" rIns="50800" bIns="50800" anchor="ctr"/>
-              <a:lstStyle>
-                <a:lvl1pPr>
-                  <a:defRPr sz="2800" b="0">
-                    <a:latin typeface="Helvetica Light"/>
-                    <a:ea typeface="Helvetica Light"/>
-                    <a:cs typeface="Helvetica Light"/>
-                    <a:sym typeface="Helvetica Light"/>
-                  </a:defRPr>
-                </a:lvl1pPr>
-              </a:lstStyle>
-              <a:p>
-                <a:r>
-                  <a:rPr lang="en-US" altLang="zh-CN" sz="1800" b="1" dirty="0" err="1">
-                    <a:solidFill>
-                      <a:srgbClr val="6C6969"/>
-                    </a:solidFill>
-                    <a:latin typeface="微软雅黑" panose="020B0503020204020204" pitchFamily="34" charset="-122"/>
-                    <a:ea typeface="微软雅黑" panose="020B0503020204020204" pitchFamily="34" charset="-122"/>
-                  </a:rPr>
-                  <a:t>tcp</a:t>
-                </a:r>
-                <a:endParaRPr sz="1800" b="1" dirty="0">
-                  <a:solidFill>
-                    <a:srgbClr val="6C6969"/>
-                  </a:solidFill>
-                  <a:latin typeface="微软雅黑" panose="020B0503020204020204" pitchFamily="34" charset="-122"/>
-                  <a:ea typeface="微软雅黑" panose="020B0503020204020204" pitchFamily="34" charset="-122"/>
-                </a:endParaRPr>
-              </a:p>
-            </p:txBody>
-          </p:sp>
-          <p:sp>
-            <p:nvSpPr>
-              <p:cNvPr id="154" name="Line">
-                <a:extLst>
-                  <a:ext uri="{FF2B5EF4-FFF2-40B4-BE49-F238E27FC236}">
-                    <a16:creationId xmlns:a16="http://schemas.microsoft.com/office/drawing/2014/main" id="{7CD7CDA5-AFBB-3F4C-883D-778914E6934D}"/>
-                  </a:ext>
-                </a:extLst>
-              </p:cNvPr>
-              <p:cNvSpPr/>
-              <p:nvPr/>
-            </p:nvSpPr>
-            <p:spPr>
-              <a:xfrm>
-                <a:off x="8547312" y="4118799"/>
-                <a:ext cx="1353430" cy="27135"/>
-              </a:xfrm>
-              <a:prstGeom prst="line">
-                <a:avLst/>
-              </a:prstGeom>
-              <a:ln w="38100">
-                <a:solidFill>
-                  <a:schemeClr val="bg2">
-                    <a:lumMod val="50000"/>
-                  </a:schemeClr>
-                </a:solidFill>
-                <a:tailEnd type="triangle" w="med" len="med"/>
-              </a:ln>
-            </p:spPr>
-            <p:style>
-              <a:lnRef idx="1">
-                <a:schemeClr val="accent1"/>
-              </a:lnRef>
-              <a:fillRef idx="0">
-                <a:schemeClr val="accent1"/>
-              </a:fillRef>
-              <a:effectRef idx="0">
-                <a:schemeClr val="accent1"/>
-              </a:effectRef>
-              <a:fontRef idx="minor">
-                <a:schemeClr val="tx1"/>
-              </a:fontRef>
-            </p:style>
-            <p:txBody>
-              <a:bodyPr wrap="square" lIns="50800" tIns="50800" rIns="50800" bIns="50800" numCol="1" anchor="ctr">
-                <a:noAutofit/>
-              </a:bodyPr>
-              <a:lstStyle/>
-              <a:p>
-                <a:endParaRPr b="0">
-                  <a:solidFill>
-                    <a:schemeClr val="tx1"/>
-                  </a:solidFill>
-                  <a:latin typeface="微软雅黑" panose="020B0503020204020204" pitchFamily="34" charset="-122"/>
-                  <a:ea typeface="微软雅黑" panose="020B0503020204020204" pitchFamily="34" charset="-122"/>
-                  <a:cs typeface="Helvetica Light"/>
-                </a:endParaRPr>
-              </a:p>
-            </p:txBody>
-          </p:sp>
-        </p:grpSp>
-      </p:grpSp>
+              </a:solidFill>
+              <a:latin typeface="微软雅黑" panose="020B0503020204020204" pitchFamily="34" charset="-122"/>
+              <a:ea typeface="微软雅黑" panose="020B0503020204020204" pitchFamily="34" charset="-122"/>
+              <a:cs typeface="Helvetica Light"/>
+            </a:endParaRPr>
+          </a:p>
+        </p:txBody>
+      </p:sp>
       <p:grpSp>
         <p:nvGrpSpPr>
           <p:cNvPr id="155" name="Group 154">
@@ -8261,7 +8083,7 @@
             </a:effectLst>
             <a:extLst>
               <a:ext uri="{C572A759-6A51-4108-AA02-DFA0A04FC94B}">
-                <ma14:wrappingTextBoxFlag xmlns="" xmlns:m="http://schemas.openxmlformats.org/officeDocument/2006/math" xmlns:a14="http://schemas.microsoft.com/office/drawing/2010/main" xmlns:ma14="http://schemas.microsoft.com/office/mac/drawingml/2011/main" val="1"/>
+                <ma14:wrappingTextBoxFlag xmlns:ma14="http://schemas.microsoft.com/office/mac/drawingml/2011/main" xmlns:a14="http://schemas.microsoft.com/office/drawing/2010/main" xmlns:m="http://schemas.openxmlformats.org/officeDocument/2006/math" xmlns="" val="1"/>
               </a:ext>
             </a:extLst>
           </p:spPr>
@@ -8325,7 +8147,7 @@
             </a:effectLst>
             <a:extLst>
               <a:ext uri="{C572A759-6A51-4108-AA02-DFA0A04FC94B}">
-                <ma14:wrappingTextBoxFlag xmlns="" xmlns:m="http://schemas.openxmlformats.org/officeDocument/2006/math" xmlns:a14="http://schemas.microsoft.com/office/drawing/2010/main" xmlns:ma14="http://schemas.microsoft.com/office/mac/drawingml/2011/main" val="1"/>
+                <ma14:wrappingTextBoxFlag xmlns:ma14="http://schemas.microsoft.com/office/mac/drawingml/2011/main" xmlns:a14="http://schemas.microsoft.com/office/drawing/2010/main" xmlns:m="http://schemas.openxmlformats.org/officeDocument/2006/math" xmlns="" val="1"/>
               </a:ext>
             </a:extLst>
           </p:spPr>
@@ -8395,7 +8217,7 @@
             </a:effectLst>
             <a:extLst>
               <a:ext uri="{C572A759-6A51-4108-AA02-DFA0A04FC94B}">
-                <ma14:wrappingTextBoxFlag xmlns="" xmlns:m="http://schemas.openxmlformats.org/officeDocument/2006/math" xmlns:a14="http://schemas.microsoft.com/office/drawing/2010/main" xmlns:ma14="http://schemas.microsoft.com/office/mac/drawingml/2011/main" val="1"/>
+                <ma14:wrappingTextBoxFlag xmlns:ma14="http://schemas.microsoft.com/office/mac/drawingml/2011/main" xmlns:a14="http://schemas.microsoft.com/office/drawing/2010/main" xmlns:m="http://schemas.openxmlformats.org/officeDocument/2006/math" xmlns="" val="1"/>
               </a:ext>
             </a:extLst>
           </p:spPr>
@@ -8465,7 +8287,7 @@
             </a:effectLst>
             <a:extLst>
               <a:ext uri="{C572A759-6A51-4108-AA02-DFA0A04FC94B}">
-                <ma14:wrappingTextBoxFlag xmlns="" xmlns:m="http://schemas.openxmlformats.org/officeDocument/2006/math" xmlns:a14="http://schemas.microsoft.com/office/drawing/2010/main" xmlns:ma14="http://schemas.microsoft.com/office/mac/drawingml/2011/main" val="1"/>
+                <ma14:wrappingTextBoxFlag xmlns:ma14="http://schemas.microsoft.com/office/mac/drawingml/2011/main" xmlns:a14="http://schemas.microsoft.com/office/drawing/2010/main" xmlns:m="http://schemas.openxmlformats.org/officeDocument/2006/math" xmlns="" val="1"/>
               </a:ext>
             </a:extLst>
           </p:spPr>
@@ -8535,7 +8357,7 @@
             </a:effectLst>
             <a:extLst>
               <a:ext uri="{C572A759-6A51-4108-AA02-DFA0A04FC94B}">
-                <ma14:wrappingTextBoxFlag xmlns="" xmlns:m="http://schemas.openxmlformats.org/officeDocument/2006/math" xmlns:a14="http://schemas.microsoft.com/office/drawing/2010/main" xmlns:ma14="http://schemas.microsoft.com/office/mac/drawingml/2011/main" val="1"/>
+                <ma14:wrappingTextBoxFlag xmlns:ma14="http://schemas.microsoft.com/office/mac/drawingml/2011/main" xmlns:a14="http://schemas.microsoft.com/office/drawing/2010/main" xmlns:m="http://schemas.openxmlformats.org/officeDocument/2006/math" xmlns="" val="1"/>
               </a:ext>
             </a:extLst>
           </p:spPr>
@@ -8626,7 +8448,7 @@
             </a:effectLst>
             <a:extLst>
               <a:ext uri="{C572A759-6A51-4108-AA02-DFA0A04FC94B}">
-                <ma14:wrappingTextBoxFlag xmlns="" xmlns:m="http://schemas.openxmlformats.org/officeDocument/2006/math" xmlns:a14="http://schemas.microsoft.com/office/drawing/2010/main" xmlns:ma14="http://schemas.microsoft.com/office/mac/drawingml/2011/main" val="1"/>
+                <ma14:wrappingTextBoxFlag xmlns:ma14="http://schemas.microsoft.com/office/mac/drawingml/2011/main" xmlns:a14="http://schemas.microsoft.com/office/drawing/2010/main" xmlns:m="http://schemas.openxmlformats.org/officeDocument/2006/math" xmlns="" val="1"/>
               </a:ext>
             </a:extLst>
           </p:spPr>
@@ -8696,7 +8518,7 @@
             </a:effectLst>
             <a:extLst>
               <a:ext uri="{C572A759-6A51-4108-AA02-DFA0A04FC94B}">
-                <ma14:wrappingTextBoxFlag xmlns="" xmlns:m="http://schemas.openxmlformats.org/officeDocument/2006/math" xmlns:a14="http://schemas.microsoft.com/office/drawing/2010/main" xmlns:ma14="http://schemas.microsoft.com/office/mac/drawingml/2011/main" val="1"/>
+                <ma14:wrappingTextBoxFlag xmlns:ma14="http://schemas.microsoft.com/office/mac/drawingml/2011/main" xmlns:a14="http://schemas.microsoft.com/office/drawing/2010/main" xmlns:m="http://schemas.openxmlformats.org/officeDocument/2006/math" xmlns="" val="1"/>
               </a:ext>
             </a:extLst>
           </p:spPr>
@@ -8794,7 +8616,7 @@
             </a:effectLst>
             <a:extLst>
               <a:ext uri="{C572A759-6A51-4108-AA02-DFA0A04FC94B}">
-                <ma14:wrappingTextBoxFlag xmlns="" xmlns:m="http://schemas.openxmlformats.org/officeDocument/2006/math" xmlns:a14="http://schemas.microsoft.com/office/drawing/2010/main" xmlns:ma14="http://schemas.microsoft.com/office/mac/drawingml/2011/main" val="1"/>
+                <ma14:wrappingTextBoxFlag xmlns:ma14="http://schemas.microsoft.com/office/mac/drawingml/2011/main" xmlns:a14="http://schemas.microsoft.com/office/drawing/2010/main" xmlns:m="http://schemas.openxmlformats.org/officeDocument/2006/math" xmlns="" val="1"/>
               </a:ext>
             </a:extLst>
           </p:spPr>
@@ -8850,7 +8672,7 @@
             </a:effectLst>
             <a:extLst>
               <a:ext uri="{C572A759-6A51-4108-AA02-DFA0A04FC94B}">
-                <ma14:wrappingTextBoxFlag xmlns="" xmlns:m="http://schemas.openxmlformats.org/officeDocument/2006/math" xmlns:a14="http://schemas.microsoft.com/office/drawing/2010/main" xmlns:ma14="http://schemas.microsoft.com/office/mac/drawingml/2011/main" val="1"/>
+                <ma14:wrappingTextBoxFlag xmlns:ma14="http://schemas.microsoft.com/office/mac/drawingml/2011/main" xmlns:a14="http://schemas.microsoft.com/office/drawing/2010/main" xmlns:m="http://schemas.openxmlformats.org/officeDocument/2006/math" xmlns="" val="1"/>
               </a:ext>
             </a:extLst>
           </p:spPr>
@@ -8906,7 +8728,7 @@
             </a:effectLst>
             <a:extLst>
               <a:ext uri="{C572A759-6A51-4108-AA02-DFA0A04FC94B}">
-                <ma14:wrappingTextBoxFlag xmlns="" xmlns:m="http://schemas.openxmlformats.org/officeDocument/2006/math" xmlns:a14="http://schemas.microsoft.com/office/drawing/2010/main" xmlns:ma14="http://schemas.microsoft.com/office/mac/drawingml/2011/main" val="1"/>
+                <ma14:wrappingTextBoxFlag xmlns:ma14="http://schemas.microsoft.com/office/mac/drawingml/2011/main" xmlns:a14="http://schemas.microsoft.com/office/drawing/2010/main" xmlns:m="http://schemas.openxmlformats.org/officeDocument/2006/math" xmlns="" val="1"/>
               </a:ext>
             </a:extLst>
           </p:spPr>
@@ -8975,7 +8797,7 @@
             </a:effectLst>
             <a:extLst>
               <a:ext uri="{C572A759-6A51-4108-AA02-DFA0A04FC94B}">
-                <ma14:wrappingTextBoxFlag xmlns="" xmlns:m="http://schemas.openxmlformats.org/officeDocument/2006/math" xmlns:a14="http://schemas.microsoft.com/office/drawing/2010/main" xmlns:ma14="http://schemas.microsoft.com/office/mac/drawingml/2011/main" val="1"/>
+                <ma14:wrappingTextBoxFlag xmlns:ma14="http://schemas.microsoft.com/office/mac/drawingml/2011/main" xmlns:a14="http://schemas.microsoft.com/office/drawing/2010/main" xmlns:m="http://schemas.openxmlformats.org/officeDocument/2006/math" xmlns="" val="1"/>
               </a:ext>
             </a:extLst>
           </p:spPr>
@@ -9013,184 +8835,163 @@
           </p:txBody>
         </p:sp>
       </p:grpSp>
-      <p:grpSp>
-        <p:nvGrpSpPr>
-          <p:cNvPr id="166" name="Group 165">
+      <p:sp>
+        <p:nvSpPr>
+          <p:cNvPr id="167" name="cluster &amp; load balance">
             <a:extLst>
               <a:ext uri="{FF2B5EF4-FFF2-40B4-BE49-F238E27FC236}">
-                <a16:creationId xmlns:a16="http://schemas.microsoft.com/office/drawing/2014/main" id="{FDE47C66-BB18-F84F-9A1B-B0795C8F6B25}"/>
+                <a16:creationId xmlns:a16="http://schemas.microsoft.com/office/drawing/2014/main" id="{02566AE0-DBB1-CB4A-AF41-3033717F74BF}"/>
               </a:ext>
             </a:extLst>
           </p:cNvPr>
-          <p:cNvGrpSpPr/>
+          <p:cNvSpPr/>
           <p:nvPr/>
-        </p:nvGrpSpPr>
-        <p:grpSpPr>
+        </p:nvSpPr>
+        <p:spPr>
           <a:xfrm>
-            <a:off x="3273595" y="2817305"/>
+            <a:off x="3286765" y="2804631"/>
             <a:ext cx="1255462" cy="2880000"/>
-            <a:chOff x="2383951" y="3132668"/>
-            <a:chExt cx="1255462" cy="2880000"/>
           </a:xfrm>
-        </p:grpSpPr>
-        <p:sp>
-          <p:nvSpPr>
-            <p:cNvPr id="167" name="cluster &amp; load balance">
-              <a:extLst>
-                <a:ext uri="{FF2B5EF4-FFF2-40B4-BE49-F238E27FC236}">
-                  <a16:creationId xmlns:a16="http://schemas.microsoft.com/office/drawing/2014/main" id="{02566AE0-DBB1-CB4A-AF41-3033717F74BF}"/>
-                </a:ext>
-              </a:extLst>
-            </p:cNvPr>
-            <p:cNvSpPr/>
-            <p:nvPr/>
-          </p:nvSpPr>
-          <p:spPr>
-            <a:xfrm>
-              <a:off x="2383951" y="3132668"/>
-              <a:ext cx="1255462" cy="2880000"/>
-            </a:xfrm>
-            <a:prstGeom prst="roundRect">
-              <a:avLst>
-                <a:gd name="adj" fmla="val 3763"/>
-              </a:avLst>
-            </a:prstGeom>
-            <a:solidFill>
-              <a:schemeClr val="bg1">
-                <a:lumMod val="75000"/>
-              </a:schemeClr>
-            </a:solidFill>
-            <a:ln w="12700" cap="flat">
-              <a:noFill/>
-              <a:prstDash val="solid"/>
-              <a:miter lim="400000"/>
-            </a:ln>
-            <a:effectLst>
-              <a:outerShdw blurRad="50800" dist="38100" dir="5400000" algn="t" rotWithShape="0">
-                <a:prstClr val="black">
-                  <a:alpha val="40000"/>
-                </a:prstClr>
-              </a:outerShdw>
-            </a:effectLst>
-            <a:extLst>
-              <a:ext uri="{C572A759-6A51-4108-AA02-DFA0A04FC94B}">
-                <ma14:wrappingTextBoxFlag xmlns="" xmlns:m="http://schemas.openxmlformats.org/officeDocument/2006/math" xmlns:a14="http://schemas.microsoft.com/office/drawing/2010/main" xmlns:ma14="http://schemas.microsoft.com/office/mac/drawingml/2011/main" val="1"/>
-              </a:ext>
-            </a:extLst>
-          </p:spPr>
-          <p:txBody>
-            <a:bodyPr wrap="square" lIns="50800" tIns="50800" rIns="50800" bIns="50800" numCol="1" anchor="t">
-              <a:noAutofit/>
-            </a:bodyPr>
-            <a:lstStyle/>
-            <a:p>
-              <a:r>
-                <a:rPr lang="en-US" altLang="zh-CN" sz="1700" b="0" dirty="0">
-                  <a:latin typeface="微软雅黑" panose="020B0503020204020204" pitchFamily="34" charset="-122"/>
-                  <a:ea typeface="微软雅黑" panose="020B0503020204020204" pitchFamily="34" charset="-122"/>
-                  <a:cs typeface="Helvetica Light"/>
-                </a:rPr>
-                <a:t>Router</a:t>
-              </a:r>
-              <a:endParaRPr sz="1700" b="0" dirty="0">
+          <a:prstGeom prst="roundRect">
+            <a:avLst>
+              <a:gd name="adj" fmla="val 3763"/>
+            </a:avLst>
+          </a:prstGeom>
+          <a:solidFill>
+            <a:schemeClr val="bg1">
+              <a:lumMod val="75000"/>
+            </a:schemeClr>
+          </a:solidFill>
+          <a:ln w="12700" cap="flat">
+            <a:noFill/>
+            <a:prstDash val="solid"/>
+            <a:miter lim="400000"/>
+          </a:ln>
+          <a:effectLst>
+            <a:outerShdw blurRad="50800" dist="38100" dir="5400000" algn="t" rotWithShape="0">
+              <a:prstClr val="black">
+                <a:alpha val="40000"/>
+              </a:prstClr>
+            </a:outerShdw>
+          </a:effectLst>
+          <a:extLst>
+            <a:ext uri="{C572A759-6A51-4108-AA02-DFA0A04FC94B}">
+              <ma14:wrappingTextBoxFlag xmlns:ma14="http://schemas.microsoft.com/office/mac/drawingml/2011/main" xmlns:a14="http://schemas.microsoft.com/office/drawing/2010/main" xmlns:m="http://schemas.openxmlformats.org/officeDocument/2006/math" xmlns="" val="1"/>
+            </a:ext>
+          </a:extLst>
+        </p:spPr>
+        <p:txBody>
+          <a:bodyPr wrap="square" lIns="50800" tIns="50800" rIns="50800" bIns="50800" numCol="1" anchor="t">
+            <a:noAutofit/>
+          </a:bodyPr>
+          <a:lstStyle/>
+          <a:p>
+            <a:r>
+              <a:rPr lang="en-US" altLang="zh-CN" sz="1700" b="0" dirty="0">
                 <a:latin typeface="微软雅黑" panose="020B0503020204020204" pitchFamily="34" charset="-122"/>
                 <a:ea typeface="微软雅黑" panose="020B0503020204020204" pitchFamily="34" charset="-122"/>
                 <a:cs typeface="Helvetica Light"/>
-              </a:endParaRPr>
-            </a:p>
-          </p:txBody>
-        </p:sp>
-        <p:sp>
-          <p:nvSpPr>
-            <p:cNvPr id="169" name="failfast">
-              <a:extLst>
-                <a:ext uri="{FF2B5EF4-FFF2-40B4-BE49-F238E27FC236}">
-                  <a16:creationId xmlns:a16="http://schemas.microsoft.com/office/drawing/2014/main" id="{1862D8CC-B8A7-514C-84EF-EE4C76D950EE}"/>
-                </a:ext>
-              </a:extLst>
-            </p:cNvPr>
-            <p:cNvSpPr/>
-            <p:nvPr/>
-          </p:nvSpPr>
-          <p:spPr>
-            <a:xfrm>
-              <a:off x="2396021" y="4247899"/>
-              <a:ext cx="1230475" cy="624473"/>
-            </a:xfrm>
-            <a:prstGeom prst="roundRect">
-              <a:avLst/>
-            </a:prstGeom>
-            <a:solidFill>
-              <a:schemeClr val="accent4"/>
-            </a:solidFill>
-            <a:ln w="12700" cap="flat">
-              <a:noFill/>
-              <a:miter lim="400000"/>
-            </a:ln>
-            <a:effectLst>
-              <a:outerShdw blurRad="38100" dist="25400" dir="5400000" rotWithShape="0">
-                <a:srgbClr val="000000">
-                  <a:alpha val="50000"/>
-                </a:srgbClr>
-              </a:outerShdw>
-            </a:effectLst>
+              </a:rPr>
+              <a:t>Router</a:t>
+            </a:r>
+            <a:endParaRPr sz="1700" b="0" dirty="0">
+              <a:latin typeface="微软雅黑" panose="020B0503020204020204" pitchFamily="34" charset="-122"/>
+              <a:ea typeface="微软雅黑" panose="020B0503020204020204" pitchFamily="34" charset="-122"/>
+              <a:cs typeface="Helvetica Light"/>
+            </a:endParaRPr>
+          </a:p>
+        </p:txBody>
+      </p:sp>
+      <p:sp>
+        <p:nvSpPr>
+          <p:cNvPr id="169" name="failfast">
             <a:extLst>
-              <a:ext uri="{C572A759-6A51-4108-AA02-DFA0A04FC94B}">
-                <ma14:wrappingTextBoxFlag xmlns="" xmlns:m="http://schemas.openxmlformats.org/officeDocument/2006/math" xmlns:a14="http://schemas.microsoft.com/office/drawing/2010/main" xmlns:ma14="http://schemas.microsoft.com/office/mac/drawingml/2011/main" val="1"/>
+              <a:ext uri="{FF2B5EF4-FFF2-40B4-BE49-F238E27FC236}">
+                <a16:creationId xmlns:a16="http://schemas.microsoft.com/office/drawing/2014/main" id="{1862D8CC-B8A7-514C-84EF-EE4C76D950EE}"/>
               </a:ext>
             </a:extLst>
-          </p:spPr>
-          <p:txBody>
-            <a:bodyPr wrap="square" lIns="50800" tIns="50800" rIns="50800" bIns="50800" numCol="1" anchor="ctr">
-              <a:noAutofit/>
-            </a:bodyPr>
-            <a:lstStyle/>
-            <a:p>
-              <a:r>
-                <a:rPr lang="en-US" altLang="zh-CN" sz="1500" b="0" dirty="0">
-                  <a:solidFill>
-                    <a:sysClr val="windowText" lastClr="000000"/>
-                  </a:solidFill>
-                  <a:latin typeface="微软雅黑" panose="020B0503020204020204" pitchFamily="34" charset="-122"/>
-                  <a:ea typeface="微软雅黑" panose="020B0503020204020204" pitchFamily="34" charset="-122"/>
-                  <a:cs typeface="Helvetica Light"/>
-                </a:rPr>
-                <a:t>Condition</a:t>
-              </a:r>
-              <a:r>
-                <a:rPr lang="zh-CN" altLang="en-US" sz="1500" b="0" dirty="0">
-                  <a:solidFill>
-                    <a:sysClr val="windowText" lastClr="000000"/>
-                  </a:solidFill>
-                  <a:latin typeface="微软雅黑" panose="020B0503020204020204" pitchFamily="34" charset="-122"/>
-                  <a:ea typeface="微软雅黑" panose="020B0503020204020204" pitchFamily="34" charset="-122"/>
-                  <a:cs typeface="Helvetica Light"/>
-                </a:rPr>
-                <a:t> </a:t>
-              </a:r>
-              <a:r>
-                <a:rPr lang="en-US" altLang="zh-CN" sz="1500" b="0" dirty="0">
-                  <a:solidFill>
-                    <a:sysClr val="windowText" lastClr="000000"/>
-                  </a:solidFill>
-                  <a:latin typeface="微软雅黑" panose="020B0503020204020204" pitchFamily="34" charset="-122"/>
-                  <a:ea typeface="微软雅黑" panose="020B0503020204020204" pitchFamily="34" charset="-122"/>
-                  <a:cs typeface="Helvetica Light"/>
-                </a:rPr>
-                <a:t>router</a:t>
-              </a:r>
-              <a:endParaRPr sz="1500" b="0" dirty="0">
+          </p:cNvPr>
+          <p:cNvSpPr/>
+          <p:nvPr/>
+        </p:nvSpPr>
+        <p:spPr>
+          <a:xfrm>
+            <a:off x="3380476" y="3533948"/>
+            <a:ext cx="1068459" cy="624473"/>
+          </a:xfrm>
+          <a:prstGeom prst="roundRect">
+            <a:avLst/>
+          </a:prstGeom>
+          <a:solidFill>
+            <a:schemeClr val="accent4"/>
+          </a:solidFill>
+          <a:ln w="12700" cap="flat">
+            <a:noFill/>
+            <a:miter lim="400000"/>
+          </a:ln>
+          <a:effectLst>
+            <a:outerShdw blurRad="38100" dist="25400" dir="5400000" rotWithShape="0">
+              <a:srgbClr val="000000">
+                <a:alpha val="50000"/>
+              </a:srgbClr>
+            </a:outerShdw>
+          </a:effectLst>
+          <a:extLst>
+            <a:ext uri="{C572A759-6A51-4108-AA02-DFA0A04FC94B}">
+              <ma14:wrappingTextBoxFlag xmlns:ma14="http://schemas.microsoft.com/office/mac/drawingml/2011/main" xmlns:a14="http://schemas.microsoft.com/office/drawing/2010/main" xmlns:m="http://schemas.openxmlformats.org/officeDocument/2006/math" xmlns="" val="1"/>
+            </a:ext>
+          </a:extLst>
+        </p:spPr>
+        <p:txBody>
+          <a:bodyPr wrap="square" lIns="50800" tIns="50800" rIns="50800" bIns="50800" numCol="1" anchor="ctr">
+            <a:noAutofit/>
+          </a:bodyPr>
+          <a:lstStyle/>
+          <a:p>
+            <a:r>
+              <a:rPr lang="en-US" altLang="zh-CN" sz="1500" b="0" dirty="0">
                 <a:solidFill>
                   <a:sysClr val="windowText" lastClr="000000"/>
                 </a:solidFill>
                 <a:latin typeface="微软雅黑" panose="020B0503020204020204" pitchFamily="34" charset="-122"/>
                 <a:ea typeface="微软雅黑" panose="020B0503020204020204" pitchFamily="34" charset="-122"/>
                 <a:cs typeface="Helvetica Light"/>
-              </a:endParaRPr>
-            </a:p>
-          </p:txBody>
-        </p:sp>
-      </p:grpSp>
+              </a:rPr>
+              <a:t>Condition</a:t>
+            </a:r>
+            <a:r>
+              <a:rPr lang="zh-CN" altLang="en-US" sz="1500" b="0" dirty="0">
+                <a:solidFill>
+                  <a:sysClr val="windowText" lastClr="000000"/>
+                </a:solidFill>
+                <a:latin typeface="微软雅黑" panose="020B0503020204020204" pitchFamily="34" charset="-122"/>
+                <a:ea typeface="微软雅黑" panose="020B0503020204020204" pitchFamily="34" charset="-122"/>
+                <a:cs typeface="Helvetica Light"/>
+              </a:rPr>
+              <a:t> </a:t>
+            </a:r>
+            <a:r>
+              <a:rPr lang="en-US" altLang="zh-CN" sz="1500" b="0" dirty="0">
+                <a:solidFill>
+                  <a:sysClr val="windowText" lastClr="000000"/>
+                </a:solidFill>
+                <a:latin typeface="微软雅黑" panose="020B0503020204020204" pitchFamily="34" charset="-122"/>
+                <a:ea typeface="微软雅黑" panose="020B0503020204020204" pitchFamily="34" charset="-122"/>
+                <a:cs typeface="Helvetica Light"/>
+              </a:rPr>
+              <a:t>router</a:t>
+            </a:r>
+            <a:endParaRPr sz="1500" b="0" dirty="0">
+              <a:solidFill>
+                <a:sysClr val="windowText" lastClr="000000"/>
+              </a:solidFill>
+              <a:latin typeface="微软雅黑" panose="020B0503020204020204" pitchFamily="34" charset="-122"/>
+              <a:ea typeface="微软雅黑" panose="020B0503020204020204" pitchFamily="34" charset="-122"/>
+              <a:cs typeface="Helvetica Light"/>
+            </a:endParaRPr>
+          </a:p>
+        </p:txBody>
+      </p:sp>
       <p:sp>
         <p:nvSpPr>
           <p:cNvPr id="179" name="Line">
@@ -9372,7 +9173,7 @@
             </a:effectLst>
             <a:extLst>
               <a:ext uri="{C572A759-6A51-4108-AA02-DFA0A04FC94B}">
-                <ma14:wrappingTextBoxFlag xmlns="" xmlns:m="http://schemas.openxmlformats.org/officeDocument/2006/math" xmlns:a14="http://schemas.microsoft.com/office/drawing/2010/main" xmlns:ma14="http://schemas.microsoft.com/office/mac/drawingml/2011/main" val="1"/>
+                <ma14:wrappingTextBoxFlag xmlns:ma14="http://schemas.microsoft.com/office/mac/drawingml/2011/main" xmlns:a14="http://schemas.microsoft.com/office/drawing/2010/main" xmlns:m="http://schemas.openxmlformats.org/officeDocument/2006/math" xmlns="" val="1"/>
               </a:ext>
             </a:extLst>
           </p:spPr>
@@ -9451,7 +9252,7 @@
               </a:effectLst>
               <a:extLst>
                 <a:ext uri="{C572A759-6A51-4108-AA02-DFA0A04FC94B}">
-                  <ma14:wrappingTextBoxFlag xmlns="" xmlns:m="http://schemas.openxmlformats.org/officeDocument/2006/math" xmlns:a14="http://schemas.microsoft.com/office/drawing/2010/main" xmlns:ma14="http://schemas.microsoft.com/office/mac/drawingml/2011/main" val="1"/>
+                  <ma14:wrappingTextBoxFlag xmlns:ma14="http://schemas.microsoft.com/office/mac/drawingml/2011/main" xmlns:a14="http://schemas.microsoft.com/office/drawing/2010/main" xmlns:m="http://schemas.openxmlformats.org/officeDocument/2006/math" xmlns="" val="1"/>
                 </a:ext>
               </a:extLst>
             </p:spPr>
@@ -9524,7 +9325,7 @@
               </a:effectLst>
               <a:extLst>
                 <a:ext uri="{C572A759-6A51-4108-AA02-DFA0A04FC94B}">
-                  <ma14:wrappingTextBoxFlag xmlns="" xmlns:m="http://schemas.openxmlformats.org/officeDocument/2006/math" xmlns:a14="http://schemas.microsoft.com/office/drawing/2010/main" xmlns:ma14="http://schemas.microsoft.com/office/mac/drawingml/2011/main" val="1"/>
+                  <ma14:wrappingTextBoxFlag xmlns:ma14="http://schemas.microsoft.com/office/mac/drawingml/2011/main" xmlns:a14="http://schemas.microsoft.com/office/drawing/2010/main" xmlns:m="http://schemas.openxmlformats.org/officeDocument/2006/math" xmlns="" val="1"/>
                 </a:ext>
               </a:extLst>
             </p:spPr>
@@ -9584,7 +9385,7 @@
               </a:effectLst>
               <a:extLst>
                 <a:ext uri="{C572A759-6A51-4108-AA02-DFA0A04FC94B}">
-                  <ma14:wrappingTextBoxFlag xmlns="" xmlns:m="http://schemas.openxmlformats.org/officeDocument/2006/math" xmlns:a14="http://schemas.microsoft.com/office/drawing/2010/main" xmlns:ma14="http://schemas.microsoft.com/office/mac/drawingml/2011/main" val="1"/>
+                  <ma14:wrappingTextBoxFlag xmlns:ma14="http://schemas.microsoft.com/office/mac/drawingml/2011/main" xmlns:a14="http://schemas.microsoft.com/office/drawing/2010/main" xmlns:m="http://schemas.openxmlformats.org/officeDocument/2006/math" xmlns="" val="1"/>
                 </a:ext>
               </a:extLst>
             </p:spPr>
@@ -9651,7 +9452,7 @@
           </a:effectLst>
           <a:extLst>
             <a:ext uri="{C572A759-6A51-4108-AA02-DFA0A04FC94B}">
-              <ma14:wrappingTextBoxFlag xmlns="" xmlns:m="http://schemas.openxmlformats.org/officeDocument/2006/math" xmlns:a14="http://schemas.microsoft.com/office/drawing/2010/main" xmlns:ma14="http://schemas.microsoft.com/office/mac/drawingml/2011/main" val="1"/>
+              <ma14:wrappingTextBoxFlag xmlns:ma14="http://schemas.microsoft.com/office/mac/drawingml/2011/main" xmlns:a14="http://schemas.microsoft.com/office/drawing/2010/main" xmlns:m="http://schemas.openxmlformats.org/officeDocument/2006/math" xmlns="" val="1"/>
             </a:ext>
           </a:extLst>
         </p:spPr>
@@ -9715,7 +9516,7 @@
           </a:effectLst>
           <a:extLst>
             <a:ext uri="{C572A759-6A51-4108-AA02-DFA0A04FC94B}">
-              <ma14:wrappingTextBoxFlag xmlns="" xmlns:m="http://schemas.openxmlformats.org/officeDocument/2006/math" xmlns:a14="http://schemas.microsoft.com/office/drawing/2010/main" xmlns:ma14="http://schemas.microsoft.com/office/mac/drawingml/2011/main" val="1"/>
+              <ma14:wrappingTextBoxFlag xmlns:ma14="http://schemas.microsoft.com/office/mac/drawingml/2011/main" xmlns:a14="http://schemas.microsoft.com/office/drawing/2010/main" xmlns:m="http://schemas.openxmlformats.org/officeDocument/2006/math" xmlns="" val="1"/>
             </a:ext>
           </a:extLst>
         </p:spPr>
@@ -9785,7 +9586,7 @@
           </a:effectLst>
           <a:extLst>
             <a:ext uri="{C572A759-6A51-4108-AA02-DFA0A04FC94B}">
-              <ma14:wrappingTextBoxFlag xmlns="" xmlns:m="http://schemas.openxmlformats.org/officeDocument/2006/math" xmlns:a14="http://schemas.microsoft.com/office/drawing/2010/main" xmlns:ma14="http://schemas.microsoft.com/office/mac/drawingml/2011/main" val="1"/>
+              <ma14:wrappingTextBoxFlag xmlns:ma14="http://schemas.microsoft.com/office/mac/drawingml/2011/main" xmlns:a14="http://schemas.microsoft.com/office/drawing/2010/main" xmlns:m="http://schemas.openxmlformats.org/officeDocument/2006/math" xmlns="" val="1"/>
             </a:ext>
           </a:extLst>
         </p:spPr>
@@ -9855,7 +9656,7 @@
           </a:effectLst>
           <a:extLst>
             <a:ext uri="{C572A759-6A51-4108-AA02-DFA0A04FC94B}">
-              <ma14:wrappingTextBoxFlag xmlns="" xmlns:m="http://schemas.openxmlformats.org/officeDocument/2006/math" xmlns:a14="http://schemas.microsoft.com/office/drawing/2010/main" xmlns:ma14="http://schemas.microsoft.com/office/mac/drawingml/2011/main" val="1"/>
+              <ma14:wrappingTextBoxFlag xmlns:ma14="http://schemas.microsoft.com/office/mac/drawingml/2011/main" xmlns:a14="http://schemas.microsoft.com/office/drawing/2010/main" xmlns:m="http://schemas.openxmlformats.org/officeDocument/2006/math" xmlns="" val="1"/>
             </a:ext>
           </a:extLst>
         </p:spPr>
@@ -9925,7 +9726,7 @@
           </a:effectLst>
           <a:extLst>
             <a:ext uri="{C572A759-6A51-4108-AA02-DFA0A04FC94B}">
-              <ma14:wrappingTextBoxFlag xmlns="" xmlns:m="http://schemas.openxmlformats.org/officeDocument/2006/math" xmlns:a14="http://schemas.microsoft.com/office/drawing/2010/main" xmlns:ma14="http://schemas.microsoft.com/office/mac/drawingml/2011/main" val="1"/>
+              <ma14:wrappingTextBoxFlag xmlns:ma14="http://schemas.microsoft.com/office/mac/drawingml/2011/main" xmlns:a14="http://schemas.microsoft.com/office/drawing/2010/main" xmlns:m="http://schemas.openxmlformats.org/officeDocument/2006/math" xmlns="" val="1"/>
             </a:ext>
           </a:extLst>
         </p:spPr>
@@ -9949,6 +9750,233 @@
             <a:endParaRPr sz="1500" b="0" dirty="0">
               <a:solidFill>
                 <a:sysClr val="windowText" lastClr="000000"/>
+              </a:solidFill>
+              <a:latin typeface="微软雅黑" panose="020B0503020204020204" pitchFamily="34" charset="-122"/>
+              <a:ea typeface="微软雅黑" panose="020B0503020204020204" pitchFamily="34" charset="-122"/>
+              <a:cs typeface="Helvetica Light"/>
+            </a:endParaRPr>
+          </a:p>
+        </p:txBody>
+      </p:sp>
+      <p:sp>
+        <p:nvSpPr>
+          <p:cNvPr id="141" name="generic…">
+            <a:extLst>
+              <a:ext uri="{FF2B5EF4-FFF2-40B4-BE49-F238E27FC236}">
+                <a16:creationId xmlns:a16="http://schemas.microsoft.com/office/drawing/2014/main" id="{2CE078D3-4204-4A28-B88D-96AA59125FD3}"/>
+              </a:ext>
+            </a:extLst>
+          </p:cNvPr>
+          <p:cNvSpPr/>
+          <p:nvPr/>
+        </p:nvSpPr>
+        <p:spPr>
+          <a:xfrm>
+            <a:off x="3380477" y="4355824"/>
+            <a:ext cx="1068458" cy="507307"/>
+          </a:xfrm>
+          <a:prstGeom prst="roundRect">
+            <a:avLst>
+              <a:gd name="adj" fmla="val 11868"/>
+            </a:avLst>
+          </a:prstGeom>
+          <a:solidFill>
+            <a:schemeClr val="accent4"/>
+          </a:solidFill>
+          <a:ln w="12700" cap="flat">
+            <a:noFill/>
+            <a:miter lim="400000"/>
+          </a:ln>
+          <a:effectLst>
+            <a:outerShdw blurRad="38100" dist="25400" dir="5400000" rotWithShape="0">
+              <a:srgbClr val="000000">
+                <a:alpha val="50000"/>
+              </a:srgbClr>
+            </a:outerShdw>
+          </a:effectLst>
+          <a:extLst>
+            <a:ext uri="{C572A759-6A51-4108-AA02-DFA0A04FC94B}">
+              <ma14:wrappingTextBoxFlag xmlns:ma14="http://schemas.microsoft.com/office/mac/drawingml/2011/main" xmlns:a14="http://schemas.microsoft.com/office/drawing/2010/main" xmlns:m="http://schemas.openxmlformats.org/officeDocument/2006/math" xmlns="" val="1"/>
+            </a:ext>
+          </a:extLst>
+        </p:spPr>
+        <p:txBody>
+          <a:bodyPr wrap="square" lIns="50800" tIns="50800" rIns="50800" bIns="50800" numCol="1" anchor="ctr">
+            <a:noAutofit/>
+          </a:bodyPr>
+          <a:lstStyle/>
+          <a:p>
+            <a:r>
+              <a:rPr lang="en-US" sz="1500" b="0" dirty="0">
+                <a:solidFill>
+                  <a:sysClr val="windowText" lastClr="000000"/>
+                </a:solidFill>
+                <a:latin typeface="微软雅黑" panose="020B0503020204020204" pitchFamily="34" charset="-122"/>
+                <a:ea typeface="微软雅黑" panose="020B0503020204020204" pitchFamily="34" charset="-122"/>
+                <a:cs typeface="Helvetica Light"/>
+              </a:rPr>
+              <a:t>Hlty </a:t>
+            </a:r>
+            <a:r>
+              <a:rPr lang="en-US" altLang="zh-CN" sz="1500" b="0" dirty="0">
+                <a:solidFill>
+                  <a:sysClr val="windowText" lastClr="000000"/>
+                </a:solidFill>
+                <a:latin typeface="微软雅黑" panose="020B0503020204020204" pitchFamily="34" charset="-122"/>
+                <a:ea typeface="微软雅黑" panose="020B0503020204020204" pitchFamily="34" charset="-122"/>
+                <a:cs typeface="Helvetica Light"/>
+              </a:rPr>
+              <a:t>i</a:t>
+            </a:r>
+            <a:r>
+              <a:rPr lang="en-US" sz="1500" b="0" dirty="0">
+                <a:solidFill>
+                  <a:sysClr val="windowText" lastClr="000000"/>
+                </a:solidFill>
+                <a:latin typeface="微软雅黑" panose="020B0503020204020204" pitchFamily="34" charset="-122"/>
+                <a:ea typeface="微软雅黑" panose="020B0503020204020204" pitchFamily="34" charset="-122"/>
+                <a:cs typeface="Helvetica Light"/>
+              </a:rPr>
+              <a:t>nst</a:t>
+            </a:r>
+            <a:endParaRPr sz="1500" b="0" dirty="0">
+              <a:solidFill>
+                <a:sysClr val="windowText" lastClr="000000"/>
+              </a:solidFill>
+              <a:latin typeface="微软雅黑" panose="020B0503020204020204" pitchFamily="34" charset="-122"/>
+              <a:ea typeface="微软雅黑" panose="020B0503020204020204" pitchFamily="34" charset="-122"/>
+              <a:cs typeface="Helvetica Light"/>
+            </a:endParaRPr>
+          </a:p>
+        </p:txBody>
+      </p:sp>
+      <p:sp>
+        <p:nvSpPr>
+          <p:cNvPr id="8" name="文本框 7">
+            <a:extLst>
+              <a:ext uri="{FF2B5EF4-FFF2-40B4-BE49-F238E27FC236}">
+                <a16:creationId xmlns:a16="http://schemas.microsoft.com/office/drawing/2014/main" id="{0B6AD05B-A7BE-48C2-A1F9-6E9305F5E149}"/>
+              </a:ext>
+            </a:extLst>
+          </p:cNvPr>
+          <p:cNvSpPr txBox="1"/>
+          <p:nvPr/>
+        </p:nvSpPr>
+        <p:spPr>
+          <a:xfrm>
+            <a:off x="537805" y="214653"/>
+            <a:ext cx="3215960" cy="318036"/>
+          </a:xfrm>
+          <a:prstGeom prst="rect">
+            <a:avLst/>
+          </a:prstGeom>
+          <a:noFill/>
+          <a:ln w="12700" cap="flat">
+            <a:noFill/>
+            <a:miter lim="400000"/>
+          </a:ln>
+          <a:effectLst/>
+          <a:sp3d/>
+        </p:spPr>
+        <p:style>
+          <a:lnRef idx="0">
+            <a:scrgbClr r="0" g="0" b="0"/>
+          </a:lnRef>
+          <a:fillRef idx="0">
+            <a:scrgbClr r="0" g="0" b="0"/>
+          </a:fillRef>
+          <a:effectRef idx="0">
+            <a:scrgbClr r="0" g="0" b="0"/>
+          </a:effectRef>
+          <a:fontRef idx="none"/>
+        </p:style>
+        <p:txBody>
+          <a:bodyPr rot="0" spcFirstLastPara="1" vertOverflow="overflow" horzOverflow="overflow" vert="horz" wrap="square" lIns="50800" tIns="50800" rIns="50800" bIns="50800" numCol="1" spcCol="38100" rtlCol="0" anchor="ctr">
+            <a:spAutoFit/>
+          </a:bodyPr>
+          <a:lstStyle/>
+          <a:p>
+            <a:r>
+              <a:rPr lang="en-US" altLang="zh-CN" sz="1400" b="0" dirty="0">
+                <a:solidFill>
+                  <a:sysClr val="windowText" lastClr="000000"/>
+                </a:solidFill>
+                <a:latin typeface="Verdana" panose="020B0604030504040204" pitchFamily="34" charset="0"/>
+                <a:ea typeface="Verdana" panose="020B0604030504040204" pitchFamily="34" charset="0"/>
+                <a:cs typeface="Helvetica Light"/>
+              </a:rPr>
+              <a:t>Hlty Inst -&gt; </a:t>
+            </a:r>
+            <a:r>
+              <a:rPr lang="en-US" altLang="zh-CN" sz="1400" b="0" dirty="0">
+                <a:latin typeface="Verdana" panose="020B0604030504040204" pitchFamily="34" charset="0"/>
+                <a:ea typeface="Verdana" panose="020B0604030504040204" pitchFamily="34" charset="0"/>
+              </a:rPr>
+              <a:t>Healthy instance first</a:t>
+            </a:r>
+            <a:endParaRPr lang="en-US" altLang="zh-CN" sz="1400" b="0" dirty="0">
+              <a:solidFill>
+                <a:sysClr val="windowText" lastClr="000000"/>
+              </a:solidFill>
+              <a:latin typeface="Verdana" panose="020B0604030504040204" pitchFamily="34" charset="0"/>
+              <a:ea typeface="Verdana" panose="020B0604030504040204" pitchFamily="34" charset="0"/>
+              <a:cs typeface="Helvetica Light"/>
+            </a:endParaRPr>
+          </a:p>
+        </p:txBody>
+      </p:sp>
+      <p:sp>
+        <p:nvSpPr>
+          <p:cNvPr id="143" name="Line">
+            <a:extLst>
+              <a:ext uri="{FF2B5EF4-FFF2-40B4-BE49-F238E27FC236}">
+                <a16:creationId xmlns:a16="http://schemas.microsoft.com/office/drawing/2014/main" id="{48A095E0-95B4-4AC7-BB2D-841E76A8D587}"/>
+              </a:ext>
+            </a:extLst>
+          </p:cNvPr>
+          <p:cNvSpPr/>
+          <p:nvPr/>
+        </p:nvSpPr>
+        <p:spPr>
+          <a:xfrm>
+            <a:off x="9306432" y="3743612"/>
+            <a:ext cx="1325759" cy="0"/>
+          </a:xfrm>
+          <a:prstGeom prst="line">
+            <a:avLst/>
+          </a:prstGeom>
+          <a:ln w="38100">
+            <a:solidFill>
+              <a:schemeClr val="bg2">
+                <a:lumMod val="50000"/>
+              </a:schemeClr>
+            </a:solidFill>
+            <a:tailEnd type="triangle" w="med" len="med"/>
+          </a:ln>
+        </p:spPr>
+        <p:style>
+          <a:lnRef idx="1">
+            <a:schemeClr val="accent1"/>
+          </a:lnRef>
+          <a:fillRef idx="0">
+            <a:schemeClr val="accent1"/>
+          </a:fillRef>
+          <a:effectRef idx="0">
+            <a:schemeClr val="accent1"/>
+          </a:effectRef>
+          <a:fontRef idx="minor">
+            <a:schemeClr val="tx1"/>
+          </a:fontRef>
+        </p:style>
+        <p:txBody>
+          <a:bodyPr wrap="square" lIns="50800" tIns="50800" rIns="50800" bIns="50800" numCol="1" anchor="ctr">
+            <a:noAutofit/>
+          </a:bodyPr>
+          <a:lstStyle/>
+          <a:p>
+            <a:endParaRPr b="0">
+              <a:solidFill>
+                <a:schemeClr val="tx1"/>
               </a:solidFill>
               <a:latin typeface="微软雅黑" panose="020B0503020204020204" pitchFamily="34" charset="-122"/>
               <a:ea typeface="微软雅黑" panose="020B0503020204020204" pitchFamily="34" charset="-122"/>
@@ -10037,7 +10065,7 @@
           </a:effectLst>
           <a:extLst>
             <a:ext uri="{C572A759-6A51-4108-AA02-DFA0A04FC94B}">
-              <ma14:wrappingTextBoxFlag xmlns="" xmlns:m="http://schemas.openxmlformats.org/officeDocument/2006/math" xmlns:a14="http://schemas.microsoft.com/office/drawing/2010/main" xmlns:ma14="http://schemas.microsoft.com/office/mac/drawingml/2011/main" val="1"/>
+              <ma14:wrappingTextBoxFlag xmlns:ma14="http://schemas.microsoft.com/office/mac/drawingml/2011/main" xmlns:a14="http://schemas.microsoft.com/office/drawing/2010/main" xmlns:m="http://schemas.openxmlformats.org/officeDocument/2006/math" xmlns="" val="1"/>
             </a:ext>
           </a:extLst>
         </p:spPr>
@@ -10098,7 +10126,7 @@
           </a:effectLst>
           <a:extLst>
             <a:ext uri="{C572A759-6A51-4108-AA02-DFA0A04FC94B}">
-              <ma14:wrappingTextBoxFlag xmlns="" xmlns:m="http://schemas.openxmlformats.org/officeDocument/2006/math" xmlns:a14="http://schemas.microsoft.com/office/drawing/2010/main" xmlns:ma14="http://schemas.microsoft.com/office/mac/drawingml/2011/main" val="1"/>
+              <ma14:wrappingTextBoxFlag xmlns:ma14="http://schemas.microsoft.com/office/mac/drawingml/2011/main" xmlns:a14="http://schemas.microsoft.com/office/drawing/2010/main" xmlns:m="http://schemas.openxmlformats.org/officeDocument/2006/math" xmlns="" val="1"/>
             </a:ext>
           </a:extLst>
         </p:spPr>
@@ -10173,7 +10201,7 @@
           </a:effectLst>
           <a:extLst>
             <a:ext uri="{C572A759-6A51-4108-AA02-DFA0A04FC94B}">
-              <ma14:wrappingTextBoxFlag xmlns="" xmlns:m="http://schemas.openxmlformats.org/officeDocument/2006/math" xmlns:a14="http://schemas.microsoft.com/office/drawing/2010/main" xmlns:ma14="http://schemas.microsoft.com/office/mac/drawingml/2011/main" val="1"/>
+              <ma14:wrappingTextBoxFlag xmlns:ma14="http://schemas.microsoft.com/office/mac/drawingml/2011/main" xmlns:a14="http://schemas.microsoft.com/office/drawing/2010/main" xmlns:m="http://schemas.openxmlformats.org/officeDocument/2006/math" xmlns="" val="1"/>
             </a:ext>
           </a:extLst>
         </p:spPr>
@@ -10248,7 +10276,7 @@
           </a:effectLst>
           <a:extLst>
             <a:ext uri="{C572A759-6A51-4108-AA02-DFA0A04FC94B}">
-              <ma14:wrappingTextBoxFlag xmlns="" xmlns:m="http://schemas.openxmlformats.org/officeDocument/2006/math" xmlns:a14="http://schemas.microsoft.com/office/drawing/2010/main" xmlns:ma14="http://schemas.microsoft.com/office/mac/drawingml/2011/main" val="1"/>
+              <ma14:wrappingTextBoxFlag xmlns:ma14="http://schemas.microsoft.com/office/mac/drawingml/2011/main" xmlns:a14="http://schemas.microsoft.com/office/drawing/2010/main" xmlns:m="http://schemas.openxmlformats.org/officeDocument/2006/math" xmlns="" val="1"/>
             </a:ext>
           </a:extLst>
         </p:spPr>
@@ -10323,7 +10351,7 @@
           </a:effectLst>
           <a:extLst>
             <a:ext uri="{C572A759-6A51-4108-AA02-DFA0A04FC94B}">
-              <ma14:wrappingTextBoxFlag xmlns="" xmlns:m="http://schemas.openxmlformats.org/officeDocument/2006/math" xmlns:a14="http://schemas.microsoft.com/office/drawing/2010/main" xmlns:ma14="http://schemas.microsoft.com/office/mac/drawingml/2011/main" val="1"/>
+              <ma14:wrappingTextBoxFlag xmlns:ma14="http://schemas.microsoft.com/office/mac/drawingml/2011/main" xmlns:a14="http://schemas.microsoft.com/office/drawing/2010/main" xmlns:m="http://schemas.openxmlformats.org/officeDocument/2006/math" xmlns="" val="1"/>
             </a:ext>
           </a:extLst>
         </p:spPr>
@@ -10400,7 +10428,7 @@
           </a:effectLst>
           <a:extLst>
             <a:ext uri="{C572A759-6A51-4108-AA02-DFA0A04FC94B}">
-              <ma14:wrappingTextBoxFlag xmlns="" xmlns:m="http://schemas.openxmlformats.org/officeDocument/2006/math" xmlns:a14="http://schemas.microsoft.com/office/drawing/2010/main" xmlns:ma14="http://schemas.microsoft.com/office/mac/drawingml/2011/main" val="1"/>
+              <ma14:wrappingTextBoxFlag xmlns:ma14="http://schemas.microsoft.com/office/mac/drawingml/2011/main" xmlns:a14="http://schemas.microsoft.com/office/drawing/2010/main" xmlns:m="http://schemas.openxmlformats.org/officeDocument/2006/math" xmlns="" val="1"/>
             </a:ext>
           </a:extLst>
         </p:spPr>
@@ -10460,7 +10488,7 @@
           </a:effectLst>
           <a:extLst>
             <a:ext uri="{C572A759-6A51-4108-AA02-DFA0A04FC94B}">
-              <ma14:wrappingTextBoxFlag xmlns="" xmlns:m="http://schemas.openxmlformats.org/officeDocument/2006/math" xmlns:a14="http://schemas.microsoft.com/office/drawing/2010/main" xmlns:ma14="http://schemas.microsoft.com/office/mac/drawingml/2011/main" val="1"/>
+              <ma14:wrappingTextBoxFlag xmlns:ma14="http://schemas.microsoft.com/office/mac/drawingml/2011/main" xmlns:a14="http://schemas.microsoft.com/office/drawing/2010/main" xmlns:m="http://schemas.openxmlformats.org/officeDocument/2006/math" xmlns="" val="1"/>
             </a:ext>
           </a:extLst>
         </p:spPr>
@@ -10535,7 +10563,7 @@
           </a:effectLst>
           <a:extLst>
             <a:ext uri="{C572A759-6A51-4108-AA02-DFA0A04FC94B}">
-              <ma14:wrappingTextBoxFlag xmlns="" xmlns:m="http://schemas.openxmlformats.org/officeDocument/2006/math" xmlns:a14="http://schemas.microsoft.com/office/drawing/2010/main" xmlns:ma14="http://schemas.microsoft.com/office/mac/drawingml/2011/main" val="1"/>
+              <ma14:wrappingTextBoxFlag xmlns:ma14="http://schemas.microsoft.com/office/mac/drawingml/2011/main" xmlns:a14="http://schemas.microsoft.com/office/drawing/2010/main" xmlns:m="http://schemas.openxmlformats.org/officeDocument/2006/math" xmlns="" val="1"/>
             </a:ext>
           </a:extLst>
         </p:spPr>
@@ -11086,7 +11114,7 @@
           </a:effectLst>
           <a:extLst>
             <a:ext uri="{C572A759-6A51-4108-AA02-DFA0A04FC94B}">
-              <ma14:wrappingTextBoxFlag xmlns="" xmlns:m="http://schemas.openxmlformats.org/officeDocument/2006/math" xmlns:a14="http://schemas.microsoft.com/office/drawing/2010/main" xmlns:ma14="http://schemas.microsoft.com/office/mac/drawingml/2011/main" val="1"/>
+              <ma14:wrappingTextBoxFlag xmlns:ma14="http://schemas.microsoft.com/office/mac/drawingml/2011/main" xmlns:a14="http://schemas.microsoft.com/office/drawing/2010/main" xmlns:m="http://schemas.openxmlformats.org/officeDocument/2006/math" xmlns="" val="1"/>
             </a:ext>
           </a:extLst>
         </p:spPr>
@@ -11146,7 +11174,7 @@
           </a:effectLst>
           <a:extLst>
             <a:ext uri="{C572A759-6A51-4108-AA02-DFA0A04FC94B}">
-              <ma14:wrappingTextBoxFlag xmlns="" xmlns:m="http://schemas.openxmlformats.org/officeDocument/2006/math" xmlns:a14="http://schemas.microsoft.com/office/drawing/2010/main" xmlns:ma14="http://schemas.microsoft.com/office/mac/drawingml/2011/main" val="1"/>
+              <ma14:wrappingTextBoxFlag xmlns:ma14="http://schemas.microsoft.com/office/mac/drawingml/2011/main" xmlns:a14="http://schemas.microsoft.com/office/drawing/2010/main" xmlns:m="http://schemas.openxmlformats.org/officeDocument/2006/math" xmlns="" val="1"/>
             </a:ext>
           </a:extLst>
         </p:spPr>
@@ -11221,7 +11249,7 @@
           </a:effectLst>
           <a:extLst>
             <a:ext uri="{C572A759-6A51-4108-AA02-DFA0A04FC94B}">
-              <ma14:wrappingTextBoxFlag xmlns="" xmlns:m="http://schemas.openxmlformats.org/officeDocument/2006/math" xmlns:a14="http://schemas.microsoft.com/office/drawing/2010/main" xmlns:ma14="http://schemas.microsoft.com/office/mac/drawingml/2011/main" val="1"/>
+              <ma14:wrappingTextBoxFlag xmlns:ma14="http://schemas.microsoft.com/office/mac/drawingml/2011/main" xmlns:a14="http://schemas.microsoft.com/office/drawing/2010/main" xmlns:m="http://schemas.openxmlformats.org/officeDocument/2006/math" xmlns="" val="1"/>
             </a:ext>
           </a:extLst>
         </p:spPr>
@@ -11449,7 +11477,7 @@
           </a:effectLst>
           <a:extLst>
             <a:ext uri="{C572A759-6A51-4108-AA02-DFA0A04FC94B}">
-              <ma14:wrappingTextBoxFlag xmlns="" xmlns:m="http://schemas.openxmlformats.org/officeDocument/2006/math" xmlns:a14="http://schemas.microsoft.com/office/drawing/2010/main" xmlns:ma14="http://schemas.microsoft.com/office/mac/drawingml/2011/main" val="1"/>
+              <ma14:wrappingTextBoxFlag xmlns:ma14="http://schemas.microsoft.com/office/mac/drawingml/2011/main" xmlns:a14="http://schemas.microsoft.com/office/drawing/2010/main" xmlns:m="http://schemas.openxmlformats.org/officeDocument/2006/math" xmlns="" val="1"/>
             </a:ext>
           </a:extLst>
         </p:spPr>
@@ -11562,7 +11590,7 @@
           </a:effectLst>
           <a:extLst>
             <a:ext uri="{C572A759-6A51-4108-AA02-DFA0A04FC94B}">
-              <ma14:wrappingTextBoxFlag xmlns="" xmlns:m="http://schemas.openxmlformats.org/officeDocument/2006/math" xmlns:a14="http://schemas.microsoft.com/office/drawing/2010/main" xmlns:ma14="http://schemas.microsoft.com/office/mac/drawingml/2011/main" val="1"/>
+              <ma14:wrappingTextBoxFlag xmlns:ma14="http://schemas.microsoft.com/office/mac/drawingml/2011/main" xmlns:a14="http://schemas.microsoft.com/office/drawing/2010/main" xmlns:m="http://schemas.openxmlformats.org/officeDocument/2006/math" xmlns="" val="1"/>
             </a:ext>
           </a:extLst>
         </p:spPr>
@@ -11627,7 +11655,7 @@
           </a:effectLst>
           <a:extLst>
             <a:ext uri="{C572A759-6A51-4108-AA02-DFA0A04FC94B}">
-              <ma14:wrappingTextBoxFlag xmlns="" xmlns:m="http://schemas.openxmlformats.org/officeDocument/2006/math" xmlns:a14="http://schemas.microsoft.com/office/drawing/2010/main" xmlns:ma14="http://schemas.microsoft.com/office/mac/drawingml/2011/main" val="1"/>
+              <ma14:wrappingTextBoxFlag xmlns:ma14="http://schemas.microsoft.com/office/mac/drawingml/2011/main" xmlns:a14="http://schemas.microsoft.com/office/drawing/2010/main" xmlns:m="http://schemas.openxmlformats.org/officeDocument/2006/math" xmlns="" val="1"/>
             </a:ext>
           </a:extLst>
         </p:spPr>
@@ -11712,7 +11740,7 @@
           </a:effectLst>
           <a:extLst>
             <a:ext uri="{C572A759-6A51-4108-AA02-DFA0A04FC94B}">
-              <ma14:wrappingTextBoxFlag xmlns="" xmlns:m="http://schemas.openxmlformats.org/officeDocument/2006/math" xmlns:a14="http://schemas.microsoft.com/office/drawing/2010/main" xmlns:ma14="http://schemas.microsoft.com/office/mac/drawingml/2011/main" val="1"/>
+              <ma14:wrappingTextBoxFlag xmlns:ma14="http://schemas.microsoft.com/office/mac/drawingml/2011/main" xmlns:a14="http://schemas.microsoft.com/office/drawing/2010/main" xmlns:m="http://schemas.openxmlformats.org/officeDocument/2006/math" xmlns="" val="1"/>
             </a:ext>
           </a:extLst>
         </p:spPr>
@@ -11797,7 +11825,7 @@
           </a:effectLst>
           <a:extLst>
             <a:ext uri="{C572A759-6A51-4108-AA02-DFA0A04FC94B}">
-              <ma14:wrappingTextBoxFlag xmlns="" xmlns:m="http://schemas.openxmlformats.org/officeDocument/2006/math" xmlns:a14="http://schemas.microsoft.com/office/drawing/2010/main" xmlns:ma14="http://schemas.microsoft.com/office/mac/drawingml/2011/main" val="1"/>
+              <ma14:wrappingTextBoxFlag xmlns:ma14="http://schemas.microsoft.com/office/mac/drawingml/2011/main" xmlns:a14="http://schemas.microsoft.com/office/drawing/2010/main" xmlns:m="http://schemas.openxmlformats.org/officeDocument/2006/math" xmlns="" val="1"/>
             </a:ext>
           </a:extLst>
         </p:spPr>
@@ -11878,7 +11906,7 @@
           </a:effectLst>
           <a:extLst>
             <a:ext uri="{C572A759-6A51-4108-AA02-DFA0A04FC94B}">
-              <ma14:wrappingTextBoxFlag xmlns="" xmlns:m="http://schemas.openxmlformats.org/officeDocument/2006/math" xmlns:a14="http://schemas.microsoft.com/office/drawing/2010/main" xmlns:ma14="http://schemas.microsoft.com/office/mac/drawingml/2011/main" val="1"/>
+              <ma14:wrappingTextBoxFlag xmlns:ma14="http://schemas.microsoft.com/office/mac/drawingml/2011/main" xmlns:a14="http://schemas.microsoft.com/office/drawing/2010/main" xmlns:m="http://schemas.openxmlformats.org/officeDocument/2006/math" xmlns="" val="1"/>
             </a:ext>
           </a:extLst>
         </p:spPr>
@@ -11959,7 +11987,7 @@
           </a:effectLst>
           <a:extLst>
             <a:ext uri="{C572A759-6A51-4108-AA02-DFA0A04FC94B}">
-              <ma14:wrappingTextBoxFlag xmlns="" xmlns:m="http://schemas.openxmlformats.org/officeDocument/2006/math" xmlns:a14="http://schemas.microsoft.com/office/drawing/2010/main" xmlns:ma14="http://schemas.microsoft.com/office/mac/drawingml/2011/main" val="1"/>
+              <ma14:wrappingTextBoxFlag xmlns:ma14="http://schemas.microsoft.com/office/mac/drawingml/2011/main" xmlns:a14="http://schemas.microsoft.com/office/drawing/2010/main" xmlns:m="http://schemas.openxmlformats.org/officeDocument/2006/math" xmlns="" val="1"/>
             </a:ext>
           </a:extLst>
         </p:spPr>
@@ -12036,7 +12064,7 @@
           </a:effectLst>
           <a:extLst>
             <a:ext uri="{C572A759-6A51-4108-AA02-DFA0A04FC94B}">
-              <ma14:wrappingTextBoxFlag xmlns="" xmlns:m="http://schemas.openxmlformats.org/officeDocument/2006/math" xmlns:a14="http://schemas.microsoft.com/office/drawing/2010/main" xmlns:ma14="http://schemas.microsoft.com/office/mac/drawingml/2011/main" val="1"/>
+              <ma14:wrappingTextBoxFlag xmlns:ma14="http://schemas.microsoft.com/office/mac/drawingml/2011/main" xmlns:a14="http://schemas.microsoft.com/office/drawing/2010/main" xmlns:m="http://schemas.openxmlformats.org/officeDocument/2006/math" xmlns="" val="1"/>
             </a:ext>
           </a:extLst>
         </p:spPr>
@@ -12101,7 +12129,7 @@
           </a:effectLst>
           <a:extLst>
             <a:ext uri="{C572A759-6A51-4108-AA02-DFA0A04FC94B}">
-              <ma14:wrappingTextBoxFlag xmlns="" xmlns:m="http://schemas.openxmlformats.org/officeDocument/2006/math" xmlns:a14="http://schemas.microsoft.com/office/drawing/2010/main" xmlns:ma14="http://schemas.microsoft.com/office/mac/drawingml/2011/main" val="1"/>
+              <ma14:wrappingTextBoxFlag xmlns:ma14="http://schemas.microsoft.com/office/mac/drawingml/2011/main" xmlns:a14="http://schemas.microsoft.com/office/drawing/2010/main" xmlns:m="http://schemas.openxmlformats.org/officeDocument/2006/math" xmlns="" val="1"/>
             </a:ext>
           </a:extLst>
         </p:spPr>
@@ -12186,7 +12214,7 @@
           </a:effectLst>
           <a:extLst>
             <a:ext uri="{C572A759-6A51-4108-AA02-DFA0A04FC94B}">
-              <ma14:wrappingTextBoxFlag xmlns="" xmlns:m="http://schemas.openxmlformats.org/officeDocument/2006/math" xmlns:a14="http://schemas.microsoft.com/office/drawing/2010/main" xmlns:ma14="http://schemas.microsoft.com/office/mac/drawingml/2011/main" val="1"/>
+              <ma14:wrappingTextBoxFlag xmlns:ma14="http://schemas.microsoft.com/office/mac/drawingml/2011/main" xmlns:a14="http://schemas.microsoft.com/office/drawing/2010/main" xmlns:m="http://schemas.openxmlformats.org/officeDocument/2006/math" xmlns="" val="1"/>
             </a:ext>
           </a:extLst>
         </p:spPr>
@@ -12282,7 +12310,7 @@
           </a:effectLst>
           <a:extLst>
             <a:ext uri="{C572A759-6A51-4108-AA02-DFA0A04FC94B}">
-              <ma14:wrappingTextBoxFlag xmlns="" xmlns:m="http://schemas.openxmlformats.org/officeDocument/2006/math" xmlns:a14="http://schemas.microsoft.com/office/drawing/2010/main" xmlns:ma14="http://schemas.microsoft.com/office/mac/drawingml/2011/main" val="1"/>
+              <ma14:wrappingTextBoxFlag xmlns:ma14="http://schemas.microsoft.com/office/mac/drawingml/2011/main" xmlns:a14="http://schemas.microsoft.com/office/drawing/2010/main" xmlns:m="http://schemas.openxmlformats.org/officeDocument/2006/math" xmlns="" val="1"/>
             </a:ext>
           </a:extLst>
         </p:spPr>
@@ -12733,7 +12761,7 @@
           </a:effectLst>
           <a:extLst>
             <a:ext uri="{C572A759-6A51-4108-AA02-DFA0A04FC94B}">
-              <ma14:wrappingTextBoxFlag xmlns="" xmlns:m="http://schemas.openxmlformats.org/officeDocument/2006/math" xmlns:a14="http://schemas.microsoft.com/office/drawing/2010/main" xmlns:ma14="http://schemas.microsoft.com/office/mac/drawingml/2011/main" val="1"/>
+              <ma14:wrappingTextBoxFlag xmlns:ma14="http://schemas.microsoft.com/office/mac/drawingml/2011/main" xmlns:a14="http://schemas.microsoft.com/office/drawing/2010/main" xmlns:m="http://schemas.openxmlformats.org/officeDocument/2006/math" xmlns="" val="1"/>
             </a:ext>
           </a:extLst>
         </p:spPr>
@@ -12798,7 +12826,7 @@
           </a:effectLst>
           <a:extLst>
             <a:ext uri="{C572A759-6A51-4108-AA02-DFA0A04FC94B}">
-              <ma14:wrappingTextBoxFlag xmlns="" xmlns:m="http://schemas.openxmlformats.org/officeDocument/2006/math" xmlns:a14="http://schemas.microsoft.com/office/drawing/2010/main" xmlns:ma14="http://schemas.microsoft.com/office/mac/drawingml/2011/main" val="1"/>
+              <ma14:wrappingTextBoxFlag xmlns:ma14="http://schemas.microsoft.com/office/mac/drawingml/2011/main" xmlns:a14="http://schemas.microsoft.com/office/drawing/2010/main" xmlns:m="http://schemas.openxmlformats.org/officeDocument/2006/math" xmlns="" val="1"/>
             </a:ext>
           </a:extLst>
         </p:spPr>
@@ -12876,7 +12904,7 @@
           </a:effectLst>
           <a:extLst>
             <a:ext uri="{C572A759-6A51-4108-AA02-DFA0A04FC94B}">
-              <ma14:wrappingTextBoxFlag xmlns="" xmlns:m="http://schemas.openxmlformats.org/officeDocument/2006/math" xmlns:a14="http://schemas.microsoft.com/office/drawing/2010/main" xmlns:ma14="http://schemas.microsoft.com/office/mac/drawingml/2011/main" val="1"/>
+              <ma14:wrappingTextBoxFlag xmlns:ma14="http://schemas.microsoft.com/office/mac/drawingml/2011/main" xmlns:a14="http://schemas.microsoft.com/office/drawing/2010/main" xmlns:m="http://schemas.openxmlformats.org/officeDocument/2006/math" xmlns="" val="1"/>
             </a:ext>
           </a:extLst>
         </p:spPr>
@@ -12968,7 +12996,7 @@
           </a:effectLst>
           <a:extLst>
             <a:ext uri="{C572A759-6A51-4108-AA02-DFA0A04FC94B}">
-              <ma14:wrappingTextBoxFlag xmlns="" xmlns:m="http://schemas.openxmlformats.org/officeDocument/2006/math" xmlns:a14="http://schemas.microsoft.com/office/drawing/2010/main" xmlns:ma14="http://schemas.microsoft.com/office/mac/drawingml/2011/main" val="1"/>
+              <ma14:wrappingTextBoxFlag xmlns:ma14="http://schemas.microsoft.com/office/mac/drawingml/2011/main" xmlns:a14="http://schemas.microsoft.com/office/drawing/2010/main" xmlns:m="http://schemas.openxmlformats.org/officeDocument/2006/math" xmlns="" val="1"/>
             </a:ext>
           </a:extLst>
         </p:spPr>
@@ -13051,7 +13079,7 @@
           </a:effectLst>
           <a:extLst>
             <a:ext uri="{C572A759-6A51-4108-AA02-DFA0A04FC94B}">
-              <ma14:wrappingTextBoxFlag xmlns="" xmlns:m="http://schemas.openxmlformats.org/officeDocument/2006/math" xmlns:a14="http://schemas.microsoft.com/office/drawing/2010/main" xmlns:ma14="http://schemas.microsoft.com/office/mac/drawingml/2011/main" val="1"/>
+              <ma14:wrappingTextBoxFlag xmlns:ma14="http://schemas.microsoft.com/office/mac/drawingml/2011/main" xmlns:a14="http://schemas.microsoft.com/office/drawing/2010/main" xmlns:m="http://schemas.openxmlformats.org/officeDocument/2006/math" xmlns="" val="1"/>
             </a:ext>
           </a:extLst>
         </p:spPr>
@@ -13116,7 +13144,7 @@
           </a:effectLst>
           <a:extLst>
             <a:ext uri="{C572A759-6A51-4108-AA02-DFA0A04FC94B}">
-              <ma14:wrappingTextBoxFlag xmlns="" xmlns:m="http://schemas.openxmlformats.org/officeDocument/2006/math" xmlns:a14="http://schemas.microsoft.com/office/drawing/2010/main" xmlns:ma14="http://schemas.microsoft.com/office/mac/drawingml/2011/main" val="1"/>
+              <ma14:wrappingTextBoxFlag xmlns:ma14="http://schemas.microsoft.com/office/mac/drawingml/2011/main" xmlns:a14="http://schemas.microsoft.com/office/drawing/2010/main" xmlns:m="http://schemas.openxmlformats.org/officeDocument/2006/math" xmlns="" val="1"/>
             </a:ext>
           </a:extLst>
         </p:spPr>
@@ -13201,7 +13229,7 @@
           </a:effectLst>
           <a:extLst>
             <a:ext uri="{C572A759-6A51-4108-AA02-DFA0A04FC94B}">
-              <ma14:wrappingTextBoxFlag xmlns="" xmlns:m="http://schemas.openxmlformats.org/officeDocument/2006/math" xmlns:a14="http://schemas.microsoft.com/office/drawing/2010/main" xmlns:ma14="http://schemas.microsoft.com/office/mac/drawingml/2011/main" val="1"/>
+              <ma14:wrappingTextBoxFlag xmlns:ma14="http://schemas.microsoft.com/office/mac/drawingml/2011/main" xmlns:a14="http://schemas.microsoft.com/office/drawing/2010/main" xmlns:m="http://schemas.openxmlformats.org/officeDocument/2006/math" xmlns="" val="1"/>
             </a:ext>
           </a:extLst>
         </p:spPr>
@@ -13286,7 +13314,7 @@
           </a:effectLst>
           <a:extLst>
             <a:ext uri="{C572A759-6A51-4108-AA02-DFA0A04FC94B}">
-              <ma14:wrappingTextBoxFlag xmlns="" xmlns:m="http://schemas.openxmlformats.org/officeDocument/2006/math" xmlns:a14="http://schemas.microsoft.com/office/drawing/2010/main" xmlns:ma14="http://schemas.microsoft.com/office/mac/drawingml/2011/main" val="1"/>
+              <ma14:wrappingTextBoxFlag xmlns:ma14="http://schemas.microsoft.com/office/mac/drawingml/2011/main" xmlns:a14="http://schemas.microsoft.com/office/drawing/2010/main" xmlns:m="http://schemas.openxmlformats.org/officeDocument/2006/math" xmlns="" val="1"/>
             </a:ext>
           </a:extLst>
         </p:spPr>
@@ -13371,7 +13399,7 @@
           </a:effectLst>
           <a:extLst>
             <a:ext uri="{C572A759-6A51-4108-AA02-DFA0A04FC94B}">
-              <ma14:wrappingTextBoxFlag xmlns="" xmlns:m="http://schemas.openxmlformats.org/officeDocument/2006/math" xmlns:a14="http://schemas.microsoft.com/office/drawing/2010/main" xmlns:ma14="http://schemas.microsoft.com/office/mac/drawingml/2011/main" val="1"/>
+              <ma14:wrappingTextBoxFlag xmlns:ma14="http://schemas.microsoft.com/office/mac/drawingml/2011/main" xmlns:a14="http://schemas.microsoft.com/office/drawing/2010/main" xmlns:m="http://schemas.openxmlformats.org/officeDocument/2006/math" xmlns="" val="1"/>
             </a:ext>
           </a:extLst>
         </p:spPr>
@@ -13686,7 +13714,7 @@
           </a:effectLst>
           <a:extLst>
             <a:ext uri="{C572A759-6A51-4108-AA02-DFA0A04FC94B}">
-              <ma14:wrappingTextBoxFlag xmlns="" xmlns:m="http://schemas.openxmlformats.org/officeDocument/2006/math" xmlns:a14="http://schemas.microsoft.com/office/drawing/2010/main" xmlns:ma14="http://schemas.microsoft.com/office/mac/drawingml/2011/main" val="1"/>
+              <ma14:wrappingTextBoxFlag xmlns:ma14="http://schemas.microsoft.com/office/mac/drawingml/2011/main" xmlns:a14="http://schemas.microsoft.com/office/drawing/2010/main" xmlns:m="http://schemas.openxmlformats.org/officeDocument/2006/math" xmlns="" val="1"/>
             </a:ext>
           </a:extLst>
         </p:spPr>
@@ -13769,7 +13797,7 @@
           </a:effectLst>
           <a:extLst>
             <a:ext uri="{C572A759-6A51-4108-AA02-DFA0A04FC94B}">
-              <ma14:wrappingTextBoxFlag xmlns="" xmlns:m="http://schemas.openxmlformats.org/officeDocument/2006/math" xmlns:a14="http://schemas.microsoft.com/office/drawing/2010/main" xmlns:ma14="http://schemas.microsoft.com/office/mac/drawingml/2011/main" val="1"/>
+              <ma14:wrappingTextBoxFlag xmlns:ma14="http://schemas.microsoft.com/office/mac/drawingml/2011/main" xmlns:a14="http://schemas.microsoft.com/office/drawing/2010/main" xmlns:m="http://schemas.openxmlformats.org/officeDocument/2006/math" xmlns="" val="1"/>
             </a:ext>
           </a:extLst>
         </p:spPr>
@@ -13834,7 +13862,7 @@
           </a:effectLst>
           <a:extLst>
             <a:ext uri="{C572A759-6A51-4108-AA02-DFA0A04FC94B}">
-              <ma14:wrappingTextBoxFlag xmlns="" xmlns:m="http://schemas.openxmlformats.org/officeDocument/2006/math" xmlns:a14="http://schemas.microsoft.com/office/drawing/2010/main" xmlns:ma14="http://schemas.microsoft.com/office/mac/drawingml/2011/main" val="1"/>
+              <ma14:wrappingTextBoxFlag xmlns:ma14="http://schemas.microsoft.com/office/mac/drawingml/2011/main" xmlns:a14="http://schemas.microsoft.com/office/drawing/2010/main" xmlns:m="http://schemas.openxmlformats.org/officeDocument/2006/math" xmlns="" val="1"/>
             </a:ext>
           </a:extLst>
         </p:spPr>
@@ -13915,7 +13943,7 @@
           </a:effectLst>
           <a:extLst>
             <a:ext uri="{C572A759-6A51-4108-AA02-DFA0A04FC94B}">
-              <ma14:wrappingTextBoxFlag xmlns="" xmlns:m="http://schemas.openxmlformats.org/officeDocument/2006/math" xmlns:a14="http://schemas.microsoft.com/office/drawing/2010/main" xmlns:ma14="http://schemas.microsoft.com/office/mac/drawingml/2011/main" val="1"/>
+              <ma14:wrappingTextBoxFlag xmlns:ma14="http://schemas.microsoft.com/office/mac/drawingml/2011/main" xmlns:a14="http://schemas.microsoft.com/office/drawing/2010/main" xmlns:m="http://schemas.openxmlformats.org/officeDocument/2006/math" xmlns="" val="1"/>
             </a:ext>
           </a:extLst>
         </p:spPr>
@@ -14246,7 +14274,7 @@
           </a:effectLst>
           <a:extLst>
             <a:ext uri="{C572A759-6A51-4108-AA02-DFA0A04FC94B}">
-              <ma14:wrappingTextBoxFlag xmlns="" xmlns:m="http://schemas.openxmlformats.org/officeDocument/2006/math" xmlns:a14="http://schemas.microsoft.com/office/drawing/2010/main" xmlns:ma14="http://schemas.microsoft.com/office/mac/drawingml/2011/main" val="1"/>
+              <ma14:wrappingTextBoxFlag xmlns:ma14="http://schemas.microsoft.com/office/mac/drawingml/2011/main" xmlns:a14="http://schemas.microsoft.com/office/drawing/2010/main" xmlns:m="http://schemas.openxmlformats.org/officeDocument/2006/math" xmlns="" val="1"/>
             </a:ext>
           </a:extLst>
         </p:spPr>
@@ -14311,7 +14339,7 @@
           </a:effectLst>
           <a:extLst>
             <a:ext uri="{C572A759-6A51-4108-AA02-DFA0A04FC94B}">
-              <ma14:wrappingTextBoxFlag xmlns="" xmlns:m="http://schemas.openxmlformats.org/officeDocument/2006/math" xmlns:a14="http://schemas.microsoft.com/office/drawing/2010/main" xmlns:ma14="http://schemas.microsoft.com/office/mac/drawingml/2011/main" val="1"/>
+              <ma14:wrappingTextBoxFlag xmlns:ma14="http://schemas.microsoft.com/office/mac/drawingml/2011/main" xmlns:a14="http://schemas.microsoft.com/office/drawing/2010/main" xmlns:m="http://schemas.openxmlformats.org/officeDocument/2006/math" xmlns="" val="1"/>
             </a:ext>
           </a:extLst>
         </p:spPr>
@@ -14396,7 +14424,7 @@
           </a:effectLst>
           <a:extLst>
             <a:ext uri="{C572A759-6A51-4108-AA02-DFA0A04FC94B}">
-              <ma14:wrappingTextBoxFlag xmlns="" xmlns:m="http://schemas.openxmlformats.org/officeDocument/2006/math" xmlns:a14="http://schemas.microsoft.com/office/drawing/2010/main" xmlns:ma14="http://schemas.microsoft.com/office/mac/drawingml/2011/main" val="1"/>
+              <ma14:wrappingTextBoxFlag xmlns:ma14="http://schemas.microsoft.com/office/mac/drawingml/2011/main" xmlns:a14="http://schemas.microsoft.com/office/drawing/2010/main" xmlns:m="http://schemas.openxmlformats.org/officeDocument/2006/math" xmlns="" val="1"/>
             </a:ext>
           </a:extLst>
         </p:spPr>
@@ -14481,7 +14509,7 @@
           </a:effectLst>
           <a:extLst>
             <a:ext uri="{C572A759-6A51-4108-AA02-DFA0A04FC94B}">
-              <ma14:wrappingTextBoxFlag xmlns="" xmlns:m="http://schemas.openxmlformats.org/officeDocument/2006/math" xmlns:a14="http://schemas.microsoft.com/office/drawing/2010/main" xmlns:ma14="http://schemas.microsoft.com/office/mac/drawingml/2011/main" val="1"/>
+              <ma14:wrappingTextBoxFlag xmlns:ma14="http://schemas.microsoft.com/office/mac/drawingml/2011/main" xmlns:a14="http://schemas.microsoft.com/office/drawing/2010/main" xmlns:m="http://schemas.openxmlformats.org/officeDocument/2006/math" xmlns="" val="1"/>
             </a:ext>
           </a:extLst>
         </p:spPr>
@@ -14566,7 +14594,7 @@
           </a:effectLst>
           <a:extLst>
             <a:ext uri="{C572A759-6A51-4108-AA02-DFA0A04FC94B}">
-              <ma14:wrappingTextBoxFlag xmlns="" xmlns:m="http://schemas.openxmlformats.org/officeDocument/2006/math" xmlns:a14="http://schemas.microsoft.com/office/drawing/2010/main" xmlns:ma14="http://schemas.microsoft.com/office/mac/drawingml/2011/main" val="1"/>
+              <ma14:wrappingTextBoxFlag xmlns:ma14="http://schemas.microsoft.com/office/mac/drawingml/2011/main" xmlns:a14="http://schemas.microsoft.com/office/drawing/2010/main" xmlns:m="http://schemas.openxmlformats.org/officeDocument/2006/math" xmlns="" val="1"/>
             </a:ext>
           </a:extLst>
         </p:spPr>
@@ -14797,7 +14825,7 @@
           </a:effectLst>
           <a:extLst>
             <a:ext uri="{C572A759-6A51-4108-AA02-DFA0A04FC94B}">
-              <ma14:wrappingTextBoxFlag xmlns="" xmlns:m="http://schemas.openxmlformats.org/officeDocument/2006/math" xmlns:a14="http://schemas.microsoft.com/office/drawing/2010/main" xmlns:ma14="http://schemas.microsoft.com/office/mac/drawingml/2011/main" val="1"/>
+              <ma14:wrappingTextBoxFlag xmlns:ma14="http://schemas.microsoft.com/office/mac/drawingml/2011/main" xmlns:a14="http://schemas.microsoft.com/office/drawing/2010/main" xmlns:m="http://schemas.openxmlformats.org/officeDocument/2006/math" xmlns="" val="1"/>
             </a:ext>
           </a:extLst>
         </p:spPr>
@@ -14862,7 +14890,7 @@
           </a:effectLst>
           <a:extLst>
             <a:ext uri="{C572A759-6A51-4108-AA02-DFA0A04FC94B}">
-              <ma14:wrappingTextBoxFlag xmlns="" xmlns:m="http://schemas.openxmlformats.org/officeDocument/2006/math" xmlns:a14="http://schemas.microsoft.com/office/drawing/2010/main" xmlns:ma14="http://schemas.microsoft.com/office/mac/drawingml/2011/main" val="1"/>
+              <ma14:wrappingTextBoxFlag xmlns:ma14="http://schemas.microsoft.com/office/mac/drawingml/2011/main" xmlns:a14="http://schemas.microsoft.com/office/drawing/2010/main" xmlns:m="http://schemas.openxmlformats.org/officeDocument/2006/math" xmlns="" val="1"/>
             </a:ext>
           </a:extLst>
         </p:spPr>
@@ -15095,7 +15123,7 @@
           </a:effectLst>
           <a:extLst>
             <a:ext uri="{C572A759-6A51-4108-AA02-DFA0A04FC94B}">
-              <ma14:wrappingTextBoxFlag xmlns="" xmlns:m="http://schemas.openxmlformats.org/officeDocument/2006/math" xmlns:a14="http://schemas.microsoft.com/office/drawing/2010/main" xmlns:ma14="http://schemas.microsoft.com/office/mac/drawingml/2011/main" val="1"/>
+              <ma14:wrappingTextBoxFlag xmlns:ma14="http://schemas.microsoft.com/office/mac/drawingml/2011/main" xmlns:a14="http://schemas.microsoft.com/office/drawing/2010/main" xmlns:m="http://schemas.openxmlformats.org/officeDocument/2006/math" xmlns="" val="1"/>
             </a:ext>
           </a:extLst>
         </p:spPr>
@@ -15176,7 +15204,7 @@
           </a:effectLst>
           <a:extLst>
             <a:ext uri="{C572A759-6A51-4108-AA02-DFA0A04FC94B}">
-              <ma14:wrappingTextBoxFlag xmlns="" xmlns:m="http://schemas.openxmlformats.org/officeDocument/2006/math" xmlns:a14="http://schemas.microsoft.com/office/drawing/2010/main" xmlns:ma14="http://schemas.microsoft.com/office/mac/drawingml/2011/main" val="1"/>
+              <ma14:wrappingTextBoxFlag xmlns:ma14="http://schemas.microsoft.com/office/mac/drawingml/2011/main" xmlns:a14="http://schemas.microsoft.com/office/drawing/2010/main" xmlns:m="http://schemas.openxmlformats.org/officeDocument/2006/math" xmlns="" val="1"/>
             </a:ext>
           </a:extLst>
         </p:spPr>
@@ -15261,7 +15289,7 @@
           </a:effectLst>
           <a:extLst>
             <a:ext uri="{C572A759-6A51-4108-AA02-DFA0A04FC94B}">
-              <ma14:wrappingTextBoxFlag xmlns="" xmlns:m="http://schemas.openxmlformats.org/officeDocument/2006/math" xmlns:a14="http://schemas.microsoft.com/office/drawing/2010/main" xmlns:ma14="http://schemas.microsoft.com/office/mac/drawingml/2011/main" val="1"/>
+              <ma14:wrappingTextBoxFlag xmlns:ma14="http://schemas.microsoft.com/office/mac/drawingml/2011/main" xmlns:a14="http://schemas.microsoft.com/office/drawing/2010/main" xmlns:m="http://schemas.openxmlformats.org/officeDocument/2006/math" xmlns="" val="1"/>
             </a:ext>
           </a:extLst>
         </p:spPr>
@@ -15346,7 +15374,7 @@
           </a:effectLst>
           <a:extLst>
             <a:ext uri="{C572A759-6A51-4108-AA02-DFA0A04FC94B}">
-              <ma14:wrappingTextBoxFlag xmlns="" xmlns:m="http://schemas.openxmlformats.org/officeDocument/2006/math" xmlns:a14="http://schemas.microsoft.com/office/drawing/2010/main" xmlns:ma14="http://schemas.microsoft.com/office/mac/drawingml/2011/main" val="1"/>
+              <ma14:wrappingTextBoxFlag xmlns:ma14="http://schemas.microsoft.com/office/mac/drawingml/2011/main" xmlns:a14="http://schemas.microsoft.com/office/drawing/2010/main" xmlns:m="http://schemas.openxmlformats.org/officeDocument/2006/math" xmlns="" val="1"/>
             </a:ext>
           </a:extLst>
         </p:spPr>
@@ -15427,7 +15455,7 @@
           </a:effectLst>
           <a:extLst>
             <a:ext uri="{C572A759-6A51-4108-AA02-DFA0A04FC94B}">
-              <ma14:wrappingTextBoxFlag xmlns="" xmlns:m="http://schemas.openxmlformats.org/officeDocument/2006/math" xmlns:a14="http://schemas.microsoft.com/office/drawing/2010/main" xmlns:ma14="http://schemas.microsoft.com/office/mac/drawingml/2011/main" val="1"/>
+              <ma14:wrappingTextBoxFlag xmlns:ma14="http://schemas.microsoft.com/office/mac/drawingml/2011/main" xmlns:a14="http://schemas.microsoft.com/office/drawing/2010/main" xmlns:m="http://schemas.openxmlformats.org/officeDocument/2006/math" xmlns="" val="1"/>
             </a:ext>
           </a:extLst>
         </p:spPr>
@@ -15510,7 +15538,7 @@
           </a:effectLst>
           <a:extLst>
             <a:ext uri="{C572A759-6A51-4108-AA02-DFA0A04FC94B}">
-              <ma14:wrappingTextBoxFlag xmlns="" xmlns:m="http://schemas.openxmlformats.org/officeDocument/2006/math" xmlns:a14="http://schemas.microsoft.com/office/drawing/2010/main" xmlns:ma14="http://schemas.microsoft.com/office/mac/drawingml/2011/main" val="1"/>
+              <ma14:wrappingTextBoxFlag xmlns:ma14="http://schemas.microsoft.com/office/mac/drawingml/2011/main" xmlns:a14="http://schemas.microsoft.com/office/drawing/2010/main" xmlns:m="http://schemas.openxmlformats.org/officeDocument/2006/math" xmlns="" val="1"/>
             </a:ext>
           </a:extLst>
         </p:spPr>
@@ -15575,7 +15603,7 @@
           </a:effectLst>
           <a:extLst>
             <a:ext uri="{C572A759-6A51-4108-AA02-DFA0A04FC94B}">
-              <ma14:wrappingTextBoxFlag xmlns="" xmlns:m="http://schemas.openxmlformats.org/officeDocument/2006/math" xmlns:a14="http://schemas.microsoft.com/office/drawing/2010/main" xmlns:ma14="http://schemas.microsoft.com/office/mac/drawingml/2011/main" val="1"/>
+              <ma14:wrappingTextBoxFlag xmlns:ma14="http://schemas.microsoft.com/office/mac/drawingml/2011/main" xmlns:a14="http://schemas.microsoft.com/office/drawing/2010/main" xmlns:m="http://schemas.openxmlformats.org/officeDocument/2006/math" xmlns="" val="1"/>
             </a:ext>
           </a:extLst>
         </p:spPr>
@@ -15660,7 +15688,7 @@
           </a:effectLst>
           <a:extLst>
             <a:ext uri="{C572A759-6A51-4108-AA02-DFA0A04FC94B}">
-              <ma14:wrappingTextBoxFlag xmlns="" xmlns:m="http://schemas.openxmlformats.org/officeDocument/2006/math" xmlns:a14="http://schemas.microsoft.com/office/drawing/2010/main" xmlns:ma14="http://schemas.microsoft.com/office/mac/drawingml/2011/main" val="1"/>
+              <ma14:wrappingTextBoxFlag xmlns:ma14="http://schemas.microsoft.com/office/mac/drawingml/2011/main" xmlns:a14="http://schemas.microsoft.com/office/drawing/2010/main" xmlns:m="http://schemas.openxmlformats.org/officeDocument/2006/math" xmlns="" val="1"/>
             </a:ext>
           </a:extLst>
         </p:spPr>
@@ -15925,7 +15953,7 @@
           </a:effectLst>
           <a:extLst>
             <a:ext uri="{C572A759-6A51-4108-AA02-DFA0A04FC94B}">
-              <ma14:wrappingTextBoxFlag xmlns="" xmlns:m="http://schemas.openxmlformats.org/officeDocument/2006/math" xmlns:a14="http://schemas.microsoft.com/office/drawing/2010/main" xmlns:ma14="http://schemas.microsoft.com/office/mac/drawingml/2011/main" val="1"/>
+              <ma14:wrappingTextBoxFlag xmlns:ma14="http://schemas.microsoft.com/office/mac/drawingml/2011/main" xmlns:a14="http://schemas.microsoft.com/office/drawing/2010/main" xmlns:m="http://schemas.openxmlformats.org/officeDocument/2006/math" xmlns="" val="1"/>
             </a:ext>
           </a:extLst>
         </p:spPr>

</xml_diff>

<commit_message>
changed filter of arch png
</commit_message>
<xml_diff>
--- a/resource/dubbo-go-arch.pptx
+++ b/resource/dubbo-go-arch.pptx
@@ -2233,7 +2233,7 @@
           </a:ln>
           <a:extLst>
             <a:ext uri="{C572A759-6A51-4108-AA02-DFA0A04FC94B}">
-              <ma14:wrappingTextBoxFlag xmlns:ma14="http://schemas.microsoft.com/office/mac/drawingml/2011/main" xmlns:a14="http://schemas.microsoft.com/office/drawing/2010/main" xmlns:m="http://schemas.openxmlformats.org/officeDocument/2006/math" xmlns="" val="1"/>
+              <ma14:wrappingTextBoxFlag xmlns="" xmlns:m="http://schemas.openxmlformats.org/officeDocument/2006/math" xmlns:a14="http://schemas.microsoft.com/office/drawing/2010/main" xmlns:ma14="http://schemas.microsoft.com/office/mac/drawingml/2011/main" val="1"/>
             </a:ext>
           </a:extLst>
         </p:spPr>
@@ -2272,7 +2272,7 @@
           </a:ln>
           <a:extLst>
             <a:ext uri="{C572A759-6A51-4108-AA02-DFA0A04FC94B}">
-              <ma14:wrappingTextBoxFlag xmlns:ma14="http://schemas.microsoft.com/office/mac/drawingml/2011/main" xmlns:a14="http://schemas.microsoft.com/office/drawing/2010/main" xmlns:m="http://schemas.openxmlformats.org/officeDocument/2006/math" xmlns="" val="1"/>
+              <ma14:wrappingTextBoxFlag xmlns="" xmlns:m="http://schemas.openxmlformats.org/officeDocument/2006/math" xmlns:a14="http://schemas.microsoft.com/office/drawing/2010/main" xmlns:ma14="http://schemas.microsoft.com/office/mac/drawingml/2011/main" val="1"/>
             </a:ext>
           </a:extLst>
         </p:spPr>
@@ -3155,7 +3155,7 @@
           </a:effectLst>
           <a:extLst>
             <a:ext uri="{C572A759-6A51-4108-AA02-DFA0A04FC94B}">
-              <ma14:wrappingTextBoxFlag xmlns:ma14="http://schemas.microsoft.com/office/mac/drawingml/2011/main" xmlns:a14="http://schemas.microsoft.com/office/drawing/2010/main" xmlns:m="http://schemas.openxmlformats.org/officeDocument/2006/math" xmlns="" val="1"/>
+              <ma14:wrappingTextBoxFlag xmlns="" xmlns:m="http://schemas.openxmlformats.org/officeDocument/2006/math" xmlns:a14="http://schemas.microsoft.com/office/drawing/2010/main" xmlns:ma14="http://schemas.microsoft.com/office/mac/drawingml/2011/main" val="1"/>
             </a:ext>
           </a:extLst>
         </p:spPr>
@@ -3255,7 +3255,7 @@
           </a:effectLst>
           <a:extLst>
             <a:ext uri="{C572A759-6A51-4108-AA02-DFA0A04FC94B}">
-              <ma14:wrappingTextBoxFlag xmlns:ma14="http://schemas.microsoft.com/office/mac/drawingml/2011/main" xmlns:a14="http://schemas.microsoft.com/office/drawing/2010/main" xmlns:m="http://schemas.openxmlformats.org/officeDocument/2006/math" xmlns="" val="1"/>
+              <ma14:wrappingTextBoxFlag xmlns="" xmlns:m="http://schemas.openxmlformats.org/officeDocument/2006/math" xmlns:a14="http://schemas.microsoft.com/office/drawing/2010/main" xmlns:ma14="http://schemas.microsoft.com/office/mac/drawingml/2011/main" val="1"/>
             </a:ext>
           </a:extLst>
         </p:spPr>
@@ -3325,7 +3325,7 @@
           </a:effectLst>
           <a:extLst>
             <a:ext uri="{C572A759-6A51-4108-AA02-DFA0A04FC94B}">
-              <ma14:wrappingTextBoxFlag xmlns:ma14="http://schemas.microsoft.com/office/mac/drawingml/2011/main" xmlns:a14="http://schemas.microsoft.com/office/drawing/2010/main" xmlns:m="http://schemas.openxmlformats.org/officeDocument/2006/math" xmlns="" val="1"/>
+              <ma14:wrappingTextBoxFlag xmlns="" xmlns:m="http://schemas.openxmlformats.org/officeDocument/2006/math" xmlns:a14="http://schemas.microsoft.com/office/drawing/2010/main" xmlns:ma14="http://schemas.microsoft.com/office/mac/drawingml/2011/main" val="1"/>
             </a:ext>
           </a:extLst>
         </p:spPr>
@@ -3378,7 +3378,7 @@
           </a:effectLst>
           <a:extLst>
             <a:ext uri="{C572A759-6A51-4108-AA02-DFA0A04FC94B}">
-              <ma14:wrappingTextBoxFlag xmlns:ma14="http://schemas.microsoft.com/office/mac/drawingml/2011/main" xmlns:a14="http://schemas.microsoft.com/office/drawing/2010/main" xmlns:m="http://schemas.openxmlformats.org/officeDocument/2006/math" xmlns="" val="1"/>
+              <ma14:wrappingTextBoxFlag xmlns="" xmlns:m="http://schemas.openxmlformats.org/officeDocument/2006/math" xmlns:a14="http://schemas.microsoft.com/office/drawing/2010/main" xmlns:ma14="http://schemas.microsoft.com/office/mac/drawingml/2011/main" val="1"/>
             </a:ext>
           </a:extLst>
         </p:spPr>
@@ -3445,7 +3445,7 @@
           </a:effectLst>
           <a:extLst>
             <a:ext uri="{C572A759-6A51-4108-AA02-DFA0A04FC94B}">
-              <ma14:wrappingTextBoxFlag xmlns:ma14="http://schemas.microsoft.com/office/mac/drawingml/2011/main" xmlns:a14="http://schemas.microsoft.com/office/drawing/2010/main" xmlns:m="http://schemas.openxmlformats.org/officeDocument/2006/math" xmlns="" val="1"/>
+              <ma14:wrappingTextBoxFlag xmlns="" xmlns:m="http://schemas.openxmlformats.org/officeDocument/2006/math" xmlns:a14="http://schemas.microsoft.com/office/drawing/2010/main" xmlns:ma14="http://schemas.microsoft.com/office/mac/drawingml/2011/main" val="1"/>
             </a:ext>
           </a:extLst>
         </p:spPr>
@@ -3499,7 +3499,7 @@
           </a:effectLst>
           <a:extLst>
             <a:ext uri="{C572A759-6A51-4108-AA02-DFA0A04FC94B}">
-              <ma14:wrappingTextBoxFlag xmlns:ma14="http://schemas.microsoft.com/office/mac/drawingml/2011/main" xmlns:a14="http://schemas.microsoft.com/office/drawing/2010/main" xmlns:m="http://schemas.openxmlformats.org/officeDocument/2006/math" xmlns="" val="1"/>
+              <ma14:wrappingTextBoxFlag xmlns="" xmlns:m="http://schemas.openxmlformats.org/officeDocument/2006/math" xmlns:a14="http://schemas.microsoft.com/office/drawing/2010/main" xmlns:ma14="http://schemas.microsoft.com/office/mac/drawingml/2011/main" val="1"/>
             </a:ext>
           </a:extLst>
         </p:spPr>
@@ -3578,7 +3578,7 @@
             </a:effectLst>
             <a:extLst>
               <a:ext uri="{C572A759-6A51-4108-AA02-DFA0A04FC94B}">
-                <ma14:wrappingTextBoxFlag xmlns:ma14="http://schemas.microsoft.com/office/mac/drawingml/2011/main" xmlns:a14="http://schemas.microsoft.com/office/drawing/2010/main" xmlns:m="http://schemas.openxmlformats.org/officeDocument/2006/math" xmlns="" val="1"/>
+                <ma14:wrappingTextBoxFlag xmlns="" xmlns:m="http://schemas.openxmlformats.org/officeDocument/2006/math" xmlns:a14="http://schemas.microsoft.com/office/drawing/2010/main" xmlns:ma14="http://schemas.microsoft.com/office/mac/drawingml/2011/main" val="1"/>
               </a:ext>
             </a:extLst>
           </p:spPr>
@@ -3629,7 +3629,7 @@
             </a:effectLst>
             <a:extLst>
               <a:ext uri="{C572A759-6A51-4108-AA02-DFA0A04FC94B}">
-                <ma14:wrappingTextBoxFlag xmlns:ma14="http://schemas.microsoft.com/office/mac/drawingml/2011/main" xmlns:a14="http://schemas.microsoft.com/office/drawing/2010/main" xmlns:m="http://schemas.openxmlformats.org/officeDocument/2006/math" xmlns="" val="1"/>
+                <ma14:wrappingTextBoxFlag xmlns="" xmlns:m="http://schemas.openxmlformats.org/officeDocument/2006/math" xmlns:a14="http://schemas.microsoft.com/office/drawing/2010/main" xmlns:ma14="http://schemas.microsoft.com/office/mac/drawingml/2011/main" val="1"/>
               </a:ext>
             </a:extLst>
           </p:spPr>
@@ -3683,7 +3683,7 @@
             </a:effectLst>
             <a:extLst>
               <a:ext uri="{C572A759-6A51-4108-AA02-DFA0A04FC94B}">
-                <ma14:wrappingTextBoxFlag xmlns:ma14="http://schemas.microsoft.com/office/mac/drawingml/2011/main" xmlns:a14="http://schemas.microsoft.com/office/drawing/2010/main" xmlns:m="http://schemas.openxmlformats.org/officeDocument/2006/math" xmlns="" val="1"/>
+                <ma14:wrappingTextBoxFlag xmlns="" xmlns:m="http://schemas.openxmlformats.org/officeDocument/2006/math" xmlns:a14="http://schemas.microsoft.com/office/drawing/2010/main" xmlns:ma14="http://schemas.microsoft.com/office/mac/drawingml/2011/main" val="1"/>
               </a:ext>
             </a:extLst>
           </p:spPr>
@@ -3737,7 +3737,7 @@
             </a:effectLst>
             <a:extLst>
               <a:ext uri="{C572A759-6A51-4108-AA02-DFA0A04FC94B}">
-                <ma14:wrappingTextBoxFlag xmlns:ma14="http://schemas.microsoft.com/office/mac/drawingml/2011/main" xmlns:a14="http://schemas.microsoft.com/office/drawing/2010/main" xmlns:m="http://schemas.openxmlformats.org/officeDocument/2006/math" xmlns="" val="1"/>
+                <ma14:wrappingTextBoxFlag xmlns="" xmlns:m="http://schemas.openxmlformats.org/officeDocument/2006/math" xmlns:a14="http://schemas.microsoft.com/office/drawing/2010/main" xmlns:ma14="http://schemas.microsoft.com/office/mac/drawingml/2011/main" val="1"/>
               </a:ext>
             </a:extLst>
           </p:spPr>
@@ -3791,7 +3791,7 @@
             </a:effectLst>
             <a:extLst>
               <a:ext uri="{C572A759-6A51-4108-AA02-DFA0A04FC94B}">
-                <ma14:wrappingTextBoxFlag xmlns:ma14="http://schemas.microsoft.com/office/mac/drawingml/2011/main" xmlns:a14="http://schemas.microsoft.com/office/drawing/2010/main" xmlns:m="http://schemas.openxmlformats.org/officeDocument/2006/math" xmlns="" val="1"/>
+                <ma14:wrappingTextBoxFlag xmlns="" xmlns:m="http://schemas.openxmlformats.org/officeDocument/2006/math" xmlns:a14="http://schemas.microsoft.com/office/drawing/2010/main" xmlns:ma14="http://schemas.microsoft.com/office/mac/drawingml/2011/main" val="1"/>
               </a:ext>
             </a:extLst>
           </p:spPr>
@@ -3846,7 +3846,7 @@
           </a:effectLst>
           <a:extLst>
             <a:ext uri="{C572A759-6A51-4108-AA02-DFA0A04FC94B}">
-              <ma14:wrappingTextBoxFlag xmlns:ma14="http://schemas.microsoft.com/office/mac/drawingml/2011/main" xmlns:a14="http://schemas.microsoft.com/office/drawing/2010/main" xmlns:m="http://schemas.openxmlformats.org/officeDocument/2006/math" xmlns="" val="1"/>
+              <ma14:wrappingTextBoxFlag xmlns="" xmlns:m="http://schemas.openxmlformats.org/officeDocument/2006/math" xmlns:a14="http://schemas.microsoft.com/office/drawing/2010/main" xmlns:ma14="http://schemas.microsoft.com/office/mac/drawingml/2011/main" val="1"/>
             </a:ext>
           </a:extLst>
         </p:spPr>
@@ -4022,7 +4022,7 @@
           </a:effectLst>
           <a:extLst>
             <a:ext uri="{C572A759-6A51-4108-AA02-DFA0A04FC94B}">
-              <ma14:wrappingTextBoxFlag xmlns:ma14="http://schemas.microsoft.com/office/mac/drawingml/2011/main" xmlns:a14="http://schemas.microsoft.com/office/drawing/2010/main" xmlns:m="http://schemas.openxmlformats.org/officeDocument/2006/math" xmlns="" val="1"/>
+              <ma14:wrappingTextBoxFlag xmlns="" xmlns:m="http://schemas.openxmlformats.org/officeDocument/2006/math" xmlns:a14="http://schemas.microsoft.com/office/drawing/2010/main" xmlns:ma14="http://schemas.microsoft.com/office/mac/drawingml/2011/main" val="1"/>
             </a:ext>
           </a:extLst>
         </p:spPr>
@@ -4146,7 +4146,7 @@
           </a:effectLst>
           <a:extLst>
             <a:ext uri="{C572A759-6A51-4108-AA02-DFA0A04FC94B}">
-              <ma14:wrappingTextBoxFlag xmlns:ma14="http://schemas.microsoft.com/office/mac/drawingml/2011/main" xmlns:a14="http://schemas.microsoft.com/office/drawing/2010/main" xmlns:m="http://schemas.openxmlformats.org/officeDocument/2006/math" xmlns="" val="1"/>
+              <ma14:wrappingTextBoxFlag xmlns="" xmlns:m="http://schemas.openxmlformats.org/officeDocument/2006/math" xmlns:a14="http://schemas.microsoft.com/office/drawing/2010/main" xmlns:ma14="http://schemas.microsoft.com/office/mac/drawingml/2011/main" val="1"/>
             </a:ext>
           </a:extLst>
         </p:spPr>
@@ -4225,7 +4225,7 @@
             </a:effectLst>
             <a:extLst>
               <a:ext uri="{C572A759-6A51-4108-AA02-DFA0A04FC94B}">
-                <ma14:wrappingTextBoxFlag xmlns:ma14="http://schemas.microsoft.com/office/mac/drawingml/2011/main" xmlns:a14="http://schemas.microsoft.com/office/drawing/2010/main" xmlns:m="http://schemas.openxmlformats.org/officeDocument/2006/math" xmlns="" val="1"/>
+                <ma14:wrappingTextBoxFlag xmlns="" xmlns:m="http://schemas.openxmlformats.org/officeDocument/2006/math" xmlns:a14="http://schemas.microsoft.com/office/drawing/2010/main" xmlns:ma14="http://schemas.microsoft.com/office/mac/drawingml/2011/main" val="1"/>
               </a:ext>
             </a:extLst>
           </p:spPr>
@@ -4290,7 +4290,7 @@
             </a:effectLst>
             <a:extLst>
               <a:ext uri="{C572A759-6A51-4108-AA02-DFA0A04FC94B}">
-                <ma14:wrappingTextBoxFlag xmlns:ma14="http://schemas.microsoft.com/office/mac/drawingml/2011/main" xmlns:a14="http://schemas.microsoft.com/office/drawing/2010/main" xmlns:m="http://schemas.openxmlformats.org/officeDocument/2006/math" xmlns="" val="1"/>
+                <ma14:wrappingTextBoxFlag xmlns="" xmlns:m="http://schemas.openxmlformats.org/officeDocument/2006/math" xmlns:a14="http://schemas.microsoft.com/office/drawing/2010/main" xmlns:ma14="http://schemas.microsoft.com/office/mac/drawingml/2011/main" val="1"/>
               </a:ext>
             </a:extLst>
           </p:spPr>
@@ -4355,7 +4355,7 @@
             </a:effectLst>
             <a:extLst>
               <a:ext uri="{C572A759-6A51-4108-AA02-DFA0A04FC94B}">
-                <ma14:wrappingTextBoxFlag xmlns:ma14="http://schemas.microsoft.com/office/mac/drawingml/2011/main" xmlns:a14="http://schemas.microsoft.com/office/drawing/2010/main" xmlns:m="http://schemas.openxmlformats.org/officeDocument/2006/math" xmlns="" val="1"/>
+                <ma14:wrappingTextBoxFlag xmlns="" xmlns:m="http://schemas.openxmlformats.org/officeDocument/2006/math" xmlns:a14="http://schemas.microsoft.com/office/drawing/2010/main" xmlns:ma14="http://schemas.microsoft.com/office/mac/drawingml/2011/main" val="1"/>
               </a:ext>
             </a:extLst>
           </p:spPr>
@@ -4420,7 +4420,7 @@
             </a:effectLst>
             <a:extLst>
               <a:ext uri="{C572A759-6A51-4108-AA02-DFA0A04FC94B}">
-                <ma14:wrappingTextBoxFlag xmlns:ma14="http://schemas.microsoft.com/office/mac/drawingml/2011/main" xmlns:a14="http://schemas.microsoft.com/office/drawing/2010/main" xmlns:m="http://schemas.openxmlformats.org/officeDocument/2006/math" xmlns="" val="1"/>
+                <ma14:wrappingTextBoxFlag xmlns="" xmlns:m="http://schemas.openxmlformats.org/officeDocument/2006/math" xmlns:a14="http://schemas.microsoft.com/office/drawing/2010/main" xmlns:ma14="http://schemas.microsoft.com/office/mac/drawingml/2011/main" val="1"/>
               </a:ext>
             </a:extLst>
           </p:spPr>
@@ -4707,7 +4707,7 @@
           </a:effectLst>
           <a:extLst>
             <a:ext uri="{C572A759-6A51-4108-AA02-DFA0A04FC94B}">
-              <ma14:wrappingTextBoxFlag xmlns:ma14="http://schemas.microsoft.com/office/mac/drawingml/2011/main" xmlns:a14="http://schemas.microsoft.com/office/drawing/2010/main" xmlns:m="http://schemas.openxmlformats.org/officeDocument/2006/math" xmlns="" val="1"/>
+              <ma14:wrappingTextBoxFlag xmlns="" xmlns:m="http://schemas.openxmlformats.org/officeDocument/2006/math" xmlns:a14="http://schemas.microsoft.com/office/drawing/2010/main" xmlns:ma14="http://schemas.microsoft.com/office/mac/drawingml/2011/main" val="1"/>
             </a:ext>
           </a:extLst>
         </p:spPr>
@@ -4766,7 +4766,7 @@
           </a:effectLst>
           <a:extLst>
             <a:ext uri="{C572A759-6A51-4108-AA02-DFA0A04FC94B}">
-              <ma14:wrappingTextBoxFlag xmlns:ma14="http://schemas.microsoft.com/office/mac/drawingml/2011/main" xmlns:a14="http://schemas.microsoft.com/office/drawing/2010/main" xmlns:m="http://schemas.openxmlformats.org/officeDocument/2006/math" xmlns="" val="1"/>
+              <ma14:wrappingTextBoxFlag xmlns="" xmlns:m="http://schemas.openxmlformats.org/officeDocument/2006/math" xmlns:a14="http://schemas.microsoft.com/office/drawing/2010/main" xmlns:ma14="http://schemas.microsoft.com/office/mac/drawingml/2011/main" val="1"/>
             </a:ext>
           </a:extLst>
         </p:spPr>
@@ -4831,7 +4831,7 @@
           </a:effectLst>
           <a:extLst>
             <a:ext uri="{C572A759-6A51-4108-AA02-DFA0A04FC94B}">
-              <ma14:wrappingTextBoxFlag xmlns:ma14="http://schemas.microsoft.com/office/mac/drawingml/2011/main" xmlns:a14="http://schemas.microsoft.com/office/drawing/2010/main" xmlns:m="http://schemas.openxmlformats.org/officeDocument/2006/math" xmlns="" val="1"/>
+              <ma14:wrappingTextBoxFlag xmlns="" xmlns:m="http://schemas.openxmlformats.org/officeDocument/2006/math" xmlns:a14="http://schemas.microsoft.com/office/drawing/2010/main" xmlns:ma14="http://schemas.microsoft.com/office/mac/drawingml/2011/main" val="1"/>
             </a:ext>
           </a:extLst>
         </p:spPr>
@@ -4896,7 +4896,7 @@
           </a:effectLst>
           <a:extLst>
             <a:ext uri="{C572A759-6A51-4108-AA02-DFA0A04FC94B}">
-              <ma14:wrappingTextBoxFlag xmlns:ma14="http://schemas.microsoft.com/office/mac/drawingml/2011/main" xmlns:a14="http://schemas.microsoft.com/office/drawing/2010/main" xmlns:m="http://schemas.openxmlformats.org/officeDocument/2006/math" xmlns="" val="1"/>
+              <ma14:wrappingTextBoxFlag xmlns="" xmlns:m="http://schemas.openxmlformats.org/officeDocument/2006/math" xmlns:a14="http://schemas.microsoft.com/office/drawing/2010/main" xmlns:ma14="http://schemas.microsoft.com/office/mac/drawingml/2011/main" val="1"/>
             </a:ext>
           </a:extLst>
         </p:spPr>
@@ -4961,7 +4961,7 @@
           </a:effectLst>
           <a:extLst>
             <a:ext uri="{C572A759-6A51-4108-AA02-DFA0A04FC94B}">
-              <ma14:wrappingTextBoxFlag xmlns:ma14="http://schemas.microsoft.com/office/mac/drawingml/2011/main" xmlns:a14="http://schemas.microsoft.com/office/drawing/2010/main" xmlns:m="http://schemas.openxmlformats.org/officeDocument/2006/math" xmlns="" val="1"/>
+              <ma14:wrappingTextBoxFlag xmlns="" xmlns:m="http://schemas.openxmlformats.org/officeDocument/2006/math" xmlns:a14="http://schemas.microsoft.com/office/drawing/2010/main" xmlns:ma14="http://schemas.microsoft.com/office/mac/drawingml/2011/main" val="1"/>
             </a:ext>
           </a:extLst>
         </p:spPr>
@@ -5092,7 +5092,7 @@
             <a:effectLst/>
             <a:extLst>
               <a:ext uri="{C572A759-6A51-4108-AA02-DFA0A04FC94B}">
-                <ma14:wrappingTextBoxFlag xmlns:ma14="http://schemas.microsoft.com/office/mac/drawingml/2011/main" xmlns:a14="http://schemas.microsoft.com/office/drawing/2010/main" xmlns:m="http://schemas.openxmlformats.org/officeDocument/2006/math" xmlns="" val="1"/>
+                <ma14:wrappingTextBoxFlag xmlns="" xmlns:m="http://schemas.openxmlformats.org/officeDocument/2006/math" xmlns:a14="http://schemas.microsoft.com/office/drawing/2010/main" xmlns:ma14="http://schemas.microsoft.com/office/mac/drawingml/2011/main" val="1"/>
               </a:ext>
             </a:extLst>
           </p:spPr>
@@ -5221,7 +5221,7 @@
             <a:effectLst/>
             <a:extLst>
               <a:ext uri="{C572A759-6A51-4108-AA02-DFA0A04FC94B}">
-                <ma14:wrappingTextBoxFlag xmlns:ma14="http://schemas.microsoft.com/office/mac/drawingml/2011/main" xmlns:a14="http://schemas.microsoft.com/office/drawing/2010/main" xmlns:m="http://schemas.openxmlformats.org/officeDocument/2006/math" xmlns="" val="1"/>
+                <ma14:wrappingTextBoxFlag xmlns="" xmlns:m="http://schemas.openxmlformats.org/officeDocument/2006/math" xmlns:a14="http://schemas.microsoft.com/office/drawing/2010/main" xmlns:ma14="http://schemas.microsoft.com/office/mac/drawingml/2011/main" val="1"/>
               </a:ext>
             </a:extLst>
           </p:spPr>
@@ -5272,7 +5272,7 @@
             </a:ln>
             <a:extLst>
               <a:ext uri="{C572A759-6A51-4108-AA02-DFA0A04FC94B}">
-                <ma14:wrappingTextBoxFlag xmlns:ma14="http://schemas.microsoft.com/office/mac/drawingml/2011/main" xmlns:a14="http://schemas.microsoft.com/office/drawing/2010/main" xmlns:m="http://schemas.openxmlformats.org/officeDocument/2006/math" xmlns="" val="1"/>
+                <ma14:wrappingTextBoxFlag xmlns="" xmlns:m="http://schemas.openxmlformats.org/officeDocument/2006/math" xmlns:a14="http://schemas.microsoft.com/office/drawing/2010/main" xmlns:ma14="http://schemas.microsoft.com/office/mac/drawingml/2011/main" val="1"/>
               </a:ext>
             </a:extLst>
           </p:spPr>
@@ -5466,7 +5466,7 @@
             </a:effectLst>
             <a:extLst>
               <a:ext uri="{C572A759-6A51-4108-AA02-DFA0A04FC94B}">
-                <ma14:wrappingTextBoxFlag xmlns:ma14="http://schemas.microsoft.com/office/mac/drawingml/2011/main" xmlns:a14="http://schemas.microsoft.com/office/drawing/2010/main" xmlns:m="http://schemas.openxmlformats.org/officeDocument/2006/math" xmlns="" val="1"/>
+                <ma14:wrappingTextBoxFlag xmlns="" xmlns:m="http://schemas.openxmlformats.org/officeDocument/2006/math" xmlns:a14="http://schemas.microsoft.com/office/drawing/2010/main" xmlns:ma14="http://schemas.microsoft.com/office/mac/drawingml/2011/main" val="1"/>
               </a:ext>
             </a:extLst>
           </p:spPr>
@@ -5536,7 +5536,7 @@
             </a:effectLst>
             <a:extLst>
               <a:ext uri="{C572A759-6A51-4108-AA02-DFA0A04FC94B}">
-                <ma14:wrappingTextBoxFlag xmlns:ma14="http://schemas.microsoft.com/office/mac/drawingml/2011/main" xmlns:a14="http://schemas.microsoft.com/office/drawing/2010/main" xmlns:m="http://schemas.openxmlformats.org/officeDocument/2006/math" xmlns="" val="1"/>
+                <ma14:wrappingTextBoxFlag xmlns="" xmlns:m="http://schemas.openxmlformats.org/officeDocument/2006/math" xmlns:a14="http://schemas.microsoft.com/office/drawing/2010/main" xmlns:ma14="http://schemas.microsoft.com/office/mac/drawingml/2011/main" val="1"/>
               </a:ext>
             </a:extLst>
           </p:spPr>
@@ -5659,7 +5659,7 @@
           </a:ln>
           <a:extLst>
             <a:ext uri="{C572A759-6A51-4108-AA02-DFA0A04FC94B}">
-              <ma14:wrappingTextBoxFlag xmlns:ma14="http://schemas.microsoft.com/office/mac/drawingml/2011/main" xmlns:a14="http://schemas.microsoft.com/office/drawing/2010/main" xmlns:m="http://schemas.openxmlformats.org/officeDocument/2006/math" xmlns="" val="1"/>
+              <ma14:wrappingTextBoxFlag xmlns="" xmlns:m="http://schemas.openxmlformats.org/officeDocument/2006/math" xmlns:a14="http://schemas.microsoft.com/office/drawing/2010/main" xmlns:ma14="http://schemas.microsoft.com/office/mac/drawingml/2011/main" val="1"/>
             </a:ext>
           </a:extLst>
         </p:spPr>
@@ -5748,7 +5748,7 @@
             </a:effectLst>
             <a:extLst>
               <a:ext uri="{C572A759-6A51-4108-AA02-DFA0A04FC94B}">
-                <ma14:wrappingTextBoxFlag xmlns:ma14="http://schemas.microsoft.com/office/mac/drawingml/2011/main" xmlns:a14="http://schemas.microsoft.com/office/drawing/2010/main" xmlns:m="http://schemas.openxmlformats.org/officeDocument/2006/math" xmlns="" val="1"/>
+                <ma14:wrappingTextBoxFlag xmlns="" xmlns:m="http://schemas.openxmlformats.org/officeDocument/2006/math" xmlns:a14="http://schemas.microsoft.com/office/drawing/2010/main" xmlns:ma14="http://schemas.microsoft.com/office/mac/drawingml/2011/main" val="1"/>
               </a:ext>
             </a:extLst>
           </p:spPr>
@@ -5842,7 +5842,7 @@
                 </a:effectLst>
                 <a:extLst>
                   <a:ext uri="{C572A759-6A51-4108-AA02-DFA0A04FC94B}">
-                    <ma14:wrappingTextBoxFlag xmlns:ma14="http://schemas.microsoft.com/office/mac/drawingml/2011/main" xmlns:a14="http://schemas.microsoft.com/office/drawing/2010/main" xmlns:m="http://schemas.openxmlformats.org/officeDocument/2006/math" xmlns="" val="1"/>
+                    <ma14:wrappingTextBoxFlag xmlns="" xmlns:m="http://schemas.openxmlformats.org/officeDocument/2006/math" xmlns:a14="http://schemas.microsoft.com/office/drawing/2010/main" xmlns:ma14="http://schemas.microsoft.com/office/mac/drawingml/2011/main" val="1"/>
                   </a:ext>
                 </a:extLst>
               </p:spPr>
@@ -5909,7 +5909,7 @@
                 </a:effectLst>
                 <a:extLst>
                   <a:ext uri="{C572A759-6A51-4108-AA02-DFA0A04FC94B}">
-                    <ma14:wrappingTextBoxFlag xmlns:ma14="http://schemas.microsoft.com/office/mac/drawingml/2011/main" xmlns:a14="http://schemas.microsoft.com/office/drawing/2010/main" xmlns:m="http://schemas.openxmlformats.org/officeDocument/2006/math" xmlns="" val="1"/>
+                    <ma14:wrappingTextBoxFlag xmlns="" xmlns:m="http://schemas.openxmlformats.org/officeDocument/2006/math" xmlns:a14="http://schemas.microsoft.com/office/drawing/2010/main" xmlns:ma14="http://schemas.microsoft.com/office/mac/drawingml/2011/main" val="1"/>
                   </a:ext>
                 </a:extLst>
               </p:spPr>
@@ -5994,7 +5994,7 @@
                 </a:effectLst>
                 <a:extLst>
                   <a:ext uri="{C572A759-6A51-4108-AA02-DFA0A04FC94B}">
-                    <ma14:wrappingTextBoxFlag xmlns:ma14="http://schemas.microsoft.com/office/mac/drawingml/2011/main" xmlns:a14="http://schemas.microsoft.com/office/drawing/2010/main" xmlns:m="http://schemas.openxmlformats.org/officeDocument/2006/math" xmlns="" val="1"/>
+                    <ma14:wrappingTextBoxFlag xmlns="" xmlns:m="http://schemas.openxmlformats.org/officeDocument/2006/math" xmlns:a14="http://schemas.microsoft.com/office/drawing/2010/main" xmlns:ma14="http://schemas.microsoft.com/office/mac/drawingml/2011/main" val="1"/>
                   </a:ext>
                 </a:extLst>
               </p:spPr>
@@ -6061,7 +6061,7 @@
                 </a:effectLst>
                 <a:extLst>
                   <a:ext uri="{C572A759-6A51-4108-AA02-DFA0A04FC94B}">
-                    <ma14:wrappingTextBoxFlag xmlns:ma14="http://schemas.microsoft.com/office/mac/drawingml/2011/main" xmlns:a14="http://schemas.microsoft.com/office/drawing/2010/main" xmlns:m="http://schemas.openxmlformats.org/officeDocument/2006/math" xmlns="" val="1"/>
+                    <ma14:wrappingTextBoxFlag xmlns="" xmlns:m="http://schemas.openxmlformats.org/officeDocument/2006/math" xmlns:a14="http://schemas.microsoft.com/office/drawing/2010/main" xmlns:ma14="http://schemas.microsoft.com/office/mac/drawingml/2011/main" val="1"/>
                   </a:ext>
                 </a:extLst>
               </p:spPr>
@@ -6150,7 +6150,7 @@
                 </a:effectLst>
                 <a:extLst>
                   <a:ext uri="{C572A759-6A51-4108-AA02-DFA0A04FC94B}">
-                    <ma14:wrappingTextBoxFlag xmlns:ma14="http://schemas.microsoft.com/office/mac/drawingml/2011/main" xmlns:a14="http://schemas.microsoft.com/office/drawing/2010/main" xmlns:m="http://schemas.openxmlformats.org/officeDocument/2006/math" xmlns="" val="1"/>
+                    <ma14:wrappingTextBoxFlag xmlns="" xmlns:m="http://schemas.openxmlformats.org/officeDocument/2006/math" xmlns:a14="http://schemas.microsoft.com/office/drawing/2010/main" xmlns:ma14="http://schemas.microsoft.com/office/mac/drawingml/2011/main" val="1"/>
                   </a:ext>
                 </a:extLst>
               </p:spPr>
@@ -6217,7 +6217,7 @@
                 </a:effectLst>
                 <a:extLst>
                   <a:ext uri="{C572A759-6A51-4108-AA02-DFA0A04FC94B}">
-                    <ma14:wrappingTextBoxFlag xmlns:ma14="http://schemas.microsoft.com/office/mac/drawingml/2011/main" xmlns:a14="http://schemas.microsoft.com/office/drawing/2010/main" xmlns:m="http://schemas.openxmlformats.org/officeDocument/2006/math" xmlns="" val="1"/>
+                    <ma14:wrappingTextBoxFlag xmlns="" xmlns:m="http://schemas.openxmlformats.org/officeDocument/2006/math" xmlns:a14="http://schemas.microsoft.com/office/drawing/2010/main" xmlns:ma14="http://schemas.microsoft.com/office/mac/drawingml/2011/main" val="1"/>
                   </a:ext>
                 </a:extLst>
               </p:spPr>
@@ -6302,7 +6302,7 @@
                 </a:effectLst>
                 <a:extLst>
                   <a:ext uri="{C572A759-6A51-4108-AA02-DFA0A04FC94B}">
-                    <ma14:wrappingTextBoxFlag xmlns:ma14="http://schemas.microsoft.com/office/mac/drawingml/2011/main" xmlns:a14="http://schemas.microsoft.com/office/drawing/2010/main" xmlns:m="http://schemas.openxmlformats.org/officeDocument/2006/math" xmlns="" val="1"/>
+                    <ma14:wrappingTextBoxFlag xmlns="" xmlns:m="http://schemas.openxmlformats.org/officeDocument/2006/math" xmlns:a14="http://schemas.microsoft.com/office/drawing/2010/main" xmlns:ma14="http://schemas.microsoft.com/office/mac/drawingml/2011/main" val="1"/>
                   </a:ext>
                 </a:extLst>
               </p:spPr>
@@ -6369,7 +6369,7 @@
                 </a:effectLst>
                 <a:extLst>
                   <a:ext uri="{C572A759-6A51-4108-AA02-DFA0A04FC94B}">
-                    <ma14:wrappingTextBoxFlag xmlns:ma14="http://schemas.microsoft.com/office/mac/drawingml/2011/main" xmlns:a14="http://schemas.microsoft.com/office/drawing/2010/main" xmlns:m="http://schemas.openxmlformats.org/officeDocument/2006/math" xmlns="" val="1"/>
+                    <ma14:wrappingTextBoxFlag xmlns="" xmlns:m="http://schemas.openxmlformats.org/officeDocument/2006/math" xmlns:a14="http://schemas.microsoft.com/office/drawing/2010/main" xmlns:ma14="http://schemas.microsoft.com/office/mac/drawingml/2011/main" val="1"/>
                   </a:ext>
                 </a:extLst>
               </p:spPr>
@@ -6460,7 +6460,7 @@
                 </a:effectLst>
                 <a:extLst>
                   <a:ext uri="{C572A759-6A51-4108-AA02-DFA0A04FC94B}">
-                    <ma14:wrappingTextBoxFlag xmlns:ma14="http://schemas.microsoft.com/office/mac/drawingml/2011/main" xmlns:a14="http://schemas.microsoft.com/office/drawing/2010/main" xmlns:m="http://schemas.openxmlformats.org/officeDocument/2006/math" xmlns="" val="1"/>
+                    <ma14:wrappingTextBoxFlag xmlns="" xmlns:m="http://schemas.openxmlformats.org/officeDocument/2006/math" xmlns:a14="http://schemas.microsoft.com/office/drawing/2010/main" xmlns:ma14="http://schemas.microsoft.com/office/mac/drawingml/2011/main" val="1"/>
                   </a:ext>
                 </a:extLst>
               </p:spPr>
@@ -6550,7 +6550,7 @@
                 </a:effectLst>
                 <a:extLst>
                   <a:ext uri="{C572A759-6A51-4108-AA02-DFA0A04FC94B}">
-                    <ma14:wrappingTextBoxFlag xmlns:ma14="http://schemas.microsoft.com/office/mac/drawingml/2011/main" xmlns:a14="http://schemas.microsoft.com/office/drawing/2010/main" xmlns:m="http://schemas.openxmlformats.org/officeDocument/2006/math" xmlns="" val="1"/>
+                    <ma14:wrappingTextBoxFlag xmlns="" xmlns:m="http://schemas.openxmlformats.org/officeDocument/2006/math" xmlns:a14="http://schemas.microsoft.com/office/drawing/2010/main" xmlns:ma14="http://schemas.microsoft.com/office/mac/drawingml/2011/main" val="1"/>
                   </a:ext>
                 </a:extLst>
               </p:spPr>
@@ -6661,7 +6661,7 @@
               </a:effectLst>
               <a:extLst>
                 <a:ext uri="{C572A759-6A51-4108-AA02-DFA0A04FC94B}">
-                  <ma14:wrappingTextBoxFlag xmlns:ma14="http://schemas.microsoft.com/office/mac/drawingml/2011/main" xmlns:a14="http://schemas.microsoft.com/office/drawing/2010/main" xmlns:m="http://schemas.openxmlformats.org/officeDocument/2006/math" xmlns="" val="1"/>
+                  <ma14:wrappingTextBoxFlag xmlns="" xmlns:m="http://schemas.openxmlformats.org/officeDocument/2006/math" xmlns:a14="http://schemas.microsoft.com/office/drawing/2010/main" xmlns:ma14="http://schemas.microsoft.com/office/mac/drawingml/2011/main" val="1"/>
                 </a:ext>
               </a:extLst>
             </p:spPr>
@@ -6747,7 +6747,7 @@
               </a:effectLst>
               <a:extLst>
                 <a:ext uri="{C572A759-6A51-4108-AA02-DFA0A04FC94B}">
-                  <ma14:wrappingTextBoxFlag xmlns:ma14="http://schemas.microsoft.com/office/mac/drawingml/2011/main" xmlns:a14="http://schemas.microsoft.com/office/drawing/2010/main" xmlns:m="http://schemas.openxmlformats.org/officeDocument/2006/math" xmlns="" val="1"/>
+                  <ma14:wrappingTextBoxFlag xmlns="" xmlns:m="http://schemas.openxmlformats.org/officeDocument/2006/math" xmlns:a14="http://schemas.microsoft.com/office/drawing/2010/main" xmlns:ma14="http://schemas.microsoft.com/office/mac/drawingml/2011/main" val="1"/>
                 </a:ext>
               </a:extLst>
             </p:spPr>
@@ -6811,7 +6811,7 @@
               </a:effectLst>
               <a:extLst>
                 <a:ext uri="{C572A759-6A51-4108-AA02-DFA0A04FC94B}">
-                  <ma14:wrappingTextBoxFlag xmlns:ma14="http://schemas.microsoft.com/office/mac/drawingml/2011/main" xmlns:a14="http://schemas.microsoft.com/office/drawing/2010/main" xmlns:m="http://schemas.openxmlformats.org/officeDocument/2006/math" xmlns="" val="1"/>
+                  <ma14:wrappingTextBoxFlag xmlns="" xmlns:m="http://schemas.openxmlformats.org/officeDocument/2006/math" xmlns:a14="http://schemas.microsoft.com/office/drawing/2010/main" xmlns:ma14="http://schemas.microsoft.com/office/mac/drawingml/2011/main" val="1"/>
                 </a:ext>
               </a:extLst>
             </p:spPr>
@@ -6885,7 +6885,7 @@
               </a:effectLst>
               <a:extLst>
                 <a:ext uri="{C572A759-6A51-4108-AA02-DFA0A04FC94B}">
-                  <ma14:wrappingTextBoxFlag xmlns:ma14="http://schemas.microsoft.com/office/mac/drawingml/2011/main" xmlns:a14="http://schemas.microsoft.com/office/drawing/2010/main" xmlns:m="http://schemas.openxmlformats.org/officeDocument/2006/math" xmlns="" val="1"/>
+                  <ma14:wrappingTextBoxFlag xmlns="" xmlns:m="http://schemas.openxmlformats.org/officeDocument/2006/math" xmlns:a14="http://schemas.microsoft.com/office/drawing/2010/main" xmlns:ma14="http://schemas.microsoft.com/office/mac/drawingml/2011/main" val="1"/>
                 </a:ext>
               </a:extLst>
             </p:spPr>
@@ -6980,7 +6980,7 @@
               </a:effectLst>
               <a:extLst>
                 <a:ext uri="{C572A759-6A51-4108-AA02-DFA0A04FC94B}">
-                  <ma14:wrappingTextBoxFlag xmlns:ma14="http://schemas.microsoft.com/office/mac/drawingml/2011/main" xmlns:a14="http://schemas.microsoft.com/office/drawing/2010/main" xmlns:m="http://schemas.openxmlformats.org/officeDocument/2006/math" xmlns="" val="1"/>
+                  <ma14:wrappingTextBoxFlag xmlns="" xmlns:m="http://schemas.openxmlformats.org/officeDocument/2006/math" xmlns:a14="http://schemas.microsoft.com/office/drawing/2010/main" xmlns:ma14="http://schemas.microsoft.com/office/mac/drawingml/2011/main" val="1"/>
                 </a:ext>
               </a:extLst>
             </p:spPr>
@@ -7083,7 +7083,7 @@
               </a:effectLst>
               <a:extLst>
                 <a:ext uri="{C572A759-6A51-4108-AA02-DFA0A04FC94B}">
-                  <ma14:wrappingTextBoxFlag xmlns:ma14="http://schemas.microsoft.com/office/mac/drawingml/2011/main" xmlns:a14="http://schemas.microsoft.com/office/drawing/2010/main" xmlns:m="http://schemas.openxmlformats.org/officeDocument/2006/math" xmlns="" val="1"/>
+                  <ma14:wrappingTextBoxFlag xmlns="" xmlns:m="http://schemas.openxmlformats.org/officeDocument/2006/math" xmlns:a14="http://schemas.microsoft.com/office/drawing/2010/main" xmlns:ma14="http://schemas.microsoft.com/office/mac/drawingml/2011/main" val="1"/>
                 </a:ext>
               </a:extLst>
             </p:spPr>
@@ -7157,7 +7157,7 @@
               </a:effectLst>
               <a:extLst>
                 <a:ext uri="{C572A759-6A51-4108-AA02-DFA0A04FC94B}">
-                  <ma14:wrappingTextBoxFlag xmlns:ma14="http://schemas.microsoft.com/office/mac/drawingml/2011/main" xmlns:a14="http://schemas.microsoft.com/office/drawing/2010/main" xmlns:m="http://schemas.openxmlformats.org/officeDocument/2006/math" xmlns="" val="1"/>
+                  <ma14:wrappingTextBoxFlag xmlns="" xmlns:m="http://schemas.openxmlformats.org/officeDocument/2006/math" xmlns:a14="http://schemas.microsoft.com/office/drawing/2010/main" xmlns:ma14="http://schemas.microsoft.com/office/mac/drawingml/2011/main" val="1"/>
                 </a:ext>
               </a:extLst>
             </p:spPr>
@@ -7231,7 +7231,7 @@
               </a:effectLst>
               <a:extLst>
                 <a:ext uri="{C572A759-6A51-4108-AA02-DFA0A04FC94B}">
-                  <ma14:wrappingTextBoxFlag xmlns:ma14="http://schemas.microsoft.com/office/mac/drawingml/2011/main" xmlns:a14="http://schemas.microsoft.com/office/drawing/2010/main" xmlns:m="http://schemas.openxmlformats.org/officeDocument/2006/math" xmlns="" val="1"/>
+                  <ma14:wrappingTextBoxFlag xmlns="" xmlns:m="http://schemas.openxmlformats.org/officeDocument/2006/math" xmlns:a14="http://schemas.microsoft.com/office/drawing/2010/main" xmlns:ma14="http://schemas.microsoft.com/office/mac/drawingml/2011/main" val="1"/>
                 </a:ext>
               </a:extLst>
             </p:spPr>
@@ -7324,7 +7324,7 @@
             </a:effectLst>
             <a:extLst>
               <a:ext uri="{C572A759-6A51-4108-AA02-DFA0A04FC94B}">
-                <ma14:wrappingTextBoxFlag xmlns:ma14="http://schemas.microsoft.com/office/mac/drawingml/2011/main" xmlns:a14="http://schemas.microsoft.com/office/drawing/2010/main" xmlns:m="http://schemas.openxmlformats.org/officeDocument/2006/math" xmlns="" val="1"/>
+                <ma14:wrappingTextBoxFlag xmlns="" xmlns:m="http://schemas.openxmlformats.org/officeDocument/2006/math" xmlns:a14="http://schemas.microsoft.com/office/drawing/2010/main" xmlns:ma14="http://schemas.microsoft.com/office/mac/drawingml/2011/main" val="1"/>
               </a:ext>
             </a:extLst>
           </p:spPr>
@@ -7382,7 +7382,7 @@
             </a:effectLst>
             <a:extLst>
               <a:ext uri="{C572A759-6A51-4108-AA02-DFA0A04FC94B}">
-                <ma14:wrappingTextBoxFlag xmlns:ma14="http://schemas.microsoft.com/office/mac/drawingml/2011/main" xmlns:a14="http://schemas.microsoft.com/office/drawing/2010/main" xmlns:m="http://schemas.openxmlformats.org/officeDocument/2006/math" xmlns="" val="1"/>
+                <ma14:wrappingTextBoxFlag xmlns="" xmlns:m="http://schemas.openxmlformats.org/officeDocument/2006/math" xmlns:a14="http://schemas.microsoft.com/office/drawing/2010/main" xmlns:ma14="http://schemas.microsoft.com/office/mac/drawingml/2011/main" val="1"/>
               </a:ext>
             </a:extLst>
           </p:spPr>
@@ -7452,7 +7452,7 @@
             </a:effectLst>
             <a:extLst>
               <a:ext uri="{C572A759-6A51-4108-AA02-DFA0A04FC94B}">
-                <ma14:wrappingTextBoxFlag xmlns:ma14="http://schemas.microsoft.com/office/mac/drawingml/2011/main" xmlns:a14="http://schemas.microsoft.com/office/drawing/2010/main" xmlns:m="http://schemas.openxmlformats.org/officeDocument/2006/math" xmlns="" val="1"/>
+                <ma14:wrappingTextBoxFlag xmlns="" xmlns:m="http://schemas.openxmlformats.org/officeDocument/2006/math" xmlns:a14="http://schemas.microsoft.com/office/drawing/2010/main" xmlns:ma14="http://schemas.microsoft.com/office/mac/drawingml/2011/main" val="1"/>
               </a:ext>
             </a:extLst>
           </p:spPr>
@@ -7522,7 +7522,7 @@
             </a:effectLst>
             <a:extLst>
               <a:ext uri="{C572A759-6A51-4108-AA02-DFA0A04FC94B}">
-                <ma14:wrappingTextBoxFlag xmlns:ma14="http://schemas.microsoft.com/office/mac/drawingml/2011/main" xmlns:a14="http://schemas.microsoft.com/office/drawing/2010/main" xmlns:m="http://schemas.openxmlformats.org/officeDocument/2006/math" xmlns="" val="1"/>
+                <ma14:wrappingTextBoxFlag xmlns="" xmlns:m="http://schemas.openxmlformats.org/officeDocument/2006/math" xmlns:a14="http://schemas.microsoft.com/office/drawing/2010/main" xmlns:ma14="http://schemas.microsoft.com/office/mac/drawingml/2011/main" val="1"/>
               </a:ext>
             </a:extLst>
           </p:spPr>
@@ -7592,7 +7592,7 @@
             </a:effectLst>
             <a:extLst>
               <a:ext uri="{C572A759-6A51-4108-AA02-DFA0A04FC94B}">
-                <ma14:wrappingTextBoxFlag xmlns:ma14="http://schemas.microsoft.com/office/mac/drawingml/2011/main" xmlns:a14="http://schemas.microsoft.com/office/drawing/2010/main" xmlns:m="http://schemas.openxmlformats.org/officeDocument/2006/math" xmlns="" val="1"/>
+                <ma14:wrappingTextBoxFlag xmlns="" xmlns:m="http://schemas.openxmlformats.org/officeDocument/2006/math" xmlns:a14="http://schemas.microsoft.com/office/drawing/2010/main" xmlns:ma14="http://schemas.microsoft.com/office/mac/drawingml/2011/main" val="1"/>
               </a:ext>
             </a:extLst>
           </p:spPr>
@@ -7819,7 +7819,7 @@
           </a:effectLst>
           <a:extLst>
             <a:ext uri="{C572A759-6A51-4108-AA02-DFA0A04FC94B}">
-              <ma14:wrappingTextBoxFlag xmlns:ma14="http://schemas.microsoft.com/office/mac/drawingml/2011/main" xmlns:a14="http://schemas.microsoft.com/office/drawing/2010/main" xmlns:m="http://schemas.openxmlformats.org/officeDocument/2006/math" xmlns="" val="1"/>
+              <ma14:wrappingTextBoxFlag xmlns="" xmlns:m="http://schemas.openxmlformats.org/officeDocument/2006/math" xmlns:a14="http://schemas.microsoft.com/office/drawing/2010/main" xmlns:ma14="http://schemas.microsoft.com/office/mac/drawingml/2011/main" val="1"/>
             </a:ext>
           </a:extLst>
         </p:spPr>
@@ -7870,7 +7870,7 @@
           </a:ln>
           <a:extLst>
             <a:ext uri="{C572A759-6A51-4108-AA02-DFA0A04FC94B}">
-              <ma14:wrappingTextBoxFlag xmlns:ma14="http://schemas.microsoft.com/office/mac/drawingml/2011/main" xmlns:a14="http://schemas.microsoft.com/office/drawing/2010/main" xmlns:m="http://schemas.openxmlformats.org/officeDocument/2006/math" xmlns="" val="1"/>
+              <ma14:wrappingTextBoxFlag xmlns="" xmlns:m="http://schemas.openxmlformats.org/officeDocument/2006/math" xmlns:a14="http://schemas.microsoft.com/office/drawing/2010/main" xmlns:ma14="http://schemas.microsoft.com/office/mac/drawingml/2011/main" val="1"/>
             </a:ext>
           </a:extLst>
         </p:spPr>
@@ -7925,7 +7925,7 @@
           </a:ln>
           <a:extLst>
             <a:ext uri="{C572A759-6A51-4108-AA02-DFA0A04FC94B}">
-              <ma14:wrappingTextBoxFlag xmlns:ma14="http://schemas.microsoft.com/office/mac/drawingml/2011/main" xmlns:a14="http://schemas.microsoft.com/office/drawing/2010/main" xmlns:m="http://schemas.openxmlformats.org/officeDocument/2006/math" xmlns="" val="1"/>
+              <ma14:wrappingTextBoxFlag xmlns="" xmlns:m="http://schemas.openxmlformats.org/officeDocument/2006/math" xmlns:a14="http://schemas.microsoft.com/office/drawing/2010/main" xmlns:ma14="http://schemas.microsoft.com/office/mac/drawingml/2011/main" val="1"/>
             </a:ext>
           </a:extLst>
         </p:spPr>
@@ -8083,7 +8083,7 @@
             </a:effectLst>
             <a:extLst>
               <a:ext uri="{C572A759-6A51-4108-AA02-DFA0A04FC94B}">
-                <ma14:wrappingTextBoxFlag xmlns:ma14="http://schemas.microsoft.com/office/mac/drawingml/2011/main" xmlns:a14="http://schemas.microsoft.com/office/drawing/2010/main" xmlns:m="http://schemas.openxmlformats.org/officeDocument/2006/math" xmlns="" val="1"/>
+                <ma14:wrappingTextBoxFlag xmlns="" xmlns:m="http://schemas.openxmlformats.org/officeDocument/2006/math" xmlns:a14="http://schemas.microsoft.com/office/drawing/2010/main" xmlns:ma14="http://schemas.microsoft.com/office/mac/drawingml/2011/main" val="1"/>
               </a:ext>
             </a:extLst>
           </p:spPr>
@@ -8147,7 +8147,7 @@
             </a:effectLst>
             <a:extLst>
               <a:ext uri="{C572A759-6A51-4108-AA02-DFA0A04FC94B}">
-                <ma14:wrappingTextBoxFlag xmlns:ma14="http://schemas.microsoft.com/office/mac/drawingml/2011/main" xmlns:a14="http://schemas.microsoft.com/office/drawing/2010/main" xmlns:m="http://schemas.openxmlformats.org/officeDocument/2006/math" xmlns="" val="1"/>
+                <ma14:wrappingTextBoxFlag xmlns="" xmlns:m="http://schemas.openxmlformats.org/officeDocument/2006/math" xmlns:a14="http://schemas.microsoft.com/office/drawing/2010/main" xmlns:ma14="http://schemas.microsoft.com/office/mac/drawingml/2011/main" val="1"/>
               </a:ext>
             </a:extLst>
           </p:spPr>
@@ -8217,7 +8217,7 @@
             </a:effectLst>
             <a:extLst>
               <a:ext uri="{C572A759-6A51-4108-AA02-DFA0A04FC94B}">
-                <ma14:wrappingTextBoxFlag xmlns:ma14="http://schemas.microsoft.com/office/mac/drawingml/2011/main" xmlns:a14="http://schemas.microsoft.com/office/drawing/2010/main" xmlns:m="http://schemas.openxmlformats.org/officeDocument/2006/math" xmlns="" val="1"/>
+                <ma14:wrappingTextBoxFlag xmlns="" xmlns:m="http://schemas.openxmlformats.org/officeDocument/2006/math" xmlns:a14="http://schemas.microsoft.com/office/drawing/2010/main" xmlns:ma14="http://schemas.microsoft.com/office/mac/drawingml/2011/main" val="1"/>
               </a:ext>
             </a:extLst>
           </p:spPr>
@@ -8287,7 +8287,7 @@
             </a:effectLst>
             <a:extLst>
               <a:ext uri="{C572A759-6A51-4108-AA02-DFA0A04FC94B}">
-                <ma14:wrappingTextBoxFlag xmlns:ma14="http://schemas.microsoft.com/office/mac/drawingml/2011/main" xmlns:a14="http://schemas.microsoft.com/office/drawing/2010/main" xmlns:m="http://schemas.openxmlformats.org/officeDocument/2006/math" xmlns="" val="1"/>
+                <ma14:wrappingTextBoxFlag xmlns="" xmlns:m="http://schemas.openxmlformats.org/officeDocument/2006/math" xmlns:a14="http://schemas.microsoft.com/office/drawing/2010/main" xmlns:ma14="http://schemas.microsoft.com/office/mac/drawingml/2011/main" val="1"/>
               </a:ext>
             </a:extLst>
           </p:spPr>
@@ -8357,7 +8357,7 @@
             </a:effectLst>
             <a:extLst>
               <a:ext uri="{C572A759-6A51-4108-AA02-DFA0A04FC94B}">
-                <ma14:wrappingTextBoxFlag xmlns:ma14="http://schemas.microsoft.com/office/mac/drawingml/2011/main" xmlns:a14="http://schemas.microsoft.com/office/drawing/2010/main" xmlns:m="http://schemas.openxmlformats.org/officeDocument/2006/math" xmlns="" val="1"/>
+                <ma14:wrappingTextBoxFlag xmlns="" xmlns:m="http://schemas.openxmlformats.org/officeDocument/2006/math" xmlns:a14="http://schemas.microsoft.com/office/drawing/2010/main" xmlns:ma14="http://schemas.microsoft.com/office/mac/drawingml/2011/main" val="1"/>
               </a:ext>
             </a:extLst>
           </p:spPr>
@@ -8448,7 +8448,7 @@
             </a:effectLst>
             <a:extLst>
               <a:ext uri="{C572A759-6A51-4108-AA02-DFA0A04FC94B}">
-                <ma14:wrappingTextBoxFlag xmlns:ma14="http://schemas.microsoft.com/office/mac/drawingml/2011/main" xmlns:a14="http://schemas.microsoft.com/office/drawing/2010/main" xmlns:m="http://schemas.openxmlformats.org/officeDocument/2006/math" xmlns="" val="1"/>
+                <ma14:wrappingTextBoxFlag xmlns="" xmlns:m="http://schemas.openxmlformats.org/officeDocument/2006/math" xmlns:a14="http://schemas.microsoft.com/office/drawing/2010/main" xmlns:ma14="http://schemas.microsoft.com/office/mac/drawingml/2011/main" val="1"/>
               </a:ext>
             </a:extLst>
           </p:spPr>
@@ -8518,7 +8518,7 @@
             </a:effectLst>
             <a:extLst>
               <a:ext uri="{C572A759-6A51-4108-AA02-DFA0A04FC94B}">
-                <ma14:wrappingTextBoxFlag xmlns:ma14="http://schemas.microsoft.com/office/mac/drawingml/2011/main" xmlns:a14="http://schemas.microsoft.com/office/drawing/2010/main" xmlns:m="http://schemas.openxmlformats.org/officeDocument/2006/math" xmlns="" val="1"/>
+                <ma14:wrappingTextBoxFlag xmlns="" xmlns:m="http://schemas.openxmlformats.org/officeDocument/2006/math" xmlns:a14="http://schemas.microsoft.com/office/drawing/2010/main" xmlns:ma14="http://schemas.microsoft.com/office/mac/drawingml/2011/main" val="1"/>
               </a:ext>
             </a:extLst>
           </p:spPr>
@@ -8616,7 +8616,7 @@
             </a:effectLst>
             <a:extLst>
               <a:ext uri="{C572A759-6A51-4108-AA02-DFA0A04FC94B}">
-                <ma14:wrappingTextBoxFlag xmlns:ma14="http://schemas.microsoft.com/office/mac/drawingml/2011/main" xmlns:a14="http://schemas.microsoft.com/office/drawing/2010/main" xmlns:m="http://schemas.openxmlformats.org/officeDocument/2006/math" xmlns="" val="1"/>
+                <ma14:wrappingTextBoxFlag xmlns="" xmlns:m="http://schemas.openxmlformats.org/officeDocument/2006/math" xmlns:a14="http://schemas.microsoft.com/office/drawing/2010/main" xmlns:ma14="http://schemas.microsoft.com/office/mac/drawingml/2011/main" val="1"/>
               </a:ext>
             </a:extLst>
           </p:spPr>
@@ -8672,7 +8672,7 @@
             </a:effectLst>
             <a:extLst>
               <a:ext uri="{C572A759-6A51-4108-AA02-DFA0A04FC94B}">
-                <ma14:wrappingTextBoxFlag xmlns:ma14="http://schemas.microsoft.com/office/mac/drawingml/2011/main" xmlns:a14="http://schemas.microsoft.com/office/drawing/2010/main" xmlns:m="http://schemas.openxmlformats.org/officeDocument/2006/math" xmlns="" val="1"/>
+                <ma14:wrappingTextBoxFlag xmlns="" xmlns:m="http://schemas.openxmlformats.org/officeDocument/2006/math" xmlns:a14="http://schemas.microsoft.com/office/drawing/2010/main" xmlns:ma14="http://schemas.microsoft.com/office/mac/drawingml/2011/main" val="1"/>
               </a:ext>
             </a:extLst>
           </p:spPr>
@@ -8728,7 +8728,7 @@
             </a:effectLst>
             <a:extLst>
               <a:ext uri="{C572A759-6A51-4108-AA02-DFA0A04FC94B}">
-                <ma14:wrappingTextBoxFlag xmlns:ma14="http://schemas.microsoft.com/office/mac/drawingml/2011/main" xmlns:a14="http://schemas.microsoft.com/office/drawing/2010/main" xmlns:m="http://schemas.openxmlformats.org/officeDocument/2006/math" xmlns="" val="1"/>
+                <ma14:wrappingTextBoxFlag xmlns="" xmlns:m="http://schemas.openxmlformats.org/officeDocument/2006/math" xmlns:a14="http://schemas.microsoft.com/office/drawing/2010/main" xmlns:ma14="http://schemas.microsoft.com/office/mac/drawingml/2011/main" val="1"/>
               </a:ext>
             </a:extLst>
           </p:spPr>
@@ -8797,7 +8797,7 @@
             </a:effectLst>
             <a:extLst>
               <a:ext uri="{C572A759-6A51-4108-AA02-DFA0A04FC94B}">
-                <ma14:wrappingTextBoxFlag xmlns:ma14="http://schemas.microsoft.com/office/mac/drawingml/2011/main" xmlns:a14="http://schemas.microsoft.com/office/drawing/2010/main" xmlns:m="http://schemas.openxmlformats.org/officeDocument/2006/math" xmlns="" val="1"/>
+                <ma14:wrappingTextBoxFlag xmlns="" xmlns:m="http://schemas.openxmlformats.org/officeDocument/2006/math" xmlns:a14="http://schemas.microsoft.com/office/drawing/2010/main" xmlns:ma14="http://schemas.microsoft.com/office/mac/drawingml/2011/main" val="1"/>
               </a:ext>
             </a:extLst>
           </p:spPr>
@@ -8876,7 +8876,7 @@
           </a:effectLst>
           <a:extLst>
             <a:ext uri="{C572A759-6A51-4108-AA02-DFA0A04FC94B}">
-              <ma14:wrappingTextBoxFlag xmlns:ma14="http://schemas.microsoft.com/office/mac/drawingml/2011/main" xmlns:a14="http://schemas.microsoft.com/office/drawing/2010/main" xmlns:m="http://schemas.openxmlformats.org/officeDocument/2006/math" xmlns="" val="1"/>
+              <ma14:wrappingTextBoxFlag xmlns="" xmlns:m="http://schemas.openxmlformats.org/officeDocument/2006/math" xmlns:a14="http://schemas.microsoft.com/office/drawing/2010/main" xmlns:ma14="http://schemas.microsoft.com/office/mac/drawingml/2011/main" val="1"/>
             </a:ext>
           </a:extLst>
         </p:spPr>
@@ -8938,7 +8938,7 @@
           </a:effectLst>
           <a:extLst>
             <a:ext uri="{C572A759-6A51-4108-AA02-DFA0A04FC94B}">
-              <ma14:wrappingTextBoxFlag xmlns:ma14="http://schemas.microsoft.com/office/mac/drawingml/2011/main" xmlns:a14="http://schemas.microsoft.com/office/drawing/2010/main" xmlns:m="http://schemas.openxmlformats.org/officeDocument/2006/math" xmlns="" val="1"/>
+              <ma14:wrappingTextBoxFlag xmlns="" xmlns:m="http://schemas.openxmlformats.org/officeDocument/2006/math" xmlns:a14="http://schemas.microsoft.com/office/drawing/2010/main" xmlns:ma14="http://schemas.microsoft.com/office/mac/drawingml/2011/main" val="1"/>
             </a:ext>
           </a:extLst>
         </p:spPr>
@@ -9173,7 +9173,7 @@
             </a:effectLst>
             <a:extLst>
               <a:ext uri="{C572A759-6A51-4108-AA02-DFA0A04FC94B}">
-                <ma14:wrappingTextBoxFlag xmlns:ma14="http://schemas.microsoft.com/office/mac/drawingml/2011/main" xmlns:a14="http://schemas.microsoft.com/office/drawing/2010/main" xmlns:m="http://schemas.openxmlformats.org/officeDocument/2006/math" xmlns="" val="1"/>
+                <ma14:wrappingTextBoxFlag xmlns="" xmlns:m="http://schemas.openxmlformats.org/officeDocument/2006/math" xmlns:a14="http://schemas.microsoft.com/office/drawing/2010/main" xmlns:ma14="http://schemas.microsoft.com/office/mac/drawingml/2011/main" val="1"/>
               </a:ext>
             </a:extLst>
           </p:spPr>
@@ -9252,7 +9252,7 @@
               </a:effectLst>
               <a:extLst>
                 <a:ext uri="{C572A759-6A51-4108-AA02-DFA0A04FC94B}">
-                  <ma14:wrappingTextBoxFlag xmlns:ma14="http://schemas.microsoft.com/office/mac/drawingml/2011/main" xmlns:a14="http://schemas.microsoft.com/office/drawing/2010/main" xmlns:m="http://schemas.openxmlformats.org/officeDocument/2006/math" xmlns="" val="1"/>
+                  <ma14:wrappingTextBoxFlag xmlns="" xmlns:m="http://schemas.openxmlformats.org/officeDocument/2006/math" xmlns:a14="http://schemas.microsoft.com/office/drawing/2010/main" xmlns:ma14="http://schemas.microsoft.com/office/mac/drawingml/2011/main" val="1"/>
                 </a:ext>
               </a:extLst>
             </p:spPr>
@@ -9325,7 +9325,7 @@
               </a:effectLst>
               <a:extLst>
                 <a:ext uri="{C572A759-6A51-4108-AA02-DFA0A04FC94B}">
-                  <ma14:wrappingTextBoxFlag xmlns:ma14="http://schemas.microsoft.com/office/mac/drawingml/2011/main" xmlns:a14="http://schemas.microsoft.com/office/drawing/2010/main" xmlns:m="http://schemas.openxmlformats.org/officeDocument/2006/math" xmlns="" val="1"/>
+                  <ma14:wrappingTextBoxFlag xmlns="" xmlns:m="http://schemas.openxmlformats.org/officeDocument/2006/math" xmlns:a14="http://schemas.microsoft.com/office/drawing/2010/main" xmlns:ma14="http://schemas.microsoft.com/office/mac/drawingml/2011/main" val="1"/>
                 </a:ext>
               </a:extLst>
             </p:spPr>
@@ -9385,7 +9385,7 @@
               </a:effectLst>
               <a:extLst>
                 <a:ext uri="{C572A759-6A51-4108-AA02-DFA0A04FC94B}">
-                  <ma14:wrappingTextBoxFlag xmlns:ma14="http://schemas.microsoft.com/office/mac/drawingml/2011/main" xmlns:a14="http://schemas.microsoft.com/office/drawing/2010/main" xmlns:m="http://schemas.openxmlformats.org/officeDocument/2006/math" xmlns="" val="1"/>
+                  <ma14:wrappingTextBoxFlag xmlns="" xmlns:m="http://schemas.openxmlformats.org/officeDocument/2006/math" xmlns:a14="http://schemas.microsoft.com/office/drawing/2010/main" xmlns:ma14="http://schemas.microsoft.com/office/mac/drawingml/2011/main" val="1"/>
                 </a:ext>
               </a:extLst>
             </p:spPr>
@@ -9452,7 +9452,7 @@
           </a:effectLst>
           <a:extLst>
             <a:ext uri="{C572A759-6A51-4108-AA02-DFA0A04FC94B}">
-              <ma14:wrappingTextBoxFlag xmlns:ma14="http://schemas.microsoft.com/office/mac/drawingml/2011/main" xmlns:a14="http://schemas.microsoft.com/office/drawing/2010/main" xmlns:m="http://schemas.openxmlformats.org/officeDocument/2006/math" xmlns="" val="1"/>
+              <ma14:wrappingTextBoxFlag xmlns="" xmlns:m="http://schemas.openxmlformats.org/officeDocument/2006/math" xmlns:a14="http://schemas.microsoft.com/office/drawing/2010/main" xmlns:ma14="http://schemas.microsoft.com/office/mac/drawingml/2011/main" val="1"/>
             </a:ext>
           </a:extLst>
         </p:spPr>
@@ -9516,7 +9516,7 @@
           </a:effectLst>
           <a:extLst>
             <a:ext uri="{C572A759-6A51-4108-AA02-DFA0A04FC94B}">
-              <ma14:wrappingTextBoxFlag xmlns:ma14="http://schemas.microsoft.com/office/mac/drawingml/2011/main" xmlns:a14="http://schemas.microsoft.com/office/drawing/2010/main" xmlns:m="http://schemas.openxmlformats.org/officeDocument/2006/math" xmlns="" val="1"/>
+              <ma14:wrappingTextBoxFlag xmlns="" xmlns:m="http://schemas.openxmlformats.org/officeDocument/2006/math" xmlns:a14="http://schemas.microsoft.com/office/drawing/2010/main" xmlns:ma14="http://schemas.microsoft.com/office/mac/drawingml/2011/main" val="1"/>
             </a:ext>
           </a:extLst>
         </p:spPr>
@@ -9586,7 +9586,7 @@
           </a:effectLst>
           <a:extLst>
             <a:ext uri="{C572A759-6A51-4108-AA02-DFA0A04FC94B}">
-              <ma14:wrappingTextBoxFlag xmlns:ma14="http://schemas.microsoft.com/office/mac/drawingml/2011/main" xmlns:a14="http://schemas.microsoft.com/office/drawing/2010/main" xmlns:m="http://schemas.openxmlformats.org/officeDocument/2006/math" xmlns="" val="1"/>
+              <ma14:wrappingTextBoxFlag xmlns="" xmlns:m="http://schemas.openxmlformats.org/officeDocument/2006/math" xmlns:a14="http://schemas.microsoft.com/office/drawing/2010/main" xmlns:ma14="http://schemas.microsoft.com/office/mac/drawingml/2011/main" val="1"/>
             </a:ext>
           </a:extLst>
         </p:spPr>
@@ -9656,7 +9656,7 @@
           </a:effectLst>
           <a:extLst>
             <a:ext uri="{C572A759-6A51-4108-AA02-DFA0A04FC94B}">
-              <ma14:wrappingTextBoxFlag xmlns:ma14="http://schemas.microsoft.com/office/mac/drawingml/2011/main" xmlns:a14="http://schemas.microsoft.com/office/drawing/2010/main" xmlns:m="http://schemas.openxmlformats.org/officeDocument/2006/math" xmlns="" val="1"/>
+              <ma14:wrappingTextBoxFlag xmlns="" xmlns:m="http://schemas.openxmlformats.org/officeDocument/2006/math" xmlns:a14="http://schemas.microsoft.com/office/drawing/2010/main" xmlns:ma14="http://schemas.microsoft.com/office/mac/drawingml/2011/main" val="1"/>
             </a:ext>
           </a:extLst>
         </p:spPr>
@@ -9726,7 +9726,7 @@
           </a:effectLst>
           <a:extLst>
             <a:ext uri="{C572A759-6A51-4108-AA02-DFA0A04FC94B}">
-              <ma14:wrappingTextBoxFlag xmlns:ma14="http://schemas.microsoft.com/office/mac/drawingml/2011/main" xmlns:a14="http://schemas.microsoft.com/office/drawing/2010/main" xmlns:m="http://schemas.openxmlformats.org/officeDocument/2006/math" xmlns="" val="1"/>
+              <ma14:wrappingTextBoxFlag xmlns="" xmlns:m="http://schemas.openxmlformats.org/officeDocument/2006/math" xmlns:a14="http://schemas.microsoft.com/office/drawing/2010/main" xmlns:ma14="http://schemas.microsoft.com/office/mac/drawingml/2011/main" val="1"/>
             </a:ext>
           </a:extLst>
         </p:spPr>
@@ -9796,7 +9796,7 @@
           </a:effectLst>
           <a:extLst>
             <a:ext uri="{C572A759-6A51-4108-AA02-DFA0A04FC94B}">
-              <ma14:wrappingTextBoxFlag xmlns:ma14="http://schemas.microsoft.com/office/mac/drawingml/2011/main" xmlns:a14="http://schemas.microsoft.com/office/drawing/2010/main" xmlns:m="http://schemas.openxmlformats.org/officeDocument/2006/math" xmlns="" val="1"/>
+              <ma14:wrappingTextBoxFlag xmlns="" xmlns:m="http://schemas.openxmlformats.org/officeDocument/2006/math" xmlns:a14="http://schemas.microsoft.com/office/drawing/2010/main" xmlns:ma14="http://schemas.microsoft.com/office/mac/drawingml/2011/main" val="1"/>
             </a:ext>
           </a:extLst>
         </p:spPr>
@@ -10065,7 +10065,7 @@
           </a:effectLst>
           <a:extLst>
             <a:ext uri="{C572A759-6A51-4108-AA02-DFA0A04FC94B}">
-              <ma14:wrappingTextBoxFlag xmlns:ma14="http://schemas.microsoft.com/office/mac/drawingml/2011/main" xmlns:a14="http://schemas.microsoft.com/office/drawing/2010/main" xmlns:m="http://schemas.openxmlformats.org/officeDocument/2006/math" xmlns="" val="1"/>
+              <ma14:wrappingTextBoxFlag xmlns="" xmlns:m="http://schemas.openxmlformats.org/officeDocument/2006/math" xmlns:a14="http://schemas.microsoft.com/office/drawing/2010/main" xmlns:ma14="http://schemas.microsoft.com/office/mac/drawingml/2011/main" val="1"/>
             </a:ext>
           </a:extLst>
         </p:spPr>
@@ -10126,7 +10126,7 @@
           </a:effectLst>
           <a:extLst>
             <a:ext uri="{C572A759-6A51-4108-AA02-DFA0A04FC94B}">
-              <ma14:wrappingTextBoxFlag xmlns:ma14="http://schemas.microsoft.com/office/mac/drawingml/2011/main" xmlns:a14="http://schemas.microsoft.com/office/drawing/2010/main" xmlns:m="http://schemas.openxmlformats.org/officeDocument/2006/math" xmlns="" val="1"/>
+              <ma14:wrappingTextBoxFlag xmlns="" xmlns:m="http://schemas.openxmlformats.org/officeDocument/2006/math" xmlns:a14="http://schemas.microsoft.com/office/drawing/2010/main" xmlns:ma14="http://schemas.microsoft.com/office/mac/drawingml/2011/main" val="1"/>
             </a:ext>
           </a:extLst>
         </p:spPr>
@@ -10201,7 +10201,7 @@
           </a:effectLst>
           <a:extLst>
             <a:ext uri="{C572A759-6A51-4108-AA02-DFA0A04FC94B}">
-              <ma14:wrappingTextBoxFlag xmlns:ma14="http://schemas.microsoft.com/office/mac/drawingml/2011/main" xmlns:a14="http://schemas.microsoft.com/office/drawing/2010/main" xmlns:m="http://schemas.openxmlformats.org/officeDocument/2006/math" xmlns="" val="1"/>
+              <ma14:wrappingTextBoxFlag xmlns="" xmlns:m="http://schemas.openxmlformats.org/officeDocument/2006/math" xmlns:a14="http://schemas.microsoft.com/office/drawing/2010/main" xmlns:ma14="http://schemas.microsoft.com/office/mac/drawingml/2011/main" val="1"/>
             </a:ext>
           </a:extLst>
         </p:spPr>
@@ -10276,7 +10276,7 @@
           </a:effectLst>
           <a:extLst>
             <a:ext uri="{C572A759-6A51-4108-AA02-DFA0A04FC94B}">
-              <ma14:wrappingTextBoxFlag xmlns:ma14="http://schemas.microsoft.com/office/mac/drawingml/2011/main" xmlns:a14="http://schemas.microsoft.com/office/drawing/2010/main" xmlns:m="http://schemas.openxmlformats.org/officeDocument/2006/math" xmlns="" val="1"/>
+              <ma14:wrappingTextBoxFlag xmlns="" xmlns:m="http://schemas.openxmlformats.org/officeDocument/2006/math" xmlns:a14="http://schemas.microsoft.com/office/drawing/2010/main" xmlns:ma14="http://schemas.microsoft.com/office/mac/drawingml/2011/main" val="1"/>
             </a:ext>
           </a:extLst>
         </p:spPr>
@@ -10351,7 +10351,7 @@
           </a:effectLst>
           <a:extLst>
             <a:ext uri="{C572A759-6A51-4108-AA02-DFA0A04FC94B}">
-              <ma14:wrappingTextBoxFlag xmlns:ma14="http://schemas.microsoft.com/office/mac/drawingml/2011/main" xmlns:a14="http://schemas.microsoft.com/office/drawing/2010/main" xmlns:m="http://schemas.openxmlformats.org/officeDocument/2006/math" xmlns="" val="1"/>
+              <ma14:wrappingTextBoxFlag xmlns="" xmlns:m="http://schemas.openxmlformats.org/officeDocument/2006/math" xmlns:a14="http://schemas.microsoft.com/office/drawing/2010/main" xmlns:ma14="http://schemas.microsoft.com/office/mac/drawingml/2011/main" val="1"/>
             </a:ext>
           </a:extLst>
         </p:spPr>
@@ -10428,7 +10428,7 @@
           </a:effectLst>
           <a:extLst>
             <a:ext uri="{C572A759-6A51-4108-AA02-DFA0A04FC94B}">
-              <ma14:wrappingTextBoxFlag xmlns:ma14="http://schemas.microsoft.com/office/mac/drawingml/2011/main" xmlns:a14="http://schemas.microsoft.com/office/drawing/2010/main" xmlns:m="http://schemas.openxmlformats.org/officeDocument/2006/math" xmlns="" val="1"/>
+              <ma14:wrappingTextBoxFlag xmlns="" xmlns:m="http://schemas.openxmlformats.org/officeDocument/2006/math" xmlns:a14="http://schemas.microsoft.com/office/drawing/2010/main" xmlns:ma14="http://schemas.microsoft.com/office/mac/drawingml/2011/main" val="1"/>
             </a:ext>
           </a:extLst>
         </p:spPr>
@@ -10488,7 +10488,7 @@
           </a:effectLst>
           <a:extLst>
             <a:ext uri="{C572A759-6A51-4108-AA02-DFA0A04FC94B}">
-              <ma14:wrappingTextBoxFlag xmlns:ma14="http://schemas.microsoft.com/office/mac/drawingml/2011/main" xmlns:a14="http://schemas.microsoft.com/office/drawing/2010/main" xmlns:m="http://schemas.openxmlformats.org/officeDocument/2006/math" xmlns="" val="1"/>
+              <ma14:wrappingTextBoxFlag xmlns="" xmlns:m="http://schemas.openxmlformats.org/officeDocument/2006/math" xmlns:a14="http://schemas.microsoft.com/office/drawing/2010/main" xmlns:ma14="http://schemas.microsoft.com/office/mac/drawingml/2011/main" val="1"/>
             </a:ext>
           </a:extLst>
         </p:spPr>
@@ -10563,7 +10563,7 @@
           </a:effectLst>
           <a:extLst>
             <a:ext uri="{C572A759-6A51-4108-AA02-DFA0A04FC94B}">
-              <ma14:wrappingTextBoxFlag xmlns:ma14="http://schemas.microsoft.com/office/mac/drawingml/2011/main" xmlns:a14="http://schemas.microsoft.com/office/drawing/2010/main" xmlns:m="http://schemas.openxmlformats.org/officeDocument/2006/math" xmlns="" val="1"/>
+              <ma14:wrappingTextBoxFlag xmlns="" xmlns:m="http://schemas.openxmlformats.org/officeDocument/2006/math" xmlns:a14="http://schemas.microsoft.com/office/drawing/2010/main" xmlns:ma14="http://schemas.microsoft.com/office/mac/drawingml/2011/main" val="1"/>
             </a:ext>
           </a:extLst>
         </p:spPr>
@@ -11114,7 +11114,7 @@
           </a:effectLst>
           <a:extLst>
             <a:ext uri="{C572A759-6A51-4108-AA02-DFA0A04FC94B}">
-              <ma14:wrappingTextBoxFlag xmlns:ma14="http://schemas.microsoft.com/office/mac/drawingml/2011/main" xmlns:a14="http://schemas.microsoft.com/office/drawing/2010/main" xmlns:m="http://schemas.openxmlformats.org/officeDocument/2006/math" xmlns="" val="1"/>
+              <ma14:wrappingTextBoxFlag xmlns="" xmlns:m="http://schemas.openxmlformats.org/officeDocument/2006/math" xmlns:a14="http://schemas.microsoft.com/office/drawing/2010/main" xmlns:ma14="http://schemas.microsoft.com/office/mac/drawingml/2011/main" val="1"/>
             </a:ext>
           </a:extLst>
         </p:spPr>
@@ -11174,7 +11174,7 @@
           </a:effectLst>
           <a:extLst>
             <a:ext uri="{C572A759-6A51-4108-AA02-DFA0A04FC94B}">
-              <ma14:wrappingTextBoxFlag xmlns:ma14="http://schemas.microsoft.com/office/mac/drawingml/2011/main" xmlns:a14="http://schemas.microsoft.com/office/drawing/2010/main" xmlns:m="http://schemas.openxmlformats.org/officeDocument/2006/math" xmlns="" val="1"/>
+              <ma14:wrappingTextBoxFlag xmlns="" xmlns:m="http://schemas.openxmlformats.org/officeDocument/2006/math" xmlns:a14="http://schemas.microsoft.com/office/drawing/2010/main" xmlns:ma14="http://schemas.microsoft.com/office/mac/drawingml/2011/main" val="1"/>
             </a:ext>
           </a:extLst>
         </p:spPr>
@@ -11249,7 +11249,7 @@
           </a:effectLst>
           <a:extLst>
             <a:ext uri="{C572A759-6A51-4108-AA02-DFA0A04FC94B}">
-              <ma14:wrappingTextBoxFlag xmlns:ma14="http://schemas.microsoft.com/office/mac/drawingml/2011/main" xmlns:a14="http://schemas.microsoft.com/office/drawing/2010/main" xmlns:m="http://schemas.openxmlformats.org/officeDocument/2006/math" xmlns="" val="1"/>
+              <ma14:wrappingTextBoxFlag xmlns="" xmlns:m="http://schemas.openxmlformats.org/officeDocument/2006/math" xmlns:a14="http://schemas.microsoft.com/office/drawing/2010/main" xmlns:ma14="http://schemas.microsoft.com/office/mac/drawingml/2011/main" val="1"/>
             </a:ext>
           </a:extLst>
         </p:spPr>
@@ -11477,7 +11477,7 @@
           </a:effectLst>
           <a:extLst>
             <a:ext uri="{C572A759-6A51-4108-AA02-DFA0A04FC94B}">
-              <ma14:wrappingTextBoxFlag xmlns:ma14="http://schemas.microsoft.com/office/mac/drawingml/2011/main" xmlns:a14="http://schemas.microsoft.com/office/drawing/2010/main" xmlns:m="http://schemas.openxmlformats.org/officeDocument/2006/math" xmlns="" val="1"/>
+              <ma14:wrappingTextBoxFlag xmlns="" xmlns:m="http://schemas.openxmlformats.org/officeDocument/2006/math" xmlns:a14="http://schemas.microsoft.com/office/drawing/2010/main" xmlns:ma14="http://schemas.microsoft.com/office/mac/drawingml/2011/main" val="1"/>
             </a:ext>
           </a:extLst>
         </p:spPr>
@@ -11590,7 +11590,7 @@
           </a:effectLst>
           <a:extLst>
             <a:ext uri="{C572A759-6A51-4108-AA02-DFA0A04FC94B}">
-              <ma14:wrappingTextBoxFlag xmlns:ma14="http://schemas.microsoft.com/office/mac/drawingml/2011/main" xmlns:a14="http://schemas.microsoft.com/office/drawing/2010/main" xmlns:m="http://schemas.openxmlformats.org/officeDocument/2006/math" xmlns="" val="1"/>
+              <ma14:wrappingTextBoxFlag xmlns="" xmlns:m="http://schemas.openxmlformats.org/officeDocument/2006/math" xmlns:a14="http://schemas.microsoft.com/office/drawing/2010/main" xmlns:ma14="http://schemas.microsoft.com/office/mac/drawingml/2011/main" val="1"/>
             </a:ext>
           </a:extLst>
         </p:spPr>
@@ -11655,7 +11655,7 @@
           </a:effectLst>
           <a:extLst>
             <a:ext uri="{C572A759-6A51-4108-AA02-DFA0A04FC94B}">
-              <ma14:wrappingTextBoxFlag xmlns:ma14="http://schemas.microsoft.com/office/mac/drawingml/2011/main" xmlns:a14="http://schemas.microsoft.com/office/drawing/2010/main" xmlns:m="http://schemas.openxmlformats.org/officeDocument/2006/math" xmlns="" val="1"/>
+              <ma14:wrappingTextBoxFlag xmlns="" xmlns:m="http://schemas.openxmlformats.org/officeDocument/2006/math" xmlns:a14="http://schemas.microsoft.com/office/drawing/2010/main" xmlns:ma14="http://schemas.microsoft.com/office/mac/drawingml/2011/main" val="1"/>
             </a:ext>
           </a:extLst>
         </p:spPr>
@@ -11740,7 +11740,7 @@
           </a:effectLst>
           <a:extLst>
             <a:ext uri="{C572A759-6A51-4108-AA02-DFA0A04FC94B}">
-              <ma14:wrappingTextBoxFlag xmlns:ma14="http://schemas.microsoft.com/office/mac/drawingml/2011/main" xmlns:a14="http://schemas.microsoft.com/office/drawing/2010/main" xmlns:m="http://schemas.openxmlformats.org/officeDocument/2006/math" xmlns="" val="1"/>
+              <ma14:wrappingTextBoxFlag xmlns="" xmlns:m="http://schemas.openxmlformats.org/officeDocument/2006/math" xmlns:a14="http://schemas.microsoft.com/office/drawing/2010/main" xmlns:ma14="http://schemas.microsoft.com/office/mac/drawingml/2011/main" val="1"/>
             </a:ext>
           </a:extLst>
         </p:spPr>
@@ -11825,7 +11825,7 @@
           </a:effectLst>
           <a:extLst>
             <a:ext uri="{C572A759-6A51-4108-AA02-DFA0A04FC94B}">
-              <ma14:wrappingTextBoxFlag xmlns:ma14="http://schemas.microsoft.com/office/mac/drawingml/2011/main" xmlns:a14="http://schemas.microsoft.com/office/drawing/2010/main" xmlns:m="http://schemas.openxmlformats.org/officeDocument/2006/math" xmlns="" val="1"/>
+              <ma14:wrappingTextBoxFlag xmlns="" xmlns:m="http://schemas.openxmlformats.org/officeDocument/2006/math" xmlns:a14="http://schemas.microsoft.com/office/drawing/2010/main" xmlns:ma14="http://schemas.microsoft.com/office/mac/drawingml/2011/main" val="1"/>
             </a:ext>
           </a:extLst>
         </p:spPr>
@@ -11906,7 +11906,7 @@
           </a:effectLst>
           <a:extLst>
             <a:ext uri="{C572A759-6A51-4108-AA02-DFA0A04FC94B}">
-              <ma14:wrappingTextBoxFlag xmlns:ma14="http://schemas.microsoft.com/office/mac/drawingml/2011/main" xmlns:a14="http://schemas.microsoft.com/office/drawing/2010/main" xmlns:m="http://schemas.openxmlformats.org/officeDocument/2006/math" xmlns="" val="1"/>
+              <ma14:wrappingTextBoxFlag xmlns="" xmlns:m="http://schemas.openxmlformats.org/officeDocument/2006/math" xmlns:a14="http://schemas.microsoft.com/office/drawing/2010/main" xmlns:ma14="http://schemas.microsoft.com/office/mac/drawingml/2011/main" val="1"/>
             </a:ext>
           </a:extLst>
         </p:spPr>
@@ -11987,7 +11987,7 @@
           </a:effectLst>
           <a:extLst>
             <a:ext uri="{C572A759-6A51-4108-AA02-DFA0A04FC94B}">
-              <ma14:wrappingTextBoxFlag xmlns:ma14="http://schemas.microsoft.com/office/mac/drawingml/2011/main" xmlns:a14="http://schemas.microsoft.com/office/drawing/2010/main" xmlns:m="http://schemas.openxmlformats.org/officeDocument/2006/math" xmlns="" val="1"/>
+              <ma14:wrappingTextBoxFlag xmlns="" xmlns:m="http://schemas.openxmlformats.org/officeDocument/2006/math" xmlns:a14="http://schemas.microsoft.com/office/drawing/2010/main" xmlns:ma14="http://schemas.microsoft.com/office/mac/drawingml/2011/main" val="1"/>
             </a:ext>
           </a:extLst>
         </p:spPr>
@@ -12064,7 +12064,7 @@
           </a:effectLst>
           <a:extLst>
             <a:ext uri="{C572A759-6A51-4108-AA02-DFA0A04FC94B}">
-              <ma14:wrappingTextBoxFlag xmlns:ma14="http://schemas.microsoft.com/office/mac/drawingml/2011/main" xmlns:a14="http://schemas.microsoft.com/office/drawing/2010/main" xmlns:m="http://schemas.openxmlformats.org/officeDocument/2006/math" xmlns="" val="1"/>
+              <ma14:wrappingTextBoxFlag xmlns="" xmlns:m="http://schemas.openxmlformats.org/officeDocument/2006/math" xmlns:a14="http://schemas.microsoft.com/office/drawing/2010/main" xmlns:ma14="http://schemas.microsoft.com/office/mac/drawingml/2011/main" val="1"/>
             </a:ext>
           </a:extLst>
         </p:spPr>
@@ -12129,7 +12129,7 @@
           </a:effectLst>
           <a:extLst>
             <a:ext uri="{C572A759-6A51-4108-AA02-DFA0A04FC94B}">
-              <ma14:wrappingTextBoxFlag xmlns:ma14="http://schemas.microsoft.com/office/mac/drawingml/2011/main" xmlns:a14="http://schemas.microsoft.com/office/drawing/2010/main" xmlns:m="http://schemas.openxmlformats.org/officeDocument/2006/math" xmlns="" val="1"/>
+              <ma14:wrappingTextBoxFlag xmlns="" xmlns:m="http://schemas.openxmlformats.org/officeDocument/2006/math" xmlns:a14="http://schemas.microsoft.com/office/drawing/2010/main" xmlns:ma14="http://schemas.microsoft.com/office/mac/drawingml/2011/main" val="1"/>
             </a:ext>
           </a:extLst>
         </p:spPr>
@@ -12214,7 +12214,7 @@
           </a:effectLst>
           <a:extLst>
             <a:ext uri="{C572A759-6A51-4108-AA02-DFA0A04FC94B}">
-              <ma14:wrappingTextBoxFlag xmlns:ma14="http://schemas.microsoft.com/office/mac/drawingml/2011/main" xmlns:a14="http://schemas.microsoft.com/office/drawing/2010/main" xmlns:m="http://schemas.openxmlformats.org/officeDocument/2006/math" xmlns="" val="1"/>
+              <ma14:wrappingTextBoxFlag xmlns="" xmlns:m="http://schemas.openxmlformats.org/officeDocument/2006/math" xmlns:a14="http://schemas.microsoft.com/office/drawing/2010/main" xmlns:ma14="http://schemas.microsoft.com/office/mac/drawingml/2011/main" val="1"/>
             </a:ext>
           </a:extLst>
         </p:spPr>
@@ -12310,7 +12310,7 @@
           </a:effectLst>
           <a:extLst>
             <a:ext uri="{C572A759-6A51-4108-AA02-DFA0A04FC94B}">
-              <ma14:wrappingTextBoxFlag xmlns:ma14="http://schemas.microsoft.com/office/mac/drawingml/2011/main" xmlns:a14="http://schemas.microsoft.com/office/drawing/2010/main" xmlns:m="http://schemas.openxmlformats.org/officeDocument/2006/math" xmlns="" val="1"/>
+              <ma14:wrappingTextBoxFlag xmlns="" xmlns:m="http://schemas.openxmlformats.org/officeDocument/2006/math" xmlns:a14="http://schemas.microsoft.com/office/drawing/2010/main" xmlns:ma14="http://schemas.microsoft.com/office/mac/drawingml/2011/main" val="1"/>
             </a:ext>
           </a:extLst>
         </p:spPr>
@@ -12761,7 +12761,7 @@
           </a:effectLst>
           <a:extLst>
             <a:ext uri="{C572A759-6A51-4108-AA02-DFA0A04FC94B}">
-              <ma14:wrappingTextBoxFlag xmlns:ma14="http://schemas.microsoft.com/office/mac/drawingml/2011/main" xmlns:a14="http://schemas.microsoft.com/office/drawing/2010/main" xmlns:m="http://schemas.openxmlformats.org/officeDocument/2006/math" xmlns="" val="1"/>
+              <ma14:wrappingTextBoxFlag xmlns="" xmlns:m="http://schemas.openxmlformats.org/officeDocument/2006/math" xmlns:a14="http://schemas.microsoft.com/office/drawing/2010/main" xmlns:ma14="http://schemas.microsoft.com/office/mac/drawingml/2011/main" val="1"/>
             </a:ext>
           </a:extLst>
         </p:spPr>
@@ -12826,7 +12826,7 @@
           </a:effectLst>
           <a:extLst>
             <a:ext uri="{C572A759-6A51-4108-AA02-DFA0A04FC94B}">
-              <ma14:wrappingTextBoxFlag xmlns:ma14="http://schemas.microsoft.com/office/mac/drawingml/2011/main" xmlns:a14="http://schemas.microsoft.com/office/drawing/2010/main" xmlns:m="http://schemas.openxmlformats.org/officeDocument/2006/math" xmlns="" val="1"/>
+              <ma14:wrappingTextBoxFlag xmlns="" xmlns:m="http://schemas.openxmlformats.org/officeDocument/2006/math" xmlns:a14="http://schemas.microsoft.com/office/drawing/2010/main" xmlns:ma14="http://schemas.microsoft.com/office/mac/drawingml/2011/main" val="1"/>
             </a:ext>
           </a:extLst>
         </p:spPr>
@@ -12875,7 +12875,7 @@
         </p:nvSpPr>
         <p:spPr>
           <a:xfrm>
-            <a:off x="7936819" y="4253991"/>
+            <a:off x="7936819" y="4535895"/>
             <a:ext cx="1401454" cy="313529"/>
           </a:xfrm>
           <a:prstGeom prst="roundRect">
@@ -12904,7 +12904,7 @@
           </a:effectLst>
           <a:extLst>
             <a:ext uri="{C572A759-6A51-4108-AA02-DFA0A04FC94B}">
-              <ma14:wrappingTextBoxFlag xmlns:ma14="http://schemas.microsoft.com/office/mac/drawingml/2011/main" xmlns:a14="http://schemas.microsoft.com/office/drawing/2010/main" xmlns:m="http://schemas.openxmlformats.org/officeDocument/2006/math" xmlns="" val="1"/>
+              <ma14:wrappingTextBoxFlag xmlns="" xmlns:m="http://schemas.openxmlformats.org/officeDocument/2006/math" xmlns:a14="http://schemas.microsoft.com/office/drawing/2010/main" xmlns:ma14="http://schemas.microsoft.com/office/mac/drawingml/2011/main" val="1"/>
             </a:ext>
           </a:extLst>
         </p:spPr>
@@ -12996,7 +12996,7 @@
           </a:effectLst>
           <a:extLst>
             <a:ext uri="{C572A759-6A51-4108-AA02-DFA0A04FC94B}">
-              <ma14:wrappingTextBoxFlag xmlns:ma14="http://schemas.microsoft.com/office/mac/drawingml/2011/main" xmlns:a14="http://schemas.microsoft.com/office/drawing/2010/main" xmlns:m="http://schemas.openxmlformats.org/officeDocument/2006/math" xmlns="" val="1"/>
+              <ma14:wrappingTextBoxFlag xmlns="" xmlns:m="http://schemas.openxmlformats.org/officeDocument/2006/math" xmlns:a14="http://schemas.microsoft.com/office/drawing/2010/main" xmlns:ma14="http://schemas.microsoft.com/office/mac/drawingml/2011/main" val="1"/>
             </a:ext>
           </a:extLst>
         </p:spPr>
@@ -13079,7 +13079,7 @@
           </a:effectLst>
           <a:extLst>
             <a:ext uri="{C572A759-6A51-4108-AA02-DFA0A04FC94B}">
-              <ma14:wrappingTextBoxFlag xmlns:ma14="http://schemas.microsoft.com/office/mac/drawingml/2011/main" xmlns:a14="http://schemas.microsoft.com/office/drawing/2010/main" xmlns:m="http://schemas.openxmlformats.org/officeDocument/2006/math" xmlns="" val="1"/>
+              <ma14:wrappingTextBoxFlag xmlns="" xmlns:m="http://schemas.openxmlformats.org/officeDocument/2006/math" xmlns:a14="http://schemas.microsoft.com/office/drawing/2010/main" xmlns:ma14="http://schemas.microsoft.com/office/mac/drawingml/2011/main" val="1"/>
             </a:ext>
           </a:extLst>
         </p:spPr>
@@ -13144,7 +13144,7 @@
           </a:effectLst>
           <a:extLst>
             <a:ext uri="{C572A759-6A51-4108-AA02-DFA0A04FC94B}">
-              <ma14:wrappingTextBoxFlag xmlns:ma14="http://schemas.microsoft.com/office/mac/drawingml/2011/main" xmlns:a14="http://schemas.microsoft.com/office/drawing/2010/main" xmlns:m="http://schemas.openxmlformats.org/officeDocument/2006/math" xmlns="" val="1"/>
+              <ma14:wrappingTextBoxFlag xmlns="" xmlns:m="http://schemas.openxmlformats.org/officeDocument/2006/math" xmlns:a14="http://schemas.microsoft.com/office/drawing/2010/main" xmlns:ma14="http://schemas.microsoft.com/office/mac/drawingml/2011/main" val="1"/>
             </a:ext>
           </a:extLst>
         </p:spPr>
@@ -13229,7 +13229,7 @@
           </a:effectLst>
           <a:extLst>
             <a:ext uri="{C572A759-6A51-4108-AA02-DFA0A04FC94B}">
-              <ma14:wrappingTextBoxFlag xmlns:ma14="http://schemas.microsoft.com/office/mac/drawingml/2011/main" xmlns:a14="http://schemas.microsoft.com/office/drawing/2010/main" xmlns:m="http://schemas.openxmlformats.org/officeDocument/2006/math" xmlns="" val="1"/>
+              <ma14:wrappingTextBoxFlag xmlns="" xmlns:m="http://schemas.openxmlformats.org/officeDocument/2006/math" xmlns:a14="http://schemas.microsoft.com/office/drawing/2010/main" xmlns:ma14="http://schemas.microsoft.com/office/mac/drawingml/2011/main" val="1"/>
             </a:ext>
           </a:extLst>
         </p:spPr>
@@ -13314,7 +13314,7 @@
           </a:effectLst>
           <a:extLst>
             <a:ext uri="{C572A759-6A51-4108-AA02-DFA0A04FC94B}">
-              <ma14:wrappingTextBoxFlag xmlns:ma14="http://schemas.microsoft.com/office/mac/drawingml/2011/main" xmlns:a14="http://schemas.microsoft.com/office/drawing/2010/main" xmlns:m="http://schemas.openxmlformats.org/officeDocument/2006/math" xmlns="" val="1"/>
+              <ma14:wrappingTextBoxFlag xmlns="" xmlns:m="http://schemas.openxmlformats.org/officeDocument/2006/math" xmlns:a14="http://schemas.microsoft.com/office/drawing/2010/main" xmlns:ma14="http://schemas.microsoft.com/office/mac/drawingml/2011/main" val="1"/>
             </a:ext>
           </a:extLst>
         </p:spPr>
@@ -13399,7 +13399,7 @@
           </a:effectLst>
           <a:extLst>
             <a:ext uri="{C572A759-6A51-4108-AA02-DFA0A04FC94B}">
-              <ma14:wrappingTextBoxFlag xmlns:ma14="http://schemas.microsoft.com/office/mac/drawingml/2011/main" xmlns:a14="http://schemas.microsoft.com/office/drawing/2010/main" xmlns:m="http://schemas.openxmlformats.org/officeDocument/2006/math" xmlns="" val="1"/>
+              <ma14:wrappingTextBoxFlag xmlns="" xmlns:m="http://schemas.openxmlformats.org/officeDocument/2006/math" xmlns:a14="http://schemas.microsoft.com/office/drawing/2010/main" xmlns:ma14="http://schemas.microsoft.com/office/mac/drawingml/2011/main" val="1"/>
             </a:ext>
           </a:extLst>
         </p:spPr>
@@ -13636,18 +13636,17 @@
           </p:cNvPr>
           <p:cNvCxnSpPr>
             <a:cxnSpLocks/>
+            <a:stCxn id="118" idx="2"/>
           </p:cNvCxnSpPr>
           <p:nvPr/>
         </p:nvCxnSpPr>
         <p:spPr>
-          <a:xfrm rot="10800000" flipV="1">
-            <a:off x="1889099" y="4079830"/>
-            <a:ext cx="4496109" cy="534717"/>
+          <a:xfrm rot="5400000">
+            <a:off x="4059687" y="2284980"/>
+            <a:ext cx="158980" cy="4500154"/>
           </a:xfrm>
-          <a:prstGeom prst="bentConnector3">
-            <a:avLst>
-              <a:gd name="adj1" fmla="val -41"/>
-            </a:avLst>
+          <a:prstGeom prst="bentConnector2">
+            <a:avLst/>
           </a:prstGeom>
           <a:noFill/>
           <a:ln w="25400" cap="flat">
@@ -13714,7 +13713,7 @@
           </a:effectLst>
           <a:extLst>
             <a:ext uri="{C572A759-6A51-4108-AA02-DFA0A04FC94B}">
-              <ma14:wrappingTextBoxFlag xmlns:ma14="http://schemas.microsoft.com/office/mac/drawingml/2011/main" xmlns:a14="http://schemas.microsoft.com/office/drawing/2010/main" xmlns:m="http://schemas.openxmlformats.org/officeDocument/2006/math" xmlns="" val="1"/>
+              <ma14:wrappingTextBoxFlag xmlns="" xmlns:m="http://schemas.openxmlformats.org/officeDocument/2006/math" xmlns:a14="http://schemas.microsoft.com/office/drawing/2010/main" xmlns:ma14="http://schemas.microsoft.com/office/mac/drawingml/2011/main" val="1"/>
             </a:ext>
           </a:extLst>
         </p:spPr>
@@ -13770,8 +13769,8 @@
         </p:nvSpPr>
         <p:spPr>
           <a:xfrm>
-            <a:off x="5753190" y="3119241"/>
-            <a:ext cx="1272127" cy="1002476"/>
+            <a:off x="5753190" y="3119240"/>
+            <a:ext cx="1272127" cy="1336327"/>
           </a:xfrm>
           <a:prstGeom prst="roundRect">
             <a:avLst>
@@ -13797,7 +13796,7 @@
           </a:effectLst>
           <a:extLst>
             <a:ext uri="{C572A759-6A51-4108-AA02-DFA0A04FC94B}">
-              <ma14:wrappingTextBoxFlag xmlns:ma14="http://schemas.microsoft.com/office/mac/drawingml/2011/main" xmlns:a14="http://schemas.microsoft.com/office/drawing/2010/main" xmlns:m="http://schemas.openxmlformats.org/officeDocument/2006/math" xmlns="" val="1"/>
+              <ma14:wrappingTextBoxFlag xmlns="" xmlns:m="http://schemas.openxmlformats.org/officeDocument/2006/math" xmlns:a14="http://schemas.microsoft.com/office/drawing/2010/main" xmlns:ma14="http://schemas.microsoft.com/office/mac/drawingml/2011/main" val="1"/>
             </a:ext>
           </a:extLst>
         </p:spPr>
@@ -13862,7 +13861,7 @@
           </a:effectLst>
           <a:extLst>
             <a:ext uri="{C572A759-6A51-4108-AA02-DFA0A04FC94B}">
-              <ma14:wrappingTextBoxFlag xmlns:ma14="http://schemas.microsoft.com/office/mac/drawingml/2011/main" xmlns:a14="http://schemas.microsoft.com/office/drawing/2010/main" xmlns:m="http://schemas.openxmlformats.org/officeDocument/2006/math" xmlns="" val="1"/>
+              <ma14:wrappingTextBoxFlag xmlns="" xmlns:m="http://schemas.openxmlformats.org/officeDocument/2006/math" xmlns:a14="http://schemas.microsoft.com/office/drawing/2010/main" xmlns:ma14="http://schemas.microsoft.com/office/mac/drawingml/2011/main" val="1"/>
             </a:ext>
           </a:extLst>
         </p:spPr>
@@ -13918,7 +13917,7 @@
         </p:nvSpPr>
         <p:spPr>
           <a:xfrm>
-            <a:off x="5939251" y="3681595"/>
+            <a:off x="5939251" y="4101233"/>
             <a:ext cx="890337" cy="313529"/>
           </a:xfrm>
           <a:prstGeom prst="roundRect">
@@ -13943,7 +13942,7 @@
           </a:effectLst>
           <a:extLst>
             <a:ext uri="{C572A759-6A51-4108-AA02-DFA0A04FC94B}">
-              <ma14:wrappingTextBoxFlag xmlns:ma14="http://schemas.microsoft.com/office/mac/drawingml/2011/main" xmlns:a14="http://schemas.microsoft.com/office/drawing/2010/main" xmlns:m="http://schemas.openxmlformats.org/officeDocument/2006/math" xmlns="" val="1"/>
+              <ma14:wrappingTextBoxFlag xmlns="" xmlns:m="http://schemas.openxmlformats.org/officeDocument/2006/math" xmlns:a14="http://schemas.microsoft.com/office/drawing/2010/main" xmlns:ma14="http://schemas.microsoft.com/office/mac/drawingml/2011/main" val="1"/>
             </a:ext>
           </a:extLst>
         </p:spPr>
@@ -14274,7 +14273,7 @@
           </a:effectLst>
           <a:extLst>
             <a:ext uri="{C572A759-6A51-4108-AA02-DFA0A04FC94B}">
-              <ma14:wrappingTextBoxFlag xmlns:ma14="http://schemas.microsoft.com/office/mac/drawingml/2011/main" xmlns:a14="http://schemas.microsoft.com/office/drawing/2010/main" xmlns:m="http://schemas.openxmlformats.org/officeDocument/2006/math" xmlns="" val="1"/>
+              <ma14:wrappingTextBoxFlag xmlns="" xmlns:m="http://schemas.openxmlformats.org/officeDocument/2006/math" xmlns:a14="http://schemas.microsoft.com/office/drawing/2010/main" xmlns:ma14="http://schemas.microsoft.com/office/mac/drawingml/2011/main" val="1"/>
             </a:ext>
           </a:extLst>
         </p:spPr>
@@ -14339,7 +14338,7 @@
           </a:effectLst>
           <a:extLst>
             <a:ext uri="{C572A759-6A51-4108-AA02-DFA0A04FC94B}">
-              <ma14:wrappingTextBoxFlag xmlns:ma14="http://schemas.microsoft.com/office/mac/drawingml/2011/main" xmlns:a14="http://schemas.microsoft.com/office/drawing/2010/main" xmlns:m="http://schemas.openxmlformats.org/officeDocument/2006/math" xmlns="" val="1"/>
+              <ma14:wrappingTextBoxFlag xmlns="" xmlns:m="http://schemas.openxmlformats.org/officeDocument/2006/math" xmlns:a14="http://schemas.microsoft.com/office/drawing/2010/main" xmlns:ma14="http://schemas.microsoft.com/office/mac/drawingml/2011/main" val="1"/>
             </a:ext>
           </a:extLst>
         </p:spPr>
@@ -14424,7 +14423,7 @@
           </a:effectLst>
           <a:extLst>
             <a:ext uri="{C572A759-6A51-4108-AA02-DFA0A04FC94B}">
-              <ma14:wrappingTextBoxFlag xmlns:ma14="http://schemas.microsoft.com/office/mac/drawingml/2011/main" xmlns:a14="http://schemas.microsoft.com/office/drawing/2010/main" xmlns:m="http://schemas.openxmlformats.org/officeDocument/2006/math" xmlns="" val="1"/>
+              <ma14:wrappingTextBoxFlag xmlns="" xmlns:m="http://schemas.openxmlformats.org/officeDocument/2006/math" xmlns:a14="http://schemas.microsoft.com/office/drawing/2010/main" xmlns:ma14="http://schemas.microsoft.com/office/mac/drawingml/2011/main" val="1"/>
             </a:ext>
           </a:extLst>
         </p:spPr>
@@ -14509,7 +14508,7 @@
           </a:effectLst>
           <a:extLst>
             <a:ext uri="{C572A759-6A51-4108-AA02-DFA0A04FC94B}">
-              <ma14:wrappingTextBoxFlag xmlns:ma14="http://schemas.microsoft.com/office/mac/drawingml/2011/main" xmlns:a14="http://schemas.microsoft.com/office/drawing/2010/main" xmlns:m="http://schemas.openxmlformats.org/officeDocument/2006/math" xmlns="" val="1"/>
+              <ma14:wrappingTextBoxFlag xmlns="" xmlns:m="http://schemas.openxmlformats.org/officeDocument/2006/math" xmlns:a14="http://schemas.microsoft.com/office/drawing/2010/main" xmlns:ma14="http://schemas.microsoft.com/office/mac/drawingml/2011/main" val="1"/>
             </a:ext>
           </a:extLst>
         </p:spPr>
@@ -14594,7 +14593,7 @@
           </a:effectLst>
           <a:extLst>
             <a:ext uri="{C572A759-6A51-4108-AA02-DFA0A04FC94B}">
-              <ma14:wrappingTextBoxFlag xmlns:ma14="http://schemas.microsoft.com/office/mac/drawingml/2011/main" xmlns:a14="http://schemas.microsoft.com/office/drawing/2010/main" xmlns:m="http://schemas.openxmlformats.org/officeDocument/2006/math" xmlns="" val="1"/>
+              <ma14:wrappingTextBoxFlag xmlns="" xmlns:m="http://schemas.openxmlformats.org/officeDocument/2006/math" xmlns:a14="http://schemas.microsoft.com/office/drawing/2010/main" xmlns:ma14="http://schemas.microsoft.com/office/mac/drawingml/2011/main" val="1"/>
             </a:ext>
           </a:extLst>
         </p:spPr>
@@ -14825,7 +14824,7 @@
           </a:effectLst>
           <a:extLst>
             <a:ext uri="{C572A759-6A51-4108-AA02-DFA0A04FC94B}">
-              <ma14:wrappingTextBoxFlag xmlns:ma14="http://schemas.microsoft.com/office/mac/drawingml/2011/main" xmlns:a14="http://schemas.microsoft.com/office/drawing/2010/main" xmlns:m="http://schemas.openxmlformats.org/officeDocument/2006/math" xmlns="" val="1"/>
+              <ma14:wrappingTextBoxFlag xmlns="" xmlns:m="http://schemas.openxmlformats.org/officeDocument/2006/math" xmlns:a14="http://schemas.microsoft.com/office/drawing/2010/main" xmlns:ma14="http://schemas.microsoft.com/office/mac/drawingml/2011/main" val="1"/>
             </a:ext>
           </a:extLst>
         </p:spPr>
@@ -14890,7 +14889,7 @@
           </a:effectLst>
           <a:extLst>
             <a:ext uri="{C572A759-6A51-4108-AA02-DFA0A04FC94B}">
-              <ma14:wrappingTextBoxFlag xmlns:ma14="http://schemas.microsoft.com/office/mac/drawingml/2011/main" xmlns:a14="http://schemas.microsoft.com/office/drawing/2010/main" xmlns:m="http://schemas.openxmlformats.org/officeDocument/2006/math" xmlns="" val="1"/>
+              <ma14:wrappingTextBoxFlag xmlns="" xmlns:m="http://schemas.openxmlformats.org/officeDocument/2006/math" xmlns:a14="http://schemas.microsoft.com/office/drawing/2010/main" xmlns:ma14="http://schemas.microsoft.com/office/mac/drawingml/2011/main" val="1"/>
             </a:ext>
           </a:extLst>
         </p:spPr>
@@ -15123,7 +15122,7 @@
           </a:effectLst>
           <a:extLst>
             <a:ext uri="{C572A759-6A51-4108-AA02-DFA0A04FC94B}">
-              <ma14:wrappingTextBoxFlag xmlns:ma14="http://schemas.microsoft.com/office/mac/drawingml/2011/main" xmlns:a14="http://schemas.microsoft.com/office/drawing/2010/main" xmlns:m="http://schemas.openxmlformats.org/officeDocument/2006/math" xmlns="" val="1"/>
+              <ma14:wrappingTextBoxFlag xmlns="" xmlns:m="http://schemas.openxmlformats.org/officeDocument/2006/math" xmlns:a14="http://schemas.microsoft.com/office/drawing/2010/main" xmlns:ma14="http://schemas.microsoft.com/office/mac/drawingml/2011/main" val="1"/>
             </a:ext>
           </a:extLst>
         </p:spPr>
@@ -15204,7 +15203,7 @@
           </a:effectLst>
           <a:extLst>
             <a:ext uri="{C572A759-6A51-4108-AA02-DFA0A04FC94B}">
-              <ma14:wrappingTextBoxFlag xmlns:ma14="http://schemas.microsoft.com/office/mac/drawingml/2011/main" xmlns:a14="http://schemas.microsoft.com/office/drawing/2010/main" xmlns:m="http://schemas.openxmlformats.org/officeDocument/2006/math" xmlns="" val="1"/>
+              <ma14:wrappingTextBoxFlag xmlns="" xmlns:m="http://schemas.openxmlformats.org/officeDocument/2006/math" xmlns:a14="http://schemas.microsoft.com/office/drawing/2010/main" xmlns:ma14="http://schemas.microsoft.com/office/mac/drawingml/2011/main" val="1"/>
             </a:ext>
           </a:extLst>
         </p:spPr>
@@ -15289,7 +15288,7 @@
           </a:effectLst>
           <a:extLst>
             <a:ext uri="{C572A759-6A51-4108-AA02-DFA0A04FC94B}">
-              <ma14:wrappingTextBoxFlag xmlns:ma14="http://schemas.microsoft.com/office/mac/drawingml/2011/main" xmlns:a14="http://schemas.microsoft.com/office/drawing/2010/main" xmlns:m="http://schemas.openxmlformats.org/officeDocument/2006/math" xmlns="" val="1"/>
+              <ma14:wrappingTextBoxFlag xmlns="" xmlns:m="http://schemas.openxmlformats.org/officeDocument/2006/math" xmlns:a14="http://schemas.microsoft.com/office/drawing/2010/main" xmlns:ma14="http://schemas.microsoft.com/office/mac/drawingml/2011/main" val="1"/>
             </a:ext>
           </a:extLst>
         </p:spPr>
@@ -15374,7 +15373,7 @@
           </a:effectLst>
           <a:extLst>
             <a:ext uri="{C572A759-6A51-4108-AA02-DFA0A04FC94B}">
-              <ma14:wrappingTextBoxFlag xmlns:ma14="http://schemas.microsoft.com/office/mac/drawingml/2011/main" xmlns:a14="http://schemas.microsoft.com/office/drawing/2010/main" xmlns:m="http://schemas.openxmlformats.org/officeDocument/2006/math" xmlns="" val="1"/>
+              <ma14:wrappingTextBoxFlag xmlns="" xmlns:m="http://schemas.openxmlformats.org/officeDocument/2006/math" xmlns:a14="http://schemas.microsoft.com/office/drawing/2010/main" xmlns:ma14="http://schemas.microsoft.com/office/mac/drawingml/2011/main" val="1"/>
             </a:ext>
           </a:extLst>
         </p:spPr>
@@ -15455,7 +15454,7 @@
           </a:effectLst>
           <a:extLst>
             <a:ext uri="{C572A759-6A51-4108-AA02-DFA0A04FC94B}">
-              <ma14:wrappingTextBoxFlag xmlns:ma14="http://schemas.microsoft.com/office/mac/drawingml/2011/main" xmlns:a14="http://schemas.microsoft.com/office/drawing/2010/main" xmlns:m="http://schemas.openxmlformats.org/officeDocument/2006/math" xmlns="" val="1"/>
+              <ma14:wrappingTextBoxFlag xmlns="" xmlns:m="http://schemas.openxmlformats.org/officeDocument/2006/math" xmlns:a14="http://schemas.microsoft.com/office/drawing/2010/main" xmlns:ma14="http://schemas.microsoft.com/office/mac/drawingml/2011/main" val="1"/>
             </a:ext>
           </a:extLst>
         </p:spPr>
@@ -15538,7 +15537,7 @@
           </a:effectLst>
           <a:extLst>
             <a:ext uri="{C572A759-6A51-4108-AA02-DFA0A04FC94B}">
-              <ma14:wrappingTextBoxFlag xmlns:ma14="http://schemas.microsoft.com/office/mac/drawingml/2011/main" xmlns:a14="http://schemas.microsoft.com/office/drawing/2010/main" xmlns:m="http://schemas.openxmlformats.org/officeDocument/2006/math" xmlns="" val="1"/>
+              <ma14:wrappingTextBoxFlag xmlns="" xmlns:m="http://schemas.openxmlformats.org/officeDocument/2006/math" xmlns:a14="http://schemas.microsoft.com/office/drawing/2010/main" xmlns:ma14="http://schemas.microsoft.com/office/mac/drawingml/2011/main" val="1"/>
             </a:ext>
           </a:extLst>
         </p:spPr>
@@ -15603,7 +15602,7 @@
           </a:effectLst>
           <a:extLst>
             <a:ext uri="{C572A759-6A51-4108-AA02-DFA0A04FC94B}">
-              <ma14:wrappingTextBoxFlag xmlns:ma14="http://schemas.microsoft.com/office/mac/drawingml/2011/main" xmlns:a14="http://schemas.microsoft.com/office/drawing/2010/main" xmlns:m="http://schemas.openxmlformats.org/officeDocument/2006/math" xmlns="" val="1"/>
+              <ma14:wrappingTextBoxFlag xmlns="" xmlns:m="http://schemas.openxmlformats.org/officeDocument/2006/math" xmlns:a14="http://schemas.microsoft.com/office/drawing/2010/main" xmlns:ma14="http://schemas.microsoft.com/office/mac/drawingml/2011/main" val="1"/>
             </a:ext>
           </a:extLst>
         </p:spPr>
@@ -15688,7 +15687,7 @@
           </a:effectLst>
           <a:extLst>
             <a:ext uri="{C572A759-6A51-4108-AA02-DFA0A04FC94B}">
-              <ma14:wrappingTextBoxFlag xmlns:ma14="http://schemas.microsoft.com/office/mac/drawingml/2011/main" xmlns:a14="http://schemas.microsoft.com/office/drawing/2010/main" xmlns:m="http://schemas.openxmlformats.org/officeDocument/2006/math" xmlns="" val="1"/>
+              <ma14:wrappingTextBoxFlag xmlns="" xmlns:m="http://schemas.openxmlformats.org/officeDocument/2006/math" xmlns:a14="http://schemas.microsoft.com/office/drawing/2010/main" xmlns:ma14="http://schemas.microsoft.com/office/mac/drawingml/2011/main" val="1"/>
             </a:ext>
           </a:extLst>
         </p:spPr>
@@ -15924,8 +15923,8 @@
         </p:nvSpPr>
         <p:spPr>
           <a:xfrm>
-            <a:off x="7937357" y="4864511"/>
-            <a:ext cx="1330407" cy="385077"/>
+            <a:off x="5939251" y="3671691"/>
+            <a:ext cx="890337" cy="314049"/>
           </a:xfrm>
           <a:prstGeom prst="roundRect">
             <a:avLst/>
@@ -15953,7 +15952,7 @@
           </a:effectLst>
           <a:extLst>
             <a:ext uri="{C572A759-6A51-4108-AA02-DFA0A04FC94B}">
-              <ma14:wrappingTextBoxFlag xmlns:ma14="http://schemas.microsoft.com/office/mac/drawingml/2011/main" xmlns:a14="http://schemas.microsoft.com/office/drawing/2010/main" xmlns:m="http://schemas.openxmlformats.org/officeDocument/2006/math" xmlns="" val="1"/>
+              <ma14:wrappingTextBoxFlag xmlns="" xmlns:m="http://schemas.openxmlformats.org/officeDocument/2006/math" xmlns:a14="http://schemas.microsoft.com/office/drawing/2010/main" xmlns:ma14="http://schemas.microsoft.com/office/mac/drawingml/2011/main" val="1"/>
             </a:ext>
           </a:extLst>
         </p:spPr>
@@ -15992,7 +15991,7 @@
                 <a:latin typeface="微软雅黑" panose="020B0503020204020204" pitchFamily="34" charset="-122"/>
                 <a:ea typeface="微软雅黑" panose="020B0503020204020204" pitchFamily="34" charset="-122"/>
               </a:rPr>
-              <a:t> healthy instance first</a:t>
+              <a:t> hlty inst</a:t>
             </a:r>
           </a:p>
           <a:p>
@@ -16002,6 +16001,84 @@
               </a:solidFill>
               <a:latin typeface="微软雅黑" panose="020B0503020204020204" pitchFamily="34" charset="-122"/>
               <a:ea typeface="微软雅黑" panose="020B0503020204020204" pitchFamily="34" charset="-122"/>
+            </a:endParaRPr>
+          </a:p>
+        </p:txBody>
+      </p:sp>
+      <p:sp>
+        <p:nvSpPr>
+          <p:cNvPr id="93" name="文本框 92">
+            <a:extLst>
+              <a:ext uri="{FF2B5EF4-FFF2-40B4-BE49-F238E27FC236}">
+                <a16:creationId xmlns:a16="http://schemas.microsoft.com/office/drawing/2014/main" id="{879010A7-FBAD-4F7B-8E94-292A23735C61}"/>
+              </a:ext>
+            </a:extLst>
+          </p:cNvPr>
+          <p:cNvSpPr txBox="1"/>
+          <p:nvPr/>
+        </p:nvSpPr>
+        <p:spPr>
+          <a:xfrm>
+            <a:off x="3154714" y="9262583"/>
+            <a:ext cx="3215960" cy="318036"/>
+          </a:xfrm>
+          <a:prstGeom prst="rect">
+            <a:avLst/>
+          </a:prstGeom>
+          <a:noFill/>
+          <a:ln w="12700" cap="flat">
+            <a:noFill/>
+            <a:miter lim="400000"/>
+          </a:ln>
+          <a:effectLst/>
+          <a:sp3d/>
+        </p:spPr>
+        <p:style>
+          <a:lnRef idx="0">
+            <a:scrgbClr r="0" g="0" b="0"/>
+          </a:lnRef>
+          <a:fillRef idx="0">
+            <a:scrgbClr r="0" g="0" b="0"/>
+          </a:fillRef>
+          <a:effectRef idx="0">
+            <a:scrgbClr r="0" g="0" b="0"/>
+          </a:effectRef>
+          <a:fontRef idx="none"/>
+        </p:style>
+        <p:txBody>
+          <a:bodyPr rot="0" spcFirstLastPara="1" vertOverflow="overflow" horzOverflow="overflow" vert="horz" wrap="square" lIns="50800" tIns="50800" rIns="50800" bIns="50800" numCol="1" spcCol="38100" rtlCol="0" anchor="ctr">
+            <a:spAutoFit/>
+          </a:bodyPr>
+          <a:lstStyle/>
+          <a:p>
+            <a:r>
+              <a:rPr lang="en-US" altLang="zh-CN" sz="1400" b="0" dirty="0">
+                <a:solidFill>
+                  <a:schemeClr val="bg1"/>
+                </a:solidFill>
+                <a:latin typeface="Verdana" panose="020B0604030504040204" pitchFamily="34" charset="0"/>
+                <a:ea typeface="Verdana" panose="020B0604030504040204" pitchFamily="34" charset="0"/>
+                <a:cs typeface="Helvetica Light"/>
+              </a:rPr>
+              <a:t>Hlty Inst -&gt; </a:t>
+            </a:r>
+            <a:r>
+              <a:rPr lang="en-US" altLang="zh-CN" sz="1400" b="0" dirty="0">
+                <a:solidFill>
+                  <a:schemeClr val="bg1"/>
+                </a:solidFill>
+                <a:latin typeface="Verdana" panose="020B0604030504040204" pitchFamily="34" charset="0"/>
+                <a:ea typeface="Verdana" panose="020B0604030504040204" pitchFamily="34" charset="0"/>
+              </a:rPr>
+              <a:t>Healthy instance first</a:t>
+            </a:r>
+            <a:endParaRPr lang="en-US" altLang="zh-CN" sz="1400" b="0" dirty="0">
+              <a:solidFill>
+                <a:schemeClr val="bg1"/>
+              </a:solidFill>
+              <a:latin typeface="Verdana" panose="020B0604030504040204" pitchFamily="34" charset="0"/>
+              <a:ea typeface="Verdana" panose="020B0604030504040204" pitchFamily="34" charset="0"/>
+              <a:cs typeface="Helvetica Light"/>
             </a:endParaRPr>
           </a:p>
         </p:txBody>

</xml_diff>

<commit_message>
changed ppt background color
</commit_message>
<xml_diff>
--- a/resource/dubbo-go-arch.pptx
+++ b/resource/dubbo-go-arch.pptx
@@ -2108,12 +2108,9 @@
 <p:sldMaster xmlns:a="http://schemas.openxmlformats.org/drawingml/2006/main" xmlns:r="http://schemas.openxmlformats.org/officeDocument/2006/relationships" xmlns:p="http://schemas.openxmlformats.org/presentationml/2006/main">
   <p:cSld>
     <p:bg>
-      <p:bgPr>
-        <a:solidFill>
-          <a:srgbClr val="FFFFFF"/>
-        </a:solidFill>
-        <a:effectLst/>
-      </p:bgPr>
+      <p:bgRef idx="1001">
+        <a:schemeClr val="bg1"/>
+      </p:bgRef>
     </p:bg>
     <p:spTree>
       <p:nvGrpSpPr>
@@ -2149,9 +2146,7 @@
           <a:prstGeom prst="rect">
             <a:avLst/>
           </a:prstGeom>
-          <a:solidFill>
-            <a:srgbClr val="17222F"/>
-          </a:solidFill>
+          <a:noFill/>
           <a:ln w="12700" cap="flat">
             <a:noFill/>
             <a:miter lim="400000"/>
@@ -2233,7 +2228,7 @@
           </a:ln>
           <a:extLst>
             <a:ext uri="{C572A759-6A51-4108-AA02-DFA0A04FC94B}">
-              <ma14:wrappingTextBoxFlag xmlns:ma14="http://schemas.microsoft.com/office/mac/drawingml/2011/main" xmlns:a14="http://schemas.microsoft.com/office/drawing/2010/main" xmlns:m="http://schemas.openxmlformats.org/officeDocument/2006/math" xmlns="" val="1"/>
+              <ma14:wrappingTextBoxFlag xmlns="" xmlns:m="http://schemas.openxmlformats.org/officeDocument/2006/math" xmlns:a14="http://schemas.microsoft.com/office/drawing/2010/main" xmlns:ma14="http://schemas.microsoft.com/office/mac/drawingml/2011/main" val="1"/>
             </a:ext>
           </a:extLst>
         </p:spPr>
@@ -2272,7 +2267,7 @@
           </a:ln>
           <a:extLst>
             <a:ext uri="{C572A759-6A51-4108-AA02-DFA0A04FC94B}">
-              <ma14:wrappingTextBoxFlag xmlns:ma14="http://schemas.microsoft.com/office/mac/drawingml/2011/main" xmlns:a14="http://schemas.microsoft.com/office/drawing/2010/main" xmlns:m="http://schemas.openxmlformats.org/officeDocument/2006/math" xmlns="" val="1"/>
+              <ma14:wrappingTextBoxFlag xmlns="" xmlns:m="http://schemas.openxmlformats.org/officeDocument/2006/math" xmlns:a14="http://schemas.microsoft.com/office/drawing/2010/main" xmlns:ma14="http://schemas.microsoft.com/office/mac/drawingml/2011/main" val="1"/>
             </a:ext>
           </a:extLst>
         </p:spPr>
@@ -3155,7 +3150,7 @@
           </a:effectLst>
           <a:extLst>
             <a:ext uri="{C572A759-6A51-4108-AA02-DFA0A04FC94B}">
-              <ma14:wrappingTextBoxFlag xmlns:ma14="http://schemas.microsoft.com/office/mac/drawingml/2011/main" xmlns:a14="http://schemas.microsoft.com/office/drawing/2010/main" xmlns:m="http://schemas.openxmlformats.org/officeDocument/2006/math" xmlns="" val="1"/>
+              <ma14:wrappingTextBoxFlag xmlns="" xmlns:m="http://schemas.openxmlformats.org/officeDocument/2006/math" xmlns:a14="http://schemas.microsoft.com/office/drawing/2010/main" xmlns:ma14="http://schemas.microsoft.com/office/mac/drawingml/2011/main" val="1"/>
             </a:ext>
           </a:extLst>
         </p:spPr>
@@ -3255,7 +3250,7 @@
           </a:effectLst>
           <a:extLst>
             <a:ext uri="{C572A759-6A51-4108-AA02-DFA0A04FC94B}">
-              <ma14:wrappingTextBoxFlag xmlns:ma14="http://schemas.microsoft.com/office/mac/drawingml/2011/main" xmlns:a14="http://schemas.microsoft.com/office/drawing/2010/main" xmlns:m="http://schemas.openxmlformats.org/officeDocument/2006/math" xmlns="" val="1"/>
+              <ma14:wrappingTextBoxFlag xmlns="" xmlns:m="http://schemas.openxmlformats.org/officeDocument/2006/math" xmlns:a14="http://schemas.microsoft.com/office/drawing/2010/main" xmlns:ma14="http://schemas.microsoft.com/office/mac/drawingml/2011/main" val="1"/>
             </a:ext>
           </a:extLst>
         </p:spPr>
@@ -3325,7 +3320,7 @@
           </a:effectLst>
           <a:extLst>
             <a:ext uri="{C572A759-6A51-4108-AA02-DFA0A04FC94B}">
-              <ma14:wrappingTextBoxFlag xmlns:ma14="http://schemas.microsoft.com/office/mac/drawingml/2011/main" xmlns:a14="http://schemas.microsoft.com/office/drawing/2010/main" xmlns:m="http://schemas.openxmlformats.org/officeDocument/2006/math" xmlns="" val="1"/>
+              <ma14:wrappingTextBoxFlag xmlns="" xmlns:m="http://schemas.openxmlformats.org/officeDocument/2006/math" xmlns:a14="http://schemas.microsoft.com/office/drawing/2010/main" xmlns:ma14="http://schemas.microsoft.com/office/mac/drawingml/2011/main" val="1"/>
             </a:ext>
           </a:extLst>
         </p:spPr>
@@ -3378,7 +3373,7 @@
           </a:effectLst>
           <a:extLst>
             <a:ext uri="{C572A759-6A51-4108-AA02-DFA0A04FC94B}">
-              <ma14:wrappingTextBoxFlag xmlns:ma14="http://schemas.microsoft.com/office/mac/drawingml/2011/main" xmlns:a14="http://schemas.microsoft.com/office/drawing/2010/main" xmlns:m="http://schemas.openxmlformats.org/officeDocument/2006/math" xmlns="" val="1"/>
+              <ma14:wrappingTextBoxFlag xmlns="" xmlns:m="http://schemas.openxmlformats.org/officeDocument/2006/math" xmlns:a14="http://schemas.microsoft.com/office/drawing/2010/main" xmlns:ma14="http://schemas.microsoft.com/office/mac/drawingml/2011/main" val="1"/>
             </a:ext>
           </a:extLst>
         </p:spPr>
@@ -3432,7 +3427,7 @@
           </a:effectLst>
           <a:extLst>
             <a:ext uri="{C572A759-6A51-4108-AA02-DFA0A04FC94B}">
-              <ma14:wrappingTextBoxFlag xmlns:ma14="http://schemas.microsoft.com/office/mac/drawingml/2011/main" xmlns:a14="http://schemas.microsoft.com/office/drawing/2010/main" xmlns:m="http://schemas.openxmlformats.org/officeDocument/2006/math" xmlns="" val="1"/>
+              <ma14:wrappingTextBoxFlag xmlns="" xmlns:m="http://schemas.openxmlformats.org/officeDocument/2006/math" xmlns:a14="http://schemas.microsoft.com/office/drawing/2010/main" xmlns:ma14="http://schemas.microsoft.com/office/mac/drawingml/2011/main" val="1"/>
             </a:ext>
           </a:extLst>
         </p:spPr>
@@ -3486,7 +3481,7 @@
           </a:effectLst>
           <a:extLst>
             <a:ext uri="{C572A759-6A51-4108-AA02-DFA0A04FC94B}">
-              <ma14:wrappingTextBoxFlag xmlns:ma14="http://schemas.microsoft.com/office/mac/drawingml/2011/main" xmlns:a14="http://schemas.microsoft.com/office/drawing/2010/main" xmlns:m="http://schemas.openxmlformats.org/officeDocument/2006/math" xmlns="" val="1"/>
+              <ma14:wrappingTextBoxFlag xmlns="" xmlns:m="http://schemas.openxmlformats.org/officeDocument/2006/math" xmlns:a14="http://schemas.microsoft.com/office/drawing/2010/main" xmlns:ma14="http://schemas.microsoft.com/office/mac/drawingml/2011/main" val="1"/>
             </a:ext>
           </a:extLst>
         </p:spPr>
@@ -3545,7 +3540,7 @@
           </a:effectLst>
           <a:extLst>
             <a:ext uri="{C572A759-6A51-4108-AA02-DFA0A04FC94B}">
-              <ma14:wrappingTextBoxFlag xmlns:ma14="http://schemas.microsoft.com/office/mac/drawingml/2011/main" xmlns:a14="http://schemas.microsoft.com/office/drawing/2010/main" xmlns:m="http://schemas.openxmlformats.org/officeDocument/2006/math" xmlns="" val="1"/>
+              <ma14:wrappingTextBoxFlag xmlns="" xmlns:m="http://schemas.openxmlformats.org/officeDocument/2006/math" xmlns:a14="http://schemas.microsoft.com/office/drawing/2010/main" xmlns:ma14="http://schemas.microsoft.com/office/mac/drawingml/2011/main" val="1"/>
             </a:ext>
           </a:extLst>
         </p:spPr>
@@ -3596,7 +3591,7 @@
           </a:effectLst>
           <a:extLst>
             <a:ext uri="{C572A759-6A51-4108-AA02-DFA0A04FC94B}">
-              <ma14:wrappingTextBoxFlag xmlns:ma14="http://schemas.microsoft.com/office/mac/drawingml/2011/main" xmlns:a14="http://schemas.microsoft.com/office/drawing/2010/main" xmlns:m="http://schemas.openxmlformats.org/officeDocument/2006/math" xmlns="" val="1"/>
+              <ma14:wrappingTextBoxFlag xmlns="" xmlns:m="http://schemas.openxmlformats.org/officeDocument/2006/math" xmlns:a14="http://schemas.microsoft.com/office/drawing/2010/main" xmlns:ma14="http://schemas.microsoft.com/office/mac/drawingml/2011/main" val="1"/>
             </a:ext>
           </a:extLst>
         </p:spPr>
@@ -3650,7 +3645,7 @@
           </a:effectLst>
           <a:extLst>
             <a:ext uri="{C572A759-6A51-4108-AA02-DFA0A04FC94B}">
-              <ma14:wrappingTextBoxFlag xmlns:ma14="http://schemas.microsoft.com/office/mac/drawingml/2011/main" xmlns:a14="http://schemas.microsoft.com/office/drawing/2010/main" xmlns:m="http://schemas.openxmlformats.org/officeDocument/2006/math" xmlns="" val="1"/>
+              <ma14:wrappingTextBoxFlag xmlns="" xmlns:m="http://schemas.openxmlformats.org/officeDocument/2006/math" xmlns:a14="http://schemas.microsoft.com/office/drawing/2010/main" xmlns:ma14="http://schemas.microsoft.com/office/mac/drawingml/2011/main" val="1"/>
             </a:ext>
           </a:extLst>
         </p:spPr>
@@ -3704,7 +3699,7 @@
           </a:effectLst>
           <a:extLst>
             <a:ext uri="{C572A759-6A51-4108-AA02-DFA0A04FC94B}">
-              <ma14:wrappingTextBoxFlag xmlns:ma14="http://schemas.microsoft.com/office/mac/drawingml/2011/main" xmlns:a14="http://schemas.microsoft.com/office/drawing/2010/main" xmlns:m="http://schemas.openxmlformats.org/officeDocument/2006/math" xmlns="" val="1"/>
+              <ma14:wrappingTextBoxFlag xmlns="" xmlns:m="http://schemas.openxmlformats.org/officeDocument/2006/math" xmlns:a14="http://schemas.microsoft.com/office/drawing/2010/main" xmlns:ma14="http://schemas.microsoft.com/office/mac/drawingml/2011/main" val="1"/>
             </a:ext>
           </a:extLst>
         </p:spPr>
@@ -3758,7 +3753,7 @@
           </a:effectLst>
           <a:extLst>
             <a:ext uri="{C572A759-6A51-4108-AA02-DFA0A04FC94B}">
-              <ma14:wrappingTextBoxFlag xmlns:ma14="http://schemas.microsoft.com/office/mac/drawingml/2011/main" xmlns:a14="http://schemas.microsoft.com/office/drawing/2010/main" xmlns:m="http://schemas.openxmlformats.org/officeDocument/2006/math" xmlns="" val="1"/>
+              <ma14:wrappingTextBoxFlag xmlns="" xmlns:m="http://schemas.openxmlformats.org/officeDocument/2006/math" xmlns:a14="http://schemas.microsoft.com/office/drawing/2010/main" xmlns:ma14="http://schemas.microsoft.com/office/mac/drawingml/2011/main" val="1"/>
             </a:ext>
           </a:extLst>
         </p:spPr>
@@ -3812,7 +3807,7 @@
           </a:effectLst>
           <a:extLst>
             <a:ext uri="{C572A759-6A51-4108-AA02-DFA0A04FC94B}">
-              <ma14:wrappingTextBoxFlag xmlns:ma14="http://schemas.microsoft.com/office/mac/drawingml/2011/main" xmlns:a14="http://schemas.microsoft.com/office/drawing/2010/main" xmlns:m="http://schemas.openxmlformats.org/officeDocument/2006/math" xmlns="" val="1"/>
+              <ma14:wrappingTextBoxFlag xmlns="" xmlns:m="http://schemas.openxmlformats.org/officeDocument/2006/math" xmlns:a14="http://schemas.microsoft.com/office/drawing/2010/main" xmlns:ma14="http://schemas.microsoft.com/office/mac/drawingml/2011/main" val="1"/>
             </a:ext>
           </a:extLst>
         </p:spPr>
@@ -3988,7 +3983,7 @@
           </a:effectLst>
           <a:extLst>
             <a:ext uri="{C572A759-6A51-4108-AA02-DFA0A04FC94B}">
-              <ma14:wrappingTextBoxFlag xmlns:ma14="http://schemas.microsoft.com/office/mac/drawingml/2011/main" xmlns:a14="http://schemas.microsoft.com/office/drawing/2010/main" xmlns:m="http://schemas.openxmlformats.org/officeDocument/2006/math" xmlns="" val="1"/>
+              <ma14:wrappingTextBoxFlag xmlns="" xmlns:m="http://schemas.openxmlformats.org/officeDocument/2006/math" xmlns:a14="http://schemas.microsoft.com/office/drawing/2010/main" xmlns:ma14="http://schemas.microsoft.com/office/mac/drawingml/2011/main" val="1"/>
             </a:ext>
           </a:extLst>
         </p:spPr>
@@ -4112,7 +4107,7 @@
           </a:effectLst>
           <a:extLst>
             <a:ext uri="{C572A759-6A51-4108-AA02-DFA0A04FC94B}">
-              <ma14:wrappingTextBoxFlag xmlns:ma14="http://schemas.microsoft.com/office/mac/drawingml/2011/main" xmlns:a14="http://schemas.microsoft.com/office/drawing/2010/main" xmlns:m="http://schemas.openxmlformats.org/officeDocument/2006/math" xmlns="" val="1"/>
+              <ma14:wrappingTextBoxFlag xmlns="" xmlns:m="http://schemas.openxmlformats.org/officeDocument/2006/math" xmlns:a14="http://schemas.microsoft.com/office/drawing/2010/main" xmlns:ma14="http://schemas.microsoft.com/office/mac/drawingml/2011/main" val="1"/>
             </a:ext>
           </a:extLst>
         </p:spPr>
@@ -4171,7 +4166,7 @@
           </a:effectLst>
           <a:extLst>
             <a:ext uri="{C572A759-6A51-4108-AA02-DFA0A04FC94B}">
-              <ma14:wrappingTextBoxFlag xmlns:ma14="http://schemas.microsoft.com/office/mac/drawingml/2011/main" xmlns:a14="http://schemas.microsoft.com/office/drawing/2010/main" xmlns:m="http://schemas.openxmlformats.org/officeDocument/2006/math" xmlns="" val="1"/>
+              <ma14:wrappingTextBoxFlag xmlns="" xmlns:m="http://schemas.openxmlformats.org/officeDocument/2006/math" xmlns:a14="http://schemas.microsoft.com/office/drawing/2010/main" xmlns:ma14="http://schemas.microsoft.com/office/mac/drawingml/2011/main" val="1"/>
             </a:ext>
           </a:extLst>
         </p:spPr>
@@ -4236,7 +4231,7 @@
           </a:effectLst>
           <a:extLst>
             <a:ext uri="{C572A759-6A51-4108-AA02-DFA0A04FC94B}">
-              <ma14:wrappingTextBoxFlag xmlns:ma14="http://schemas.microsoft.com/office/mac/drawingml/2011/main" xmlns:a14="http://schemas.microsoft.com/office/drawing/2010/main" xmlns:m="http://schemas.openxmlformats.org/officeDocument/2006/math" xmlns="" val="1"/>
+              <ma14:wrappingTextBoxFlag xmlns="" xmlns:m="http://schemas.openxmlformats.org/officeDocument/2006/math" xmlns:a14="http://schemas.microsoft.com/office/drawing/2010/main" xmlns:ma14="http://schemas.microsoft.com/office/mac/drawingml/2011/main" val="1"/>
             </a:ext>
           </a:extLst>
         </p:spPr>
@@ -4301,7 +4296,7 @@
           </a:effectLst>
           <a:extLst>
             <a:ext uri="{C572A759-6A51-4108-AA02-DFA0A04FC94B}">
-              <ma14:wrappingTextBoxFlag xmlns:ma14="http://schemas.microsoft.com/office/mac/drawingml/2011/main" xmlns:a14="http://schemas.microsoft.com/office/drawing/2010/main" xmlns:m="http://schemas.openxmlformats.org/officeDocument/2006/math" xmlns="" val="1"/>
+              <ma14:wrappingTextBoxFlag xmlns="" xmlns:m="http://schemas.openxmlformats.org/officeDocument/2006/math" xmlns:a14="http://schemas.microsoft.com/office/drawing/2010/main" xmlns:ma14="http://schemas.microsoft.com/office/mac/drawingml/2011/main" val="1"/>
             </a:ext>
           </a:extLst>
         </p:spPr>
@@ -4366,7 +4361,7 @@
           </a:effectLst>
           <a:extLst>
             <a:ext uri="{C572A759-6A51-4108-AA02-DFA0A04FC94B}">
-              <ma14:wrappingTextBoxFlag xmlns:ma14="http://schemas.microsoft.com/office/mac/drawingml/2011/main" xmlns:a14="http://schemas.microsoft.com/office/drawing/2010/main" xmlns:m="http://schemas.openxmlformats.org/officeDocument/2006/math" xmlns="" val="1"/>
+              <ma14:wrappingTextBoxFlag xmlns="" xmlns:m="http://schemas.openxmlformats.org/officeDocument/2006/math" xmlns:a14="http://schemas.microsoft.com/office/drawing/2010/main" xmlns:ma14="http://schemas.microsoft.com/office/mac/drawingml/2011/main" val="1"/>
             </a:ext>
           </a:extLst>
         </p:spPr>
@@ -4652,7 +4647,7 @@
           </a:effectLst>
           <a:extLst>
             <a:ext uri="{C572A759-6A51-4108-AA02-DFA0A04FC94B}">
-              <ma14:wrappingTextBoxFlag xmlns:ma14="http://schemas.microsoft.com/office/mac/drawingml/2011/main" xmlns:a14="http://schemas.microsoft.com/office/drawing/2010/main" xmlns:m="http://schemas.openxmlformats.org/officeDocument/2006/math" xmlns="" val="1"/>
+              <ma14:wrappingTextBoxFlag xmlns="" xmlns:m="http://schemas.openxmlformats.org/officeDocument/2006/math" xmlns:a14="http://schemas.microsoft.com/office/drawing/2010/main" xmlns:ma14="http://schemas.microsoft.com/office/mac/drawingml/2011/main" val="1"/>
             </a:ext>
           </a:extLst>
         </p:spPr>
@@ -4711,7 +4706,7 @@
           </a:effectLst>
           <a:extLst>
             <a:ext uri="{C572A759-6A51-4108-AA02-DFA0A04FC94B}">
-              <ma14:wrappingTextBoxFlag xmlns:ma14="http://schemas.microsoft.com/office/mac/drawingml/2011/main" xmlns:a14="http://schemas.microsoft.com/office/drawing/2010/main" xmlns:m="http://schemas.openxmlformats.org/officeDocument/2006/math" xmlns="" val="1"/>
+              <ma14:wrappingTextBoxFlag xmlns="" xmlns:m="http://schemas.openxmlformats.org/officeDocument/2006/math" xmlns:a14="http://schemas.microsoft.com/office/drawing/2010/main" xmlns:ma14="http://schemas.microsoft.com/office/mac/drawingml/2011/main" val="1"/>
             </a:ext>
           </a:extLst>
         </p:spPr>
@@ -4776,7 +4771,7 @@
           </a:effectLst>
           <a:extLst>
             <a:ext uri="{C572A759-6A51-4108-AA02-DFA0A04FC94B}">
-              <ma14:wrappingTextBoxFlag xmlns:ma14="http://schemas.microsoft.com/office/mac/drawingml/2011/main" xmlns:a14="http://schemas.microsoft.com/office/drawing/2010/main" xmlns:m="http://schemas.openxmlformats.org/officeDocument/2006/math" xmlns="" val="1"/>
+              <ma14:wrappingTextBoxFlag xmlns="" xmlns:m="http://schemas.openxmlformats.org/officeDocument/2006/math" xmlns:a14="http://schemas.microsoft.com/office/drawing/2010/main" xmlns:ma14="http://schemas.microsoft.com/office/mac/drawingml/2011/main" val="1"/>
             </a:ext>
           </a:extLst>
         </p:spPr>
@@ -4841,7 +4836,7 @@
           </a:effectLst>
           <a:extLst>
             <a:ext uri="{C572A759-6A51-4108-AA02-DFA0A04FC94B}">
-              <ma14:wrappingTextBoxFlag xmlns:ma14="http://schemas.microsoft.com/office/mac/drawingml/2011/main" xmlns:a14="http://schemas.microsoft.com/office/drawing/2010/main" xmlns:m="http://schemas.openxmlformats.org/officeDocument/2006/math" xmlns="" val="1"/>
+              <ma14:wrappingTextBoxFlag xmlns="" xmlns:m="http://schemas.openxmlformats.org/officeDocument/2006/math" xmlns:a14="http://schemas.microsoft.com/office/drawing/2010/main" xmlns:ma14="http://schemas.microsoft.com/office/mac/drawingml/2011/main" val="1"/>
             </a:ext>
           </a:extLst>
         </p:spPr>
@@ -4906,7 +4901,7 @@
           </a:effectLst>
           <a:extLst>
             <a:ext uri="{C572A759-6A51-4108-AA02-DFA0A04FC94B}">
-              <ma14:wrappingTextBoxFlag xmlns:ma14="http://schemas.microsoft.com/office/mac/drawingml/2011/main" xmlns:a14="http://schemas.microsoft.com/office/drawing/2010/main" xmlns:m="http://schemas.openxmlformats.org/officeDocument/2006/math" xmlns="" val="1"/>
+              <ma14:wrappingTextBoxFlag xmlns="" xmlns:m="http://schemas.openxmlformats.org/officeDocument/2006/math" xmlns:a14="http://schemas.microsoft.com/office/drawing/2010/main" xmlns:ma14="http://schemas.microsoft.com/office/mac/drawingml/2011/main" val="1"/>
             </a:ext>
           </a:extLst>
         </p:spPr>
@@ -5037,7 +5032,7 @@
             <a:effectLst/>
             <a:extLst>
               <a:ext uri="{C572A759-6A51-4108-AA02-DFA0A04FC94B}">
-                <ma14:wrappingTextBoxFlag xmlns:ma14="http://schemas.microsoft.com/office/mac/drawingml/2011/main" xmlns:a14="http://schemas.microsoft.com/office/drawing/2010/main" xmlns:m="http://schemas.openxmlformats.org/officeDocument/2006/math" xmlns="" val="1"/>
+                <ma14:wrappingTextBoxFlag xmlns="" xmlns:m="http://schemas.openxmlformats.org/officeDocument/2006/math" xmlns:a14="http://schemas.microsoft.com/office/drawing/2010/main" xmlns:ma14="http://schemas.microsoft.com/office/mac/drawingml/2011/main" val="1"/>
               </a:ext>
             </a:extLst>
           </p:spPr>
@@ -5166,7 +5161,7 @@
             <a:effectLst/>
             <a:extLst>
               <a:ext uri="{C572A759-6A51-4108-AA02-DFA0A04FC94B}">
-                <ma14:wrappingTextBoxFlag xmlns:ma14="http://schemas.microsoft.com/office/mac/drawingml/2011/main" xmlns:a14="http://schemas.microsoft.com/office/drawing/2010/main" xmlns:m="http://schemas.openxmlformats.org/officeDocument/2006/math" xmlns="" val="1"/>
+                <ma14:wrappingTextBoxFlag xmlns="" xmlns:m="http://schemas.openxmlformats.org/officeDocument/2006/math" xmlns:a14="http://schemas.microsoft.com/office/drawing/2010/main" xmlns:ma14="http://schemas.microsoft.com/office/mac/drawingml/2011/main" val="1"/>
               </a:ext>
             </a:extLst>
           </p:spPr>
@@ -5217,7 +5212,7 @@
             </a:ln>
             <a:extLst>
               <a:ext uri="{C572A759-6A51-4108-AA02-DFA0A04FC94B}">
-                <ma14:wrappingTextBoxFlag xmlns:ma14="http://schemas.microsoft.com/office/mac/drawingml/2011/main" xmlns:a14="http://schemas.microsoft.com/office/drawing/2010/main" xmlns:m="http://schemas.openxmlformats.org/officeDocument/2006/math" xmlns="" val="1"/>
+                <ma14:wrappingTextBoxFlag xmlns="" xmlns:m="http://schemas.openxmlformats.org/officeDocument/2006/math" xmlns:a14="http://schemas.microsoft.com/office/drawing/2010/main" xmlns:ma14="http://schemas.microsoft.com/office/mac/drawingml/2011/main" val="1"/>
               </a:ext>
             </a:extLst>
           </p:spPr>
@@ -5411,7 +5406,7 @@
             </a:effectLst>
             <a:extLst>
               <a:ext uri="{C572A759-6A51-4108-AA02-DFA0A04FC94B}">
-                <ma14:wrappingTextBoxFlag xmlns:ma14="http://schemas.microsoft.com/office/mac/drawingml/2011/main" xmlns:a14="http://schemas.microsoft.com/office/drawing/2010/main" xmlns:m="http://schemas.openxmlformats.org/officeDocument/2006/math" xmlns="" val="1"/>
+                <ma14:wrappingTextBoxFlag xmlns="" xmlns:m="http://schemas.openxmlformats.org/officeDocument/2006/math" xmlns:a14="http://schemas.microsoft.com/office/drawing/2010/main" xmlns:ma14="http://schemas.microsoft.com/office/mac/drawingml/2011/main" val="1"/>
               </a:ext>
             </a:extLst>
           </p:spPr>
@@ -5481,7 +5476,7 @@
             </a:effectLst>
             <a:extLst>
               <a:ext uri="{C572A759-6A51-4108-AA02-DFA0A04FC94B}">
-                <ma14:wrappingTextBoxFlag xmlns:ma14="http://schemas.microsoft.com/office/mac/drawingml/2011/main" xmlns:a14="http://schemas.microsoft.com/office/drawing/2010/main" xmlns:m="http://schemas.openxmlformats.org/officeDocument/2006/math" xmlns="" val="1"/>
+                <ma14:wrappingTextBoxFlag xmlns="" xmlns:m="http://schemas.openxmlformats.org/officeDocument/2006/math" xmlns:a14="http://schemas.microsoft.com/office/drawing/2010/main" xmlns:ma14="http://schemas.microsoft.com/office/mac/drawingml/2011/main" val="1"/>
               </a:ext>
             </a:extLst>
           </p:spPr>
@@ -5604,7 +5599,7 @@
           </a:ln>
           <a:extLst>
             <a:ext uri="{C572A759-6A51-4108-AA02-DFA0A04FC94B}">
-              <ma14:wrappingTextBoxFlag xmlns:ma14="http://schemas.microsoft.com/office/mac/drawingml/2011/main" xmlns:a14="http://schemas.microsoft.com/office/drawing/2010/main" xmlns:m="http://schemas.openxmlformats.org/officeDocument/2006/math" xmlns="" val="1"/>
+              <ma14:wrappingTextBoxFlag xmlns="" xmlns:m="http://schemas.openxmlformats.org/officeDocument/2006/math" xmlns:a14="http://schemas.microsoft.com/office/drawing/2010/main" xmlns:ma14="http://schemas.microsoft.com/office/mac/drawingml/2011/main" val="1"/>
             </a:ext>
           </a:extLst>
         </p:spPr>
@@ -5693,7 +5688,7 @@
             </a:effectLst>
             <a:extLst>
               <a:ext uri="{C572A759-6A51-4108-AA02-DFA0A04FC94B}">
-                <ma14:wrappingTextBoxFlag xmlns:ma14="http://schemas.microsoft.com/office/mac/drawingml/2011/main" xmlns:a14="http://schemas.microsoft.com/office/drawing/2010/main" xmlns:m="http://schemas.openxmlformats.org/officeDocument/2006/math" xmlns="" val="1"/>
+                <ma14:wrappingTextBoxFlag xmlns="" xmlns:m="http://schemas.openxmlformats.org/officeDocument/2006/math" xmlns:a14="http://schemas.microsoft.com/office/drawing/2010/main" xmlns:ma14="http://schemas.microsoft.com/office/mac/drawingml/2011/main" val="1"/>
               </a:ext>
             </a:extLst>
           </p:spPr>
@@ -5787,7 +5782,7 @@
                 </a:effectLst>
                 <a:extLst>
                   <a:ext uri="{C572A759-6A51-4108-AA02-DFA0A04FC94B}">
-                    <ma14:wrappingTextBoxFlag xmlns:ma14="http://schemas.microsoft.com/office/mac/drawingml/2011/main" xmlns:a14="http://schemas.microsoft.com/office/drawing/2010/main" xmlns:m="http://schemas.openxmlformats.org/officeDocument/2006/math" xmlns="" val="1"/>
+                    <ma14:wrappingTextBoxFlag xmlns="" xmlns:m="http://schemas.openxmlformats.org/officeDocument/2006/math" xmlns:a14="http://schemas.microsoft.com/office/drawing/2010/main" xmlns:ma14="http://schemas.microsoft.com/office/mac/drawingml/2011/main" val="1"/>
                   </a:ext>
                 </a:extLst>
               </p:spPr>
@@ -5854,7 +5849,7 @@
                 </a:effectLst>
                 <a:extLst>
                   <a:ext uri="{C572A759-6A51-4108-AA02-DFA0A04FC94B}">
-                    <ma14:wrappingTextBoxFlag xmlns:ma14="http://schemas.microsoft.com/office/mac/drawingml/2011/main" xmlns:a14="http://schemas.microsoft.com/office/drawing/2010/main" xmlns:m="http://schemas.openxmlformats.org/officeDocument/2006/math" xmlns="" val="1"/>
+                    <ma14:wrappingTextBoxFlag xmlns="" xmlns:m="http://schemas.openxmlformats.org/officeDocument/2006/math" xmlns:a14="http://schemas.microsoft.com/office/drawing/2010/main" xmlns:ma14="http://schemas.microsoft.com/office/mac/drawingml/2011/main" val="1"/>
                   </a:ext>
                 </a:extLst>
               </p:spPr>
@@ -5939,7 +5934,7 @@
                 </a:effectLst>
                 <a:extLst>
                   <a:ext uri="{C572A759-6A51-4108-AA02-DFA0A04FC94B}">
-                    <ma14:wrappingTextBoxFlag xmlns:ma14="http://schemas.microsoft.com/office/mac/drawingml/2011/main" xmlns:a14="http://schemas.microsoft.com/office/drawing/2010/main" xmlns:m="http://schemas.openxmlformats.org/officeDocument/2006/math" xmlns="" val="1"/>
+                    <ma14:wrappingTextBoxFlag xmlns="" xmlns:m="http://schemas.openxmlformats.org/officeDocument/2006/math" xmlns:a14="http://schemas.microsoft.com/office/drawing/2010/main" xmlns:ma14="http://schemas.microsoft.com/office/mac/drawingml/2011/main" val="1"/>
                   </a:ext>
                 </a:extLst>
               </p:spPr>
@@ -6006,7 +6001,7 @@
                 </a:effectLst>
                 <a:extLst>
                   <a:ext uri="{C572A759-6A51-4108-AA02-DFA0A04FC94B}">
-                    <ma14:wrappingTextBoxFlag xmlns:ma14="http://schemas.microsoft.com/office/mac/drawingml/2011/main" xmlns:a14="http://schemas.microsoft.com/office/drawing/2010/main" xmlns:m="http://schemas.openxmlformats.org/officeDocument/2006/math" xmlns="" val="1"/>
+                    <ma14:wrappingTextBoxFlag xmlns="" xmlns:m="http://schemas.openxmlformats.org/officeDocument/2006/math" xmlns:a14="http://schemas.microsoft.com/office/drawing/2010/main" xmlns:ma14="http://schemas.microsoft.com/office/mac/drawingml/2011/main" val="1"/>
                   </a:ext>
                 </a:extLst>
               </p:spPr>
@@ -6095,7 +6090,7 @@
                 </a:effectLst>
                 <a:extLst>
                   <a:ext uri="{C572A759-6A51-4108-AA02-DFA0A04FC94B}">
-                    <ma14:wrappingTextBoxFlag xmlns:ma14="http://schemas.microsoft.com/office/mac/drawingml/2011/main" xmlns:a14="http://schemas.microsoft.com/office/drawing/2010/main" xmlns:m="http://schemas.openxmlformats.org/officeDocument/2006/math" xmlns="" val="1"/>
+                    <ma14:wrappingTextBoxFlag xmlns="" xmlns:m="http://schemas.openxmlformats.org/officeDocument/2006/math" xmlns:a14="http://schemas.microsoft.com/office/drawing/2010/main" xmlns:ma14="http://schemas.microsoft.com/office/mac/drawingml/2011/main" val="1"/>
                   </a:ext>
                 </a:extLst>
               </p:spPr>
@@ -6162,7 +6157,7 @@
                 </a:effectLst>
                 <a:extLst>
                   <a:ext uri="{C572A759-6A51-4108-AA02-DFA0A04FC94B}">
-                    <ma14:wrappingTextBoxFlag xmlns:ma14="http://schemas.microsoft.com/office/mac/drawingml/2011/main" xmlns:a14="http://schemas.microsoft.com/office/drawing/2010/main" xmlns:m="http://schemas.openxmlformats.org/officeDocument/2006/math" xmlns="" val="1"/>
+                    <ma14:wrappingTextBoxFlag xmlns="" xmlns:m="http://schemas.openxmlformats.org/officeDocument/2006/math" xmlns:a14="http://schemas.microsoft.com/office/drawing/2010/main" xmlns:ma14="http://schemas.microsoft.com/office/mac/drawingml/2011/main" val="1"/>
                   </a:ext>
                 </a:extLst>
               </p:spPr>
@@ -6247,7 +6242,7 @@
                 </a:effectLst>
                 <a:extLst>
                   <a:ext uri="{C572A759-6A51-4108-AA02-DFA0A04FC94B}">
-                    <ma14:wrappingTextBoxFlag xmlns:ma14="http://schemas.microsoft.com/office/mac/drawingml/2011/main" xmlns:a14="http://schemas.microsoft.com/office/drawing/2010/main" xmlns:m="http://schemas.openxmlformats.org/officeDocument/2006/math" xmlns="" val="1"/>
+                    <ma14:wrappingTextBoxFlag xmlns="" xmlns:m="http://schemas.openxmlformats.org/officeDocument/2006/math" xmlns:a14="http://schemas.microsoft.com/office/drawing/2010/main" xmlns:ma14="http://schemas.microsoft.com/office/mac/drawingml/2011/main" val="1"/>
                   </a:ext>
                 </a:extLst>
               </p:spPr>
@@ -6314,7 +6309,7 @@
                 </a:effectLst>
                 <a:extLst>
                   <a:ext uri="{C572A759-6A51-4108-AA02-DFA0A04FC94B}">
-                    <ma14:wrappingTextBoxFlag xmlns:ma14="http://schemas.microsoft.com/office/mac/drawingml/2011/main" xmlns:a14="http://schemas.microsoft.com/office/drawing/2010/main" xmlns:m="http://schemas.openxmlformats.org/officeDocument/2006/math" xmlns="" val="1"/>
+                    <ma14:wrappingTextBoxFlag xmlns="" xmlns:m="http://schemas.openxmlformats.org/officeDocument/2006/math" xmlns:a14="http://schemas.microsoft.com/office/drawing/2010/main" xmlns:ma14="http://schemas.microsoft.com/office/mac/drawingml/2011/main" val="1"/>
                   </a:ext>
                 </a:extLst>
               </p:spPr>
@@ -6405,7 +6400,7 @@
                 </a:effectLst>
                 <a:extLst>
                   <a:ext uri="{C572A759-6A51-4108-AA02-DFA0A04FC94B}">
-                    <ma14:wrappingTextBoxFlag xmlns:ma14="http://schemas.microsoft.com/office/mac/drawingml/2011/main" xmlns:a14="http://schemas.microsoft.com/office/drawing/2010/main" xmlns:m="http://schemas.openxmlformats.org/officeDocument/2006/math" xmlns="" val="1"/>
+                    <ma14:wrappingTextBoxFlag xmlns="" xmlns:m="http://schemas.openxmlformats.org/officeDocument/2006/math" xmlns:a14="http://schemas.microsoft.com/office/drawing/2010/main" xmlns:ma14="http://schemas.microsoft.com/office/mac/drawingml/2011/main" val="1"/>
                   </a:ext>
                 </a:extLst>
               </p:spPr>
@@ -6495,7 +6490,7 @@
                 </a:effectLst>
                 <a:extLst>
                   <a:ext uri="{C572A759-6A51-4108-AA02-DFA0A04FC94B}">
-                    <ma14:wrappingTextBoxFlag xmlns:ma14="http://schemas.microsoft.com/office/mac/drawingml/2011/main" xmlns:a14="http://schemas.microsoft.com/office/drawing/2010/main" xmlns:m="http://schemas.openxmlformats.org/officeDocument/2006/math" xmlns="" val="1"/>
+                    <ma14:wrappingTextBoxFlag xmlns="" xmlns:m="http://schemas.openxmlformats.org/officeDocument/2006/math" xmlns:a14="http://schemas.microsoft.com/office/drawing/2010/main" xmlns:ma14="http://schemas.microsoft.com/office/mac/drawingml/2011/main" val="1"/>
                   </a:ext>
                 </a:extLst>
               </p:spPr>
@@ -6606,7 +6601,7 @@
               </a:effectLst>
               <a:extLst>
                 <a:ext uri="{C572A759-6A51-4108-AA02-DFA0A04FC94B}">
-                  <ma14:wrappingTextBoxFlag xmlns:ma14="http://schemas.microsoft.com/office/mac/drawingml/2011/main" xmlns:a14="http://schemas.microsoft.com/office/drawing/2010/main" xmlns:m="http://schemas.openxmlformats.org/officeDocument/2006/math" xmlns="" val="1"/>
+                  <ma14:wrappingTextBoxFlag xmlns="" xmlns:m="http://schemas.openxmlformats.org/officeDocument/2006/math" xmlns:a14="http://schemas.microsoft.com/office/drawing/2010/main" xmlns:ma14="http://schemas.microsoft.com/office/mac/drawingml/2011/main" val="1"/>
                 </a:ext>
               </a:extLst>
             </p:spPr>
@@ -6692,7 +6687,7 @@
               </a:effectLst>
               <a:extLst>
                 <a:ext uri="{C572A759-6A51-4108-AA02-DFA0A04FC94B}">
-                  <ma14:wrappingTextBoxFlag xmlns:ma14="http://schemas.microsoft.com/office/mac/drawingml/2011/main" xmlns:a14="http://schemas.microsoft.com/office/drawing/2010/main" xmlns:m="http://schemas.openxmlformats.org/officeDocument/2006/math" xmlns="" val="1"/>
+                  <ma14:wrappingTextBoxFlag xmlns="" xmlns:m="http://schemas.openxmlformats.org/officeDocument/2006/math" xmlns:a14="http://schemas.microsoft.com/office/drawing/2010/main" xmlns:ma14="http://schemas.microsoft.com/office/mac/drawingml/2011/main" val="1"/>
                 </a:ext>
               </a:extLst>
             </p:spPr>
@@ -6756,7 +6751,7 @@
               </a:effectLst>
               <a:extLst>
                 <a:ext uri="{C572A759-6A51-4108-AA02-DFA0A04FC94B}">
-                  <ma14:wrappingTextBoxFlag xmlns:ma14="http://schemas.microsoft.com/office/mac/drawingml/2011/main" xmlns:a14="http://schemas.microsoft.com/office/drawing/2010/main" xmlns:m="http://schemas.openxmlformats.org/officeDocument/2006/math" xmlns="" val="1"/>
+                  <ma14:wrappingTextBoxFlag xmlns="" xmlns:m="http://schemas.openxmlformats.org/officeDocument/2006/math" xmlns:a14="http://schemas.microsoft.com/office/drawing/2010/main" xmlns:ma14="http://schemas.microsoft.com/office/mac/drawingml/2011/main" val="1"/>
                 </a:ext>
               </a:extLst>
             </p:spPr>
@@ -6830,7 +6825,7 @@
               </a:effectLst>
               <a:extLst>
                 <a:ext uri="{C572A759-6A51-4108-AA02-DFA0A04FC94B}">
-                  <ma14:wrappingTextBoxFlag xmlns:ma14="http://schemas.microsoft.com/office/mac/drawingml/2011/main" xmlns:a14="http://schemas.microsoft.com/office/drawing/2010/main" xmlns:m="http://schemas.openxmlformats.org/officeDocument/2006/math" xmlns="" val="1"/>
+                  <ma14:wrappingTextBoxFlag xmlns="" xmlns:m="http://schemas.openxmlformats.org/officeDocument/2006/math" xmlns:a14="http://schemas.microsoft.com/office/drawing/2010/main" xmlns:ma14="http://schemas.microsoft.com/office/mac/drawingml/2011/main" val="1"/>
                 </a:ext>
               </a:extLst>
             </p:spPr>
@@ -6925,7 +6920,7 @@
               </a:effectLst>
               <a:extLst>
                 <a:ext uri="{C572A759-6A51-4108-AA02-DFA0A04FC94B}">
-                  <ma14:wrappingTextBoxFlag xmlns:ma14="http://schemas.microsoft.com/office/mac/drawingml/2011/main" xmlns:a14="http://schemas.microsoft.com/office/drawing/2010/main" xmlns:m="http://schemas.openxmlformats.org/officeDocument/2006/math" xmlns="" val="1"/>
+                  <ma14:wrappingTextBoxFlag xmlns="" xmlns:m="http://schemas.openxmlformats.org/officeDocument/2006/math" xmlns:a14="http://schemas.microsoft.com/office/drawing/2010/main" xmlns:ma14="http://schemas.microsoft.com/office/mac/drawingml/2011/main" val="1"/>
                 </a:ext>
               </a:extLst>
             </p:spPr>
@@ -7028,7 +7023,7 @@
               </a:effectLst>
               <a:extLst>
                 <a:ext uri="{C572A759-6A51-4108-AA02-DFA0A04FC94B}">
-                  <ma14:wrappingTextBoxFlag xmlns:ma14="http://schemas.microsoft.com/office/mac/drawingml/2011/main" xmlns:a14="http://schemas.microsoft.com/office/drawing/2010/main" xmlns:m="http://schemas.openxmlformats.org/officeDocument/2006/math" xmlns="" val="1"/>
+                  <ma14:wrappingTextBoxFlag xmlns="" xmlns:m="http://schemas.openxmlformats.org/officeDocument/2006/math" xmlns:a14="http://schemas.microsoft.com/office/drawing/2010/main" xmlns:ma14="http://schemas.microsoft.com/office/mac/drawingml/2011/main" val="1"/>
                 </a:ext>
               </a:extLst>
             </p:spPr>
@@ -7102,7 +7097,7 @@
               </a:effectLst>
               <a:extLst>
                 <a:ext uri="{C572A759-6A51-4108-AA02-DFA0A04FC94B}">
-                  <ma14:wrappingTextBoxFlag xmlns:ma14="http://schemas.microsoft.com/office/mac/drawingml/2011/main" xmlns:a14="http://schemas.microsoft.com/office/drawing/2010/main" xmlns:m="http://schemas.openxmlformats.org/officeDocument/2006/math" xmlns="" val="1"/>
+                  <ma14:wrappingTextBoxFlag xmlns="" xmlns:m="http://schemas.openxmlformats.org/officeDocument/2006/math" xmlns:a14="http://schemas.microsoft.com/office/drawing/2010/main" xmlns:ma14="http://schemas.microsoft.com/office/mac/drawingml/2011/main" val="1"/>
                 </a:ext>
               </a:extLst>
             </p:spPr>
@@ -7176,7 +7171,7 @@
               </a:effectLst>
               <a:extLst>
                 <a:ext uri="{C572A759-6A51-4108-AA02-DFA0A04FC94B}">
-                  <ma14:wrappingTextBoxFlag xmlns:ma14="http://schemas.microsoft.com/office/mac/drawingml/2011/main" xmlns:a14="http://schemas.microsoft.com/office/drawing/2010/main" xmlns:m="http://schemas.openxmlformats.org/officeDocument/2006/math" xmlns="" val="1"/>
+                  <ma14:wrappingTextBoxFlag xmlns="" xmlns:m="http://schemas.openxmlformats.org/officeDocument/2006/math" xmlns:a14="http://schemas.microsoft.com/office/drawing/2010/main" xmlns:ma14="http://schemas.microsoft.com/office/mac/drawingml/2011/main" val="1"/>
                 </a:ext>
               </a:extLst>
             </p:spPr>
@@ -7249,7 +7244,7 @@
           </a:effectLst>
           <a:extLst>
             <a:ext uri="{C572A759-6A51-4108-AA02-DFA0A04FC94B}">
-              <ma14:wrappingTextBoxFlag xmlns:ma14="http://schemas.microsoft.com/office/mac/drawingml/2011/main" xmlns:a14="http://schemas.microsoft.com/office/drawing/2010/main" xmlns:m="http://schemas.openxmlformats.org/officeDocument/2006/math" xmlns="" val="1"/>
+              <ma14:wrappingTextBoxFlag xmlns="" xmlns:m="http://schemas.openxmlformats.org/officeDocument/2006/math" xmlns:a14="http://schemas.microsoft.com/office/drawing/2010/main" xmlns:ma14="http://schemas.microsoft.com/office/mac/drawingml/2011/main" val="1"/>
             </a:ext>
           </a:extLst>
         </p:spPr>
@@ -7307,7 +7302,7 @@
           </a:effectLst>
           <a:extLst>
             <a:ext uri="{C572A759-6A51-4108-AA02-DFA0A04FC94B}">
-              <ma14:wrappingTextBoxFlag xmlns:ma14="http://schemas.microsoft.com/office/mac/drawingml/2011/main" xmlns:a14="http://schemas.microsoft.com/office/drawing/2010/main" xmlns:m="http://schemas.openxmlformats.org/officeDocument/2006/math" xmlns="" val="1"/>
+              <ma14:wrappingTextBoxFlag xmlns="" xmlns:m="http://schemas.openxmlformats.org/officeDocument/2006/math" xmlns:a14="http://schemas.microsoft.com/office/drawing/2010/main" xmlns:ma14="http://schemas.microsoft.com/office/mac/drawingml/2011/main" val="1"/>
             </a:ext>
           </a:extLst>
         </p:spPr>
@@ -7377,7 +7372,7 @@
           </a:effectLst>
           <a:extLst>
             <a:ext uri="{C572A759-6A51-4108-AA02-DFA0A04FC94B}">
-              <ma14:wrappingTextBoxFlag xmlns:ma14="http://schemas.microsoft.com/office/mac/drawingml/2011/main" xmlns:a14="http://schemas.microsoft.com/office/drawing/2010/main" xmlns:m="http://schemas.openxmlformats.org/officeDocument/2006/math" xmlns="" val="1"/>
+              <ma14:wrappingTextBoxFlag xmlns="" xmlns:m="http://schemas.openxmlformats.org/officeDocument/2006/math" xmlns:a14="http://schemas.microsoft.com/office/drawing/2010/main" xmlns:ma14="http://schemas.microsoft.com/office/mac/drawingml/2011/main" val="1"/>
             </a:ext>
           </a:extLst>
         </p:spPr>
@@ -7447,7 +7442,7 @@
           </a:effectLst>
           <a:extLst>
             <a:ext uri="{C572A759-6A51-4108-AA02-DFA0A04FC94B}">
-              <ma14:wrappingTextBoxFlag xmlns:ma14="http://schemas.microsoft.com/office/mac/drawingml/2011/main" xmlns:a14="http://schemas.microsoft.com/office/drawing/2010/main" xmlns:m="http://schemas.openxmlformats.org/officeDocument/2006/math" xmlns="" val="1"/>
+              <ma14:wrappingTextBoxFlag xmlns="" xmlns:m="http://schemas.openxmlformats.org/officeDocument/2006/math" xmlns:a14="http://schemas.microsoft.com/office/drawing/2010/main" xmlns:ma14="http://schemas.microsoft.com/office/mac/drawingml/2011/main" val="1"/>
             </a:ext>
           </a:extLst>
         </p:spPr>
@@ -7517,7 +7512,7 @@
           </a:effectLst>
           <a:extLst>
             <a:ext uri="{C572A759-6A51-4108-AA02-DFA0A04FC94B}">
-              <ma14:wrappingTextBoxFlag xmlns:ma14="http://schemas.microsoft.com/office/mac/drawingml/2011/main" xmlns:a14="http://schemas.microsoft.com/office/drawing/2010/main" xmlns:m="http://schemas.openxmlformats.org/officeDocument/2006/math" xmlns="" val="1"/>
+              <ma14:wrappingTextBoxFlag xmlns="" xmlns:m="http://schemas.openxmlformats.org/officeDocument/2006/math" xmlns:a14="http://schemas.microsoft.com/office/drawing/2010/main" xmlns:ma14="http://schemas.microsoft.com/office/mac/drawingml/2011/main" val="1"/>
             </a:ext>
           </a:extLst>
         </p:spPr>
@@ -7743,7 +7738,7 @@
           </a:effectLst>
           <a:extLst>
             <a:ext uri="{C572A759-6A51-4108-AA02-DFA0A04FC94B}">
-              <ma14:wrappingTextBoxFlag xmlns:ma14="http://schemas.microsoft.com/office/mac/drawingml/2011/main" xmlns:a14="http://schemas.microsoft.com/office/drawing/2010/main" xmlns:m="http://schemas.openxmlformats.org/officeDocument/2006/math" xmlns="" val="1"/>
+              <ma14:wrappingTextBoxFlag xmlns="" xmlns:m="http://schemas.openxmlformats.org/officeDocument/2006/math" xmlns:a14="http://schemas.microsoft.com/office/drawing/2010/main" xmlns:ma14="http://schemas.microsoft.com/office/mac/drawingml/2011/main" val="1"/>
             </a:ext>
           </a:extLst>
         </p:spPr>
@@ -7794,7 +7789,7 @@
           </a:ln>
           <a:extLst>
             <a:ext uri="{C572A759-6A51-4108-AA02-DFA0A04FC94B}">
-              <ma14:wrappingTextBoxFlag xmlns:ma14="http://schemas.microsoft.com/office/mac/drawingml/2011/main" xmlns:a14="http://schemas.microsoft.com/office/drawing/2010/main" xmlns:m="http://schemas.openxmlformats.org/officeDocument/2006/math" xmlns="" val="1"/>
+              <ma14:wrappingTextBoxFlag xmlns="" xmlns:m="http://schemas.openxmlformats.org/officeDocument/2006/math" xmlns:a14="http://schemas.microsoft.com/office/drawing/2010/main" xmlns:ma14="http://schemas.microsoft.com/office/mac/drawingml/2011/main" val="1"/>
             </a:ext>
           </a:extLst>
         </p:spPr>
@@ -7849,7 +7844,7 @@
           </a:ln>
           <a:extLst>
             <a:ext uri="{C572A759-6A51-4108-AA02-DFA0A04FC94B}">
-              <ma14:wrappingTextBoxFlag xmlns:ma14="http://schemas.microsoft.com/office/mac/drawingml/2011/main" xmlns:a14="http://schemas.microsoft.com/office/drawing/2010/main" xmlns:m="http://schemas.openxmlformats.org/officeDocument/2006/math" xmlns="" val="1"/>
+              <ma14:wrappingTextBoxFlag xmlns="" xmlns:m="http://schemas.openxmlformats.org/officeDocument/2006/math" xmlns:a14="http://schemas.microsoft.com/office/drawing/2010/main" xmlns:ma14="http://schemas.microsoft.com/office/mac/drawingml/2011/main" val="1"/>
             </a:ext>
           </a:extLst>
         </p:spPr>
@@ -7987,7 +7982,7 @@
           </a:effectLst>
           <a:extLst>
             <a:ext uri="{C572A759-6A51-4108-AA02-DFA0A04FC94B}">
-              <ma14:wrappingTextBoxFlag xmlns:ma14="http://schemas.microsoft.com/office/mac/drawingml/2011/main" xmlns:a14="http://schemas.microsoft.com/office/drawing/2010/main" xmlns:m="http://schemas.openxmlformats.org/officeDocument/2006/math" xmlns="" val="1"/>
+              <ma14:wrappingTextBoxFlag xmlns="" xmlns:m="http://schemas.openxmlformats.org/officeDocument/2006/math" xmlns:a14="http://schemas.microsoft.com/office/drawing/2010/main" xmlns:ma14="http://schemas.microsoft.com/office/mac/drawingml/2011/main" val="1"/>
             </a:ext>
           </a:extLst>
         </p:spPr>
@@ -8051,7 +8046,7 @@
           </a:effectLst>
           <a:extLst>
             <a:ext uri="{C572A759-6A51-4108-AA02-DFA0A04FC94B}">
-              <ma14:wrappingTextBoxFlag xmlns:ma14="http://schemas.microsoft.com/office/mac/drawingml/2011/main" xmlns:a14="http://schemas.microsoft.com/office/drawing/2010/main" xmlns:m="http://schemas.openxmlformats.org/officeDocument/2006/math" xmlns="" val="1"/>
+              <ma14:wrappingTextBoxFlag xmlns="" xmlns:m="http://schemas.openxmlformats.org/officeDocument/2006/math" xmlns:a14="http://schemas.microsoft.com/office/drawing/2010/main" xmlns:ma14="http://schemas.microsoft.com/office/mac/drawingml/2011/main" val="1"/>
             </a:ext>
           </a:extLst>
         </p:spPr>
@@ -8121,7 +8116,7 @@
           </a:effectLst>
           <a:extLst>
             <a:ext uri="{C572A759-6A51-4108-AA02-DFA0A04FC94B}">
-              <ma14:wrappingTextBoxFlag xmlns:ma14="http://schemas.microsoft.com/office/mac/drawingml/2011/main" xmlns:a14="http://schemas.microsoft.com/office/drawing/2010/main" xmlns:m="http://schemas.openxmlformats.org/officeDocument/2006/math" xmlns="" val="1"/>
+              <ma14:wrappingTextBoxFlag xmlns="" xmlns:m="http://schemas.openxmlformats.org/officeDocument/2006/math" xmlns:a14="http://schemas.microsoft.com/office/drawing/2010/main" xmlns:ma14="http://schemas.microsoft.com/office/mac/drawingml/2011/main" val="1"/>
             </a:ext>
           </a:extLst>
         </p:spPr>
@@ -8191,7 +8186,7 @@
           </a:effectLst>
           <a:extLst>
             <a:ext uri="{C572A759-6A51-4108-AA02-DFA0A04FC94B}">
-              <ma14:wrappingTextBoxFlag xmlns:ma14="http://schemas.microsoft.com/office/mac/drawingml/2011/main" xmlns:a14="http://schemas.microsoft.com/office/drawing/2010/main" xmlns:m="http://schemas.openxmlformats.org/officeDocument/2006/math" xmlns="" val="1"/>
+              <ma14:wrappingTextBoxFlag xmlns="" xmlns:m="http://schemas.openxmlformats.org/officeDocument/2006/math" xmlns:a14="http://schemas.microsoft.com/office/drawing/2010/main" xmlns:ma14="http://schemas.microsoft.com/office/mac/drawingml/2011/main" val="1"/>
             </a:ext>
           </a:extLst>
         </p:spPr>
@@ -8261,7 +8256,7 @@
           </a:effectLst>
           <a:extLst>
             <a:ext uri="{C572A759-6A51-4108-AA02-DFA0A04FC94B}">
-              <ma14:wrappingTextBoxFlag xmlns:ma14="http://schemas.microsoft.com/office/mac/drawingml/2011/main" xmlns:a14="http://schemas.microsoft.com/office/drawing/2010/main" xmlns:m="http://schemas.openxmlformats.org/officeDocument/2006/math" xmlns="" val="1"/>
+              <ma14:wrappingTextBoxFlag xmlns="" xmlns:m="http://schemas.openxmlformats.org/officeDocument/2006/math" xmlns:a14="http://schemas.microsoft.com/office/drawing/2010/main" xmlns:ma14="http://schemas.microsoft.com/office/mac/drawingml/2011/main" val="1"/>
             </a:ext>
           </a:extLst>
         </p:spPr>
@@ -8351,7 +8346,7 @@
             </a:effectLst>
             <a:extLst>
               <a:ext uri="{C572A759-6A51-4108-AA02-DFA0A04FC94B}">
-                <ma14:wrappingTextBoxFlag xmlns:ma14="http://schemas.microsoft.com/office/mac/drawingml/2011/main" xmlns:a14="http://schemas.microsoft.com/office/drawing/2010/main" xmlns:m="http://schemas.openxmlformats.org/officeDocument/2006/math" xmlns="" val="1"/>
+                <ma14:wrappingTextBoxFlag xmlns="" xmlns:m="http://schemas.openxmlformats.org/officeDocument/2006/math" xmlns:a14="http://schemas.microsoft.com/office/drawing/2010/main" xmlns:ma14="http://schemas.microsoft.com/office/mac/drawingml/2011/main" val="1"/>
               </a:ext>
             </a:extLst>
           </p:spPr>
@@ -8421,7 +8416,7 @@
             </a:effectLst>
             <a:extLst>
               <a:ext uri="{C572A759-6A51-4108-AA02-DFA0A04FC94B}">
-                <ma14:wrappingTextBoxFlag xmlns:ma14="http://schemas.microsoft.com/office/mac/drawingml/2011/main" xmlns:a14="http://schemas.microsoft.com/office/drawing/2010/main" xmlns:m="http://schemas.openxmlformats.org/officeDocument/2006/math" xmlns="" val="1"/>
+                <ma14:wrappingTextBoxFlag xmlns="" xmlns:m="http://schemas.openxmlformats.org/officeDocument/2006/math" xmlns:a14="http://schemas.microsoft.com/office/drawing/2010/main" xmlns:ma14="http://schemas.microsoft.com/office/mac/drawingml/2011/main" val="1"/>
               </a:ext>
             </a:extLst>
           </p:spPr>
@@ -8519,7 +8514,7 @@
             </a:effectLst>
             <a:extLst>
               <a:ext uri="{C572A759-6A51-4108-AA02-DFA0A04FC94B}">
-                <ma14:wrappingTextBoxFlag xmlns:ma14="http://schemas.microsoft.com/office/mac/drawingml/2011/main" xmlns:a14="http://schemas.microsoft.com/office/drawing/2010/main" xmlns:m="http://schemas.openxmlformats.org/officeDocument/2006/math" xmlns="" val="1"/>
+                <ma14:wrappingTextBoxFlag xmlns="" xmlns:m="http://schemas.openxmlformats.org/officeDocument/2006/math" xmlns:a14="http://schemas.microsoft.com/office/drawing/2010/main" xmlns:ma14="http://schemas.microsoft.com/office/mac/drawingml/2011/main" val="1"/>
               </a:ext>
             </a:extLst>
           </p:spPr>
@@ -8575,7 +8570,7 @@
             </a:effectLst>
             <a:extLst>
               <a:ext uri="{C572A759-6A51-4108-AA02-DFA0A04FC94B}">
-                <ma14:wrappingTextBoxFlag xmlns:ma14="http://schemas.microsoft.com/office/mac/drawingml/2011/main" xmlns:a14="http://schemas.microsoft.com/office/drawing/2010/main" xmlns:m="http://schemas.openxmlformats.org/officeDocument/2006/math" xmlns="" val="1"/>
+                <ma14:wrappingTextBoxFlag xmlns="" xmlns:m="http://schemas.openxmlformats.org/officeDocument/2006/math" xmlns:a14="http://schemas.microsoft.com/office/drawing/2010/main" xmlns:ma14="http://schemas.microsoft.com/office/mac/drawingml/2011/main" val="1"/>
               </a:ext>
             </a:extLst>
           </p:spPr>
@@ -8631,7 +8626,7 @@
             </a:effectLst>
             <a:extLst>
               <a:ext uri="{C572A759-6A51-4108-AA02-DFA0A04FC94B}">
-                <ma14:wrappingTextBoxFlag xmlns:ma14="http://schemas.microsoft.com/office/mac/drawingml/2011/main" xmlns:a14="http://schemas.microsoft.com/office/drawing/2010/main" xmlns:m="http://schemas.openxmlformats.org/officeDocument/2006/math" xmlns="" val="1"/>
+                <ma14:wrappingTextBoxFlag xmlns="" xmlns:m="http://schemas.openxmlformats.org/officeDocument/2006/math" xmlns:a14="http://schemas.microsoft.com/office/drawing/2010/main" xmlns:ma14="http://schemas.microsoft.com/office/mac/drawingml/2011/main" val="1"/>
               </a:ext>
             </a:extLst>
           </p:spPr>
@@ -8695,7 +8690,7 @@
             </a:effectLst>
             <a:extLst>
               <a:ext uri="{C572A759-6A51-4108-AA02-DFA0A04FC94B}">
-                <ma14:wrappingTextBoxFlag xmlns:ma14="http://schemas.microsoft.com/office/mac/drawingml/2011/main" xmlns:a14="http://schemas.microsoft.com/office/drawing/2010/main" xmlns:m="http://schemas.openxmlformats.org/officeDocument/2006/math" xmlns="" val="1"/>
+                <ma14:wrappingTextBoxFlag xmlns="" xmlns:m="http://schemas.openxmlformats.org/officeDocument/2006/math" xmlns:a14="http://schemas.microsoft.com/office/drawing/2010/main" xmlns:ma14="http://schemas.microsoft.com/office/mac/drawingml/2011/main" val="1"/>
               </a:ext>
             </a:extLst>
           </p:spPr>
@@ -8769,7 +8764,7 @@
           </a:effectLst>
           <a:extLst>
             <a:ext uri="{C572A759-6A51-4108-AA02-DFA0A04FC94B}">
-              <ma14:wrappingTextBoxFlag xmlns:ma14="http://schemas.microsoft.com/office/mac/drawingml/2011/main" xmlns:a14="http://schemas.microsoft.com/office/drawing/2010/main" xmlns:m="http://schemas.openxmlformats.org/officeDocument/2006/math" xmlns="" val="1"/>
+              <ma14:wrappingTextBoxFlag xmlns="" xmlns:m="http://schemas.openxmlformats.org/officeDocument/2006/math" xmlns:a14="http://schemas.microsoft.com/office/drawing/2010/main" xmlns:ma14="http://schemas.microsoft.com/office/mac/drawingml/2011/main" val="1"/>
             </a:ext>
           </a:extLst>
         </p:spPr>
@@ -8831,7 +8826,7 @@
           </a:effectLst>
           <a:extLst>
             <a:ext uri="{C572A759-6A51-4108-AA02-DFA0A04FC94B}">
-              <ma14:wrappingTextBoxFlag xmlns:ma14="http://schemas.microsoft.com/office/mac/drawingml/2011/main" xmlns:a14="http://schemas.microsoft.com/office/drawing/2010/main" xmlns:m="http://schemas.openxmlformats.org/officeDocument/2006/math" xmlns="" val="1"/>
+              <ma14:wrappingTextBoxFlag xmlns="" xmlns:m="http://schemas.openxmlformats.org/officeDocument/2006/math" xmlns:a14="http://schemas.microsoft.com/office/drawing/2010/main" xmlns:ma14="http://schemas.microsoft.com/office/mac/drawingml/2011/main" val="1"/>
             </a:ext>
           </a:extLst>
         </p:spPr>
@@ -9024,7 +9019,7 @@
           </a:effectLst>
           <a:extLst>
             <a:ext uri="{C572A759-6A51-4108-AA02-DFA0A04FC94B}">
-              <ma14:wrappingTextBoxFlag xmlns:ma14="http://schemas.microsoft.com/office/mac/drawingml/2011/main" xmlns:a14="http://schemas.microsoft.com/office/drawing/2010/main" xmlns:m="http://schemas.openxmlformats.org/officeDocument/2006/math" xmlns="" val="1"/>
+              <ma14:wrappingTextBoxFlag xmlns="" xmlns:m="http://schemas.openxmlformats.org/officeDocument/2006/math" xmlns:a14="http://schemas.microsoft.com/office/drawing/2010/main" xmlns:ma14="http://schemas.microsoft.com/office/mac/drawingml/2011/main" val="1"/>
             </a:ext>
           </a:extLst>
         </p:spPr>
@@ -9086,7 +9081,7 @@
           </a:effectLst>
           <a:extLst>
             <a:ext uri="{C572A759-6A51-4108-AA02-DFA0A04FC94B}">
-              <ma14:wrappingTextBoxFlag xmlns:ma14="http://schemas.microsoft.com/office/mac/drawingml/2011/main" xmlns:a14="http://schemas.microsoft.com/office/drawing/2010/main" xmlns:m="http://schemas.openxmlformats.org/officeDocument/2006/math" xmlns="" val="1"/>
+              <ma14:wrappingTextBoxFlag xmlns="" xmlns:m="http://schemas.openxmlformats.org/officeDocument/2006/math" xmlns:a14="http://schemas.microsoft.com/office/drawing/2010/main" xmlns:ma14="http://schemas.microsoft.com/office/mac/drawingml/2011/main" val="1"/>
             </a:ext>
           </a:extLst>
         </p:spPr>
@@ -9150,7 +9145,7 @@
           </a:effectLst>
           <a:extLst>
             <a:ext uri="{C572A759-6A51-4108-AA02-DFA0A04FC94B}">
-              <ma14:wrappingTextBoxFlag xmlns:ma14="http://schemas.microsoft.com/office/mac/drawingml/2011/main" xmlns:a14="http://schemas.microsoft.com/office/drawing/2010/main" xmlns:m="http://schemas.openxmlformats.org/officeDocument/2006/math" xmlns="" val="1"/>
+              <ma14:wrappingTextBoxFlag xmlns="" xmlns:m="http://schemas.openxmlformats.org/officeDocument/2006/math" xmlns:a14="http://schemas.microsoft.com/office/drawing/2010/main" xmlns:ma14="http://schemas.microsoft.com/office/mac/drawingml/2011/main" val="1"/>
             </a:ext>
           </a:extLst>
         </p:spPr>
@@ -9220,7 +9215,7 @@
           </a:effectLst>
           <a:extLst>
             <a:ext uri="{C572A759-6A51-4108-AA02-DFA0A04FC94B}">
-              <ma14:wrappingTextBoxFlag xmlns:ma14="http://schemas.microsoft.com/office/mac/drawingml/2011/main" xmlns:a14="http://schemas.microsoft.com/office/drawing/2010/main" xmlns:m="http://schemas.openxmlformats.org/officeDocument/2006/math" xmlns="" val="1"/>
+              <ma14:wrappingTextBoxFlag xmlns="" xmlns:m="http://schemas.openxmlformats.org/officeDocument/2006/math" xmlns:a14="http://schemas.microsoft.com/office/drawing/2010/main" xmlns:ma14="http://schemas.microsoft.com/office/mac/drawingml/2011/main" val="1"/>
             </a:ext>
           </a:extLst>
         </p:spPr>
@@ -9290,7 +9285,7 @@
           </a:effectLst>
           <a:extLst>
             <a:ext uri="{C572A759-6A51-4108-AA02-DFA0A04FC94B}">
-              <ma14:wrappingTextBoxFlag xmlns:ma14="http://schemas.microsoft.com/office/mac/drawingml/2011/main" xmlns:a14="http://schemas.microsoft.com/office/drawing/2010/main" xmlns:m="http://schemas.openxmlformats.org/officeDocument/2006/math" xmlns="" val="1"/>
+              <ma14:wrappingTextBoxFlag xmlns="" xmlns:m="http://schemas.openxmlformats.org/officeDocument/2006/math" xmlns:a14="http://schemas.microsoft.com/office/drawing/2010/main" xmlns:ma14="http://schemas.microsoft.com/office/mac/drawingml/2011/main" val="1"/>
             </a:ext>
           </a:extLst>
         </p:spPr>
@@ -9360,7 +9355,7 @@
           </a:effectLst>
           <a:extLst>
             <a:ext uri="{C572A759-6A51-4108-AA02-DFA0A04FC94B}">
-              <ma14:wrappingTextBoxFlag xmlns:ma14="http://schemas.microsoft.com/office/mac/drawingml/2011/main" xmlns:a14="http://schemas.microsoft.com/office/drawing/2010/main" xmlns:m="http://schemas.openxmlformats.org/officeDocument/2006/math" xmlns="" val="1"/>
+              <ma14:wrappingTextBoxFlag xmlns="" xmlns:m="http://schemas.openxmlformats.org/officeDocument/2006/math" xmlns:a14="http://schemas.microsoft.com/office/drawing/2010/main" xmlns:ma14="http://schemas.microsoft.com/office/mac/drawingml/2011/main" val="1"/>
             </a:ext>
           </a:extLst>
         </p:spPr>
@@ -9430,7 +9425,7 @@
           </a:effectLst>
           <a:extLst>
             <a:ext uri="{C572A759-6A51-4108-AA02-DFA0A04FC94B}">
-              <ma14:wrappingTextBoxFlag xmlns:ma14="http://schemas.microsoft.com/office/mac/drawingml/2011/main" xmlns:a14="http://schemas.microsoft.com/office/drawing/2010/main" xmlns:m="http://schemas.openxmlformats.org/officeDocument/2006/math" xmlns="" val="1"/>
+              <ma14:wrappingTextBoxFlag xmlns="" xmlns:m="http://schemas.openxmlformats.org/officeDocument/2006/math" xmlns:a14="http://schemas.microsoft.com/office/drawing/2010/main" xmlns:ma14="http://schemas.microsoft.com/office/mac/drawingml/2011/main" val="1"/>
             </a:ext>
           </a:extLst>
         </p:spPr>
@@ -9677,7 +9672,7 @@
           </a:effectLst>
           <a:extLst>
             <a:ext uri="{C572A759-6A51-4108-AA02-DFA0A04FC94B}">
-              <ma14:wrappingTextBoxFlag xmlns:ma14="http://schemas.microsoft.com/office/mac/drawingml/2011/main" xmlns:a14="http://schemas.microsoft.com/office/drawing/2010/main" xmlns:m="http://schemas.openxmlformats.org/officeDocument/2006/math" xmlns="" val="1"/>
+              <ma14:wrappingTextBoxFlag xmlns="" xmlns:m="http://schemas.openxmlformats.org/officeDocument/2006/math" xmlns:a14="http://schemas.microsoft.com/office/drawing/2010/main" xmlns:ma14="http://schemas.microsoft.com/office/mac/drawingml/2011/main" val="1"/>
             </a:ext>
           </a:extLst>
         </p:spPr>
@@ -9737,7 +9732,7 @@
           </a:effectLst>
           <a:extLst>
             <a:ext uri="{C572A759-6A51-4108-AA02-DFA0A04FC94B}">
-              <ma14:wrappingTextBoxFlag xmlns:ma14="http://schemas.microsoft.com/office/mac/drawingml/2011/main" xmlns:a14="http://schemas.microsoft.com/office/drawing/2010/main" xmlns:m="http://schemas.openxmlformats.org/officeDocument/2006/math" xmlns="" val="1"/>
+              <ma14:wrappingTextBoxFlag xmlns="" xmlns:m="http://schemas.openxmlformats.org/officeDocument/2006/math" xmlns:a14="http://schemas.microsoft.com/office/drawing/2010/main" xmlns:ma14="http://schemas.microsoft.com/office/mac/drawingml/2011/main" val="1"/>
             </a:ext>
           </a:extLst>
         </p:spPr>
@@ -9797,7 +9792,7 @@
           </a:effectLst>
           <a:extLst>
             <a:ext uri="{C572A759-6A51-4108-AA02-DFA0A04FC94B}">
-              <ma14:wrappingTextBoxFlag xmlns:ma14="http://schemas.microsoft.com/office/mac/drawingml/2011/main" xmlns:a14="http://schemas.microsoft.com/office/drawing/2010/main" xmlns:m="http://schemas.openxmlformats.org/officeDocument/2006/math" xmlns="" val="1"/>
+              <ma14:wrappingTextBoxFlag xmlns="" xmlns:m="http://schemas.openxmlformats.org/officeDocument/2006/math" xmlns:a14="http://schemas.microsoft.com/office/drawing/2010/main" xmlns:ma14="http://schemas.microsoft.com/office/mac/drawingml/2011/main" val="1"/>
             </a:ext>
           </a:extLst>
         </p:spPr>
@@ -9841,7 +9836,7 @@
     <p:bg>
       <p:bgPr>
         <a:solidFill>
-          <a:srgbClr val="17222F"/>
+          <a:srgbClr val="7F7F7F"/>
         </a:solidFill>
         <a:effectLst/>
       </p:bgPr>
@@ -9901,7 +9896,7 @@
           </a:effectLst>
           <a:extLst>
             <a:ext uri="{C572A759-6A51-4108-AA02-DFA0A04FC94B}">
-              <ma14:wrappingTextBoxFlag xmlns:ma14="http://schemas.microsoft.com/office/mac/drawingml/2011/main" xmlns:a14="http://schemas.microsoft.com/office/drawing/2010/main" xmlns:m="http://schemas.openxmlformats.org/officeDocument/2006/math" xmlns="" val="1"/>
+              <ma14:wrappingTextBoxFlag xmlns="" xmlns:m="http://schemas.openxmlformats.org/officeDocument/2006/math" xmlns:a14="http://schemas.microsoft.com/office/drawing/2010/main" xmlns:ma14="http://schemas.microsoft.com/office/mac/drawingml/2011/main" val="1"/>
             </a:ext>
           </a:extLst>
         </p:spPr>
@@ -9962,7 +9957,7 @@
           </a:effectLst>
           <a:extLst>
             <a:ext uri="{C572A759-6A51-4108-AA02-DFA0A04FC94B}">
-              <ma14:wrappingTextBoxFlag xmlns:ma14="http://schemas.microsoft.com/office/mac/drawingml/2011/main" xmlns:a14="http://schemas.microsoft.com/office/drawing/2010/main" xmlns:m="http://schemas.openxmlformats.org/officeDocument/2006/math" xmlns="" val="1"/>
+              <ma14:wrappingTextBoxFlag xmlns="" xmlns:m="http://schemas.openxmlformats.org/officeDocument/2006/math" xmlns:a14="http://schemas.microsoft.com/office/drawing/2010/main" xmlns:ma14="http://schemas.microsoft.com/office/mac/drawingml/2011/main" val="1"/>
             </a:ext>
           </a:extLst>
         </p:spPr>
@@ -10037,7 +10032,7 @@
           </a:effectLst>
           <a:extLst>
             <a:ext uri="{C572A759-6A51-4108-AA02-DFA0A04FC94B}">
-              <ma14:wrappingTextBoxFlag xmlns:ma14="http://schemas.microsoft.com/office/mac/drawingml/2011/main" xmlns:a14="http://schemas.microsoft.com/office/drawing/2010/main" xmlns:m="http://schemas.openxmlformats.org/officeDocument/2006/math" xmlns="" val="1"/>
+              <ma14:wrappingTextBoxFlag xmlns="" xmlns:m="http://schemas.openxmlformats.org/officeDocument/2006/math" xmlns:a14="http://schemas.microsoft.com/office/drawing/2010/main" xmlns:ma14="http://schemas.microsoft.com/office/mac/drawingml/2011/main" val="1"/>
             </a:ext>
           </a:extLst>
         </p:spPr>
@@ -10112,7 +10107,7 @@
           </a:effectLst>
           <a:extLst>
             <a:ext uri="{C572A759-6A51-4108-AA02-DFA0A04FC94B}">
-              <ma14:wrappingTextBoxFlag xmlns:ma14="http://schemas.microsoft.com/office/mac/drawingml/2011/main" xmlns:a14="http://schemas.microsoft.com/office/drawing/2010/main" xmlns:m="http://schemas.openxmlformats.org/officeDocument/2006/math" xmlns="" val="1"/>
+              <ma14:wrappingTextBoxFlag xmlns="" xmlns:m="http://schemas.openxmlformats.org/officeDocument/2006/math" xmlns:a14="http://schemas.microsoft.com/office/drawing/2010/main" xmlns:ma14="http://schemas.microsoft.com/office/mac/drawingml/2011/main" val="1"/>
             </a:ext>
           </a:extLst>
         </p:spPr>
@@ -10187,7 +10182,7 @@
           </a:effectLst>
           <a:extLst>
             <a:ext uri="{C572A759-6A51-4108-AA02-DFA0A04FC94B}">
-              <ma14:wrappingTextBoxFlag xmlns:ma14="http://schemas.microsoft.com/office/mac/drawingml/2011/main" xmlns:a14="http://schemas.microsoft.com/office/drawing/2010/main" xmlns:m="http://schemas.openxmlformats.org/officeDocument/2006/math" xmlns="" val="1"/>
+              <ma14:wrappingTextBoxFlag xmlns="" xmlns:m="http://schemas.openxmlformats.org/officeDocument/2006/math" xmlns:a14="http://schemas.microsoft.com/office/drawing/2010/main" xmlns:ma14="http://schemas.microsoft.com/office/mac/drawingml/2011/main" val="1"/>
             </a:ext>
           </a:extLst>
         </p:spPr>
@@ -10264,7 +10259,7 @@
           </a:effectLst>
           <a:extLst>
             <a:ext uri="{C572A759-6A51-4108-AA02-DFA0A04FC94B}">
-              <ma14:wrappingTextBoxFlag xmlns:ma14="http://schemas.microsoft.com/office/mac/drawingml/2011/main" xmlns:a14="http://schemas.microsoft.com/office/drawing/2010/main" xmlns:m="http://schemas.openxmlformats.org/officeDocument/2006/math" xmlns="" val="1"/>
+              <ma14:wrappingTextBoxFlag xmlns="" xmlns:m="http://schemas.openxmlformats.org/officeDocument/2006/math" xmlns:a14="http://schemas.microsoft.com/office/drawing/2010/main" xmlns:ma14="http://schemas.microsoft.com/office/mac/drawingml/2011/main" val="1"/>
             </a:ext>
           </a:extLst>
         </p:spPr>
@@ -10324,7 +10319,7 @@
           </a:effectLst>
           <a:extLst>
             <a:ext uri="{C572A759-6A51-4108-AA02-DFA0A04FC94B}">
-              <ma14:wrappingTextBoxFlag xmlns:ma14="http://schemas.microsoft.com/office/mac/drawingml/2011/main" xmlns:a14="http://schemas.microsoft.com/office/drawing/2010/main" xmlns:m="http://schemas.openxmlformats.org/officeDocument/2006/math" xmlns="" val="1"/>
+              <ma14:wrappingTextBoxFlag xmlns="" xmlns:m="http://schemas.openxmlformats.org/officeDocument/2006/math" xmlns:a14="http://schemas.microsoft.com/office/drawing/2010/main" xmlns:ma14="http://schemas.microsoft.com/office/mac/drawingml/2011/main" val="1"/>
             </a:ext>
           </a:extLst>
         </p:spPr>
@@ -10399,7 +10394,7 @@
           </a:effectLst>
           <a:extLst>
             <a:ext uri="{C572A759-6A51-4108-AA02-DFA0A04FC94B}">
-              <ma14:wrappingTextBoxFlag xmlns:ma14="http://schemas.microsoft.com/office/mac/drawingml/2011/main" xmlns:a14="http://schemas.microsoft.com/office/drawing/2010/main" xmlns:m="http://schemas.openxmlformats.org/officeDocument/2006/math" xmlns="" val="1"/>
+              <ma14:wrappingTextBoxFlag xmlns="" xmlns:m="http://schemas.openxmlformats.org/officeDocument/2006/math" xmlns:a14="http://schemas.microsoft.com/office/drawing/2010/main" xmlns:ma14="http://schemas.microsoft.com/office/mac/drawingml/2011/main" val="1"/>
             </a:ext>
           </a:extLst>
         </p:spPr>
@@ -10950,7 +10945,7 @@
           </a:effectLst>
           <a:extLst>
             <a:ext uri="{C572A759-6A51-4108-AA02-DFA0A04FC94B}">
-              <ma14:wrappingTextBoxFlag xmlns:ma14="http://schemas.microsoft.com/office/mac/drawingml/2011/main" xmlns:a14="http://schemas.microsoft.com/office/drawing/2010/main" xmlns:m="http://schemas.openxmlformats.org/officeDocument/2006/math" xmlns="" val="1"/>
+              <ma14:wrappingTextBoxFlag xmlns="" xmlns:m="http://schemas.openxmlformats.org/officeDocument/2006/math" xmlns:a14="http://schemas.microsoft.com/office/drawing/2010/main" xmlns:ma14="http://schemas.microsoft.com/office/mac/drawingml/2011/main" val="1"/>
             </a:ext>
           </a:extLst>
         </p:spPr>
@@ -11010,7 +11005,7 @@
           </a:effectLst>
           <a:extLst>
             <a:ext uri="{C572A759-6A51-4108-AA02-DFA0A04FC94B}">
-              <ma14:wrappingTextBoxFlag xmlns:ma14="http://schemas.microsoft.com/office/mac/drawingml/2011/main" xmlns:a14="http://schemas.microsoft.com/office/drawing/2010/main" xmlns:m="http://schemas.openxmlformats.org/officeDocument/2006/math" xmlns="" val="1"/>
+              <ma14:wrappingTextBoxFlag xmlns="" xmlns:m="http://schemas.openxmlformats.org/officeDocument/2006/math" xmlns:a14="http://schemas.microsoft.com/office/drawing/2010/main" xmlns:ma14="http://schemas.microsoft.com/office/mac/drawingml/2011/main" val="1"/>
             </a:ext>
           </a:extLst>
         </p:spPr>
@@ -11085,7 +11080,7 @@
           </a:effectLst>
           <a:extLst>
             <a:ext uri="{C572A759-6A51-4108-AA02-DFA0A04FC94B}">
-              <ma14:wrappingTextBoxFlag xmlns:ma14="http://schemas.microsoft.com/office/mac/drawingml/2011/main" xmlns:a14="http://schemas.microsoft.com/office/drawing/2010/main" xmlns:m="http://schemas.openxmlformats.org/officeDocument/2006/math" xmlns="" val="1"/>
+              <ma14:wrappingTextBoxFlag xmlns="" xmlns:m="http://schemas.openxmlformats.org/officeDocument/2006/math" xmlns:a14="http://schemas.microsoft.com/office/drawing/2010/main" xmlns:ma14="http://schemas.microsoft.com/office/mac/drawingml/2011/main" val="1"/>
             </a:ext>
           </a:extLst>
         </p:spPr>
@@ -11313,7 +11308,7 @@
           </a:effectLst>
           <a:extLst>
             <a:ext uri="{C572A759-6A51-4108-AA02-DFA0A04FC94B}">
-              <ma14:wrappingTextBoxFlag xmlns:ma14="http://schemas.microsoft.com/office/mac/drawingml/2011/main" xmlns:a14="http://schemas.microsoft.com/office/drawing/2010/main" xmlns:m="http://schemas.openxmlformats.org/officeDocument/2006/math" xmlns="" val="1"/>
+              <ma14:wrappingTextBoxFlag xmlns="" xmlns:m="http://schemas.openxmlformats.org/officeDocument/2006/math" xmlns:a14="http://schemas.microsoft.com/office/drawing/2010/main" xmlns:ma14="http://schemas.microsoft.com/office/mac/drawingml/2011/main" val="1"/>
             </a:ext>
           </a:extLst>
         </p:spPr>
@@ -11426,7 +11421,7 @@
           </a:effectLst>
           <a:extLst>
             <a:ext uri="{C572A759-6A51-4108-AA02-DFA0A04FC94B}">
-              <ma14:wrappingTextBoxFlag xmlns:ma14="http://schemas.microsoft.com/office/mac/drawingml/2011/main" xmlns:a14="http://schemas.microsoft.com/office/drawing/2010/main" xmlns:m="http://schemas.openxmlformats.org/officeDocument/2006/math" xmlns="" val="1"/>
+              <ma14:wrappingTextBoxFlag xmlns="" xmlns:m="http://schemas.openxmlformats.org/officeDocument/2006/math" xmlns:a14="http://schemas.microsoft.com/office/drawing/2010/main" xmlns:ma14="http://schemas.microsoft.com/office/mac/drawingml/2011/main" val="1"/>
             </a:ext>
           </a:extLst>
         </p:spPr>
@@ -11491,7 +11486,7 @@
           </a:effectLst>
           <a:extLst>
             <a:ext uri="{C572A759-6A51-4108-AA02-DFA0A04FC94B}">
-              <ma14:wrappingTextBoxFlag xmlns:ma14="http://schemas.microsoft.com/office/mac/drawingml/2011/main" xmlns:a14="http://schemas.microsoft.com/office/drawing/2010/main" xmlns:m="http://schemas.openxmlformats.org/officeDocument/2006/math" xmlns="" val="1"/>
+              <ma14:wrappingTextBoxFlag xmlns="" xmlns:m="http://schemas.openxmlformats.org/officeDocument/2006/math" xmlns:a14="http://schemas.microsoft.com/office/drawing/2010/main" xmlns:ma14="http://schemas.microsoft.com/office/mac/drawingml/2011/main" val="1"/>
             </a:ext>
           </a:extLst>
         </p:spPr>
@@ -11576,7 +11571,7 @@
           </a:effectLst>
           <a:extLst>
             <a:ext uri="{C572A759-6A51-4108-AA02-DFA0A04FC94B}">
-              <ma14:wrappingTextBoxFlag xmlns:ma14="http://schemas.microsoft.com/office/mac/drawingml/2011/main" xmlns:a14="http://schemas.microsoft.com/office/drawing/2010/main" xmlns:m="http://schemas.openxmlformats.org/officeDocument/2006/math" xmlns="" val="1"/>
+              <ma14:wrappingTextBoxFlag xmlns="" xmlns:m="http://schemas.openxmlformats.org/officeDocument/2006/math" xmlns:a14="http://schemas.microsoft.com/office/drawing/2010/main" xmlns:ma14="http://schemas.microsoft.com/office/mac/drawingml/2011/main" val="1"/>
             </a:ext>
           </a:extLst>
         </p:spPr>
@@ -11661,7 +11656,7 @@
           </a:effectLst>
           <a:extLst>
             <a:ext uri="{C572A759-6A51-4108-AA02-DFA0A04FC94B}">
-              <ma14:wrappingTextBoxFlag xmlns:ma14="http://schemas.microsoft.com/office/mac/drawingml/2011/main" xmlns:a14="http://schemas.microsoft.com/office/drawing/2010/main" xmlns:m="http://schemas.openxmlformats.org/officeDocument/2006/math" xmlns="" val="1"/>
+              <ma14:wrappingTextBoxFlag xmlns="" xmlns:m="http://schemas.openxmlformats.org/officeDocument/2006/math" xmlns:a14="http://schemas.microsoft.com/office/drawing/2010/main" xmlns:ma14="http://schemas.microsoft.com/office/mac/drawingml/2011/main" val="1"/>
             </a:ext>
           </a:extLst>
         </p:spPr>
@@ -11742,7 +11737,7 @@
           </a:effectLst>
           <a:extLst>
             <a:ext uri="{C572A759-6A51-4108-AA02-DFA0A04FC94B}">
-              <ma14:wrappingTextBoxFlag xmlns:ma14="http://schemas.microsoft.com/office/mac/drawingml/2011/main" xmlns:a14="http://schemas.microsoft.com/office/drawing/2010/main" xmlns:m="http://schemas.openxmlformats.org/officeDocument/2006/math" xmlns="" val="1"/>
+              <ma14:wrappingTextBoxFlag xmlns="" xmlns:m="http://schemas.openxmlformats.org/officeDocument/2006/math" xmlns:a14="http://schemas.microsoft.com/office/drawing/2010/main" xmlns:ma14="http://schemas.microsoft.com/office/mac/drawingml/2011/main" val="1"/>
             </a:ext>
           </a:extLst>
         </p:spPr>
@@ -11823,7 +11818,7 @@
           </a:effectLst>
           <a:extLst>
             <a:ext uri="{C572A759-6A51-4108-AA02-DFA0A04FC94B}">
-              <ma14:wrappingTextBoxFlag xmlns:ma14="http://schemas.microsoft.com/office/mac/drawingml/2011/main" xmlns:a14="http://schemas.microsoft.com/office/drawing/2010/main" xmlns:m="http://schemas.openxmlformats.org/officeDocument/2006/math" xmlns="" val="1"/>
+              <ma14:wrappingTextBoxFlag xmlns="" xmlns:m="http://schemas.openxmlformats.org/officeDocument/2006/math" xmlns:a14="http://schemas.microsoft.com/office/drawing/2010/main" xmlns:ma14="http://schemas.microsoft.com/office/mac/drawingml/2011/main" val="1"/>
             </a:ext>
           </a:extLst>
         </p:spPr>
@@ -11900,7 +11895,7 @@
           </a:effectLst>
           <a:extLst>
             <a:ext uri="{C572A759-6A51-4108-AA02-DFA0A04FC94B}">
-              <ma14:wrappingTextBoxFlag xmlns:ma14="http://schemas.microsoft.com/office/mac/drawingml/2011/main" xmlns:a14="http://schemas.microsoft.com/office/drawing/2010/main" xmlns:m="http://schemas.openxmlformats.org/officeDocument/2006/math" xmlns="" val="1"/>
+              <ma14:wrappingTextBoxFlag xmlns="" xmlns:m="http://schemas.openxmlformats.org/officeDocument/2006/math" xmlns:a14="http://schemas.microsoft.com/office/drawing/2010/main" xmlns:ma14="http://schemas.microsoft.com/office/mac/drawingml/2011/main" val="1"/>
             </a:ext>
           </a:extLst>
         </p:spPr>
@@ -11965,7 +11960,7 @@
           </a:effectLst>
           <a:extLst>
             <a:ext uri="{C572A759-6A51-4108-AA02-DFA0A04FC94B}">
-              <ma14:wrappingTextBoxFlag xmlns:ma14="http://schemas.microsoft.com/office/mac/drawingml/2011/main" xmlns:a14="http://schemas.microsoft.com/office/drawing/2010/main" xmlns:m="http://schemas.openxmlformats.org/officeDocument/2006/math" xmlns="" val="1"/>
+              <ma14:wrappingTextBoxFlag xmlns="" xmlns:m="http://schemas.openxmlformats.org/officeDocument/2006/math" xmlns:a14="http://schemas.microsoft.com/office/drawing/2010/main" xmlns:ma14="http://schemas.microsoft.com/office/mac/drawingml/2011/main" val="1"/>
             </a:ext>
           </a:extLst>
         </p:spPr>
@@ -12050,7 +12045,7 @@
           </a:effectLst>
           <a:extLst>
             <a:ext uri="{C572A759-6A51-4108-AA02-DFA0A04FC94B}">
-              <ma14:wrappingTextBoxFlag xmlns:ma14="http://schemas.microsoft.com/office/mac/drawingml/2011/main" xmlns:a14="http://schemas.microsoft.com/office/drawing/2010/main" xmlns:m="http://schemas.openxmlformats.org/officeDocument/2006/math" xmlns="" val="1"/>
+              <ma14:wrappingTextBoxFlag xmlns="" xmlns:m="http://schemas.openxmlformats.org/officeDocument/2006/math" xmlns:a14="http://schemas.microsoft.com/office/drawing/2010/main" xmlns:ma14="http://schemas.microsoft.com/office/mac/drawingml/2011/main" val="1"/>
             </a:ext>
           </a:extLst>
         </p:spPr>
@@ -12146,7 +12141,7 @@
           </a:effectLst>
           <a:extLst>
             <a:ext uri="{C572A759-6A51-4108-AA02-DFA0A04FC94B}">
-              <ma14:wrappingTextBoxFlag xmlns:ma14="http://schemas.microsoft.com/office/mac/drawingml/2011/main" xmlns:a14="http://schemas.microsoft.com/office/drawing/2010/main" xmlns:m="http://schemas.openxmlformats.org/officeDocument/2006/math" xmlns="" val="1"/>
+              <ma14:wrappingTextBoxFlag xmlns="" xmlns:m="http://schemas.openxmlformats.org/officeDocument/2006/math" xmlns:a14="http://schemas.microsoft.com/office/drawing/2010/main" xmlns:ma14="http://schemas.microsoft.com/office/mac/drawingml/2011/main" val="1"/>
             </a:ext>
           </a:extLst>
         </p:spPr>
@@ -12597,7 +12592,7 @@
           </a:effectLst>
           <a:extLst>
             <a:ext uri="{C572A759-6A51-4108-AA02-DFA0A04FC94B}">
-              <ma14:wrappingTextBoxFlag xmlns:ma14="http://schemas.microsoft.com/office/mac/drawingml/2011/main" xmlns:a14="http://schemas.microsoft.com/office/drawing/2010/main" xmlns:m="http://schemas.openxmlformats.org/officeDocument/2006/math" xmlns="" val="1"/>
+              <ma14:wrappingTextBoxFlag xmlns="" xmlns:m="http://schemas.openxmlformats.org/officeDocument/2006/math" xmlns:a14="http://schemas.microsoft.com/office/drawing/2010/main" xmlns:ma14="http://schemas.microsoft.com/office/mac/drawingml/2011/main" val="1"/>
             </a:ext>
           </a:extLst>
         </p:spPr>
@@ -12662,7 +12657,7 @@
           </a:effectLst>
           <a:extLst>
             <a:ext uri="{C572A759-6A51-4108-AA02-DFA0A04FC94B}">
-              <ma14:wrappingTextBoxFlag xmlns:ma14="http://schemas.microsoft.com/office/mac/drawingml/2011/main" xmlns:a14="http://schemas.microsoft.com/office/drawing/2010/main" xmlns:m="http://schemas.openxmlformats.org/officeDocument/2006/math" xmlns="" val="1"/>
+              <ma14:wrappingTextBoxFlag xmlns="" xmlns:m="http://schemas.openxmlformats.org/officeDocument/2006/math" xmlns:a14="http://schemas.microsoft.com/office/drawing/2010/main" xmlns:ma14="http://schemas.microsoft.com/office/mac/drawingml/2011/main" val="1"/>
             </a:ext>
           </a:extLst>
         </p:spPr>
@@ -12740,7 +12735,7 @@
           </a:effectLst>
           <a:extLst>
             <a:ext uri="{C572A759-6A51-4108-AA02-DFA0A04FC94B}">
-              <ma14:wrappingTextBoxFlag xmlns:ma14="http://schemas.microsoft.com/office/mac/drawingml/2011/main" xmlns:a14="http://schemas.microsoft.com/office/drawing/2010/main" xmlns:m="http://schemas.openxmlformats.org/officeDocument/2006/math" xmlns="" val="1"/>
+              <ma14:wrappingTextBoxFlag xmlns="" xmlns:m="http://schemas.openxmlformats.org/officeDocument/2006/math" xmlns:a14="http://schemas.microsoft.com/office/drawing/2010/main" xmlns:ma14="http://schemas.microsoft.com/office/mac/drawingml/2011/main" val="1"/>
             </a:ext>
           </a:extLst>
         </p:spPr>
@@ -12832,7 +12827,7 @@
           </a:effectLst>
           <a:extLst>
             <a:ext uri="{C572A759-6A51-4108-AA02-DFA0A04FC94B}">
-              <ma14:wrappingTextBoxFlag xmlns:ma14="http://schemas.microsoft.com/office/mac/drawingml/2011/main" xmlns:a14="http://schemas.microsoft.com/office/drawing/2010/main" xmlns:m="http://schemas.openxmlformats.org/officeDocument/2006/math" xmlns="" val="1"/>
+              <ma14:wrappingTextBoxFlag xmlns="" xmlns:m="http://schemas.openxmlformats.org/officeDocument/2006/math" xmlns:a14="http://schemas.microsoft.com/office/drawing/2010/main" xmlns:ma14="http://schemas.microsoft.com/office/mac/drawingml/2011/main" val="1"/>
             </a:ext>
           </a:extLst>
         </p:spPr>
@@ -12915,7 +12910,7 @@
           </a:effectLst>
           <a:extLst>
             <a:ext uri="{C572A759-6A51-4108-AA02-DFA0A04FC94B}">
-              <ma14:wrappingTextBoxFlag xmlns:ma14="http://schemas.microsoft.com/office/mac/drawingml/2011/main" xmlns:a14="http://schemas.microsoft.com/office/drawing/2010/main" xmlns:m="http://schemas.openxmlformats.org/officeDocument/2006/math" xmlns="" val="1"/>
+              <ma14:wrappingTextBoxFlag xmlns="" xmlns:m="http://schemas.openxmlformats.org/officeDocument/2006/math" xmlns:a14="http://schemas.microsoft.com/office/drawing/2010/main" xmlns:ma14="http://schemas.microsoft.com/office/mac/drawingml/2011/main" val="1"/>
             </a:ext>
           </a:extLst>
         </p:spPr>
@@ -12980,7 +12975,7 @@
           </a:effectLst>
           <a:extLst>
             <a:ext uri="{C572A759-6A51-4108-AA02-DFA0A04FC94B}">
-              <ma14:wrappingTextBoxFlag xmlns:ma14="http://schemas.microsoft.com/office/mac/drawingml/2011/main" xmlns:a14="http://schemas.microsoft.com/office/drawing/2010/main" xmlns:m="http://schemas.openxmlformats.org/officeDocument/2006/math" xmlns="" val="1"/>
+              <ma14:wrappingTextBoxFlag xmlns="" xmlns:m="http://schemas.openxmlformats.org/officeDocument/2006/math" xmlns:a14="http://schemas.microsoft.com/office/drawing/2010/main" xmlns:ma14="http://schemas.microsoft.com/office/mac/drawingml/2011/main" val="1"/>
             </a:ext>
           </a:extLst>
         </p:spPr>
@@ -13065,7 +13060,7 @@
           </a:effectLst>
           <a:extLst>
             <a:ext uri="{C572A759-6A51-4108-AA02-DFA0A04FC94B}">
-              <ma14:wrappingTextBoxFlag xmlns:ma14="http://schemas.microsoft.com/office/mac/drawingml/2011/main" xmlns:a14="http://schemas.microsoft.com/office/drawing/2010/main" xmlns:m="http://schemas.openxmlformats.org/officeDocument/2006/math" xmlns="" val="1"/>
+              <ma14:wrappingTextBoxFlag xmlns="" xmlns:m="http://schemas.openxmlformats.org/officeDocument/2006/math" xmlns:a14="http://schemas.microsoft.com/office/drawing/2010/main" xmlns:ma14="http://schemas.microsoft.com/office/mac/drawingml/2011/main" val="1"/>
             </a:ext>
           </a:extLst>
         </p:spPr>
@@ -13150,7 +13145,7 @@
           </a:effectLst>
           <a:extLst>
             <a:ext uri="{C572A759-6A51-4108-AA02-DFA0A04FC94B}">
-              <ma14:wrappingTextBoxFlag xmlns:ma14="http://schemas.microsoft.com/office/mac/drawingml/2011/main" xmlns:a14="http://schemas.microsoft.com/office/drawing/2010/main" xmlns:m="http://schemas.openxmlformats.org/officeDocument/2006/math" xmlns="" val="1"/>
+              <ma14:wrappingTextBoxFlag xmlns="" xmlns:m="http://schemas.openxmlformats.org/officeDocument/2006/math" xmlns:a14="http://schemas.microsoft.com/office/drawing/2010/main" xmlns:ma14="http://schemas.microsoft.com/office/mac/drawingml/2011/main" val="1"/>
             </a:ext>
           </a:extLst>
         </p:spPr>
@@ -13235,7 +13230,7 @@
           </a:effectLst>
           <a:extLst>
             <a:ext uri="{C572A759-6A51-4108-AA02-DFA0A04FC94B}">
-              <ma14:wrappingTextBoxFlag xmlns:ma14="http://schemas.microsoft.com/office/mac/drawingml/2011/main" xmlns:a14="http://schemas.microsoft.com/office/drawing/2010/main" xmlns:m="http://schemas.openxmlformats.org/officeDocument/2006/math" xmlns="" val="1"/>
+              <ma14:wrappingTextBoxFlag xmlns="" xmlns:m="http://schemas.openxmlformats.org/officeDocument/2006/math" xmlns:a14="http://schemas.microsoft.com/office/drawing/2010/main" xmlns:ma14="http://schemas.microsoft.com/office/mac/drawingml/2011/main" val="1"/>
             </a:ext>
           </a:extLst>
         </p:spPr>
@@ -13549,7 +13544,7 @@
           </a:effectLst>
           <a:extLst>
             <a:ext uri="{C572A759-6A51-4108-AA02-DFA0A04FC94B}">
-              <ma14:wrappingTextBoxFlag xmlns:ma14="http://schemas.microsoft.com/office/mac/drawingml/2011/main" xmlns:a14="http://schemas.microsoft.com/office/drawing/2010/main" xmlns:m="http://schemas.openxmlformats.org/officeDocument/2006/math" xmlns="" val="1"/>
+              <ma14:wrappingTextBoxFlag xmlns="" xmlns:m="http://schemas.openxmlformats.org/officeDocument/2006/math" xmlns:a14="http://schemas.microsoft.com/office/drawing/2010/main" xmlns:ma14="http://schemas.microsoft.com/office/mac/drawingml/2011/main" val="1"/>
             </a:ext>
           </a:extLst>
         </p:spPr>
@@ -13632,7 +13627,7 @@
           </a:effectLst>
           <a:extLst>
             <a:ext uri="{C572A759-6A51-4108-AA02-DFA0A04FC94B}">
-              <ma14:wrappingTextBoxFlag xmlns:ma14="http://schemas.microsoft.com/office/mac/drawingml/2011/main" xmlns:a14="http://schemas.microsoft.com/office/drawing/2010/main" xmlns:m="http://schemas.openxmlformats.org/officeDocument/2006/math" xmlns="" val="1"/>
+              <ma14:wrappingTextBoxFlag xmlns="" xmlns:m="http://schemas.openxmlformats.org/officeDocument/2006/math" xmlns:a14="http://schemas.microsoft.com/office/drawing/2010/main" xmlns:ma14="http://schemas.microsoft.com/office/mac/drawingml/2011/main" val="1"/>
             </a:ext>
           </a:extLst>
         </p:spPr>
@@ -13697,7 +13692,7 @@
           </a:effectLst>
           <a:extLst>
             <a:ext uri="{C572A759-6A51-4108-AA02-DFA0A04FC94B}">
-              <ma14:wrappingTextBoxFlag xmlns:ma14="http://schemas.microsoft.com/office/mac/drawingml/2011/main" xmlns:a14="http://schemas.microsoft.com/office/drawing/2010/main" xmlns:m="http://schemas.openxmlformats.org/officeDocument/2006/math" xmlns="" val="1"/>
+              <ma14:wrappingTextBoxFlag xmlns="" xmlns:m="http://schemas.openxmlformats.org/officeDocument/2006/math" xmlns:a14="http://schemas.microsoft.com/office/drawing/2010/main" xmlns:ma14="http://schemas.microsoft.com/office/mac/drawingml/2011/main" val="1"/>
             </a:ext>
           </a:extLst>
         </p:spPr>
@@ -13778,7 +13773,7 @@
           </a:effectLst>
           <a:extLst>
             <a:ext uri="{C572A759-6A51-4108-AA02-DFA0A04FC94B}">
-              <ma14:wrappingTextBoxFlag xmlns:ma14="http://schemas.microsoft.com/office/mac/drawingml/2011/main" xmlns:a14="http://schemas.microsoft.com/office/drawing/2010/main" xmlns:m="http://schemas.openxmlformats.org/officeDocument/2006/math" xmlns="" val="1"/>
+              <ma14:wrappingTextBoxFlag xmlns="" xmlns:m="http://schemas.openxmlformats.org/officeDocument/2006/math" xmlns:a14="http://schemas.microsoft.com/office/drawing/2010/main" xmlns:ma14="http://schemas.microsoft.com/office/mac/drawingml/2011/main" val="1"/>
             </a:ext>
           </a:extLst>
         </p:spPr>
@@ -14109,7 +14104,7 @@
           </a:effectLst>
           <a:extLst>
             <a:ext uri="{C572A759-6A51-4108-AA02-DFA0A04FC94B}">
-              <ma14:wrappingTextBoxFlag xmlns:ma14="http://schemas.microsoft.com/office/mac/drawingml/2011/main" xmlns:a14="http://schemas.microsoft.com/office/drawing/2010/main" xmlns:m="http://schemas.openxmlformats.org/officeDocument/2006/math" xmlns="" val="1"/>
+              <ma14:wrappingTextBoxFlag xmlns="" xmlns:m="http://schemas.openxmlformats.org/officeDocument/2006/math" xmlns:a14="http://schemas.microsoft.com/office/drawing/2010/main" xmlns:ma14="http://schemas.microsoft.com/office/mac/drawingml/2011/main" val="1"/>
             </a:ext>
           </a:extLst>
         </p:spPr>
@@ -14174,7 +14169,7 @@
           </a:effectLst>
           <a:extLst>
             <a:ext uri="{C572A759-6A51-4108-AA02-DFA0A04FC94B}">
-              <ma14:wrappingTextBoxFlag xmlns:ma14="http://schemas.microsoft.com/office/mac/drawingml/2011/main" xmlns:a14="http://schemas.microsoft.com/office/drawing/2010/main" xmlns:m="http://schemas.openxmlformats.org/officeDocument/2006/math" xmlns="" val="1"/>
+              <ma14:wrappingTextBoxFlag xmlns="" xmlns:m="http://schemas.openxmlformats.org/officeDocument/2006/math" xmlns:a14="http://schemas.microsoft.com/office/drawing/2010/main" xmlns:ma14="http://schemas.microsoft.com/office/mac/drawingml/2011/main" val="1"/>
             </a:ext>
           </a:extLst>
         </p:spPr>
@@ -14259,7 +14254,7 @@
           </a:effectLst>
           <a:extLst>
             <a:ext uri="{C572A759-6A51-4108-AA02-DFA0A04FC94B}">
-              <ma14:wrappingTextBoxFlag xmlns:ma14="http://schemas.microsoft.com/office/mac/drawingml/2011/main" xmlns:a14="http://schemas.microsoft.com/office/drawing/2010/main" xmlns:m="http://schemas.openxmlformats.org/officeDocument/2006/math" xmlns="" val="1"/>
+              <ma14:wrappingTextBoxFlag xmlns="" xmlns:m="http://schemas.openxmlformats.org/officeDocument/2006/math" xmlns:a14="http://schemas.microsoft.com/office/drawing/2010/main" xmlns:ma14="http://schemas.microsoft.com/office/mac/drawingml/2011/main" val="1"/>
             </a:ext>
           </a:extLst>
         </p:spPr>
@@ -14344,7 +14339,7 @@
           </a:effectLst>
           <a:extLst>
             <a:ext uri="{C572A759-6A51-4108-AA02-DFA0A04FC94B}">
-              <ma14:wrappingTextBoxFlag xmlns:ma14="http://schemas.microsoft.com/office/mac/drawingml/2011/main" xmlns:a14="http://schemas.microsoft.com/office/drawing/2010/main" xmlns:m="http://schemas.openxmlformats.org/officeDocument/2006/math" xmlns="" val="1"/>
+              <ma14:wrappingTextBoxFlag xmlns="" xmlns:m="http://schemas.openxmlformats.org/officeDocument/2006/math" xmlns:a14="http://schemas.microsoft.com/office/drawing/2010/main" xmlns:ma14="http://schemas.microsoft.com/office/mac/drawingml/2011/main" val="1"/>
             </a:ext>
           </a:extLst>
         </p:spPr>
@@ -14429,7 +14424,7 @@
           </a:effectLst>
           <a:extLst>
             <a:ext uri="{C572A759-6A51-4108-AA02-DFA0A04FC94B}">
-              <ma14:wrappingTextBoxFlag xmlns:ma14="http://schemas.microsoft.com/office/mac/drawingml/2011/main" xmlns:a14="http://schemas.microsoft.com/office/drawing/2010/main" xmlns:m="http://schemas.openxmlformats.org/officeDocument/2006/math" xmlns="" val="1"/>
+              <ma14:wrappingTextBoxFlag xmlns="" xmlns:m="http://schemas.openxmlformats.org/officeDocument/2006/math" xmlns:a14="http://schemas.microsoft.com/office/drawing/2010/main" xmlns:ma14="http://schemas.microsoft.com/office/mac/drawingml/2011/main" val="1"/>
             </a:ext>
           </a:extLst>
         </p:spPr>
@@ -14660,7 +14655,7 @@
           </a:effectLst>
           <a:extLst>
             <a:ext uri="{C572A759-6A51-4108-AA02-DFA0A04FC94B}">
-              <ma14:wrappingTextBoxFlag xmlns:ma14="http://schemas.microsoft.com/office/mac/drawingml/2011/main" xmlns:a14="http://schemas.microsoft.com/office/drawing/2010/main" xmlns:m="http://schemas.openxmlformats.org/officeDocument/2006/math" xmlns="" val="1"/>
+              <ma14:wrappingTextBoxFlag xmlns="" xmlns:m="http://schemas.openxmlformats.org/officeDocument/2006/math" xmlns:a14="http://schemas.microsoft.com/office/drawing/2010/main" xmlns:ma14="http://schemas.microsoft.com/office/mac/drawingml/2011/main" val="1"/>
             </a:ext>
           </a:extLst>
         </p:spPr>
@@ -14725,7 +14720,7 @@
           </a:effectLst>
           <a:extLst>
             <a:ext uri="{C572A759-6A51-4108-AA02-DFA0A04FC94B}">
-              <ma14:wrappingTextBoxFlag xmlns:ma14="http://schemas.microsoft.com/office/mac/drawingml/2011/main" xmlns:a14="http://schemas.microsoft.com/office/drawing/2010/main" xmlns:m="http://schemas.openxmlformats.org/officeDocument/2006/math" xmlns="" val="1"/>
+              <ma14:wrappingTextBoxFlag xmlns="" xmlns:m="http://schemas.openxmlformats.org/officeDocument/2006/math" xmlns:a14="http://schemas.microsoft.com/office/drawing/2010/main" xmlns:ma14="http://schemas.microsoft.com/office/mac/drawingml/2011/main" val="1"/>
             </a:ext>
           </a:extLst>
         </p:spPr>
@@ -14958,7 +14953,7 @@
           </a:effectLst>
           <a:extLst>
             <a:ext uri="{C572A759-6A51-4108-AA02-DFA0A04FC94B}">
-              <ma14:wrappingTextBoxFlag xmlns:ma14="http://schemas.microsoft.com/office/mac/drawingml/2011/main" xmlns:a14="http://schemas.microsoft.com/office/drawing/2010/main" xmlns:m="http://schemas.openxmlformats.org/officeDocument/2006/math" xmlns="" val="1"/>
+              <ma14:wrappingTextBoxFlag xmlns="" xmlns:m="http://schemas.openxmlformats.org/officeDocument/2006/math" xmlns:a14="http://schemas.microsoft.com/office/drawing/2010/main" xmlns:ma14="http://schemas.microsoft.com/office/mac/drawingml/2011/main" val="1"/>
             </a:ext>
           </a:extLst>
         </p:spPr>
@@ -15039,7 +15034,7 @@
           </a:effectLst>
           <a:extLst>
             <a:ext uri="{C572A759-6A51-4108-AA02-DFA0A04FC94B}">
-              <ma14:wrappingTextBoxFlag xmlns:ma14="http://schemas.microsoft.com/office/mac/drawingml/2011/main" xmlns:a14="http://schemas.microsoft.com/office/drawing/2010/main" xmlns:m="http://schemas.openxmlformats.org/officeDocument/2006/math" xmlns="" val="1"/>
+              <ma14:wrappingTextBoxFlag xmlns="" xmlns:m="http://schemas.openxmlformats.org/officeDocument/2006/math" xmlns:a14="http://schemas.microsoft.com/office/drawing/2010/main" xmlns:ma14="http://schemas.microsoft.com/office/mac/drawingml/2011/main" val="1"/>
             </a:ext>
           </a:extLst>
         </p:spPr>
@@ -15124,7 +15119,7 @@
           </a:effectLst>
           <a:extLst>
             <a:ext uri="{C572A759-6A51-4108-AA02-DFA0A04FC94B}">
-              <ma14:wrappingTextBoxFlag xmlns:ma14="http://schemas.microsoft.com/office/mac/drawingml/2011/main" xmlns:a14="http://schemas.microsoft.com/office/drawing/2010/main" xmlns:m="http://schemas.openxmlformats.org/officeDocument/2006/math" xmlns="" val="1"/>
+              <ma14:wrappingTextBoxFlag xmlns="" xmlns:m="http://schemas.openxmlformats.org/officeDocument/2006/math" xmlns:a14="http://schemas.microsoft.com/office/drawing/2010/main" xmlns:ma14="http://schemas.microsoft.com/office/mac/drawingml/2011/main" val="1"/>
             </a:ext>
           </a:extLst>
         </p:spPr>
@@ -15209,7 +15204,7 @@
           </a:effectLst>
           <a:extLst>
             <a:ext uri="{C572A759-6A51-4108-AA02-DFA0A04FC94B}">
-              <ma14:wrappingTextBoxFlag xmlns:ma14="http://schemas.microsoft.com/office/mac/drawingml/2011/main" xmlns:a14="http://schemas.microsoft.com/office/drawing/2010/main" xmlns:m="http://schemas.openxmlformats.org/officeDocument/2006/math" xmlns="" val="1"/>
+              <ma14:wrappingTextBoxFlag xmlns="" xmlns:m="http://schemas.openxmlformats.org/officeDocument/2006/math" xmlns:a14="http://schemas.microsoft.com/office/drawing/2010/main" xmlns:ma14="http://schemas.microsoft.com/office/mac/drawingml/2011/main" val="1"/>
             </a:ext>
           </a:extLst>
         </p:spPr>
@@ -15290,7 +15285,7 @@
           </a:effectLst>
           <a:extLst>
             <a:ext uri="{C572A759-6A51-4108-AA02-DFA0A04FC94B}">
-              <ma14:wrappingTextBoxFlag xmlns:ma14="http://schemas.microsoft.com/office/mac/drawingml/2011/main" xmlns:a14="http://schemas.microsoft.com/office/drawing/2010/main" xmlns:m="http://schemas.openxmlformats.org/officeDocument/2006/math" xmlns="" val="1"/>
+              <ma14:wrappingTextBoxFlag xmlns="" xmlns:m="http://schemas.openxmlformats.org/officeDocument/2006/math" xmlns:a14="http://schemas.microsoft.com/office/drawing/2010/main" xmlns:ma14="http://schemas.microsoft.com/office/mac/drawingml/2011/main" val="1"/>
             </a:ext>
           </a:extLst>
         </p:spPr>
@@ -15373,7 +15368,7 @@
           </a:effectLst>
           <a:extLst>
             <a:ext uri="{C572A759-6A51-4108-AA02-DFA0A04FC94B}">
-              <ma14:wrappingTextBoxFlag xmlns:ma14="http://schemas.microsoft.com/office/mac/drawingml/2011/main" xmlns:a14="http://schemas.microsoft.com/office/drawing/2010/main" xmlns:m="http://schemas.openxmlformats.org/officeDocument/2006/math" xmlns="" val="1"/>
+              <ma14:wrappingTextBoxFlag xmlns="" xmlns:m="http://schemas.openxmlformats.org/officeDocument/2006/math" xmlns:a14="http://schemas.microsoft.com/office/drawing/2010/main" xmlns:ma14="http://schemas.microsoft.com/office/mac/drawingml/2011/main" val="1"/>
             </a:ext>
           </a:extLst>
         </p:spPr>
@@ -15438,7 +15433,7 @@
           </a:effectLst>
           <a:extLst>
             <a:ext uri="{C572A759-6A51-4108-AA02-DFA0A04FC94B}">
-              <ma14:wrappingTextBoxFlag xmlns:ma14="http://schemas.microsoft.com/office/mac/drawingml/2011/main" xmlns:a14="http://schemas.microsoft.com/office/drawing/2010/main" xmlns:m="http://schemas.openxmlformats.org/officeDocument/2006/math" xmlns="" val="1"/>
+              <ma14:wrappingTextBoxFlag xmlns="" xmlns:m="http://schemas.openxmlformats.org/officeDocument/2006/math" xmlns:a14="http://schemas.microsoft.com/office/drawing/2010/main" xmlns:ma14="http://schemas.microsoft.com/office/mac/drawingml/2011/main" val="1"/>
             </a:ext>
           </a:extLst>
         </p:spPr>
@@ -15523,7 +15518,7 @@
           </a:effectLst>
           <a:extLst>
             <a:ext uri="{C572A759-6A51-4108-AA02-DFA0A04FC94B}">
-              <ma14:wrappingTextBoxFlag xmlns:ma14="http://schemas.microsoft.com/office/mac/drawingml/2011/main" xmlns:a14="http://schemas.microsoft.com/office/drawing/2010/main" xmlns:m="http://schemas.openxmlformats.org/officeDocument/2006/math" xmlns="" val="1"/>
+              <ma14:wrappingTextBoxFlag xmlns="" xmlns:m="http://schemas.openxmlformats.org/officeDocument/2006/math" xmlns:a14="http://schemas.microsoft.com/office/drawing/2010/main" xmlns:ma14="http://schemas.microsoft.com/office/mac/drawingml/2011/main" val="1"/>
             </a:ext>
           </a:extLst>
         </p:spPr>
@@ -15788,7 +15783,7 @@
           </a:effectLst>
           <a:extLst>
             <a:ext uri="{C572A759-6A51-4108-AA02-DFA0A04FC94B}">
-              <ma14:wrappingTextBoxFlag xmlns:ma14="http://schemas.microsoft.com/office/mac/drawingml/2011/main" xmlns:a14="http://schemas.microsoft.com/office/drawing/2010/main" xmlns:m="http://schemas.openxmlformats.org/officeDocument/2006/math" xmlns="" val="1"/>
+              <ma14:wrappingTextBoxFlag xmlns="" xmlns:m="http://schemas.openxmlformats.org/officeDocument/2006/math" xmlns:a14="http://schemas.microsoft.com/office/drawing/2010/main" xmlns:ma14="http://schemas.microsoft.com/office/mac/drawingml/2011/main" val="1"/>
             </a:ext>
           </a:extLst>
         </p:spPr>

</xml_diff>

<commit_message>
update the upper-case names
</commit_message>
<xml_diff>
--- a/resource/dubbo-go-arch.pptx
+++ b/resource/dubbo-go-arch.pptx
@@ -2228,7 +2228,7 @@
           </a:ln>
           <a:extLst>
             <a:ext uri="{C572A759-6A51-4108-AA02-DFA0A04FC94B}">
-              <ma14:wrappingTextBoxFlag xmlns="" xmlns:m="http://schemas.openxmlformats.org/officeDocument/2006/math" xmlns:a14="http://schemas.microsoft.com/office/drawing/2010/main" xmlns:ma14="http://schemas.microsoft.com/office/mac/drawingml/2011/main" val="1"/>
+              <ma14:wrappingTextBoxFlag xmlns:ma14="http://schemas.microsoft.com/office/mac/drawingml/2011/main" xmlns:a14="http://schemas.microsoft.com/office/drawing/2010/main" xmlns:m="http://schemas.openxmlformats.org/officeDocument/2006/math" xmlns="" val="1"/>
             </a:ext>
           </a:extLst>
         </p:spPr>
@@ -2267,7 +2267,7 @@
           </a:ln>
           <a:extLst>
             <a:ext uri="{C572A759-6A51-4108-AA02-DFA0A04FC94B}">
-              <ma14:wrappingTextBoxFlag xmlns="" xmlns:m="http://schemas.openxmlformats.org/officeDocument/2006/math" xmlns:a14="http://schemas.microsoft.com/office/drawing/2010/main" xmlns:ma14="http://schemas.microsoft.com/office/mac/drawingml/2011/main" val="1"/>
+              <ma14:wrappingTextBoxFlag xmlns:ma14="http://schemas.microsoft.com/office/mac/drawingml/2011/main" xmlns:a14="http://schemas.microsoft.com/office/drawing/2010/main" xmlns:m="http://schemas.openxmlformats.org/officeDocument/2006/math" xmlns="" val="1"/>
             </a:ext>
           </a:extLst>
         </p:spPr>
@@ -3150,7 +3150,7 @@
           </a:effectLst>
           <a:extLst>
             <a:ext uri="{C572A759-6A51-4108-AA02-DFA0A04FC94B}">
-              <ma14:wrappingTextBoxFlag xmlns="" xmlns:m="http://schemas.openxmlformats.org/officeDocument/2006/math" xmlns:a14="http://schemas.microsoft.com/office/drawing/2010/main" xmlns:ma14="http://schemas.microsoft.com/office/mac/drawingml/2011/main" val="1"/>
+              <ma14:wrappingTextBoxFlag xmlns:ma14="http://schemas.microsoft.com/office/mac/drawingml/2011/main" xmlns:a14="http://schemas.microsoft.com/office/drawing/2010/main" xmlns:m="http://schemas.openxmlformats.org/officeDocument/2006/math" xmlns="" val="1"/>
             </a:ext>
           </a:extLst>
         </p:spPr>
@@ -3250,7 +3250,7 @@
           </a:effectLst>
           <a:extLst>
             <a:ext uri="{C572A759-6A51-4108-AA02-DFA0A04FC94B}">
-              <ma14:wrappingTextBoxFlag xmlns="" xmlns:m="http://schemas.openxmlformats.org/officeDocument/2006/math" xmlns:a14="http://schemas.microsoft.com/office/drawing/2010/main" xmlns:ma14="http://schemas.microsoft.com/office/mac/drawingml/2011/main" val="1"/>
+              <ma14:wrappingTextBoxFlag xmlns:ma14="http://schemas.microsoft.com/office/mac/drawingml/2011/main" xmlns:a14="http://schemas.microsoft.com/office/drawing/2010/main" xmlns:m="http://schemas.openxmlformats.org/officeDocument/2006/math" xmlns="" val="1"/>
             </a:ext>
           </a:extLst>
         </p:spPr>
@@ -3320,7 +3320,7 @@
           </a:effectLst>
           <a:extLst>
             <a:ext uri="{C572A759-6A51-4108-AA02-DFA0A04FC94B}">
-              <ma14:wrappingTextBoxFlag xmlns="" xmlns:m="http://schemas.openxmlformats.org/officeDocument/2006/math" xmlns:a14="http://schemas.microsoft.com/office/drawing/2010/main" xmlns:ma14="http://schemas.microsoft.com/office/mac/drawingml/2011/main" val="1"/>
+              <ma14:wrappingTextBoxFlag xmlns:ma14="http://schemas.microsoft.com/office/mac/drawingml/2011/main" xmlns:a14="http://schemas.microsoft.com/office/drawing/2010/main" xmlns:m="http://schemas.openxmlformats.org/officeDocument/2006/math" xmlns="" val="1"/>
             </a:ext>
           </a:extLst>
         </p:spPr>
@@ -3373,7 +3373,7 @@
           </a:effectLst>
           <a:extLst>
             <a:ext uri="{C572A759-6A51-4108-AA02-DFA0A04FC94B}">
-              <ma14:wrappingTextBoxFlag xmlns="" xmlns:m="http://schemas.openxmlformats.org/officeDocument/2006/math" xmlns:a14="http://schemas.microsoft.com/office/drawing/2010/main" xmlns:ma14="http://schemas.microsoft.com/office/mac/drawingml/2011/main" val="1"/>
+              <ma14:wrappingTextBoxFlag xmlns:ma14="http://schemas.microsoft.com/office/mac/drawingml/2011/main" xmlns:a14="http://schemas.microsoft.com/office/drawing/2010/main" xmlns:m="http://schemas.openxmlformats.org/officeDocument/2006/math" xmlns="" val="1"/>
             </a:ext>
           </a:extLst>
         </p:spPr>
@@ -3427,7 +3427,7 @@
           </a:effectLst>
           <a:extLst>
             <a:ext uri="{C572A759-6A51-4108-AA02-DFA0A04FC94B}">
-              <ma14:wrappingTextBoxFlag xmlns="" xmlns:m="http://schemas.openxmlformats.org/officeDocument/2006/math" xmlns:a14="http://schemas.microsoft.com/office/drawing/2010/main" xmlns:ma14="http://schemas.microsoft.com/office/mac/drawingml/2011/main" val="1"/>
+              <ma14:wrappingTextBoxFlag xmlns:ma14="http://schemas.microsoft.com/office/mac/drawingml/2011/main" xmlns:a14="http://schemas.microsoft.com/office/drawing/2010/main" xmlns:m="http://schemas.openxmlformats.org/officeDocument/2006/math" xmlns="" val="1"/>
             </a:ext>
           </a:extLst>
         </p:spPr>
@@ -3481,7 +3481,7 @@
           </a:effectLst>
           <a:extLst>
             <a:ext uri="{C572A759-6A51-4108-AA02-DFA0A04FC94B}">
-              <ma14:wrappingTextBoxFlag xmlns="" xmlns:m="http://schemas.openxmlformats.org/officeDocument/2006/math" xmlns:a14="http://schemas.microsoft.com/office/drawing/2010/main" xmlns:ma14="http://schemas.microsoft.com/office/mac/drawingml/2011/main" val="1"/>
+              <ma14:wrappingTextBoxFlag xmlns:ma14="http://schemas.microsoft.com/office/mac/drawingml/2011/main" xmlns:a14="http://schemas.microsoft.com/office/drawing/2010/main" xmlns:m="http://schemas.openxmlformats.org/officeDocument/2006/math" xmlns="" val="1"/>
             </a:ext>
           </a:extLst>
         </p:spPr>
@@ -3540,7 +3540,7 @@
           </a:effectLst>
           <a:extLst>
             <a:ext uri="{C572A759-6A51-4108-AA02-DFA0A04FC94B}">
-              <ma14:wrappingTextBoxFlag xmlns="" xmlns:m="http://schemas.openxmlformats.org/officeDocument/2006/math" xmlns:a14="http://schemas.microsoft.com/office/drawing/2010/main" xmlns:ma14="http://schemas.microsoft.com/office/mac/drawingml/2011/main" val="1"/>
+              <ma14:wrappingTextBoxFlag xmlns:ma14="http://schemas.microsoft.com/office/mac/drawingml/2011/main" xmlns:a14="http://schemas.microsoft.com/office/drawing/2010/main" xmlns:m="http://schemas.openxmlformats.org/officeDocument/2006/math" xmlns="" val="1"/>
             </a:ext>
           </a:extLst>
         </p:spPr>
@@ -3591,7 +3591,7 @@
           </a:effectLst>
           <a:extLst>
             <a:ext uri="{C572A759-6A51-4108-AA02-DFA0A04FC94B}">
-              <ma14:wrappingTextBoxFlag xmlns="" xmlns:m="http://schemas.openxmlformats.org/officeDocument/2006/math" xmlns:a14="http://schemas.microsoft.com/office/drawing/2010/main" xmlns:ma14="http://schemas.microsoft.com/office/mac/drawingml/2011/main" val="1"/>
+              <ma14:wrappingTextBoxFlag xmlns:ma14="http://schemas.microsoft.com/office/mac/drawingml/2011/main" xmlns:a14="http://schemas.microsoft.com/office/drawing/2010/main" xmlns:m="http://schemas.openxmlformats.org/officeDocument/2006/math" xmlns="" val="1"/>
             </a:ext>
           </a:extLst>
         </p:spPr>
@@ -3645,7 +3645,7 @@
           </a:effectLst>
           <a:extLst>
             <a:ext uri="{C572A759-6A51-4108-AA02-DFA0A04FC94B}">
-              <ma14:wrappingTextBoxFlag xmlns="" xmlns:m="http://schemas.openxmlformats.org/officeDocument/2006/math" xmlns:a14="http://schemas.microsoft.com/office/drawing/2010/main" xmlns:ma14="http://schemas.microsoft.com/office/mac/drawingml/2011/main" val="1"/>
+              <ma14:wrappingTextBoxFlag xmlns:ma14="http://schemas.microsoft.com/office/mac/drawingml/2011/main" xmlns:a14="http://schemas.microsoft.com/office/drawing/2010/main" xmlns:m="http://schemas.openxmlformats.org/officeDocument/2006/math" xmlns="" val="1"/>
             </a:ext>
           </a:extLst>
         </p:spPr>
@@ -3699,7 +3699,7 @@
           </a:effectLst>
           <a:extLst>
             <a:ext uri="{C572A759-6A51-4108-AA02-DFA0A04FC94B}">
-              <ma14:wrappingTextBoxFlag xmlns="" xmlns:m="http://schemas.openxmlformats.org/officeDocument/2006/math" xmlns:a14="http://schemas.microsoft.com/office/drawing/2010/main" xmlns:ma14="http://schemas.microsoft.com/office/mac/drawingml/2011/main" val="1"/>
+              <ma14:wrappingTextBoxFlag xmlns:ma14="http://schemas.microsoft.com/office/mac/drawingml/2011/main" xmlns:a14="http://schemas.microsoft.com/office/drawing/2010/main" xmlns:m="http://schemas.openxmlformats.org/officeDocument/2006/math" xmlns="" val="1"/>
             </a:ext>
           </a:extLst>
         </p:spPr>
@@ -3753,7 +3753,7 @@
           </a:effectLst>
           <a:extLst>
             <a:ext uri="{C572A759-6A51-4108-AA02-DFA0A04FC94B}">
-              <ma14:wrappingTextBoxFlag xmlns="" xmlns:m="http://schemas.openxmlformats.org/officeDocument/2006/math" xmlns:a14="http://schemas.microsoft.com/office/drawing/2010/main" xmlns:ma14="http://schemas.microsoft.com/office/mac/drawingml/2011/main" val="1"/>
+              <ma14:wrappingTextBoxFlag xmlns:ma14="http://schemas.microsoft.com/office/mac/drawingml/2011/main" xmlns:a14="http://schemas.microsoft.com/office/drawing/2010/main" xmlns:m="http://schemas.openxmlformats.org/officeDocument/2006/math" xmlns="" val="1"/>
             </a:ext>
           </a:extLst>
         </p:spPr>
@@ -3807,7 +3807,7 @@
           </a:effectLst>
           <a:extLst>
             <a:ext uri="{C572A759-6A51-4108-AA02-DFA0A04FC94B}">
-              <ma14:wrappingTextBoxFlag xmlns="" xmlns:m="http://schemas.openxmlformats.org/officeDocument/2006/math" xmlns:a14="http://schemas.microsoft.com/office/drawing/2010/main" xmlns:ma14="http://schemas.microsoft.com/office/mac/drawingml/2011/main" val="1"/>
+              <ma14:wrappingTextBoxFlag xmlns:ma14="http://schemas.microsoft.com/office/mac/drawingml/2011/main" xmlns:a14="http://schemas.microsoft.com/office/drawing/2010/main" xmlns:m="http://schemas.openxmlformats.org/officeDocument/2006/math" xmlns="" val="1"/>
             </a:ext>
           </a:extLst>
         </p:spPr>
@@ -3983,7 +3983,7 @@
           </a:effectLst>
           <a:extLst>
             <a:ext uri="{C572A759-6A51-4108-AA02-DFA0A04FC94B}">
-              <ma14:wrappingTextBoxFlag xmlns="" xmlns:m="http://schemas.openxmlformats.org/officeDocument/2006/math" xmlns:a14="http://schemas.microsoft.com/office/drawing/2010/main" xmlns:ma14="http://schemas.microsoft.com/office/mac/drawingml/2011/main" val="1"/>
+              <ma14:wrappingTextBoxFlag xmlns:ma14="http://schemas.microsoft.com/office/mac/drawingml/2011/main" xmlns:a14="http://schemas.microsoft.com/office/drawing/2010/main" xmlns:m="http://schemas.openxmlformats.org/officeDocument/2006/math" xmlns="" val="1"/>
             </a:ext>
           </a:extLst>
         </p:spPr>
@@ -4107,7 +4107,7 @@
           </a:effectLst>
           <a:extLst>
             <a:ext uri="{C572A759-6A51-4108-AA02-DFA0A04FC94B}">
-              <ma14:wrappingTextBoxFlag xmlns="" xmlns:m="http://schemas.openxmlformats.org/officeDocument/2006/math" xmlns:a14="http://schemas.microsoft.com/office/drawing/2010/main" xmlns:ma14="http://schemas.microsoft.com/office/mac/drawingml/2011/main" val="1"/>
+              <ma14:wrappingTextBoxFlag xmlns:ma14="http://schemas.microsoft.com/office/mac/drawingml/2011/main" xmlns:a14="http://schemas.microsoft.com/office/drawing/2010/main" xmlns:m="http://schemas.openxmlformats.org/officeDocument/2006/math" xmlns="" val="1"/>
             </a:ext>
           </a:extLst>
         </p:spPr>
@@ -4166,7 +4166,7 @@
           </a:effectLst>
           <a:extLst>
             <a:ext uri="{C572A759-6A51-4108-AA02-DFA0A04FC94B}">
-              <ma14:wrappingTextBoxFlag xmlns="" xmlns:m="http://schemas.openxmlformats.org/officeDocument/2006/math" xmlns:a14="http://schemas.microsoft.com/office/drawing/2010/main" xmlns:ma14="http://schemas.microsoft.com/office/mac/drawingml/2011/main" val="1"/>
+              <ma14:wrappingTextBoxFlag xmlns:ma14="http://schemas.microsoft.com/office/mac/drawingml/2011/main" xmlns:a14="http://schemas.microsoft.com/office/drawing/2010/main" xmlns:m="http://schemas.openxmlformats.org/officeDocument/2006/math" xmlns="" val="1"/>
             </a:ext>
           </a:extLst>
         </p:spPr>
@@ -4231,7 +4231,7 @@
           </a:effectLst>
           <a:extLst>
             <a:ext uri="{C572A759-6A51-4108-AA02-DFA0A04FC94B}">
-              <ma14:wrappingTextBoxFlag xmlns="" xmlns:m="http://schemas.openxmlformats.org/officeDocument/2006/math" xmlns:a14="http://schemas.microsoft.com/office/drawing/2010/main" xmlns:ma14="http://schemas.microsoft.com/office/mac/drawingml/2011/main" val="1"/>
+              <ma14:wrappingTextBoxFlag xmlns:ma14="http://schemas.microsoft.com/office/mac/drawingml/2011/main" xmlns:a14="http://schemas.microsoft.com/office/drawing/2010/main" xmlns:m="http://schemas.openxmlformats.org/officeDocument/2006/math" xmlns="" val="1"/>
             </a:ext>
           </a:extLst>
         </p:spPr>
@@ -4296,7 +4296,7 @@
           </a:effectLst>
           <a:extLst>
             <a:ext uri="{C572A759-6A51-4108-AA02-DFA0A04FC94B}">
-              <ma14:wrappingTextBoxFlag xmlns="" xmlns:m="http://schemas.openxmlformats.org/officeDocument/2006/math" xmlns:a14="http://schemas.microsoft.com/office/drawing/2010/main" xmlns:ma14="http://schemas.microsoft.com/office/mac/drawingml/2011/main" val="1"/>
+              <ma14:wrappingTextBoxFlag xmlns:ma14="http://schemas.microsoft.com/office/mac/drawingml/2011/main" xmlns:a14="http://schemas.microsoft.com/office/drawing/2010/main" xmlns:m="http://schemas.openxmlformats.org/officeDocument/2006/math" xmlns="" val="1"/>
             </a:ext>
           </a:extLst>
         </p:spPr>
@@ -4361,7 +4361,7 @@
           </a:effectLst>
           <a:extLst>
             <a:ext uri="{C572A759-6A51-4108-AA02-DFA0A04FC94B}">
-              <ma14:wrappingTextBoxFlag xmlns="" xmlns:m="http://schemas.openxmlformats.org/officeDocument/2006/math" xmlns:a14="http://schemas.microsoft.com/office/drawing/2010/main" xmlns:ma14="http://schemas.microsoft.com/office/mac/drawingml/2011/main" val="1"/>
+              <ma14:wrappingTextBoxFlag xmlns:ma14="http://schemas.microsoft.com/office/mac/drawingml/2011/main" xmlns:a14="http://schemas.microsoft.com/office/drawing/2010/main" xmlns:m="http://schemas.openxmlformats.org/officeDocument/2006/math" xmlns="" val="1"/>
             </a:ext>
           </a:extLst>
         </p:spPr>
@@ -4647,7 +4647,7 @@
           </a:effectLst>
           <a:extLst>
             <a:ext uri="{C572A759-6A51-4108-AA02-DFA0A04FC94B}">
-              <ma14:wrappingTextBoxFlag xmlns="" xmlns:m="http://schemas.openxmlformats.org/officeDocument/2006/math" xmlns:a14="http://schemas.microsoft.com/office/drawing/2010/main" xmlns:ma14="http://schemas.microsoft.com/office/mac/drawingml/2011/main" val="1"/>
+              <ma14:wrappingTextBoxFlag xmlns:ma14="http://schemas.microsoft.com/office/mac/drawingml/2011/main" xmlns:a14="http://schemas.microsoft.com/office/drawing/2010/main" xmlns:m="http://schemas.openxmlformats.org/officeDocument/2006/math" xmlns="" val="1"/>
             </a:ext>
           </a:extLst>
         </p:spPr>
@@ -4706,7 +4706,7 @@
           </a:effectLst>
           <a:extLst>
             <a:ext uri="{C572A759-6A51-4108-AA02-DFA0A04FC94B}">
-              <ma14:wrappingTextBoxFlag xmlns="" xmlns:m="http://schemas.openxmlformats.org/officeDocument/2006/math" xmlns:a14="http://schemas.microsoft.com/office/drawing/2010/main" xmlns:ma14="http://schemas.microsoft.com/office/mac/drawingml/2011/main" val="1"/>
+              <ma14:wrappingTextBoxFlag xmlns:ma14="http://schemas.microsoft.com/office/mac/drawingml/2011/main" xmlns:a14="http://schemas.microsoft.com/office/drawing/2010/main" xmlns:m="http://schemas.openxmlformats.org/officeDocument/2006/math" xmlns="" val="1"/>
             </a:ext>
           </a:extLst>
         </p:spPr>
@@ -4771,7 +4771,7 @@
           </a:effectLst>
           <a:extLst>
             <a:ext uri="{C572A759-6A51-4108-AA02-DFA0A04FC94B}">
-              <ma14:wrappingTextBoxFlag xmlns="" xmlns:m="http://schemas.openxmlformats.org/officeDocument/2006/math" xmlns:a14="http://schemas.microsoft.com/office/drawing/2010/main" xmlns:ma14="http://schemas.microsoft.com/office/mac/drawingml/2011/main" val="1"/>
+              <ma14:wrappingTextBoxFlag xmlns:ma14="http://schemas.microsoft.com/office/mac/drawingml/2011/main" xmlns:a14="http://schemas.microsoft.com/office/drawing/2010/main" xmlns:m="http://schemas.openxmlformats.org/officeDocument/2006/math" xmlns="" val="1"/>
             </a:ext>
           </a:extLst>
         </p:spPr>
@@ -4836,7 +4836,7 @@
           </a:effectLst>
           <a:extLst>
             <a:ext uri="{C572A759-6A51-4108-AA02-DFA0A04FC94B}">
-              <ma14:wrappingTextBoxFlag xmlns="" xmlns:m="http://schemas.openxmlformats.org/officeDocument/2006/math" xmlns:a14="http://schemas.microsoft.com/office/drawing/2010/main" xmlns:ma14="http://schemas.microsoft.com/office/mac/drawingml/2011/main" val="1"/>
+              <ma14:wrappingTextBoxFlag xmlns:ma14="http://schemas.microsoft.com/office/mac/drawingml/2011/main" xmlns:a14="http://schemas.microsoft.com/office/drawing/2010/main" xmlns:m="http://schemas.openxmlformats.org/officeDocument/2006/math" xmlns="" val="1"/>
             </a:ext>
           </a:extLst>
         </p:spPr>
@@ -4901,7 +4901,7 @@
           </a:effectLst>
           <a:extLst>
             <a:ext uri="{C572A759-6A51-4108-AA02-DFA0A04FC94B}">
-              <ma14:wrappingTextBoxFlag xmlns="" xmlns:m="http://schemas.openxmlformats.org/officeDocument/2006/math" xmlns:a14="http://schemas.microsoft.com/office/drawing/2010/main" xmlns:ma14="http://schemas.microsoft.com/office/mac/drawingml/2011/main" val="1"/>
+              <ma14:wrappingTextBoxFlag xmlns:ma14="http://schemas.microsoft.com/office/mac/drawingml/2011/main" xmlns:a14="http://schemas.microsoft.com/office/drawing/2010/main" xmlns:m="http://schemas.openxmlformats.org/officeDocument/2006/math" xmlns="" val="1"/>
             </a:ext>
           </a:extLst>
         </p:spPr>
@@ -5032,7 +5032,7 @@
             <a:effectLst/>
             <a:extLst>
               <a:ext uri="{C572A759-6A51-4108-AA02-DFA0A04FC94B}">
-                <ma14:wrappingTextBoxFlag xmlns="" xmlns:m="http://schemas.openxmlformats.org/officeDocument/2006/math" xmlns:a14="http://schemas.microsoft.com/office/drawing/2010/main" xmlns:ma14="http://schemas.microsoft.com/office/mac/drawingml/2011/main" val="1"/>
+                <ma14:wrappingTextBoxFlag xmlns:ma14="http://schemas.microsoft.com/office/mac/drawingml/2011/main" xmlns:a14="http://schemas.microsoft.com/office/drawing/2010/main" xmlns:m="http://schemas.openxmlformats.org/officeDocument/2006/math" xmlns="" val="1"/>
               </a:ext>
             </a:extLst>
           </p:spPr>
@@ -5161,7 +5161,7 @@
             <a:effectLst/>
             <a:extLst>
               <a:ext uri="{C572A759-6A51-4108-AA02-DFA0A04FC94B}">
-                <ma14:wrappingTextBoxFlag xmlns="" xmlns:m="http://schemas.openxmlformats.org/officeDocument/2006/math" xmlns:a14="http://schemas.microsoft.com/office/drawing/2010/main" xmlns:ma14="http://schemas.microsoft.com/office/mac/drawingml/2011/main" val="1"/>
+                <ma14:wrappingTextBoxFlag xmlns:ma14="http://schemas.microsoft.com/office/mac/drawingml/2011/main" xmlns:a14="http://schemas.microsoft.com/office/drawing/2010/main" xmlns:m="http://schemas.openxmlformats.org/officeDocument/2006/math" xmlns="" val="1"/>
               </a:ext>
             </a:extLst>
           </p:spPr>
@@ -5212,7 +5212,7 @@
             </a:ln>
             <a:extLst>
               <a:ext uri="{C572A759-6A51-4108-AA02-DFA0A04FC94B}">
-                <ma14:wrappingTextBoxFlag xmlns="" xmlns:m="http://schemas.openxmlformats.org/officeDocument/2006/math" xmlns:a14="http://schemas.microsoft.com/office/drawing/2010/main" xmlns:ma14="http://schemas.microsoft.com/office/mac/drawingml/2011/main" val="1"/>
+                <ma14:wrappingTextBoxFlag xmlns:ma14="http://schemas.microsoft.com/office/mac/drawingml/2011/main" xmlns:a14="http://schemas.microsoft.com/office/drawing/2010/main" xmlns:m="http://schemas.openxmlformats.org/officeDocument/2006/math" xmlns="" val="1"/>
               </a:ext>
             </a:extLst>
           </p:spPr>
@@ -5406,7 +5406,7 @@
             </a:effectLst>
             <a:extLst>
               <a:ext uri="{C572A759-6A51-4108-AA02-DFA0A04FC94B}">
-                <ma14:wrappingTextBoxFlag xmlns="" xmlns:m="http://schemas.openxmlformats.org/officeDocument/2006/math" xmlns:a14="http://schemas.microsoft.com/office/drawing/2010/main" xmlns:ma14="http://schemas.microsoft.com/office/mac/drawingml/2011/main" val="1"/>
+                <ma14:wrappingTextBoxFlag xmlns:ma14="http://schemas.microsoft.com/office/mac/drawingml/2011/main" xmlns:a14="http://schemas.microsoft.com/office/drawing/2010/main" xmlns:m="http://schemas.openxmlformats.org/officeDocument/2006/math" xmlns="" val="1"/>
               </a:ext>
             </a:extLst>
           </p:spPr>
@@ -5476,7 +5476,7 @@
             </a:effectLst>
             <a:extLst>
               <a:ext uri="{C572A759-6A51-4108-AA02-DFA0A04FC94B}">
-                <ma14:wrappingTextBoxFlag xmlns="" xmlns:m="http://schemas.openxmlformats.org/officeDocument/2006/math" xmlns:a14="http://schemas.microsoft.com/office/drawing/2010/main" xmlns:ma14="http://schemas.microsoft.com/office/mac/drawingml/2011/main" val="1"/>
+                <ma14:wrappingTextBoxFlag xmlns:ma14="http://schemas.microsoft.com/office/mac/drawingml/2011/main" xmlns:a14="http://schemas.microsoft.com/office/drawing/2010/main" xmlns:m="http://schemas.openxmlformats.org/officeDocument/2006/math" xmlns="" val="1"/>
               </a:ext>
             </a:extLst>
           </p:spPr>
@@ -5599,7 +5599,7 @@
           </a:ln>
           <a:extLst>
             <a:ext uri="{C572A759-6A51-4108-AA02-DFA0A04FC94B}">
-              <ma14:wrappingTextBoxFlag xmlns="" xmlns:m="http://schemas.openxmlformats.org/officeDocument/2006/math" xmlns:a14="http://schemas.microsoft.com/office/drawing/2010/main" xmlns:ma14="http://schemas.microsoft.com/office/mac/drawingml/2011/main" val="1"/>
+              <ma14:wrappingTextBoxFlag xmlns:ma14="http://schemas.microsoft.com/office/mac/drawingml/2011/main" xmlns:a14="http://schemas.microsoft.com/office/drawing/2010/main" xmlns:m="http://schemas.openxmlformats.org/officeDocument/2006/math" xmlns="" val="1"/>
             </a:ext>
           </a:extLst>
         </p:spPr>
@@ -5688,7 +5688,7 @@
             </a:effectLst>
             <a:extLst>
               <a:ext uri="{C572A759-6A51-4108-AA02-DFA0A04FC94B}">
-                <ma14:wrappingTextBoxFlag xmlns="" xmlns:m="http://schemas.openxmlformats.org/officeDocument/2006/math" xmlns:a14="http://schemas.microsoft.com/office/drawing/2010/main" xmlns:ma14="http://schemas.microsoft.com/office/mac/drawingml/2011/main" val="1"/>
+                <ma14:wrappingTextBoxFlag xmlns:ma14="http://schemas.microsoft.com/office/mac/drawingml/2011/main" xmlns:a14="http://schemas.microsoft.com/office/drawing/2010/main" xmlns:m="http://schemas.openxmlformats.org/officeDocument/2006/math" xmlns="" val="1"/>
               </a:ext>
             </a:extLst>
           </p:spPr>
@@ -5782,7 +5782,7 @@
                 </a:effectLst>
                 <a:extLst>
                   <a:ext uri="{C572A759-6A51-4108-AA02-DFA0A04FC94B}">
-                    <ma14:wrappingTextBoxFlag xmlns="" xmlns:m="http://schemas.openxmlformats.org/officeDocument/2006/math" xmlns:a14="http://schemas.microsoft.com/office/drawing/2010/main" xmlns:ma14="http://schemas.microsoft.com/office/mac/drawingml/2011/main" val="1"/>
+                    <ma14:wrappingTextBoxFlag xmlns:ma14="http://schemas.microsoft.com/office/mac/drawingml/2011/main" xmlns:a14="http://schemas.microsoft.com/office/drawing/2010/main" xmlns:m="http://schemas.openxmlformats.org/officeDocument/2006/math" xmlns="" val="1"/>
                   </a:ext>
                 </a:extLst>
               </p:spPr>
@@ -5849,7 +5849,7 @@
                 </a:effectLst>
                 <a:extLst>
                   <a:ext uri="{C572A759-6A51-4108-AA02-DFA0A04FC94B}">
-                    <ma14:wrappingTextBoxFlag xmlns="" xmlns:m="http://schemas.openxmlformats.org/officeDocument/2006/math" xmlns:a14="http://schemas.microsoft.com/office/drawing/2010/main" xmlns:ma14="http://schemas.microsoft.com/office/mac/drawingml/2011/main" val="1"/>
+                    <ma14:wrappingTextBoxFlag xmlns:ma14="http://schemas.microsoft.com/office/mac/drawingml/2011/main" xmlns:a14="http://schemas.microsoft.com/office/drawing/2010/main" xmlns:m="http://schemas.openxmlformats.org/officeDocument/2006/math" xmlns="" val="1"/>
                   </a:ext>
                 </a:extLst>
               </p:spPr>
@@ -5934,7 +5934,7 @@
                 </a:effectLst>
                 <a:extLst>
                   <a:ext uri="{C572A759-6A51-4108-AA02-DFA0A04FC94B}">
-                    <ma14:wrappingTextBoxFlag xmlns="" xmlns:m="http://schemas.openxmlformats.org/officeDocument/2006/math" xmlns:a14="http://schemas.microsoft.com/office/drawing/2010/main" xmlns:ma14="http://schemas.microsoft.com/office/mac/drawingml/2011/main" val="1"/>
+                    <ma14:wrappingTextBoxFlag xmlns:ma14="http://schemas.microsoft.com/office/mac/drawingml/2011/main" xmlns:a14="http://schemas.microsoft.com/office/drawing/2010/main" xmlns:m="http://schemas.openxmlformats.org/officeDocument/2006/math" xmlns="" val="1"/>
                   </a:ext>
                 </a:extLst>
               </p:spPr>
@@ -6001,7 +6001,7 @@
                 </a:effectLst>
                 <a:extLst>
                   <a:ext uri="{C572A759-6A51-4108-AA02-DFA0A04FC94B}">
-                    <ma14:wrappingTextBoxFlag xmlns="" xmlns:m="http://schemas.openxmlformats.org/officeDocument/2006/math" xmlns:a14="http://schemas.microsoft.com/office/drawing/2010/main" xmlns:ma14="http://schemas.microsoft.com/office/mac/drawingml/2011/main" val="1"/>
+                    <ma14:wrappingTextBoxFlag xmlns:ma14="http://schemas.microsoft.com/office/mac/drawingml/2011/main" xmlns:a14="http://schemas.microsoft.com/office/drawing/2010/main" xmlns:m="http://schemas.openxmlformats.org/officeDocument/2006/math" xmlns="" val="1"/>
                   </a:ext>
                 </a:extLst>
               </p:spPr>
@@ -6090,7 +6090,7 @@
                 </a:effectLst>
                 <a:extLst>
                   <a:ext uri="{C572A759-6A51-4108-AA02-DFA0A04FC94B}">
-                    <ma14:wrappingTextBoxFlag xmlns="" xmlns:m="http://schemas.openxmlformats.org/officeDocument/2006/math" xmlns:a14="http://schemas.microsoft.com/office/drawing/2010/main" xmlns:ma14="http://schemas.microsoft.com/office/mac/drawingml/2011/main" val="1"/>
+                    <ma14:wrappingTextBoxFlag xmlns:ma14="http://schemas.microsoft.com/office/mac/drawingml/2011/main" xmlns:a14="http://schemas.microsoft.com/office/drawing/2010/main" xmlns:m="http://schemas.openxmlformats.org/officeDocument/2006/math" xmlns="" val="1"/>
                   </a:ext>
                 </a:extLst>
               </p:spPr>
@@ -6157,7 +6157,7 @@
                 </a:effectLst>
                 <a:extLst>
                   <a:ext uri="{C572A759-6A51-4108-AA02-DFA0A04FC94B}">
-                    <ma14:wrappingTextBoxFlag xmlns="" xmlns:m="http://schemas.openxmlformats.org/officeDocument/2006/math" xmlns:a14="http://schemas.microsoft.com/office/drawing/2010/main" xmlns:ma14="http://schemas.microsoft.com/office/mac/drawingml/2011/main" val="1"/>
+                    <ma14:wrappingTextBoxFlag xmlns:ma14="http://schemas.microsoft.com/office/mac/drawingml/2011/main" xmlns:a14="http://schemas.microsoft.com/office/drawing/2010/main" xmlns:m="http://schemas.openxmlformats.org/officeDocument/2006/math" xmlns="" val="1"/>
                   </a:ext>
                 </a:extLst>
               </p:spPr>
@@ -6242,7 +6242,7 @@
                 </a:effectLst>
                 <a:extLst>
                   <a:ext uri="{C572A759-6A51-4108-AA02-DFA0A04FC94B}">
-                    <ma14:wrappingTextBoxFlag xmlns="" xmlns:m="http://schemas.openxmlformats.org/officeDocument/2006/math" xmlns:a14="http://schemas.microsoft.com/office/drawing/2010/main" xmlns:ma14="http://schemas.microsoft.com/office/mac/drawingml/2011/main" val="1"/>
+                    <ma14:wrappingTextBoxFlag xmlns:ma14="http://schemas.microsoft.com/office/mac/drawingml/2011/main" xmlns:a14="http://schemas.microsoft.com/office/drawing/2010/main" xmlns:m="http://schemas.openxmlformats.org/officeDocument/2006/math" xmlns="" val="1"/>
                   </a:ext>
                 </a:extLst>
               </p:spPr>
@@ -6309,7 +6309,7 @@
                 </a:effectLst>
                 <a:extLst>
                   <a:ext uri="{C572A759-6A51-4108-AA02-DFA0A04FC94B}">
-                    <ma14:wrappingTextBoxFlag xmlns="" xmlns:m="http://schemas.openxmlformats.org/officeDocument/2006/math" xmlns:a14="http://schemas.microsoft.com/office/drawing/2010/main" xmlns:ma14="http://schemas.microsoft.com/office/mac/drawingml/2011/main" val="1"/>
+                    <ma14:wrappingTextBoxFlag xmlns:ma14="http://schemas.microsoft.com/office/mac/drawingml/2011/main" xmlns:a14="http://schemas.microsoft.com/office/drawing/2010/main" xmlns:m="http://schemas.openxmlformats.org/officeDocument/2006/math" xmlns="" val="1"/>
                   </a:ext>
                 </a:extLst>
               </p:spPr>
@@ -6400,7 +6400,7 @@
                 </a:effectLst>
                 <a:extLst>
                   <a:ext uri="{C572A759-6A51-4108-AA02-DFA0A04FC94B}">
-                    <ma14:wrappingTextBoxFlag xmlns="" xmlns:m="http://schemas.openxmlformats.org/officeDocument/2006/math" xmlns:a14="http://schemas.microsoft.com/office/drawing/2010/main" xmlns:ma14="http://schemas.microsoft.com/office/mac/drawingml/2011/main" val="1"/>
+                    <ma14:wrappingTextBoxFlag xmlns:ma14="http://schemas.microsoft.com/office/mac/drawingml/2011/main" xmlns:a14="http://schemas.microsoft.com/office/drawing/2010/main" xmlns:m="http://schemas.openxmlformats.org/officeDocument/2006/math" xmlns="" val="1"/>
                   </a:ext>
                 </a:extLst>
               </p:spPr>
@@ -6490,7 +6490,7 @@
                 </a:effectLst>
                 <a:extLst>
                   <a:ext uri="{C572A759-6A51-4108-AA02-DFA0A04FC94B}">
-                    <ma14:wrappingTextBoxFlag xmlns="" xmlns:m="http://schemas.openxmlformats.org/officeDocument/2006/math" xmlns:a14="http://schemas.microsoft.com/office/drawing/2010/main" xmlns:ma14="http://schemas.microsoft.com/office/mac/drawingml/2011/main" val="1"/>
+                    <ma14:wrappingTextBoxFlag xmlns:ma14="http://schemas.microsoft.com/office/mac/drawingml/2011/main" xmlns:a14="http://schemas.microsoft.com/office/drawing/2010/main" xmlns:m="http://schemas.openxmlformats.org/officeDocument/2006/math" xmlns="" val="1"/>
                   </a:ext>
                 </a:extLst>
               </p:spPr>
@@ -6601,7 +6601,7 @@
               </a:effectLst>
               <a:extLst>
                 <a:ext uri="{C572A759-6A51-4108-AA02-DFA0A04FC94B}">
-                  <ma14:wrappingTextBoxFlag xmlns="" xmlns:m="http://schemas.openxmlformats.org/officeDocument/2006/math" xmlns:a14="http://schemas.microsoft.com/office/drawing/2010/main" xmlns:ma14="http://schemas.microsoft.com/office/mac/drawingml/2011/main" val="1"/>
+                  <ma14:wrappingTextBoxFlag xmlns:ma14="http://schemas.microsoft.com/office/mac/drawingml/2011/main" xmlns:a14="http://schemas.microsoft.com/office/drawing/2010/main" xmlns:m="http://schemas.openxmlformats.org/officeDocument/2006/math" xmlns="" val="1"/>
                 </a:ext>
               </a:extLst>
             </p:spPr>
@@ -6687,7 +6687,7 @@
               </a:effectLst>
               <a:extLst>
                 <a:ext uri="{C572A759-6A51-4108-AA02-DFA0A04FC94B}">
-                  <ma14:wrappingTextBoxFlag xmlns="" xmlns:m="http://schemas.openxmlformats.org/officeDocument/2006/math" xmlns:a14="http://schemas.microsoft.com/office/drawing/2010/main" xmlns:ma14="http://schemas.microsoft.com/office/mac/drawingml/2011/main" val="1"/>
+                  <ma14:wrappingTextBoxFlag xmlns:ma14="http://schemas.microsoft.com/office/mac/drawingml/2011/main" xmlns:a14="http://schemas.microsoft.com/office/drawing/2010/main" xmlns:m="http://schemas.openxmlformats.org/officeDocument/2006/math" xmlns="" val="1"/>
                 </a:ext>
               </a:extLst>
             </p:spPr>
@@ -6751,7 +6751,7 @@
               </a:effectLst>
               <a:extLst>
                 <a:ext uri="{C572A759-6A51-4108-AA02-DFA0A04FC94B}">
-                  <ma14:wrappingTextBoxFlag xmlns="" xmlns:m="http://schemas.openxmlformats.org/officeDocument/2006/math" xmlns:a14="http://schemas.microsoft.com/office/drawing/2010/main" xmlns:ma14="http://schemas.microsoft.com/office/mac/drawingml/2011/main" val="1"/>
+                  <ma14:wrappingTextBoxFlag xmlns:ma14="http://schemas.microsoft.com/office/mac/drawingml/2011/main" xmlns:a14="http://schemas.microsoft.com/office/drawing/2010/main" xmlns:m="http://schemas.openxmlformats.org/officeDocument/2006/math" xmlns="" val="1"/>
                 </a:ext>
               </a:extLst>
             </p:spPr>
@@ -6825,7 +6825,7 @@
               </a:effectLst>
               <a:extLst>
                 <a:ext uri="{C572A759-6A51-4108-AA02-DFA0A04FC94B}">
-                  <ma14:wrappingTextBoxFlag xmlns="" xmlns:m="http://schemas.openxmlformats.org/officeDocument/2006/math" xmlns:a14="http://schemas.microsoft.com/office/drawing/2010/main" xmlns:ma14="http://schemas.microsoft.com/office/mac/drawingml/2011/main" val="1"/>
+                  <ma14:wrappingTextBoxFlag xmlns:ma14="http://schemas.microsoft.com/office/mac/drawingml/2011/main" xmlns:a14="http://schemas.microsoft.com/office/drawing/2010/main" xmlns:m="http://schemas.openxmlformats.org/officeDocument/2006/math" xmlns="" val="1"/>
                 </a:ext>
               </a:extLst>
             </p:spPr>
@@ -6920,7 +6920,7 @@
               </a:effectLst>
               <a:extLst>
                 <a:ext uri="{C572A759-6A51-4108-AA02-DFA0A04FC94B}">
-                  <ma14:wrappingTextBoxFlag xmlns="" xmlns:m="http://schemas.openxmlformats.org/officeDocument/2006/math" xmlns:a14="http://schemas.microsoft.com/office/drawing/2010/main" xmlns:ma14="http://schemas.microsoft.com/office/mac/drawingml/2011/main" val="1"/>
+                  <ma14:wrappingTextBoxFlag xmlns:ma14="http://schemas.microsoft.com/office/mac/drawingml/2011/main" xmlns:a14="http://schemas.microsoft.com/office/drawing/2010/main" xmlns:m="http://schemas.openxmlformats.org/officeDocument/2006/math" xmlns="" val="1"/>
                 </a:ext>
               </a:extLst>
             </p:spPr>
@@ -7023,7 +7023,7 @@
               </a:effectLst>
               <a:extLst>
                 <a:ext uri="{C572A759-6A51-4108-AA02-DFA0A04FC94B}">
-                  <ma14:wrappingTextBoxFlag xmlns="" xmlns:m="http://schemas.openxmlformats.org/officeDocument/2006/math" xmlns:a14="http://schemas.microsoft.com/office/drawing/2010/main" xmlns:ma14="http://schemas.microsoft.com/office/mac/drawingml/2011/main" val="1"/>
+                  <ma14:wrappingTextBoxFlag xmlns:ma14="http://schemas.microsoft.com/office/mac/drawingml/2011/main" xmlns:a14="http://schemas.microsoft.com/office/drawing/2010/main" xmlns:m="http://schemas.openxmlformats.org/officeDocument/2006/math" xmlns="" val="1"/>
                 </a:ext>
               </a:extLst>
             </p:spPr>
@@ -7097,7 +7097,7 @@
               </a:effectLst>
               <a:extLst>
                 <a:ext uri="{C572A759-6A51-4108-AA02-DFA0A04FC94B}">
-                  <ma14:wrappingTextBoxFlag xmlns="" xmlns:m="http://schemas.openxmlformats.org/officeDocument/2006/math" xmlns:a14="http://schemas.microsoft.com/office/drawing/2010/main" xmlns:ma14="http://schemas.microsoft.com/office/mac/drawingml/2011/main" val="1"/>
+                  <ma14:wrappingTextBoxFlag xmlns:ma14="http://schemas.microsoft.com/office/mac/drawingml/2011/main" xmlns:a14="http://schemas.microsoft.com/office/drawing/2010/main" xmlns:m="http://schemas.openxmlformats.org/officeDocument/2006/math" xmlns="" val="1"/>
                 </a:ext>
               </a:extLst>
             </p:spPr>
@@ -7171,7 +7171,7 @@
               </a:effectLst>
               <a:extLst>
                 <a:ext uri="{C572A759-6A51-4108-AA02-DFA0A04FC94B}">
-                  <ma14:wrappingTextBoxFlag xmlns="" xmlns:m="http://schemas.openxmlformats.org/officeDocument/2006/math" xmlns:a14="http://schemas.microsoft.com/office/drawing/2010/main" xmlns:ma14="http://schemas.microsoft.com/office/mac/drawingml/2011/main" val="1"/>
+                  <ma14:wrappingTextBoxFlag xmlns:ma14="http://schemas.microsoft.com/office/mac/drawingml/2011/main" xmlns:a14="http://schemas.microsoft.com/office/drawing/2010/main" xmlns:m="http://schemas.openxmlformats.org/officeDocument/2006/math" xmlns="" val="1"/>
                 </a:ext>
               </a:extLst>
             </p:spPr>
@@ -7244,7 +7244,7 @@
           </a:effectLst>
           <a:extLst>
             <a:ext uri="{C572A759-6A51-4108-AA02-DFA0A04FC94B}">
-              <ma14:wrappingTextBoxFlag xmlns="" xmlns:m="http://schemas.openxmlformats.org/officeDocument/2006/math" xmlns:a14="http://schemas.microsoft.com/office/drawing/2010/main" xmlns:ma14="http://schemas.microsoft.com/office/mac/drawingml/2011/main" val="1"/>
+              <ma14:wrappingTextBoxFlag xmlns:ma14="http://schemas.microsoft.com/office/mac/drawingml/2011/main" xmlns:a14="http://schemas.microsoft.com/office/drawing/2010/main" xmlns:m="http://schemas.openxmlformats.org/officeDocument/2006/math" xmlns="" val="1"/>
             </a:ext>
           </a:extLst>
         </p:spPr>
@@ -7302,7 +7302,7 @@
           </a:effectLst>
           <a:extLst>
             <a:ext uri="{C572A759-6A51-4108-AA02-DFA0A04FC94B}">
-              <ma14:wrappingTextBoxFlag xmlns="" xmlns:m="http://schemas.openxmlformats.org/officeDocument/2006/math" xmlns:a14="http://schemas.microsoft.com/office/drawing/2010/main" xmlns:ma14="http://schemas.microsoft.com/office/mac/drawingml/2011/main" val="1"/>
+              <ma14:wrappingTextBoxFlag xmlns:ma14="http://schemas.microsoft.com/office/mac/drawingml/2011/main" xmlns:a14="http://schemas.microsoft.com/office/drawing/2010/main" xmlns:m="http://schemas.openxmlformats.org/officeDocument/2006/math" xmlns="" val="1"/>
             </a:ext>
           </a:extLst>
         </p:spPr>
@@ -7372,7 +7372,7 @@
           </a:effectLst>
           <a:extLst>
             <a:ext uri="{C572A759-6A51-4108-AA02-DFA0A04FC94B}">
-              <ma14:wrappingTextBoxFlag xmlns="" xmlns:m="http://schemas.openxmlformats.org/officeDocument/2006/math" xmlns:a14="http://schemas.microsoft.com/office/drawing/2010/main" xmlns:ma14="http://schemas.microsoft.com/office/mac/drawingml/2011/main" val="1"/>
+              <ma14:wrappingTextBoxFlag xmlns:ma14="http://schemas.microsoft.com/office/mac/drawingml/2011/main" xmlns:a14="http://schemas.microsoft.com/office/drawing/2010/main" xmlns:m="http://schemas.openxmlformats.org/officeDocument/2006/math" xmlns="" val="1"/>
             </a:ext>
           </a:extLst>
         </p:spPr>
@@ -7442,7 +7442,7 @@
           </a:effectLst>
           <a:extLst>
             <a:ext uri="{C572A759-6A51-4108-AA02-DFA0A04FC94B}">
-              <ma14:wrappingTextBoxFlag xmlns="" xmlns:m="http://schemas.openxmlformats.org/officeDocument/2006/math" xmlns:a14="http://schemas.microsoft.com/office/drawing/2010/main" xmlns:ma14="http://schemas.microsoft.com/office/mac/drawingml/2011/main" val="1"/>
+              <ma14:wrappingTextBoxFlag xmlns:ma14="http://schemas.microsoft.com/office/mac/drawingml/2011/main" xmlns:a14="http://schemas.microsoft.com/office/drawing/2010/main" xmlns:m="http://schemas.openxmlformats.org/officeDocument/2006/math" xmlns="" val="1"/>
             </a:ext>
           </a:extLst>
         </p:spPr>
@@ -7512,7 +7512,7 @@
           </a:effectLst>
           <a:extLst>
             <a:ext uri="{C572A759-6A51-4108-AA02-DFA0A04FC94B}">
-              <ma14:wrappingTextBoxFlag xmlns="" xmlns:m="http://schemas.openxmlformats.org/officeDocument/2006/math" xmlns:a14="http://schemas.microsoft.com/office/drawing/2010/main" xmlns:ma14="http://schemas.microsoft.com/office/mac/drawingml/2011/main" val="1"/>
+              <ma14:wrappingTextBoxFlag xmlns:ma14="http://schemas.microsoft.com/office/mac/drawingml/2011/main" xmlns:a14="http://schemas.microsoft.com/office/drawing/2010/main" xmlns:m="http://schemas.openxmlformats.org/officeDocument/2006/math" xmlns="" val="1"/>
             </a:ext>
           </a:extLst>
         </p:spPr>
@@ -7738,7 +7738,7 @@
           </a:effectLst>
           <a:extLst>
             <a:ext uri="{C572A759-6A51-4108-AA02-DFA0A04FC94B}">
-              <ma14:wrappingTextBoxFlag xmlns="" xmlns:m="http://schemas.openxmlformats.org/officeDocument/2006/math" xmlns:a14="http://schemas.microsoft.com/office/drawing/2010/main" xmlns:ma14="http://schemas.microsoft.com/office/mac/drawingml/2011/main" val="1"/>
+              <ma14:wrappingTextBoxFlag xmlns:ma14="http://schemas.microsoft.com/office/mac/drawingml/2011/main" xmlns:a14="http://schemas.microsoft.com/office/drawing/2010/main" xmlns:m="http://schemas.openxmlformats.org/officeDocument/2006/math" xmlns="" val="1"/>
             </a:ext>
           </a:extLst>
         </p:spPr>
@@ -7789,7 +7789,7 @@
           </a:ln>
           <a:extLst>
             <a:ext uri="{C572A759-6A51-4108-AA02-DFA0A04FC94B}">
-              <ma14:wrappingTextBoxFlag xmlns="" xmlns:m="http://schemas.openxmlformats.org/officeDocument/2006/math" xmlns:a14="http://schemas.microsoft.com/office/drawing/2010/main" xmlns:ma14="http://schemas.microsoft.com/office/mac/drawingml/2011/main" val="1"/>
+              <ma14:wrappingTextBoxFlag xmlns:ma14="http://schemas.microsoft.com/office/mac/drawingml/2011/main" xmlns:a14="http://schemas.microsoft.com/office/drawing/2010/main" xmlns:m="http://schemas.openxmlformats.org/officeDocument/2006/math" xmlns="" val="1"/>
             </a:ext>
           </a:extLst>
         </p:spPr>
@@ -7844,7 +7844,7 @@
           </a:ln>
           <a:extLst>
             <a:ext uri="{C572A759-6A51-4108-AA02-DFA0A04FC94B}">
-              <ma14:wrappingTextBoxFlag xmlns="" xmlns:m="http://schemas.openxmlformats.org/officeDocument/2006/math" xmlns:a14="http://schemas.microsoft.com/office/drawing/2010/main" xmlns:ma14="http://schemas.microsoft.com/office/mac/drawingml/2011/main" val="1"/>
+              <ma14:wrappingTextBoxFlag xmlns:ma14="http://schemas.microsoft.com/office/mac/drawingml/2011/main" xmlns:a14="http://schemas.microsoft.com/office/drawing/2010/main" xmlns:m="http://schemas.openxmlformats.org/officeDocument/2006/math" xmlns="" val="1"/>
             </a:ext>
           </a:extLst>
         </p:spPr>
@@ -7982,7 +7982,7 @@
           </a:effectLst>
           <a:extLst>
             <a:ext uri="{C572A759-6A51-4108-AA02-DFA0A04FC94B}">
-              <ma14:wrappingTextBoxFlag xmlns="" xmlns:m="http://schemas.openxmlformats.org/officeDocument/2006/math" xmlns:a14="http://schemas.microsoft.com/office/drawing/2010/main" xmlns:ma14="http://schemas.microsoft.com/office/mac/drawingml/2011/main" val="1"/>
+              <ma14:wrappingTextBoxFlag xmlns:ma14="http://schemas.microsoft.com/office/mac/drawingml/2011/main" xmlns:a14="http://schemas.microsoft.com/office/drawing/2010/main" xmlns:m="http://schemas.openxmlformats.org/officeDocument/2006/math" xmlns="" val="1"/>
             </a:ext>
           </a:extLst>
         </p:spPr>
@@ -8046,7 +8046,7 @@
           </a:effectLst>
           <a:extLst>
             <a:ext uri="{C572A759-6A51-4108-AA02-DFA0A04FC94B}">
-              <ma14:wrappingTextBoxFlag xmlns="" xmlns:m="http://schemas.openxmlformats.org/officeDocument/2006/math" xmlns:a14="http://schemas.microsoft.com/office/drawing/2010/main" xmlns:ma14="http://schemas.microsoft.com/office/mac/drawingml/2011/main" val="1"/>
+              <ma14:wrappingTextBoxFlag xmlns:ma14="http://schemas.microsoft.com/office/mac/drawingml/2011/main" xmlns:a14="http://schemas.microsoft.com/office/drawing/2010/main" xmlns:m="http://schemas.openxmlformats.org/officeDocument/2006/math" xmlns="" val="1"/>
             </a:ext>
           </a:extLst>
         </p:spPr>
@@ -8116,7 +8116,7 @@
           </a:effectLst>
           <a:extLst>
             <a:ext uri="{C572A759-6A51-4108-AA02-DFA0A04FC94B}">
-              <ma14:wrappingTextBoxFlag xmlns="" xmlns:m="http://schemas.openxmlformats.org/officeDocument/2006/math" xmlns:a14="http://schemas.microsoft.com/office/drawing/2010/main" xmlns:ma14="http://schemas.microsoft.com/office/mac/drawingml/2011/main" val="1"/>
+              <ma14:wrappingTextBoxFlag xmlns:ma14="http://schemas.microsoft.com/office/mac/drawingml/2011/main" xmlns:a14="http://schemas.microsoft.com/office/drawing/2010/main" xmlns:m="http://schemas.openxmlformats.org/officeDocument/2006/math" xmlns="" val="1"/>
             </a:ext>
           </a:extLst>
         </p:spPr>
@@ -8186,7 +8186,7 @@
           </a:effectLst>
           <a:extLst>
             <a:ext uri="{C572A759-6A51-4108-AA02-DFA0A04FC94B}">
-              <ma14:wrappingTextBoxFlag xmlns="" xmlns:m="http://schemas.openxmlformats.org/officeDocument/2006/math" xmlns:a14="http://schemas.microsoft.com/office/drawing/2010/main" xmlns:ma14="http://schemas.microsoft.com/office/mac/drawingml/2011/main" val="1"/>
+              <ma14:wrappingTextBoxFlag xmlns:ma14="http://schemas.microsoft.com/office/mac/drawingml/2011/main" xmlns:a14="http://schemas.microsoft.com/office/drawing/2010/main" xmlns:m="http://schemas.openxmlformats.org/officeDocument/2006/math" xmlns="" val="1"/>
             </a:ext>
           </a:extLst>
         </p:spPr>
@@ -8256,7 +8256,7 @@
           </a:effectLst>
           <a:extLst>
             <a:ext uri="{C572A759-6A51-4108-AA02-DFA0A04FC94B}">
-              <ma14:wrappingTextBoxFlag xmlns="" xmlns:m="http://schemas.openxmlformats.org/officeDocument/2006/math" xmlns:a14="http://schemas.microsoft.com/office/drawing/2010/main" xmlns:ma14="http://schemas.microsoft.com/office/mac/drawingml/2011/main" val="1"/>
+              <ma14:wrappingTextBoxFlag xmlns:ma14="http://schemas.microsoft.com/office/mac/drawingml/2011/main" xmlns:a14="http://schemas.microsoft.com/office/drawing/2010/main" xmlns:m="http://schemas.openxmlformats.org/officeDocument/2006/math" xmlns="" val="1"/>
             </a:ext>
           </a:extLst>
         </p:spPr>
@@ -8346,7 +8346,7 @@
             </a:effectLst>
             <a:extLst>
               <a:ext uri="{C572A759-6A51-4108-AA02-DFA0A04FC94B}">
-                <ma14:wrappingTextBoxFlag xmlns="" xmlns:m="http://schemas.openxmlformats.org/officeDocument/2006/math" xmlns:a14="http://schemas.microsoft.com/office/drawing/2010/main" xmlns:ma14="http://schemas.microsoft.com/office/mac/drawingml/2011/main" val="1"/>
+                <ma14:wrappingTextBoxFlag xmlns:ma14="http://schemas.microsoft.com/office/mac/drawingml/2011/main" xmlns:a14="http://schemas.microsoft.com/office/drawing/2010/main" xmlns:m="http://schemas.openxmlformats.org/officeDocument/2006/math" xmlns="" val="1"/>
               </a:ext>
             </a:extLst>
           </p:spPr>
@@ -8416,7 +8416,7 @@
             </a:effectLst>
             <a:extLst>
               <a:ext uri="{C572A759-6A51-4108-AA02-DFA0A04FC94B}">
-                <ma14:wrappingTextBoxFlag xmlns="" xmlns:m="http://schemas.openxmlformats.org/officeDocument/2006/math" xmlns:a14="http://schemas.microsoft.com/office/drawing/2010/main" xmlns:ma14="http://schemas.microsoft.com/office/mac/drawingml/2011/main" val="1"/>
+                <ma14:wrappingTextBoxFlag xmlns:ma14="http://schemas.microsoft.com/office/mac/drawingml/2011/main" xmlns:a14="http://schemas.microsoft.com/office/drawing/2010/main" xmlns:m="http://schemas.openxmlformats.org/officeDocument/2006/math" xmlns="" val="1"/>
               </a:ext>
             </a:extLst>
           </p:spPr>
@@ -8514,7 +8514,7 @@
             </a:effectLst>
             <a:extLst>
               <a:ext uri="{C572A759-6A51-4108-AA02-DFA0A04FC94B}">
-                <ma14:wrappingTextBoxFlag xmlns="" xmlns:m="http://schemas.openxmlformats.org/officeDocument/2006/math" xmlns:a14="http://schemas.microsoft.com/office/drawing/2010/main" xmlns:ma14="http://schemas.microsoft.com/office/mac/drawingml/2011/main" val="1"/>
+                <ma14:wrappingTextBoxFlag xmlns:ma14="http://schemas.microsoft.com/office/mac/drawingml/2011/main" xmlns:a14="http://schemas.microsoft.com/office/drawing/2010/main" xmlns:m="http://schemas.openxmlformats.org/officeDocument/2006/math" xmlns="" val="1"/>
               </a:ext>
             </a:extLst>
           </p:spPr>
@@ -8570,7 +8570,7 @@
             </a:effectLst>
             <a:extLst>
               <a:ext uri="{C572A759-6A51-4108-AA02-DFA0A04FC94B}">
-                <ma14:wrappingTextBoxFlag xmlns="" xmlns:m="http://schemas.openxmlformats.org/officeDocument/2006/math" xmlns:a14="http://schemas.microsoft.com/office/drawing/2010/main" xmlns:ma14="http://schemas.microsoft.com/office/mac/drawingml/2011/main" val="1"/>
+                <ma14:wrappingTextBoxFlag xmlns:ma14="http://schemas.microsoft.com/office/mac/drawingml/2011/main" xmlns:a14="http://schemas.microsoft.com/office/drawing/2010/main" xmlns:m="http://schemas.openxmlformats.org/officeDocument/2006/math" xmlns="" val="1"/>
               </a:ext>
             </a:extLst>
           </p:spPr>
@@ -8626,7 +8626,7 @@
             </a:effectLst>
             <a:extLst>
               <a:ext uri="{C572A759-6A51-4108-AA02-DFA0A04FC94B}">
-                <ma14:wrappingTextBoxFlag xmlns="" xmlns:m="http://schemas.openxmlformats.org/officeDocument/2006/math" xmlns:a14="http://schemas.microsoft.com/office/drawing/2010/main" xmlns:ma14="http://schemas.microsoft.com/office/mac/drawingml/2011/main" val="1"/>
+                <ma14:wrappingTextBoxFlag xmlns:ma14="http://schemas.microsoft.com/office/mac/drawingml/2011/main" xmlns:a14="http://schemas.microsoft.com/office/drawing/2010/main" xmlns:m="http://schemas.openxmlformats.org/officeDocument/2006/math" xmlns="" val="1"/>
               </a:ext>
             </a:extLst>
           </p:spPr>
@@ -8690,7 +8690,7 @@
             </a:effectLst>
             <a:extLst>
               <a:ext uri="{C572A759-6A51-4108-AA02-DFA0A04FC94B}">
-                <ma14:wrappingTextBoxFlag xmlns="" xmlns:m="http://schemas.openxmlformats.org/officeDocument/2006/math" xmlns:a14="http://schemas.microsoft.com/office/drawing/2010/main" xmlns:ma14="http://schemas.microsoft.com/office/mac/drawingml/2011/main" val="1"/>
+                <ma14:wrappingTextBoxFlag xmlns:ma14="http://schemas.microsoft.com/office/mac/drawingml/2011/main" xmlns:a14="http://schemas.microsoft.com/office/drawing/2010/main" xmlns:m="http://schemas.openxmlformats.org/officeDocument/2006/math" xmlns="" val="1"/>
               </a:ext>
             </a:extLst>
           </p:spPr>
@@ -8764,7 +8764,7 @@
           </a:effectLst>
           <a:extLst>
             <a:ext uri="{C572A759-6A51-4108-AA02-DFA0A04FC94B}">
-              <ma14:wrappingTextBoxFlag xmlns="" xmlns:m="http://schemas.openxmlformats.org/officeDocument/2006/math" xmlns:a14="http://schemas.microsoft.com/office/drawing/2010/main" xmlns:ma14="http://schemas.microsoft.com/office/mac/drawingml/2011/main" val="1"/>
+              <ma14:wrappingTextBoxFlag xmlns:ma14="http://schemas.microsoft.com/office/mac/drawingml/2011/main" xmlns:a14="http://schemas.microsoft.com/office/drawing/2010/main" xmlns:m="http://schemas.openxmlformats.org/officeDocument/2006/math" xmlns="" val="1"/>
             </a:ext>
           </a:extLst>
         </p:spPr>
@@ -8826,7 +8826,7 @@
           </a:effectLst>
           <a:extLst>
             <a:ext uri="{C572A759-6A51-4108-AA02-DFA0A04FC94B}">
-              <ma14:wrappingTextBoxFlag xmlns="" xmlns:m="http://schemas.openxmlformats.org/officeDocument/2006/math" xmlns:a14="http://schemas.microsoft.com/office/drawing/2010/main" xmlns:ma14="http://schemas.microsoft.com/office/mac/drawingml/2011/main" val="1"/>
+              <ma14:wrappingTextBoxFlag xmlns:ma14="http://schemas.microsoft.com/office/mac/drawingml/2011/main" xmlns:a14="http://schemas.microsoft.com/office/drawing/2010/main" xmlns:m="http://schemas.openxmlformats.org/officeDocument/2006/math" xmlns="" val="1"/>
             </a:ext>
           </a:extLst>
         </p:spPr>
@@ -9019,7 +9019,7 @@
           </a:effectLst>
           <a:extLst>
             <a:ext uri="{C572A759-6A51-4108-AA02-DFA0A04FC94B}">
-              <ma14:wrappingTextBoxFlag xmlns="" xmlns:m="http://schemas.openxmlformats.org/officeDocument/2006/math" xmlns:a14="http://schemas.microsoft.com/office/drawing/2010/main" xmlns:ma14="http://schemas.microsoft.com/office/mac/drawingml/2011/main" val="1"/>
+              <ma14:wrappingTextBoxFlag xmlns:ma14="http://schemas.microsoft.com/office/mac/drawingml/2011/main" xmlns:a14="http://schemas.microsoft.com/office/drawing/2010/main" xmlns:m="http://schemas.openxmlformats.org/officeDocument/2006/math" xmlns="" val="1"/>
             </a:ext>
           </a:extLst>
         </p:spPr>
@@ -9081,7 +9081,7 @@
           </a:effectLst>
           <a:extLst>
             <a:ext uri="{C572A759-6A51-4108-AA02-DFA0A04FC94B}">
-              <ma14:wrappingTextBoxFlag xmlns="" xmlns:m="http://schemas.openxmlformats.org/officeDocument/2006/math" xmlns:a14="http://schemas.microsoft.com/office/drawing/2010/main" xmlns:ma14="http://schemas.microsoft.com/office/mac/drawingml/2011/main" val="1"/>
+              <ma14:wrappingTextBoxFlag xmlns:ma14="http://schemas.microsoft.com/office/mac/drawingml/2011/main" xmlns:a14="http://schemas.microsoft.com/office/drawing/2010/main" xmlns:m="http://schemas.openxmlformats.org/officeDocument/2006/math" xmlns="" val="1"/>
             </a:ext>
           </a:extLst>
         </p:spPr>
@@ -9145,7 +9145,7 @@
           </a:effectLst>
           <a:extLst>
             <a:ext uri="{C572A759-6A51-4108-AA02-DFA0A04FC94B}">
-              <ma14:wrappingTextBoxFlag xmlns="" xmlns:m="http://schemas.openxmlformats.org/officeDocument/2006/math" xmlns:a14="http://schemas.microsoft.com/office/drawing/2010/main" xmlns:ma14="http://schemas.microsoft.com/office/mac/drawingml/2011/main" val="1"/>
+              <ma14:wrappingTextBoxFlag xmlns:ma14="http://schemas.microsoft.com/office/mac/drawingml/2011/main" xmlns:a14="http://schemas.microsoft.com/office/drawing/2010/main" xmlns:m="http://schemas.openxmlformats.org/officeDocument/2006/math" xmlns="" val="1"/>
             </a:ext>
           </a:extLst>
         </p:spPr>
@@ -9215,7 +9215,7 @@
           </a:effectLst>
           <a:extLst>
             <a:ext uri="{C572A759-6A51-4108-AA02-DFA0A04FC94B}">
-              <ma14:wrappingTextBoxFlag xmlns="" xmlns:m="http://schemas.openxmlformats.org/officeDocument/2006/math" xmlns:a14="http://schemas.microsoft.com/office/drawing/2010/main" xmlns:ma14="http://schemas.microsoft.com/office/mac/drawingml/2011/main" val="1"/>
+              <ma14:wrappingTextBoxFlag xmlns:ma14="http://schemas.microsoft.com/office/mac/drawingml/2011/main" xmlns:a14="http://schemas.microsoft.com/office/drawing/2010/main" xmlns:m="http://schemas.openxmlformats.org/officeDocument/2006/math" xmlns="" val="1"/>
             </a:ext>
           </a:extLst>
         </p:spPr>
@@ -9285,7 +9285,7 @@
           </a:effectLst>
           <a:extLst>
             <a:ext uri="{C572A759-6A51-4108-AA02-DFA0A04FC94B}">
-              <ma14:wrappingTextBoxFlag xmlns="" xmlns:m="http://schemas.openxmlformats.org/officeDocument/2006/math" xmlns:a14="http://schemas.microsoft.com/office/drawing/2010/main" xmlns:ma14="http://schemas.microsoft.com/office/mac/drawingml/2011/main" val="1"/>
+              <ma14:wrappingTextBoxFlag xmlns:ma14="http://schemas.microsoft.com/office/mac/drawingml/2011/main" xmlns:a14="http://schemas.microsoft.com/office/drawing/2010/main" xmlns:m="http://schemas.openxmlformats.org/officeDocument/2006/math" xmlns="" val="1"/>
             </a:ext>
           </a:extLst>
         </p:spPr>
@@ -9355,7 +9355,7 @@
           </a:effectLst>
           <a:extLst>
             <a:ext uri="{C572A759-6A51-4108-AA02-DFA0A04FC94B}">
-              <ma14:wrappingTextBoxFlag xmlns="" xmlns:m="http://schemas.openxmlformats.org/officeDocument/2006/math" xmlns:a14="http://schemas.microsoft.com/office/drawing/2010/main" xmlns:ma14="http://schemas.microsoft.com/office/mac/drawingml/2011/main" val="1"/>
+              <ma14:wrappingTextBoxFlag xmlns:ma14="http://schemas.microsoft.com/office/mac/drawingml/2011/main" xmlns:a14="http://schemas.microsoft.com/office/drawing/2010/main" xmlns:m="http://schemas.openxmlformats.org/officeDocument/2006/math" xmlns="" val="1"/>
             </a:ext>
           </a:extLst>
         </p:spPr>
@@ -9425,7 +9425,7 @@
           </a:effectLst>
           <a:extLst>
             <a:ext uri="{C572A759-6A51-4108-AA02-DFA0A04FC94B}">
-              <ma14:wrappingTextBoxFlag xmlns="" xmlns:m="http://schemas.openxmlformats.org/officeDocument/2006/math" xmlns:a14="http://schemas.microsoft.com/office/drawing/2010/main" xmlns:ma14="http://schemas.microsoft.com/office/mac/drawingml/2011/main" val="1"/>
+              <ma14:wrappingTextBoxFlag xmlns:ma14="http://schemas.microsoft.com/office/mac/drawingml/2011/main" xmlns:a14="http://schemas.microsoft.com/office/drawing/2010/main" xmlns:m="http://schemas.openxmlformats.org/officeDocument/2006/math" xmlns="" val="1"/>
             </a:ext>
           </a:extLst>
         </p:spPr>
@@ -9672,7 +9672,7 @@
           </a:effectLst>
           <a:extLst>
             <a:ext uri="{C572A759-6A51-4108-AA02-DFA0A04FC94B}">
-              <ma14:wrappingTextBoxFlag xmlns="" xmlns:m="http://schemas.openxmlformats.org/officeDocument/2006/math" xmlns:a14="http://schemas.microsoft.com/office/drawing/2010/main" xmlns:ma14="http://schemas.microsoft.com/office/mac/drawingml/2011/main" val="1"/>
+              <ma14:wrappingTextBoxFlag xmlns:ma14="http://schemas.microsoft.com/office/mac/drawingml/2011/main" xmlns:a14="http://schemas.microsoft.com/office/drawing/2010/main" xmlns:m="http://schemas.openxmlformats.org/officeDocument/2006/math" xmlns="" val="1"/>
             </a:ext>
           </a:extLst>
         </p:spPr>
@@ -9732,7 +9732,7 @@
           </a:effectLst>
           <a:extLst>
             <a:ext uri="{C572A759-6A51-4108-AA02-DFA0A04FC94B}">
-              <ma14:wrappingTextBoxFlag xmlns="" xmlns:m="http://schemas.openxmlformats.org/officeDocument/2006/math" xmlns:a14="http://schemas.microsoft.com/office/drawing/2010/main" xmlns:ma14="http://schemas.microsoft.com/office/mac/drawingml/2011/main" val="1"/>
+              <ma14:wrappingTextBoxFlag xmlns:ma14="http://schemas.microsoft.com/office/mac/drawingml/2011/main" xmlns:a14="http://schemas.microsoft.com/office/drawing/2010/main" xmlns:m="http://schemas.openxmlformats.org/officeDocument/2006/math" xmlns="" val="1"/>
             </a:ext>
           </a:extLst>
         </p:spPr>
@@ -9792,7 +9792,7 @@
           </a:effectLst>
           <a:extLst>
             <a:ext uri="{C572A759-6A51-4108-AA02-DFA0A04FC94B}">
-              <ma14:wrappingTextBoxFlag xmlns="" xmlns:m="http://schemas.openxmlformats.org/officeDocument/2006/math" xmlns:a14="http://schemas.microsoft.com/office/drawing/2010/main" xmlns:ma14="http://schemas.microsoft.com/office/mac/drawingml/2011/main" val="1"/>
+              <ma14:wrappingTextBoxFlag xmlns:ma14="http://schemas.microsoft.com/office/mac/drawingml/2011/main" xmlns:a14="http://schemas.microsoft.com/office/drawing/2010/main" xmlns:m="http://schemas.openxmlformats.org/officeDocument/2006/math" xmlns="" val="1"/>
             </a:ext>
           </a:extLst>
         </p:spPr>
@@ -9836,7 +9836,7 @@
     <p:bg>
       <p:bgPr>
         <a:solidFill>
-          <a:srgbClr val="7F7F7F"/>
+          <a:srgbClr val="17242F"/>
         </a:solidFill>
         <a:effectLst/>
       </p:bgPr>
@@ -9896,7 +9896,7 @@
           </a:effectLst>
           <a:extLst>
             <a:ext uri="{C572A759-6A51-4108-AA02-DFA0A04FC94B}">
-              <ma14:wrappingTextBoxFlag xmlns="" xmlns:m="http://schemas.openxmlformats.org/officeDocument/2006/math" xmlns:a14="http://schemas.microsoft.com/office/drawing/2010/main" xmlns:ma14="http://schemas.microsoft.com/office/mac/drawingml/2011/main" val="1"/>
+              <ma14:wrappingTextBoxFlag xmlns:ma14="http://schemas.microsoft.com/office/mac/drawingml/2011/main" xmlns:a14="http://schemas.microsoft.com/office/drawing/2010/main" xmlns:m="http://schemas.openxmlformats.org/officeDocument/2006/math" xmlns="" val="1"/>
             </a:ext>
           </a:extLst>
         </p:spPr>
@@ -9957,7 +9957,7 @@
           </a:effectLst>
           <a:extLst>
             <a:ext uri="{C572A759-6A51-4108-AA02-DFA0A04FC94B}">
-              <ma14:wrappingTextBoxFlag xmlns="" xmlns:m="http://schemas.openxmlformats.org/officeDocument/2006/math" xmlns:a14="http://schemas.microsoft.com/office/drawing/2010/main" xmlns:ma14="http://schemas.microsoft.com/office/mac/drawingml/2011/main" val="1"/>
+              <ma14:wrappingTextBoxFlag xmlns:ma14="http://schemas.microsoft.com/office/mac/drawingml/2011/main" xmlns:a14="http://schemas.microsoft.com/office/drawing/2010/main" xmlns:m="http://schemas.openxmlformats.org/officeDocument/2006/math" xmlns="" val="1"/>
             </a:ext>
           </a:extLst>
         </p:spPr>
@@ -10032,7 +10032,7 @@
           </a:effectLst>
           <a:extLst>
             <a:ext uri="{C572A759-6A51-4108-AA02-DFA0A04FC94B}">
-              <ma14:wrappingTextBoxFlag xmlns="" xmlns:m="http://schemas.openxmlformats.org/officeDocument/2006/math" xmlns:a14="http://schemas.microsoft.com/office/drawing/2010/main" xmlns:ma14="http://schemas.microsoft.com/office/mac/drawingml/2011/main" val="1"/>
+              <ma14:wrappingTextBoxFlag xmlns:ma14="http://schemas.microsoft.com/office/mac/drawingml/2011/main" xmlns:a14="http://schemas.microsoft.com/office/drawing/2010/main" xmlns:m="http://schemas.openxmlformats.org/officeDocument/2006/math" xmlns="" val="1"/>
             </a:ext>
           </a:extLst>
         </p:spPr>
@@ -10083,6 +10083,83 @@
         <p:spPr>
           <a:xfrm>
             <a:off x="8251547" y="2085203"/>
+            <a:ext cx="1169204" cy="442356"/>
+          </a:xfrm>
+          <a:prstGeom prst="roundRect">
+            <a:avLst/>
+          </a:prstGeom>
+          <a:solidFill>
+            <a:srgbClr val="175154"/>
+          </a:solidFill>
+          <a:ln w="19050" cap="flat">
+            <a:solidFill>
+              <a:schemeClr val="tx2">
+                <a:lumMod val="60000"/>
+                <a:lumOff val="40000"/>
+              </a:schemeClr>
+            </a:solidFill>
+            <a:miter lim="400000"/>
+          </a:ln>
+          <a:effectLst>
+            <a:outerShdw blurRad="38100" dist="25400" dir="5400000" rotWithShape="0">
+              <a:srgbClr val="000000">
+                <a:alpha val="50000"/>
+              </a:srgbClr>
+            </a:outerShdw>
+          </a:effectLst>
+          <a:extLst>
+            <a:ext uri="{C572A759-6A51-4108-AA02-DFA0A04FC94B}">
+              <ma14:wrappingTextBoxFlag xmlns:ma14="http://schemas.microsoft.com/office/mac/drawingml/2011/main" xmlns:a14="http://schemas.microsoft.com/office/drawing/2010/main" xmlns:m="http://schemas.openxmlformats.org/officeDocument/2006/math" xmlns="" val="1"/>
+            </a:ext>
+          </a:extLst>
+        </p:spPr>
+        <p:txBody>
+          <a:bodyPr wrap="square" lIns="50800" tIns="50800" rIns="50800" bIns="50800" numCol="1" anchor="ctr">
+            <a:noAutofit/>
+          </a:bodyPr>
+          <a:lstStyle>
+            <a:lvl1pPr>
+              <a:defRPr b="0">
+                <a:solidFill>
+                  <a:srgbClr val="FFFFFF"/>
+                </a:solidFill>
+                <a:latin typeface="Helvetica Light"/>
+                <a:ea typeface="Helvetica Light"/>
+                <a:cs typeface="Helvetica Light"/>
+                <a:sym typeface="Helvetica Light"/>
+              </a:defRPr>
+            </a:lvl1pPr>
+          </a:lstStyle>
+          <a:p>
+            <a:r>
+              <a:rPr lang="en-US" dirty="0">
+                <a:latin typeface="微软雅黑" panose="020B0503020204020204" pitchFamily="34" charset="-122"/>
+                <a:ea typeface="微软雅黑" panose="020B0503020204020204" pitchFamily="34" charset="-122"/>
+              </a:rPr>
+              <a:t>nacos</a:t>
+            </a:r>
+            <a:endParaRPr dirty="0">
+              <a:latin typeface="微软雅黑" panose="020B0503020204020204" pitchFamily="34" charset="-122"/>
+              <a:ea typeface="微软雅黑" panose="020B0503020204020204" pitchFamily="34" charset="-122"/>
+            </a:endParaRPr>
+          </a:p>
+        </p:txBody>
+      </p:sp>
+      <p:sp>
+        <p:nvSpPr>
+          <p:cNvPr id="19" name="zk">
+            <a:extLst>
+              <a:ext uri="{FF2B5EF4-FFF2-40B4-BE49-F238E27FC236}">
+                <a16:creationId xmlns:a16="http://schemas.microsoft.com/office/drawing/2014/main" id="{EFC4C370-BC9C-4DBD-9B64-F6E6E30422AE}"/>
+              </a:ext>
+            </a:extLst>
+          </p:cNvPr>
+          <p:cNvSpPr/>
+          <p:nvPr/>
+        </p:nvSpPr>
+        <p:spPr>
+          <a:xfrm>
+            <a:off x="6421942" y="2085203"/>
             <a:ext cx="1169204" cy="442356"/>
           </a:xfrm>
           <a:prstGeom prst="roundRect">
@@ -10107,7 +10184,7 @@
           </a:effectLst>
           <a:extLst>
             <a:ext uri="{C572A759-6A51-4108-AA02-DFA0A04FC94B}">
-              <ma14:wrappingTextBoxFlag xmlns="" xmlns:m="http://schemas.openxmlformats.org/officeDocument/2006/math" xmlns:a14="http://schemas.microsoft.com/office/drawing/2010/main" xmlns:ma14="http://schemas.microsoft.com/office/mac/drawingml/2011/main" val="1"/>
+              <ma14:wrappingTextBoxFlag xmlns:ma14="http://schemas.microsoft.com/office/mac/drawingml/2011/main" xmlns:a14="http://schemas.microsoft.com/office/drawing/2010/main" xmlns:m="http://schemas.openxmlformats.org/officeDocument/2006/math" xmlns="" val="1"/>
             </a:ext>
           </a:extLst>
         </p:spPr>
@@ -10130,11 +10207,11 @@
           </a:lstStyle>
           <a:p>
             <a:r>
-              <a:rPr lang="en-US" dirty="0">
+              <a:rPr lang="en-US" altLang="zh-CN" dirty="0">
                 <a:latin typeface="微软雅黑" panose="020B0503020204020204" pitchFamily="34" charset="-122"/>
                 <a:ea typeface="微软雅黑" panose="020B0503020204020204" pitchFamily="34" charset="-122"/>
               </a:rPr>
-              <a:t>nacos</a:t>
+              <a:t>etcd</a:t>
             </a:r>
             <a:endParaRPr dirty="0">
               <a:latin typeface="微软雅黑" panose="020B0503020204020204" pitchFamily="34" charset="-122"/>
@@ -10145,10 +10222,10 @@
       </p:sp>
       <p:sp>
         <p:nvSpPr>
-          <p:cNvPr id="19" name="zk">
+          <p:cNvPr id="20" name="Registries">
             <a:extLst>
               <a:ext uri="{FF2B5EF4-FFF2-40B4-BE49-F238E27FC236}">
-                <a16:creationId xmlns:a16="http://schemas.microsoft.com/office/drawing/2014/main" id="{EFC4C370-BC9C-4DBD-9B64-F6E6E30422AE}"/>
+                <a16:creationId xmlns:a16="http://schemas.microsoft.com/office/drawing/2014/main" id="{9D0FEC0B-B783-4711-A7C9-A42C73F4A52A}"/>
               </a:ext>
             </a:extLst>
           </p:cNvPr>
@@ -10157,7 +10234,69 @@
         </p:nvSpPr>
         <p:spPr>
           <a:xfrm>
-            <a:off x="6421942" y="2085203"/>
+            <a:off x="3154714" y="6779311"/>
+            <a:ext cx="11331307" cy="940948"/>
+          </a:xfrm>
+          <a:prstGeom prst="roundRect">
+            <a:avLst>
+              <a:gd name="adj" fmla="val 7483"/>
+            </a:avLst>
+          </a:prstGeom>
+          <a:noFill/>
+          <a:ln w="12700" cap="flat">
+            <a:solidFill>
+              <a:schemeClr val="tx2">
+                <a:lumMod val="75000"/>
+              </a:schemeClr>
+            </a:solidFill>
+            <a:prstDash val="dashDot"/>
+            <a:miter lim="400000"/>
+          </a:ln>
+          <a:effectLst>
+            <a:outerShdw blurRad="38100" dist="25400" dir="5400000" rotWithShape="0">
+              <a:srgbClr val="000000">
+                <a:alpha val="50000"/>
+              </a:srgbClr>
+            </a:outerShdw>
+          </a:effectLst>
+          <a:extLst>
+            <a:ext uri="{C572A759-6A51-4108-AA02-DFA0A04FC94B}">
+              <ma14:wrappingTextBoxFlag xmlns:ma14="http://schemas.microsoft.com/office/mac/drawingml/2011/main" xmlns:a14="http://schemas.microsoft.com/office/drawing/2010/main" xmlns:m="http://schemas.openxmlformats.org/officeDocument/2006/math" xmlns="" val="1"/>
+            </a:ext>
+          </a:extLst>
+        </p:spPr>
+        <p:txBody>
+          <a:bodyPr wrap="square" lIns="50800" tIns="50800" rIns="50800" bIns="50800" numCol="1" anchor="t">
+            <a:noAutofit/>
+          </a:bodyPr>
+          <a:lstStyle/>
+          <a:p>
+            <a:pPr algn="r"/>
+            <a:endParaRPr dirty="0">
+              <a:solidFill>
+                <a:schemeClr val="tx1"/>
+              </a:solidFill>
+              <a:latin typeface="微软雅黑" panose="020B0503020204020204" pitchFamily="34" charset="-122"/>
+              <a:ea typeface="微软雅黑" panose="020B0503020204020204" pitchFamily="34" charset="-122"/>
+            </a:endParaRPr>
+          </a:p>
+        </p:txBody>
+      </p:sp>
+      <p:sp>
+        <p:nvSpPr>
+          <p:cNvPr id="22" name="zk">
+            <a:extLst>
+              <a:ext uri="{FF2B5EF4-FFF2-40B4-BE49-F238E27FC236}">
+                <a16:creationId xmlns:a16="http://schemas.microsoft.com/office/drawing/2014/main" id="{8ADFB8E2-B14D-4106-939A-1D54D0D64136}"/>
+              </a:ext>
+            </a:extLst>
+          </p:cNvPr>
+          <p:cNvSpPr/>
+          <p:nvPr/>
+        </p:nvSpPr>
+        <p:spPr>
+          <a:xfrm>
+            <a:off x="6146851" y="7026166"/>
             <a:ext cx="1169204" cy="442356"/>
           </a:xfrm>
           <a:prstGeom prst="roundRect">
@@ -10182,7 +10321,7 @@
           </a:effectLst>
           <a:extLst>
             <a:ext uri="{C572A759-6A51-4108-AA02-DFA0A04FC94B}">
-              <ma14:wrappingTextBoxFlag xmlns="" xmlns:m="http://schemas.openxmlformats.org/officeDocument/2006/math" xmlns:a14="http://schemas.microsoft.com/office/drawing/2010/main" xmlns:ma14="http://schemas.microsoft.com/office/mac/drawingml/2011/main" val="1"/>
+              <ma14:wrappingTextBoxFlag xmlns:ma14="http://schemas.microsoft.com/office/mac/drawingml/2011/main" xmlns:a14="http://schemas.microsoft.com/office/drawing/2010/main" xmlns:m="http://schemas.openxmlformats.org/officeDocument/2006/math" xmlns="" val="1"/>
             </a:ext>
           </a:extLst>
         </p:spPr>
@@ -10209,7 +10348,7 @@
                 <a:latin typeface="微软雅黑" panose="020B0503020204020204" pitchFamily="34" charset="-122"/>
                 <a:ea typeface="微软雅黑" panose="020B0503020204020204" pitchFamily="34" charset="-122"/>
               </a:rPr>
-              <a:t>etcd</a:t>
+              <a:t>ZK</a:t>
             </a:r>
             <a:endParaRPr dirty="0">
               <a:latin typeface="微软雅黑" panose="020B0503020204020204" pitchFamily="34" charset="-122"/>
@@ -10220,10 +10359,10 @@
       </p:sp>
       <p:sp>
         <p:nvSpPr>
-          <p:cNvPr id="20" name="Registries">
+          <p:cNvPr id="25" name="zk">
             <a:extLst>
               <a:ext uri="{FF2B5EF4-FFF2-40B4-BE49-F238E27FC236}">
-                <a16:creationId xmlns:a16="http://schemas.microsoft.com/office/drawing/2014/main" id="{9D0FEC0B-B783-4711-A7C9-A42C73F4A52A}"/>
+                <a16:creationId xmlns:a16="http://schemas.microsoft.com/office/drawing/2014/main" id="{1E652752-74F1-4163-8CD9-ED5EDE803748}"/>
               </a:ext>
             </a:extLst>
           </p:cNvPr>
@@ -10232,69 +10371,7 @@
         </p:nvSpPr>
         <p:spPr>
           <a:xfrm>
-            <a:off x="3154714" y="6779311"/>
-            <a:ext cx="11331307" cy="940948"/>
-          </a:xfrm>
-          <a:prstGeom prst="roundRect">
-            <a:avLst>
-              <a:gd name="adj" fmla="val 7483"/>
-            </a:avLst>
-          </a:prstGeom>
-          <a:noFill/>
-          <a:ln w="12700" cap="flat">
-            <a:solidFill>
-              <a:schemeClr val="tx2">
-                <a:lumMod val="75000"/>
-              </a:schemeClr>
-            </a:solidFill>
-            <a:prstDash val="dashDot"/>
-            <a:miter lim="400000"/>
-          </a:ln>
-          <a:effectLst>
-            <a:outerShdw blurRad="38100" dist="25400" dir="5400000" rotWithShape="0">
-              <a:srgbClr val="000000">
-                <a:alpha val="50000"/>
-              </a:srgbClr>
-            </a:outerShdw>
-          </a:effectLst>
-          <a:extLst>
-            <a:ext uri="{C572A759-6A51-4108-AA02-DFA0A04FC94B}">
-              <ma14:wrappingTextBoxFlag xmlns="" xmlns:m="http://schemas.openxmlformats.org/officeDocument/2006/math" xmlns:a14="http://schemas.microsoft.com/office/drawing/2010/main" xmlns:ma14="http://schemas.microsoft.com/office/mac/drawingml/2011/main" val="1"/>
-            </a:ext>
-          </a:extLst>
-        </p:spPr>
-        <p:txBody>
-          <a:bodyPr wrap="square" lIns="50800" tIns="50800" rIns="50800" bIns="50800" numCol="1" anchor="t">
-            <a:noAutofit/>
-          </a:bodyPr>
-          <a:lstStyle/>
-          <a:p>
-            <a:pPr algn="r"/>
-            <a:endParaRPr dirty="0">
-              <a:solidFill>
-                <a:schemeClr val="tx1"/>
-              </a:solidFill>
-              <a:latin typeface="微软雅黑" panose="020B0503020204020204" pitchFamily="34" charset="-122"/>
-              <a:ea typeface="微软雅黑" panose="020B0503020204020204" pitchFamily="34" charset="-122"/>
-            </a:endParaRPr>
-          </a:p>
-        </p:txBody>
-      </p:sp>
-      <p:sp>
-        <p:nvSpPr>
-          <p:cNvPr id="22" name="zk">
-            <a:extLst>
-              <a:ext uri="{FF2B5EF4-FFF2-40B4-BE49-F238E27FC236}">
-                <a16:creationId xmlns:a16="http://schemas.microsoft.com/office/drawing/2014/main" id="{8ADFB8E2-B14D-4106-939A-1D54D0D64136}"/>
-              </a:ext>
-            </a:extLst>
-          </p:cNvPr>
-          <p:cNvSpPr/>
-          <p:nvPr/>
-        </p:nvSpPr>
-        <p:spPr>
-          <a:xfrm>
-            <a:off x="6146851" y="7026166"/>
+            <a:off x="7994752" y="7026166"/>
             <a:ext cx="1169204" cy="442356"/>
           </a:xfrm>
           <a:prstGeom prst="roundRect">
@@ -10319,82 +10396,7 @@
           </a:effectLst>
           <a:extLst>
             <a:ext uri="{C572A759-6A51-4108-AA02-DFA0A04FC94B}">
-              <ma14:wrappingTextBoxFlag xmlns="" xmlns:m="http://schemas.openxmlformats.org/officeDocument/2006/math" xmlns:a14="http://schemas.microsoft.com/office/drawing/2010/main" xmlns:ma14="http://schemas.microsoft.com/office/mac/drawingml/2011/main" val="1"/>
-            </a:ext>
-          </a:extLst>
-        </p:spPr>
-        <p:txBody>
-          <a:bodyPr wrap="square" lIns="50800" tIns="50800" rIns="50800" bIns="50800" numCol="1" anchor="ctr">
-            <a:noAutofit/>
-          </a:bodyPr>
-          <a:lstStyle>
-            <a:lvl1pPr>
-              <a:defRPr b="0">
-                <a:solidFill>
-                  <a:srgbClr val="FFFFFF"/>
-                </a:solidFill>
-                <a:latin typeface="Helvetica Light"/>
-                <a:ea typeface="Helvetica Light"/>
-                <a:cs typeface="Helvetica Light"/>
-                <a:sym typeface="Helvetica Light"/>
-              </a:defRPr>
-            </a:lvl1pPr>
-          </a:lstStyle>
-          <a:p>
-            <a:r>
-              <a:rPr lang="en-US" altLang="zh-CN" dirty="0">
-                <a:latin typeface="微软雅黑" panose="020B0503020204020204" pitchFamily="34" charset="-122"/>
-                <a:ea typeface="微软雅黑" panose="020B0503020204020204" pitchFamily="34" charset="-122"/>
-              </a:rPr>
-              <a:t>ZK</a:t>
-            </a:r>
-            <a:endParaRPr dirty="0">
-              <a:latin typeface="微软雅黑" panose="020B0503020204020204" pitchFamily="34" charset="-122"/>
-              <a:ea typeface="微软雅黑" panose="020B0503020204020204" pitchFamily="34" charset="-122"/>
-            </a:endParaRPr>
-          </a:p>
-        </p:txBody>
-      </p:sp>
-      <p:sp>
-        <p:nvSpPr>
-          <p:cNvPr id="25" name="zk">
-            <a:extLst>
-              <a:ext uri="{FF2B5EF4-FFF2-40B4-BE49-F238E27FC236}">
-                <a16:creationId xmlns:a16="http://schemas.microsoft.com/office/drawing/2014/main" id="{1E652752-74F1-4163-8CD9-ED5EDE803748}"/>
-              </a:ext>
-            </a:extLst>
-          </p:cNvPr>
-          <p:cNvSpPr/>
-          <p:nvPr/>
-        </p:nvSpPr>
-        <p:spPr>
-          <a:xfrm>
-            <a:off x="7994752" y="7026166"/>
-            <a:ext cx="1169204" cy="442356"/>
-          </a:xfrm>
-          <a:prstGeom prst="roundRect">
-            <a:avLst/>
-          </a:prstGeom>
-          <a:noFill/>
-          <a:ln w="19050" cap="flat">
-            <a:solidFill>
-              <a:schemeClr val="tx2">
-                <a:lumMod val="60000"/>
-                <a:lumOff val="40000"/>
-              </a:schemeClr>
-            </a:solidFill>
-            <a:miter lim="400000"/>
-          </a:ln>
-          <a:effectLst>
-            <a:outerShdw blurRad="38100" dist="25400" dir="5400000" rotWithShape="0">
-              <a:srgbClr val="000000">
-                <a:alpha val="50000"/>
-              </a:srgbClr>
-            </a:outerShdw>
-          </a:effectLst>
-          <a:extLst>
-            <a:ext uri="{C572A759-6A51-4108-AA02-DFA0A04FC94B}">
-              <ma14:wrappingTextBoxFlag xmlns="" xmlns:m="http://schemas.openxmlformats.org/officeDocument/2006/math" xmlns:a14="http://schemas.microsoft.com/office/drawing/2010/main" xmlns:ma14="http://schemas.microsoft.com/office/mac/drawingml/2011/main" val="1"/>
+              <ma14:wrappingTextBoxFlag xmlns:ma14="http://schemas.microsoft.com/office/mac/drawingml/2011/main" xmlns:a14="http://schemas.microsoft.com/office/drawing/2010/main" xmlns:m="http://schemas.openxmlformats.org/officeDocument/2006/math" xmlns="" val="1"/>
             </a:ext>
           </a:extLst>
         </p:spPr>
@@ -10945,7 +10947,7 @@
           </a:effectLst>
           <a:extLst>
             <a:ext uri="{C572A759-6A51-4108-AA02-DFA0A04FC94B}">
-              <ma14:wrappingTextBoxFlag xmlns="" xmlns:m="http://schemas.openxmlformats.org/officeDocument/2006/math" xmlns:a14="http://schemas.microsoft.com/office/drawing/2010/main" xmlns:ma14="http://schemas.microsoft.com/office/mac/drawingml/2011/main" val="1"/>
+              <ma14:wrappingTextBoxFlag xmlns:ma14="http://schemas.microsoft.com/office/mac/drawingml/2011/main" xmlns:a14="http://schemas.microsoft.com/office/drawing/2010/main" xmlns:m="http://schemas.openxmlformats.org/officeDocument/2006/math" xmlns="" val="1"/>
             </a:ext>
           </a:extLst>
         </p:spPr>
@@ -11005,7 +11007,7 @@
           </a:effectLst>
           <a:extLst>
             <a:ext uri="{C572A759-6A51-4108-AA02-DFA0A04FC94B}">
-              <ma14:wrappingTextBoxFlag xmlns="" xmlns:m="http://schemas.openxmlformats.org/officeDocument/2006/math" xmlns:a14="http://schemas.microsoft.com/office/drawing/2010/main" xmlns:ma14="http://schemas.microsoft.com/office/mac/drawingml/2011/main" val="1"/>
+              <ma14:wrappingTextBoxFlag xmlns:ma14="http://schemas.microsoft.com/office/mac/drawingml/2011/main" xmlns:a14="http://schemas.microsoft.com/office/drawing/2010/main" xmlns:m="http://schemas.openxmlformats.org/officeDocument/2006/math" xmlns="" val="1"/>
             </a:ext>
           </a:extLst>
         </p:spPr>
@@ -11080,7 +11082,7 @@
           </a:effectLst>
           <a:extLst>
             <a:ext uri="{C572A759-6A51-4108-AA02-DFA0A04FC94B}">
-              <ma14:wrappingTextBoxFlag xmlns="" xmlns:m="http://schemas.openxmlformats.org/officeDocument/2006/math" xmlns:a14="http://schemas.microsoft.com/office/drawing/2010/main" xmlns:ma14="http://schemas.microsoft.com/office/mac/drawingml/2011/main" val="1"/>
+              <ma14:wrappingTextBoxFlag xmlns:ma14="http://schemas.microsoft.com/office/mac/drawingml/2011/main" xmlns:a14="http://schemas.microsoft.com/office/drawing/2010/main" xmlns:m="http://schemas.openxmlformats.org/officeDocument/2006/math" xmlns="" val="1"/>
             </a:ext>
           </a:extLst>
         </p:spPr>
@@ -11285,10 +11287,7 @@
             <a:avLst/>
           </a:prstGeom>
           <a:solidFill>
-            <a:schemeClr val="tx1">
-              <a:lumMod val="50000"/>
-              <a:lumOff val="50000"/>
-            </a:schemeClr>
+            <a:srgbClr val="2FA6AD"/>
           </a:solidFill>
           <a:ln w="19050" cap="flat">
             <a:solidFill>
@@ -11308,7 +11307,7 @@
           </a:effectLst>
           <a:extLst>
             <a:ext uri="{C572A759-6A51-4108-AA02-DFA0A04FC94B}">
-              <ma14:wrappingTextBoxFlag xmlns="" xmlns:m="http://schemas.openxmlformats.org/officeDocument/2006/math" xmlns:a14="http://schemas.microsoft.com/office/drawing/2010/main" xmlns:ma14="http://schemas.microsoft.com/office/mac/drawingml/2011/main" val="1"/>
+              <ma14:wrappingTextBoxFlag xmlns:ma14="http://schemas.microsoft.com/office/mac/drawingml/2011/main" xmlns:a14="http://schemas.microsoft.com/office/drawing/2010/main" xmlns:m="http://schemas.openxmlformats.org/officeDocument/2006/math" xmlns="" val="1"/>
             </a:ext>
           </a:extLst>
         </p:spPr>
@@ -11421,7 +11420,7 @@
           </a:effectLst>
           <a:extLst>
             <a:ext uri="{C572A759-6A51-4108-AA02-DFA0A04FC94B}">
-              <ma14:wrappingTextBoxFlag xmlns="" xmlns:m="http://schemas.openxmlformats.org/officeDocument/2006/math" xmlns:a14="http://schemas.microsoft.com/office/drawing/2010/main" xmlns:ma14="http://schemas.microsoft.com/office/mac/drawingml/2011/main" val="1"/>
+              <ma14:wrappingTextBoxFlag xmlns:ma14="http://schemas.microsoft.com/office/mac/drawingml/2011/main" xmlns:a14="http://schemas.microsoft.com/office/drawing/2010/main" xmlns:m="http://schemas.openxmlformats.org/officeDocument/2006/math" xmlns="" val="1"/>
             </a:ext>
           </a:extLst>
         </p:spPr>
@@ -11464,9 +11463,7 @@
             <a:avLst/>
           </a:prstGeom>
           <a:solidFill>
-            <a:schemeClr val="tx2">
-              <a:lumMod val="75000"/>
-            </a:schemeClr>
+            <a:srgbClr val="2FA6AD"/>
           </a:solidFill>
           <a:ln w="19050" cap="flat">
             <a:solidFill>
@@ -11486,7 +11483,7 @@
           </a:effectLst>
           <a:extLst>
             <a:ext uri="{C572A759-6A51-4108-AA02-DFA0A04FC94B}">
-              <ma14:wrappingTextBoxFlag xmlns="" xmlns:m="http://schemas.openxmlformats.org/officeDocument/2006/math" xmlns:a14="http://schemas.microsoft.com/office/drawing/2010/main" xmlns:ma14="http://schemas.microsoft.com/office/mac/drawingml/2011/main" val="1"/>
+              <ma14:wrappingTextBoxFlag xmlns:ma14="http://schemas.microsoft.com/office/mac/drawingml/2011/main" xmlns:a14="http://schemas.microsoft.com/office/drawing/2010/main" xmlns:m="http://schemas.openxmlformats.org/officeDocument/2006/math" xmlns="" val="1"/>
             </a:ext>
           </a:extLst>
         </p:spPr>
@@ -11509,7 +11506,7 @@
           </a:lstStyle>
           <a:p>
             <a:r>
-              <a:rPr lang="en-US" altLang="zh-CN" sz="1200" dirty="0">
+              <a:rPr lang="en-US" altLang="zh-CN" sz="1200" b="1" dirty="0">
                 <a:solidFill>
                   <a:schemeClr val="bg1"/>
                 </a:solidFill>
@@ -11518,7 +11515,7 @@
               </a:rPr>
               <a:t>failover</a:t>
             </a:r>
-            <a:endParaRPr sz="1200" dirty="0">
+            <a:endParaRPr sz="1200" b="1" dirty="0">
               <a:solidFill>
                 <a:schemeClr val="bg1"/>
               </a:solidFill>
@@ -11549,9 +11546,7 @@
             <a:avLst/>
           </a:prstGeom>
           <a:solidFill>
-            <a:schemeClr val="tx2">
-              <a:lumMod val="75000"/>
-            </a:schemeClr>
+            <a:srgbClr val="2FA6AD"/>
           </a:solidFill>
           <a:ln w="19050" cap="flat">
             <a:solidFill>
@@ -11571,7 +11566,7 @@
           </a:effectLst>
           <a:extLst>
             <a:ext uri="{C572A759-6A51-4108-AA02-DFA0A04FC94B}">
-              <ma14:wrappingTextBoxFlag xmlns="" xmlns:m="http://schemas.openxmlformats.org/officeDocument/2006/math" xmlns:a14="http://schemas.microsoft.com/office/drawing/2010/main" xmlns:ma14="http://schemas.microsoft.com/office/mac/drawingml/2011/main" val="1"/>
+              <ma14:wrappingTextBoxFlag xmlns:ma14="http://schemas.microsoft.com/office/mac/drawingml/2011/main" xmlns:a14="http://schemas.microsoft.com/office/drawing/2010/main" xmlns:m="http://schemas.openxmlformats.org/officeDocument/2006/math" xmlns="" val="1"/>
             </a:ext>
           </a:extLst>
         </p:spPr>
@@ -11594,7 +11589,7 @@
           </a:lstStyle>
           <a:p>
             <a:r>
-              <a:rPr lang="en-US" altLang="zh-CN" sz="1200" dirty="0">
+              <a:rPr lang="en-US" altLang="zh-CN" sz="1200" b="1" dirty="0">
                 <a:solidFill>
                   <a:schemeClr val="bg1"/>
                 </a:solidFill>
@@ -11603,7 +11598,7 @@
               </a:rPr>
               <a:t>failfast</a:t>
             </a:r>
-            <a:endParaRPr sz="1200" dirty="0">
+            <a:endParaRPr sz="1200" b="1" dirty="0">
               <a:solidFill>
                 <a:schemeClr val="bg1"/>
               </a:solidFill>
@@ -11634,9 +11629,7 @@
             <a:avLst/>
           </a:prstGeom>
           <a:solidFill>
-            <a:schemeClr val="tx2">
-              <a:lumMod val="75000"/>
-            </a:schemeClr>
+            <a:srgbClr val="2FA6AD"/>
           </a:solidFill>
           <a:ln w="19050" cap="flat">
             <a:solidFill>
@@ -11656,7 +11649,7 @@
           </a:effectLst>
           <a:extLst>
             <a:ext uri="{C572A759-6A51-4108-AA02-DFA0A04FC94B}">
-              <ma14:wrappingTextBoxFlag xmlns="" xmlns:m="http://schemas.openxmlformats.org/officeDocument/2006/math" xmlns:a14="http://schemas.microsoft.com/office/drawing/2010/main" xmlns:ma14="http://schemas.microsoft.com/office/mac/drawingml/2011/main" val="1"/>
+              <ma14:wrappingTextBoxFlag xmlns:ma14="http://schemas.microsoft.com/office/mac/drawingml/2011/main" xmlns:a14="http://schemas.microsoft.com/office/drawing/2010/main" xmlns:m="http://schemas.openxmlformats.org/officeDocument/2006/math" xmlns="" val="1"/>
             </a:ext>
           </a:extLst>
         </p:spPr>
@@ -11679,7 +11672,7 @@
           </a:lstStyle>
           <a:p>
             <a:r>
-              <a:rPr lang="en-US" altLang="zh-CN" sz="1200" dirty="0">
+              <a:rPr lang="en-US" altLang="zh-CN" sz="1200" b="1" dirty="0">
                 <a:solidFill>
                   <a:schemeClr val="bg1"/>
                 </a:solidFill>
@@ -11688,7 +11681,7 @@
               </a:rPr>
               <a:t>failsave</a:t>
             </a:r>
-            <a:endParaRPr sz="1200" dirty="0">
+            <a:endParaRPr sz="1200" b="1" dirty="0">
               <a:solidFill>
                 <a:schemeClr val="bg1"/>
               </a:solidFill>
@@ -11718,7 +11711,9 @@
           <a:prstGeom prst="roundRect">
             <a:avLst/>
           </a:prstGeom>
-          <a:noFill/>
+          <a:solidFill>
+            <a:srgbClr val="17242F"/>
+          </a:solidFill>
           <a:ln w="19050" cap="flat">
             <a:solidFill>
               <a:schemeClr val="tx2">
@@ -11737,7 +11732,7 @@
           </a:effectLst>
           <a:extLst>
             <a:ext uri="{C572A759-6A51-4108-AA02-DFA0A04FC94B}">
-              <ma14:wrappingTextBoxFlag xmlns="" xmlns:m="http://schemas.openxmlformats.org/officeDocument/2006/math" xmlns:a14="http://schemas.microsoft.com/office/drawing/2010/main" xmlns:ma14="http://schemas.microsoft.com/office/mac/drawingml/2011/main" val="1"/>
+              <ma14:wrappingTextBoxFlag xmlns:ma14="http://schemas.microsoft.com/office/mac/drawingml/2011/main" xmlns:a14="http://schemas.microsoft.com/office/drawing/2010/main" xmlns:m="http://schemas.openxmlformats.org/officeDocument/2006/math" xmlns="" val="1"/>
             </a:ext>
           </a:extLst>
         </p:spPr>
@@ -11799,7 +11794,9 @@
           <a:prstGeom prst="roundRect">
             <a:avLst/>
           </a:prstGeom>
-          <a:noFill/>
+          <a:solidFill>
+            <a:srgbClr val="165155"/>
+          </a:solidFill>
           <a:ln w="19050" cap="flat">
             <a:solidFill>
               <a:schemeClr val="tx2">
@@ -11818,7 +11815,7 @@
           </a:effectLst>
           <a:extLst>
             <a:ext uri="{C572A759-6A51-4108-AA02-DFA0A04FC94B}">
-              <ma14:wrappingTextBoxFlag xmlns="" xmlns:m="http://schemas.openxmlformats.org/officeDocument/2006/math" xmlns:a14="http://schemas.microsoft.com/office/drawing/2010/main" xmlns:ma14="http://schemas.microsoft.com/office/mac/drawingml/2011/main" val="1"/>
+              <ma14:wrappingTextBoxFlag xmlns:ma14="http://schemas.microsoft.com/office/mac/drawingml/2011/main" xmlns:a14="http://schemas.microsoft.com/office/drawing/2010/main" xmlns:m="http://schemas.openxmlformats.org/officeDocument/2006/math" xmlns="" val="1"/>
             </a:ext>
           </a:extLst>
         </p:spPr>
@@ -11895,7 +11892,7 @@
           </a:effectLst>
           <a:extLst>
             <a:ext uri="{C572A759-6A51-4108-AA02-DFA0A04FC94B}">
-              <ma14:wrappingTextBoxFlag xmlns="" xmlns:m="http://schemas.openxmlformats.org/officeDocument/2006/math" xmlns:a14="http://schemas.microsoft.com/office/drawing/2010/main" xmlns:ma14="http://schemas.microsoft.com/office/mac/drawingml/2011/main" val="1"/>
+              <ma14:wrappingTextBoxFlag xmlns:ma14="http://schemas.microsoft.com/office/mac/drawingml/2011/main" xmlns:a14="http://schemas.microsoft.com/office/drawing/2010/main" xmlns:m="http://schemas.openxmlformats.org/officeDocument/2006/math" xmlns="" val="1"/>
             </a:ext>
           </a:extLst>
         </p:spPr>
@@ -11938,9 +11935,7 @@
             <a:avLst/>
           </a:prstGeom>
           <a:solidFill>
-            <a:schemeClr val="tx2">
-              <a:lumMod val="75000"/>
-            </a:schemeClr>
+            <a:schemeClr val="tx1"/>
           </a:solidFill>
           <a:ln w="19050" cap="flat">
             <a:solidFill>
@@ -11960,7 +11955,7 @@
           </a:effectLst>
           <a:extLst>
             <a:ext uri="{C572A759-6A51-4108-AA02-DFA0A04FC94B}">
-              <ma14:wrappingTextBoxFlag xmlns="" xmlns:m="http://schemas.openxmlformats.org/officeDocument/2006/math" xmlns:a14="http://schemas.microsoft.com/office/drawing/2010/main" xmlns:ma14="http://schemas.microsoft.com/office/mac/drawingml/2011/main" val="1"/>
+              <ma14:wrappingTextBoxFlag xmlns:ma14="http://schemas.microsoft.com/office/mac/drawingml/2011/main" xmlns:a14="http://schemas.microsoft.com/office/drawing/2010/main" xmlns:m="http://schemas.openxmlformats.org/officeDocument/2006/math" xmlns="" val="1"/>
             </a:ext>
           </a:extLst>
         </p:spPr>
@@ -11983,16 +11978,16 @@
           </a:lstStyle>
           <a:p>
             <a:r>
-              <a:rPr lang="en-US" altLang="zh-CN" sz="1200" dirty="0">
+              <a:rPr lang="en-US" altLang="zh-CN" sz="1200" b="1" dirty="0">
                 <a:solidFill>
                   <a:schemeClr val="bg1"/>
                 </a:solidFill>
                 <a:latin typeface="微软雅黑" panose="020B0503020204020204" pitchFamily="34" charset="-122"/>
                 <a:ea typeface="微软雅黑" panose="020B0503020204020204" pitchFamily="34" charset="-122"/>
               </a:rPr>
-              <a:t>random</a:t>
+              <a:t>Random</a:t>
             </a:r>
-            <a:endParaRPr sz="1200" dirty="0">
+            <a:endParaRPr sz="1200" b="1" dirty="0">
               <a:solidFill>
                 <a:schemeClr val="bg1"/>
               </a:solidFill>
@@ -12023,9 +12018,7 @@
             <a:avLst/>
           </a:prstGeom>
           <a:solidFill>
-            <a:schemeClr val="tx2">
-              <a:lumMod val="75000"/>
-            </a:schemeClr>
+            <a:srgbClr val="2FA6AD"/>
           </a:solidFill>
           <a:ln w="19050" cap="flat">
             <a:solidFill>
@@ -12045,7 +12038,7 @@
           </a:effectLst>
           <a:extLst>
             <a:ext uri="{C572A759-6A51-4108-AA02-DFA0A04FC94B}">
-              <ma14:wrappingTextBoxFlag xmlns="" xmlns:m="http://schemas.openxmlformats.org/officeDocument/2006/math" xmlns:a14="http://schemas.microsoft.com/office/drawing/2010/main" xmlns:ma14="http://schemas.microsoft.com/office/mac/drawingml/2011/main" val="1"/>
+              <ma14:wrappingTextBoxFlag xmlns:ma14="http://schemas.microsoft.com/office/mac/drawingml/2011/main" xmlns:a14="http://schemas.microsoft.com/office/drawing/2010/main" xmlns:m="http://schemas.openxmlformats.org/officeDocument/2006/math" xmlns="" val="1"/>
             </a:ext>
           </a:extLst>
         </p:spPr>
@@ -12067,7 +12060,7 @@
             </a:lvl1pPr>
           </a:lstStyle>
           <a:p>
-            <a:endParaRPr lang="en-US" altLang="zh-CN" sz="1200" dirty="0">
+            <a:endParaRPr lang="en-US" altLang="zh-CN" sz="1200" b="1" dirty="0">
               <a:solidFill>
                 <a:schemeClr val="bg1"/>
               </a:solidFill>
@@ -12077,7 +12070,7 @@
           </a:p>
           <a:p>
             <a:r>
-              <a:rPr lang="en-US" altLang="zh-CN" sz="1200" dirty="0">
+              <a:rPr lang="en-US" altLang="zh-CN" sz="1200" b="1" dirty="0">
                 <a:solidFill>
                   <a:schemeClr val="bg1"/>
                 </a:solidFill>
@@ -12088,7 +12081,7 @@
             </a:r>
           </a:p>
           <a:p>
-            <a:endParaRPr sz="1200" dirty="0">
+            <a:endParaRPr sz="1200" b="1" dirty="0">
               <a:solidFill>
                 <a:schemeClr val="bg1"/>
               </a:solidFill>
@@ -12119,9 +12112,7 @@
             <a:avLst/>
           </a:prstGeom>
           <a:solidFill>
-            <a:schemeClr val="tx2">
-              <a:lumMod val="75000"/>
-            </a:schemeClr>
+            <a:schemeClr val="tx1"/>
           </a:solidFill>
           <a:ln w="19050" cap="flat">
             <a:solidFill>
@@ -12141,7 +12132,7 @@
           </a:effectLst>
           <a:extLst>
             <a:ext uri="{C572A759-6A51-4108-AA02-DFA0A04FC94B}">
-              <ma14:wrappingTextBoxFlag xmlns="" xmlns:m="http://schemas.openxmlformats.org/officeDocument/2006/math" xmlns:a14="http://schemas.microsoft.com/office/drawing/2010/main" xmlns:ma14="http://schemas.microsoft.com/office/mac/drawingml/2011/main" val="1"/>
+              <ma14:wrappingTextBoxFlag xmlns:ma14="http://schemas.microsoft.com/office/mac/drawingml/2011/main" xmlns:a14="http://schemas.microsoft.com/office/drawing/2010/main" xmlns:m="http://schemas.openxmlformats.org/officeDocument/2006/math" xmlns="" val="1"/>
             </a:ext>
           </a:extLst>
         </p:spPr>
@@ -12164,7 +12155,7 @@
           </a:lstStyle>
           <a:p>
             <a:r>
-              <a:rPr lang="en-US" altLang="zh-CN" sz="1200" dirty="0">
+              <a:rPr lang="en-US" altLang="zh-CN" sz="1200" b="1" dirty="0">
                 <a:solidFill>
                   <a:schemeClr val="bg1"/>
                 </a:solidFill>
@@ -12173,7 +12164,7 @@
               </a:rPr>
               <a:t>RR</a:t>
             </a:r>
-            <a:endParaRPr sz="1200" dirty="0">
+            <a:endParaRPr sz="1200" b="1" dirty="0">
               <a:solidFill>
                 <a:schemeClr val="bg1"/>
               </a:solidFill>
@@ -12592,7 +12583,7 @@
           </a:effectLst>
           <a:extLst>
             <a:ext uri="{C572A759-6A51-4108-AA02-DFA0A04FC94B}">
-              <ma14:wrappingTextBoxFlag xmlns="" xmlns:m="http://schemas.openxmlformats.org/officeDocument/2006/math" xmlns:a14="http://schemas.microsoft.com/office/drawing/2010/main" xmlns:ma14="http://schemas.microsoft.com/office/mac/drawingml/2011/main" val="1"/>
+              <ma14:wrappingTextBoxFlag xmlns:ma14="http://schemas.microsoft.com/office/mac/drawingml/2011/main" xmlns:a14="http://schemas.microsoft.com/office/drawing/2010/main" xmlns:m="http://schemas.openxmlformats.org/officeDocument/2006/math" xmlns="" val="1"/>
             </a:ext>
           </a:extLst>
         </p:spPr>
@@ -12635,9 +12626,7 @@
             <a:avLst/>
           </a:prstGeom>
           <a:solidFill>
-            <a:schemeClr val="tx2">
-              <a:lumMod val="75000"/>
-            </a:schemeClr>
+            <a:srgbClr val="175154"/>
           </a:solidFill>
           <a:ln w="19050" cap="flat">
             <a:solidFill>
@@ -12657,7 +12646,7 @@
           </a:effectLst>
           <a:extLst>
             <a:ext uri="{C572A759-6A51-4108-AA02-DFA0A04FC94B}">
-              <ma14:wrappingTextBoxFlag xmlns="" xmlns:m="http://schemas.openxmlformats.org/officeDocument/2006/math" xmlns:a14="http://schemas.microsoft.com/office/drawing/2010/main" xmlns:ma14="http://schemas.microsoft.com/office/mac/drawingml/2011/main" val="1"/>
+              <ma14:wrappingTextBoxFlag xmlns:ma14="http://schemas.microsoft.com/office/mac/drawingml/2011/main" xmlns:a14="http://schemas.microsoft.com/office/drawing/2010/main" xmlns:m="http://schemas.openxmlformats.org/officeDocument/2006/math" xmlns="" val="1"/>
             </a:ext>
           </a:extLst>
         </p:spPr>
@@ -12687,7 +12676,7 @@
                 <a:latin typeface="微软雅黑" panose="020B0503020204020204" pitchFamily="34" charset="-122"/>
                 <a:ea typeface="微软雅黑" panose="020B0503020204020204" pitchFamily="34" charset="-122"/>
               </a:rPr>
-              <a:t>tps limit</a:t>
+              <a:t>TPS limit</a:t>
             </a:r>
           </a:p>
         </p:txBody>
@@ -12713,9 +12702,7 @@
             <a:avLst/>
           </a:prstGeom>
           <a:solidFill>
-            <a:schemeClr val="tx2">
-              <a:lumMod val="75000"/>
-            </a:schemeClr>
+            <a:srgbClr val="175154"/>
           </a:solidFill>
           <a:ln w="19050" cap="flat">
             <a:solidFill>
@@ -12735,7 +12722,7 @@
           </a:effectLst>
           <a:extLst>
             <a:ext uri="{C572A759-6A51-4108-AA02-DFA0A04FC94B}">
-              <ma14:wrappingTextBoxFlag xmlns="" xmlns:m="http://schemas.openxmlformats.org/officeDocument/2006/math" xmlns:a14="http://schemas.microsoft.com/office/drawing/2010/main" xmlns:ma14="http://schemas.microsoft.com/office/mac/drawingml/2011/main" val="1"/>
+              <ma14:wrappingTextBoxFlag xmlns:ma14="http://schemas.microsoft.com/office/mac/drawingml/2011/main" xmlns:a14="http://schemas.microsoft.com/office/drawing/2010/main" xmlns:m="http://schemas.openxmlformats.org/officeDocument/2006/math" xmlns="" val="1"/>
             </a:ext>
           </a:extLst>
         </p:spPr>
@@ -12767,6 +12754,16 @@
           </a:p>
           <a:p>
             <a:r>
+              <a:rPr lang="en-US" altLang="zh-CN" sz="1200">
+                <a:solidFill>
+                  <a:schemeClr val="bg1"/>
+                </a:solidFill>
+                <a:latin typeface="微软雅黑" panose="020B0503020204020204" pitchFamily="34" charset="-122"/>
+                <a:ea typeface="微软雅黑" panose="020B0503020204020204" pitchFamily="34" charset="-122"/>
+              </a:rPr>
+              <a:t>Generic </a:t>
+            </a:r>
+            <a:r>
               <a:rPr lang="en-US" altLang="zh-CN" sz="1200" dirty="0">
                 <a:solidFill>
                   <a:schemeClr val="bg1"/>
@@ -12774,7 +12771,7 @@
                 <a:latin typeface="微软雅黑" panose="020B0503020204020204" pitchFamily="34" charset="-122"/>
                 <a:ea typeface="微软雅黑" panose="020B0503020204020204" pitchFamily="34" charset="-122"/>
               </a:rPr>
-              <a:t>generic invoke</a:t>
+              <a:t>invoke</a:t>
             </a:r>
           </a:p>
           <a:p>
@@ -12808,7 +12805,9 @@
           <a:prstGeom prst="roundRect">
             <a:avLst/>
           </a:prstGeom>
-          <a:noFill/>
+          <a:solidFill>
+            <a:srgbClr val="17242F"/>
+          </a:solidFill>
           <a:ln w="19050" cap="flat">
             <a:solidFill>
               <a:schemeClr val="tx2">
@@ -12827,7 +12826,7 @@
           </a:effectLst>
           <a:extLst>
             <a:ext uri="{C572A759-6A51-4108-AA02-DFA0A04FC94B}">
-              <ma14:wrappingTextBoxFlag xmlns="" xmlns:m="http://schemas.openxmlformats.org/officeDocument/2006/math" xmlns:a14="http://schemas.microsoft.com/office/drawing/2010/main" xmlns:ma14="http://schemas.microsoft.com/office/mac/drawingml/2011/main" val="1"/>
+              <ma14:wrappingTextBoxFlag xmlns:ma14="http://schemas.microsoft.com/office/mac/drawingml/2011/main" xmlns:a14="http://schemas.microsoft.com/office/drawing/2010/main" xmlns:m="http://schemas.openxmlformats.org/officeDocument/2006/math" xmlns="" val="1"/>
             </a:ext>
           </a:extLst>
         </p:spPr>
@@ -12910,7 +12909,7 @@
           </a:effectLst>
           <a:extLst>
             <a:ext uri="{C572A759-6A51-4108-AA02-DFA0A04FC94B}">
-              <ma14:wrappingTextBoxFlag xmlns="" xmlns:m="http://schemas.openxmlformats.org/officeDocument/2006/math" xmlns:a14="http://schemas.microsoft.com/office/drawing/2010/main" xmlns:ma14="http://schemas.microsoft.com/office/mac/drawingml/2011/main" val="1"/>
+              <ma14:wrappingTextBoxFlag xmlns:ma14="http://schemas.microsoft.com/office/mac/drawingml/2011/main" xmlns:a14="http://schemas.microsoft.com/office/drawing/2010/main" xmlns:m="http://schemas.openxmlformats.org/officeDocument/2006/math" xmlns="" val="1"/>
             </a:ext>
           </a:extLst>
         </p:spPr>
@@ -12953,9 +12952,7 @@
             <a:avLst/>
           </a:prstGeom>
           <a:solidFill>
-            <a:schemeClr val="tx2">
-              <a:lumMod val="75000"/>
-            </a:schemeClr>
+            <a:schemeClr val="tx1"/>
           </a:solidFill>
           <a:ln w="19050" cap="flat">
             <a:solidFill>
@@ -12975,7 +12972,7 @@
           </a:effectLst>
           <a:extLst>
             <a:ext uri="{C572A759-6A51-4108-AA02-DFA0A04FC94B}">
-              <ma14:wrappingTextBoxFlag xmlns="" xmlns:m="http://schemas.openxmlformats.org/officeDocument/2006/math" xmlns:a14="http://schemas.microsoft.com/office/drawing/2010/main" xmlns:ma14="http://schemas.microsoft.com/office/mac/drawingml/2011/main" val="1"/>
+              <ma14:wrappingTextBoxFlag xmlns:ma14="http://schemas.microsoft.com/office/mac/drawingml/2011/main" xmlns:a14="http://schemas.microsoft.com/office/drawing/2010/main" xmlns:m="http://schemas.openxmlformats.org/officeDocument/2006/math" xmlns="" val="1"/>
             </a:ext>
           </a:extLst>
         </p:spPr>
@@ -12998,16 +12995,16 @@
           </a:lstStyle>
           <a:p>
             <a:r>
-              <a:rPr lang="en-US" altLang="zh-CN" sz="1200" dirty="0">
+              <a:rPr lang="en-US" altLang="zh-CN" sz="1200" b="1" dirty="0">
                 <a:solidFill>
                   <a:schemeClr val="bg1"/>
                 </a:solidFill>
                 <a:latin typeface="微软雅黑" panose="020B0503020204020204" pitchFamily="34" charset="-122"/>
                 <a:ea typeface="微软雅黑" panose="020B0503020204020204" pitchFamily="34" charset="-122"/>
               </a:rPr>
-              <a:t>grpc</a:t>
+              <a:t>gRPC</a:t>
             </a:r>
-            <a:endParaRPr sz="1200" dirty="0">
+            <a:endParaRPr sz="1200" b="1" dirty="0">
               <a:solidFill>
                 <a:schemeClr val="bg1"/>
               </a:solidFill>
@@ -13038,9 +13035,7 @@
             <a:avLst/>
           </a:prstGeom>
           <a:solidFill>
-            <a:schemeClr val="tx2">
-              <a:lumMod val="75000"/>
-            </a:schemeClr>
+            <a:schemeClr val="tx1"/>
           </a:solidFill>
           <a:ln w="19050" cap="flat">
             <a:solidFill>
@@ -13060,7 +13055,7 @@
           </a:effectLst>
           <a:extLst>
             <a:ext uri="{C572A759-6A51-4108-AA02-DFA0A04FC94B}">
-              <ma14:wrappingTextBoxFlag xmlns="" xmlns:m="http://schemas.openxmlformats.org/officeDocument/2006/math" xmlns:a14="http://schemas.microsoft.com/office/drawing/2010/main" xmlns:ma14="http://schemas.microsoft.com/office/mac/drawingml/2011/main" val="1"/>
+              <ma14:wrappingTextBoxFlag xmlns:ma14="http://schemas.microsoft.com/office/mac/drawingml/2011/main" xmlns:a14="http://schemas.microsoft.com/office/drawing/2010/main" xmlns:m="http://schemas.openxmlformats.org/officeDocument/2006/math" xmlns="" val="1"/>
             </a:ext>
           </a:extLst>
         </p:spPr>
@@ -13083,16 +13078,16 @@
           </a:lstStyle>
           <a:p>
             <a:r>
-              <a:rPr lang="en-US" altLang="zh-CN" sz="1200" dirty="0">
+              <a:rPr lang="en-US" altLang="zh-CN" sz="1200" b="1" dirty="0">
                 <a:solidFill>
                   <a:schemeClr val="bg1"/>
                 </a:solidFill>
                 <a:latin typeface="微软雅黑" panose="020B0503020204020204" pitchFamily="34" charset="-122"/>
                 <a:ea typeface="微软雅黑" panose="020B0503020204020204" pitchFamily="34" charset="-122"/>
               </a:rPr>
-              <a:t>jsonrpc</a:t>
+              <a:t>JSONRPC</a:t>
             </a:r>
-            <a:endParaRPr sz="1200" dirty="0">
+            <a:endParaRPr sz="1200" b="1" dirty="0">
               <a:solidFill>
                 <a:schemeClr val="bg1"/>
               </a:solidFill>
@@ -13123,9 +13118,7 @@
             <a:avLst/>
           </a:prstGeom>
           <a:solidFill>
-            <a:schemeClr val="tx2">
-              <a:lumMod val="75000"/>
-            </a:schemeClr>
+            <a:schemeClr val="tx1"/>
           </a:solidFill>
           <a:ln w="19050" cap="flat">
             <a:solidFill>
@@ -13145,7 +13138,7 @@
           </a:effectLst>
           <a:extLst>
             <a:ext uri="{C572A759-6A51-4108-AA02-DFA0A04FC94B}">
-              <ma14:wrappingTextBoxFlag xmlns="" xmlns:m="http://schemas.openxmlformats.org/officeDocument/2006/math" xmlns:a14="http://schemas.microsoft.com/office/drawing/2010/main" xmlns:ma14="http://schemas.microsoft.com/office/mac/drawingml/2011/main" val="1"/>
+              <ma14:wrappingTextBoxFlag xmlns:ma14="http://schemas.microsoft.com/office/mac/drawingml/2011/main" xmlns:a14="http://schemas.microsoft.com/office/drawing/2010/main" xmlns:m="http://schemas.openxmlformats.org/officeDocument/2006/math" xmlns="" val="1"/>
             </a:ext>
           </a:extLst>
         </p:spPr>
@@ -13168,16 +13161,16 @@
           </a:lstStyle>
           <a:p>
             <a:r>
-              <a:rPr lang="en-US" altLang="zh-CN" sz="1200" dirty="0">
+              <a:rPr lang="en-US" altLang="zh-CN" sz="1200" b="1" dirty="0">
                 <a:solidFill>
                   <a:schemeClr val="bg1"/>
                 </a:solidFill>
                 <a:latin typeface="微软雅黑" panose="020B0503020204020204" pitchFamily="34" charset="-122"/>
                 <a:ea typeface="微软雅黑" panose="020B0503020204020204" pitchFamily="34" charset="-122"/>
               </a:rPr>
-              <a:t>rest</a:t>
+              <a:t>REST</a:t>
             </a:r>
-            <a:endParaRPr sz="1200" dirty="0">
+            <a:endParaRPr sz="1200" b="1" dirty="0">
               <a:solidFill>
                 <a:schemeClr val="bg1"/>
               </a:solidFill>
@@ -13208,9 +13201,7 @@
             <a:avLst/>
           </a:prstGeom>
           <a:solidFill>
-            <a:schemeClr val="tx2">
-              <a:lumMod val="75000"/>
-            </a:schemeClr>
+            <a:srgbClr val="2FA6AD"/>
           </a:solidFill>
           <a:ln w="19050" cap="flat">
             <a:solidFill>
@@ -13230,7 +13221,7 @@
           </a:effectLst>
           <a:extLst>
             <a:ext uri="{C572A759-6A51-4108-AA02-DFA0A04FC94B}">
-              <ma14:wrappingTextBoxFlag xmlns="" xmlns:m="http://schemas.openxmlformats.org/officeDocument/2006/math" xmlns:a14="http://schemas.microsoft.com/office/drawing/2010/main" xmlns:ma14="http://schemas.microsoft.com/office/mac/drawingml/2011/main" val="1"/>
+              <ma14:wrappingTextBoxFlag xmlns:ma14="http://schemas.microsoft.com/office/mac/drawingml/2011/main" xmlns:a14="http://schemas.microsoft.com/office/drawing/2010/main" xmlns:m="http://schemas.openxmlformats.org/officeDocument/2006/math" xmlns="" val="1"/>
             </a:ext>
           </a:extLst>
         </p:spPr>
@@ -13253,16 +13244,16 @@
           </a:lstStyle>
           <a:p>
             <a:r>
-              <a:rPr lang="en-US" altLang="zh-CN" sz="1200" dirty="0">
+              <a:rPr lang="en-US" altLang="zh-CN" sz="1200" b="1" dirty="0">
                 <a:solidFill>
                   <a:schemeClr val="bg1"/>
                 </a:solidFill>
                 <a:latin typeface="微软雅黑" panose="020B0503020204020204" pitchFamily="34" charset="-122"/>
                 <a:ea typeface="微软雅黑" panose="020B0503020204020204" pitchFamily="34" charset="-122"/>
               </a:rPr>
-              <a:t>dubbo</a:t>
+              <a:t>Dubbo</a:t>
             </a:r>
-            <a:endParaRPr sz="1200" dirty="0">
+            <a:endParaRPr sz="1200" b="1" dirty="0">
               <a:solidFill>
                 <a:schemeClr val="bg1"/>
               </a:solidFill>
@@ -13435,7 +13426,7 @@
                 <a:cs typeface="Helvetica Neue"/>
                 <a:sym typeface="Helvetica Neue"/>
               </a:rPr>
-              <a:t>protocol</a:t>
+              <a:t>Protocol</a:t>
             </a:r>
             <a:endParaRPr kumimoji="0" lang="zh-CN" altLang="en-US" sz="1200" b="1" i="0" u="none" strike="noStrike" cap="none" spc="0" normalizeH="0" baseline="0" dirty="0">
               <a:ln>
@@ -13525,7 +13516,9 @@
           <a:prstGeom prst="roundRect">
             <a:avLst/>
           </a:prstGeom>
-          <a:noFill/>
+          <a:solidFill>
+            <a:srgbClr val="17242F"/>
+          </a:solidFill>
           <a:ln w="19050" cap="flat">
             <a:solidFill>
               <a:schemeClr val="tx2">
@@ -13544,7 +13537,7 @@
           </a:effectLst>
           <a:extLst>
             <a:ext uri="{C572A759-6A51-4108-AA02-DFA0A04FC94B}">
-              <ma14:wrappingTextBoxFlag xmlns="" xmlns:m="http://schemas.openxmlformats.org/officeDocument/2006/math" xmlns:a14="http://schemas.microsoft.com/office/drawing/2010/main" xmlns:ma14="http://schemas.microsoft.com/office/mac/drawingml/2011/main" val="1"/>
+              <ma14:wrappingTextBoxFlag xmlns:ma14="http://schemas.microsoft.com/office/mac/drawingml/2011/main" xmlns:a14="http://schemas.microsoft.com/office/drawing/2010/main" xmlns:m="http://schemas.openxmlformats.org/officeDocument/2006/math" xmlns="" val="1"/>
             </a:ext>
           </a:extLst>
         </p:spPr>
@@ -13627,7 +13620,7 @@
           </a:effectLst>
           <a:extLst>
             <a:ext uri="{C572A759-6A51-4108-AA02-DFA0A04FC94B}">
-              <ma14:wrappingTextBoxFlag xmlns="" xmlns:m="http://schemas.openxmlformats.org/officeDocument/2006/math" xmlns:a14="http://schemas.microsoft.com/office/drawing/2010/main" xmlns:ma14="http://schemas.microsoft.com/office/mac/drawingml/2011/main" val="1"/>
+              <ma14:wrappingTextBoxFlag xmlns:ma14="http://schemas.microsoft.com/office/mac/drawingml/2011/main" xmlns:a14="http://schemas.microsoft.com/office/drawing/2010/main" xmlns:m="http://schemas.openxmlformats.org/officeDocument/2006/math" xmlns="" val="1"/>
             </a:ext>
           </a:extLst>
         </p:spPr>
@@ -13670,9 +13663,7 @@
             <a:avLst/>
           </a:prstGeom>
           <a:solidFill>
-            <a:schemeClr val="tx2">
-              <a:lumMod val="75000"/>
-            </a:schemeClr>
+            <a:schemeClr val="tx1"/>
           </a:solidFill>
           <a:ln w="19050" cap="flat">
             <a:solidFill>
@@ -13692,7 +13683,7 @@
           </a:effectLst>
           <a:extLst>
             <a:ext uri="{C572A759-6A51-4108-AA02-DFA0A04FC94B}">
-              <ma14:wrappingTextBoxFlag xmlns="" xmlns:m="http://schemas.openxmlformats.org/officeDocument/2006/math" xmlns:a14="http://schemas.microsoft.com/office/drawing/2010/main" xmlns:ma14="http://schemas.microsoft.com/office/mac/drawingml/2011/main" val="1"/>
+              <ma14:wrappingTextBoxFlag xmlns:ma14="http://schemas.microsoft.com/office/mac/drawingml/2011/main" xmlns:a14="http://schemas.microsoft.com/office/drawing/2010/main" xmlns:m="http://schemas.openxmlformats.org/officeDocument/2006/math" xmlns="" val="1"/>
             </a:ext>
           </a:extLst>
         </p:spPr>
@@ -13715,7 +13706,7 @@
           </a:lstStyle>
           <a:p>
             <a:r>
-              <a:rPr lang="en-US" altLang="zh-CN" sz="1200" dirty="0">
+              <a:rPr lang="en-US" altLang="zh-CN" sz="1200" b="1" dirty="0">
                 <a:solidFill>
                   <a:schemeClr val="bg1"/>
                 </a:solidFill>
@@ -13724,7 +13715,7 @@
               </a:rPr>
               <a:t>condition</a:t>
             </a:r>
-            <a:endParaRPr sz="1200" dirty="0">
+            <a:endParaRPr sz="1200" b="1" dirty="0">
               <a:solidFill>
                 <a:schemeClr val="bg1"/>
               </a:solidFill>
@@ -13754,7 +13745,9 @@
           <a:prstGeom prst="roundRect">
             <a:avLst/>
           </a:prstGeom>
-          <a:noFill/>
+          <a:solidFill>
+            <a:srgbClr val="17242F"/>
+          </a:solidFill>
           <a:ln w="19050" cap="flat">
             <a:solidFill>
               <a:schemeClr val="tx2">
@@ -13773,7 +13766,7 @@
           </a:effectLst>
           <a:extLst>
             <a:ext uri="{C572A759-6A51-4108-AA02-DFA0A04FC94B}">
-              <ma14:wrappingTextBoxFlag xmlns="" xmlns:m="http://schemas.openxmlformats.org/officeDocument/2006/math" xmlns:a14="http://schemas.microsoft.com/office/drawing/2010/main" xmlns:ma14="http://schemas.microsoft.com/office/mac/drawingml/2011/main" val="1"/>
+              <ma14:wrappingTextBoxFlag xmlns:ma14="http://schemas.microsoft.com/office/mac/drawingml/2011/main" xmlns:a14="http://schemas.microsoft.com/office/drawing/2010/main" xmlns:m="http://schemas.openxmlformats.org/officeDocument/2006/math" xmlns="" val="1"/>
             </a:ext>
           </a:extLst>
         </p:spPr>
@@ -14104,7 +14097,7 @@
           </a:effectLst>
           <a:extLst>
             <a:ext uri="{C572A759-6A51-4108-AA02-DFA0A04FC94B}">
-              <ma14:wrappingTextBoxFlag xmlns="" xmlns:m="http://schemas.openxmlformats.org/officeDocument/2006/math" xmlns:a14="http://schemas.microsoft.com/office/drawing/2010/main" xmlns:ma14="http://schemas.microsoft.com/office/mac/drawingml/2011/main" val="1"/>
+              <ma14:wrappingTextBoxFlag xmlns:ma14="http://schemas.microsoft.com/office/mac/drawingml/2011/main" xmlns:a14="http://schemas.microsoft.com/office/drawing/2010/main" xmlns:m="http://schemas.openxmlformats.org/officeDocument/2006/math" xmlns="" val="1"/>
             </a:ext>
           </a:extLst>
         </p:spPr>
@@ -14147,9 +14140,7 @@
             <a:avLst/>
           </a:prstGeom>
           <a:solidFill>
-            <a:schemeClr val="tx2">
-              <a:lumMod val="75000"/>
-            </a:schemeClr>
+            <a:schemeClr val="tx1"/>
           </a:solidFill>
           <a:ln w="19050" cap="flat">
             <a:solidFill>
@@ -14169,7 +14160,7 @@
           </a:effectLst>
           <a:extLst>
             <a:ext uri="{C572A759-6A51-4108-AA02-DFA0A04FC94B}">
-              <ma14:wrappingTextBoxFlag xmlns="" xmlns:m="http://schemas.openxmlformats.org/officeDocument/2006/math" xmlns:a14="http://schemas.microsoft.com/office/drawing/2010/main" xmlns:ma14="http://schemas.microsoft.com/office/mac/drawingml/2011/main" val="1"/>
+              <ma14:wrappingTextBoxFlag xmlns:ma14="http://schemas.microsoft.com/office/mac/drawingml/2011/main" xmlns:a14="http://schemas.microsoft.com/office/drawing/2010/main" xmlns:m="http://schemas.openxmlformats.org/officeDocument/2006/math" xmlns="" val="1"/>
             </a:ext>
           </a:extLst>
         </p:spPr>
@@ -14192,16 +14183,16 @@
           </a:lstStyle>
           <a:p>
             <a:r>
-              <a:rPr lang="en-US" altLang="zh-CN" sz="1200" dirty="0">
+              <a:rPr lang="en-US" altLang="zh-CN" sz="1200" b="1" dirty="0">
                 <a:solidFill>
                   <a:schemeClr val="bg1"/>
                 </a:solidFill>
                 <a:latin typeface="微软雅黑" panose="020B0503020204020204" pitchFamily="34" charset="-122"/>
                 <a:ea typeface="微软雅黑" panose="020B0503020204020204" pitchFamily="34" charset="-122"/>
               </a:rPr>
-              <a:t>grpc</a:t>
+              <a:t>gRPC</a:t>
             </a:r>
-            <a:endParaRPr sz="1200" dirty="0">
+            <a:endParaRPr sz="1200" b="1" dirty="0">
               <a:solidFill>
                 <a:schemeClr val="bg1"/>
               </a:solidFill>
@@ -14232,9 +14223,7 @@
             <a:avLst/>
           </a:prstGeom>
           <a:solidFill>
-            <a:schemeClr val="tx2">
-              <a:lumMod val="75000"/>
-            </a:schemeClr>
+            <a:schemeClr val="tx1"/>
           </a:solidFill>
           <a:ln w="19050" cap="flat">
             <a:solidFill>
@@ -14254,7 +14243,7 @@
           </a:effectLst>
           <a:extLst>
             <a:ext uri="{C572A759-6A51-4108-AA02-DFA0A04FC94B}">
-              <ma14:wrappingTextBoxFlag xmlns="" xmlns:m="http://schemas.openxmlformats.org/officeDocument/2006/math" xmlns:a14="http://schemas.microsoft.com/office/drawing/2010/main" xmlns:ma14="http://schemas.microsoft.com/office/mac/drawingml/2011/main" val="1"/>
+              <ma14:wrappingTextBoxFlag xmlns:ma14="http://schemas.microsoft.com/office/mac/drawingml/2011/main" xmlns:a14="http://schemas.microsoft.com/office/drawing/2010/main" xmlns:m="http://schemas.openxmlformats.org/officeDocument/2006/math" xmlns="" val="1"/>
             </a:ext>
           </a:extLst>
         </p:spPr>
@@ -14277,16 +14266,16 @@
           </a:lstStyle>
           <a:p>
             <a:r>
-              <a:rPr lang="en-US" altLang="zh-CN" sz="1200" dirty="0">
+              <a:rPr lang="en-US" altLang="zh-CN" sz="1200" b="1" dirty="0">
                 <a:solidFill>
                   <a:schemeClr val="bg1"/>
                 </a:solidFill>
                 <a:latin typeface="微软雅黑" panose="020B0503020204020204" pitchFamily="34" charset="-122"/>
                 <a:ea typeface="微软雅黑" panose="020B0503020204020204" pitchFamily="34" charset="-122"/>
               </a:rPr>
-              <a:t>jsonrpc</a:t>
+              <a:t>JSONRPC</a:t>
             </a:r>
-            <a:endParaRPr sz="1200" dirty="0">
+            <a:endParaRPr sz="1200" b="1" dirty="0">
               <a:solidFill>
                 <a:schemeClr val="bg1"/>
               </a:solidFill>
@@ -14317,9 +14306,7 @@
             <a:avLst/>
           </a:prstGeom>
           <a:solidFill>
-            <a:schemeClr val="tx2">
-              <a:lumMod val="75000"/>
-            </a:schemeClr>
+            <a:schemeClr val="tx1"/>
           </a:solidFill>
           <a:ln w="19050" cap="flat">
             <a:solidFill>
@@ -14339,7 +14326,7 @@
           </a:effectLst>
           <a:extLst>
             <a:ext uri="{C572A759-6A51-4108-AA02-DFA0A04FC94B}">
-              <ma14:wrappingTextBoxFlag xmlns="" xmlns:m="http://schemas.openxmlformats.org/officeDocument/2006/math" xmlns:a14="http://schemas.microsoft.com/office/drawing/2010/main" xmlns:ma14="http://schemas.microsoft.com/office/mac/drawingml/2011/main" val="1"/>
+              <ma14:wrappingTextBoxFlag xmlns:ma14="http://schemas.microsoft.com/office/mac/drawingml/2011/main" xmlns:a14="http://schemas.microsoft.com/office/drawing/2010/main" xmlns:m="http://schemas.openxmlformats.org/officeDocument/2006/math" xmlns="" val="1"/>
             </a:ext>
           </a:extLst>
         </p:spPr>
@@ -14362,16 +14349,16 @@
           </a:lstStyle>
           <a:p>
             <a:r>
-              <a:rPr lang="en-US" altLang="zh-CN" sz="1200" dirty="0">
+              <a:rPr lang="en-US" altLang="zh-CN" sz="1200" b="1" dirty="0">
                 <a:solidFill>
                   <a:schemeClr val="bg1"/>
                 </a:solidFill>
                 <a:latin typeface="微软雅黑" panose="020B0503020204020204" pitchFamily="34" charset="-122"/>
                 <a:ea typeface="微软雅黑" panose="020B0503020204020204" pitchFamily="34" charset="-122"/>
               </a:rPr>
-              <a:t>rest</a:t>
+              <a:t>REST</a:t>
             </a:r>
-            <a:endParaRPr sz="1200" dirty="0">
+            <a:endParaRPr sz="1200" b="1" dirty="0">
               <a:solidFill>
                 <a:schemeClr val="bg1"/>
               </a:solidFill>
@@ -14402,9 +14389,7 @@
             <a:avLst/>
           </a:prstGeom>
           <a:solidFill>
-            <a:schemeClr val="tx2">
-              <a:lumMod val="75000"/>
-            </a:schemeClr>
+            <a:srgbClr val="2FA6AD"/>
           </a:solidFill>
           <a:ln w="19050" cap="flat">
             <a:solidFill>
@@ -14424,7 +14409,7 @@
           </a:effectLst>
           <a:extLst>
             <a:ext uri="{C572A759-6A51-4108-AA02-DFA0A04FC94B}">
-              <ma14:wrappingTextBoxFlag xmlns="" xmlns:m="http://schemas.openxmlformats.org/officeDocument/2006/math" xmlns:a14="http://schemas.microsoft.com/office/drawing/2010/main" xmlns:ma14="http://schemas.microsoft.com/office/mac/drawingml/2011/main" val="1"/>
+              <ma14:wrappingTextBoxFlag xmlns:ma14="http://schemas.microsoft.com/office/mac/drawingml/2011/main" xmlns:a14="http://schemas.microsoft.com/office/drawing/2010/main" xmlns:m="http://schemas.openxmlformats.org/officeDocument/2006/math" xmlns="" val="1"/>
             </a:ext>
           </a:extLst>
         </p:spPr>
@@ -14447,16 +14432,16 @@
           </a:lstStyle>
           <a:p>
             <a:r>
-              <a:rPr lang="en-US" altLang="zh-CN" sz="1200" dirty="0">
+              <a:rPr lang="en-US" altLang="zh-CN" sz="1200" b="1" dirty="0">
                 <a:solidFill>
                   <a:schemeClr val="bg1"/>
                 </a:solidFill>
                 <a:latin typeface="微软雅黑" panose="020B0503020204020204" pitchFamily="34" charset="-122"/>
                 <a:ea typeface="微软雅黑" panose="020B0503020204020204" pitchFamily="34" charset="-122"/>
               </a:rPr>
-              <a:t>dubbo</a:t>
+              <a:t>Dubbo</a:t>
             </a:r>
-            <a:endParaRPr sz="1200" dirty="0">
+            <a:endParaRPr sz="1200" b="1" dirty="0">
               <a:solidFill>
                 <a:schemeClr val="bg1"/>
               </a:solidFill>
@@ -14655,7 +14640,7 @@
           </a:effectLst>
           <a:extLst>
             <a:ext uri="{C572A759-6A51-4108-AA02-DFA0A04FC94B}">
-              <ma14:wrappingTextBoxFlag xmlns="" xmlns:m="http://schemas.openxmlformats.org/officeDocument/2006/math" xmlns:a14="http://schemas.microsoft.com/office/drawing/2010/main" xmlns:ma14="http://schemas.microsoft.com/office/mac/drawingml/2011/main" val="1"/>
+              <ma14:wrappingTextBoxFlag xmlns:ma14="http://schemas.microsoft.com/office/mac/drawingml/2011/main" xmlns:a14="http://schemas.microsoft.com/office/drawing/2010/main" xmlns:m="http://schemas.openxmlformats.org/officeDocument/2006/math" xmlns="" val="1"/>
             </a:ext>
           </a:extLst>
         </p:spPr>
@@ -14692,15 +14677,13 @@
         <p:spPr>
           <a:xfrm>
             <a:off x="12242197" y="4742952"/>
-            <a:ext cx="890337" cy="313529"/>
+            <a:ext cx="944414" cy="313529"/>
           </a:xfrm>
           <a:prstGeom prst="roundRect">
             <a:avLst/>
           </a:prstGeom>
           <a:solidFill>
-            <a:schemeClr val="tx2">
-              <a:lumMod val="75000"/>
-            </a:schemeClr>
+            <a:schemeClr val="tx1"/>
           </a:solidFill>
           <a:ln w="19050" cap="flat">
             <a:solidFill>
@@ -14720,7 +14703,7 @@
           </a:effectLst>
           <a:extLst>
             <a:ext uri="{C572A759-6A51-4108-AA02-DFA0A04FC94B}">
-              <ma14:wrappingTextBoxFlag xmlns="" xmlns:m="http://schemas.openxmlformats.org/officeDocument/2006/math" xmlns:a14="http://schemas.microsoft.com/office/drawing/2010/main" xmlns:ma14="http://schemas.microsoft.com/office/mac/drawingml/2011/main" val="1"/>
+              <ma14:wrappingTextBoxFlag xmlns:ma14="http://schemas.microsoft.com/office/mac/drawingml/2011/main" xmlns:a14="http://schemas.microsoft.com/office/drawing/2010/main" xmlns:m="http://schemas.openxmlformats.org/officeDocument/2006/math" xmlns="" val="1"/>
             </a:ext>
           </a:extLst>
         </p:spPr>
@@ -14743,7 +14726,7 @@
           </a:lstStyle>
           <a:p>
             <a:r>
-              <a:rPr lang="en-US" sz="1200" dirty="0">
+              <a:rPr lang="en-US" sz="1200" b="1" dirty="0">
                 <a:solidFill>
                   <a:schemeClr val="bg1"/>
                 </a:solidFill>
@@ -14752,7 +14735,7 @@
               </a:rPr>
               <a:t>interface1</a:t>
             </a:r>
-            <a:endParaRPr sz="1200" dirty="0">
+            <a:endParaRPr sz="1200" b="1" dirty="0">
               <a:solidFill>
                 <a:schemeClr val="bg1"/>
               </a:solidFill>
@@ -14925,15 +14908,13 @@
         <p:spPr>
           <a:xfrm>
             <a:off x="12242197" y="5210731"/>
-            <a:ext cx="890337" cy="313529"/>
+            <a:ext cx="944414" cy="313529"/>
           </a:xfrm>
           <a:prstGeom prst="roundRect">
             <a:avLst/>
           </a:prstGeom>
           <a:solidFill>
-            <a:schemeClr val="tx2">
-              <a:lumMod val="75000"/>
-            </a:schemeClr>
+            <a:schemeClr val="tx1"/>
           </a:solidFill>
           <a:ln w="19050" cap="flat">
             <a:solidFill>
@@ -14953,7 +14934,7 @@
           </a:effectLst>
           <a:extLst>
             <a:ext uri="{C572A759-6A51-4108-AA02-DFA0A04FC94B}">
-              <ma14:wrappingTextBoxFlag xmlns="" xmlns:m="http://schemas.openxmlformats.org/officeDocument/2006/math" xmlns:a14="http://schemas.microsoft.com/office/drawing/2010/main" xmlns:ma14="http://schemas.microsoft.com/office/mac/drawingml/2011/main" val="1"/>
+              <ma14:wrappingTextBoxFlag xmlns:ma14="http://schemas.microsoft.com/office/mac/drawingml/2011/main" xmlns:a14="http://schemas.microsoft.com/office/drawing/2010/main" xmlns:m="http://schemas.openxmlformats.org/officeDocument/2006/math" xmlns="" val="1"/>
             </a:ext>
           </a:extLst>
         </p:spPr>
@@ -14976,7 +14957,7 @@
           </a:lstStyle>
           <a:p>
             <a:r>
-              <a:rPr lang="en-US" sz="1200" dirty="0">
+              <a:rPr lang="en-US" sz="1200" b="1" dirty="0">
                 <a:solidFill>
                   <a:schemeClr val="bg1"/>
                 </a:solidFill>
@@ -14985,7 +14966,7 @@
               </a:rPr>
               <a:t>interface2</a:t>
             </a:r>
-            <a:endParaRPr sz="1200" dirty="0">
+            <a:endParaRPr sz="1200" b="1" dirty="0">
               <a:solidFill>
                 <a:schemeClr val="bg1"/>
               </a:solidFill>
@@ -15010,96 +14991,13 @@
         <p:spPr>
           <a:xfrm>
             <a:off x="12242197" y="5663257"/>
-            <a:ext cx="890337" cy="313529"/>
+            <a:ext cx="944414" cy="313529"/>
           </a:xfrm>
           <a:prstGeom prst="roundRect">
             <a:avLst/>
           </a:prstGeom>
-          <a:noFill/>
-          <a:ln w="19050" cap="flat">
-            <a:solidFill>
-              <a:schemeClr val="tx2">
-                <a:lumMod val="60000"/>
-                <a:lumOff val="40000"/>
-              </a:schemeClr>
-            </a:solidFill>
-            <a:miter lim="400000"/>
-          </a:ln>
-          <a:effectLst>
-            <a:outerShdw blurRad="38100" dist="25400" dir="5400000" rotWithShape="0">
-              <a:srgbClr val="000000">
-                <a:alpha val="50000"/>
-              </a:srgbClr>
-            </a:outerShdw>
-          </a:effectLst>
-          <a:extLst>
-            <a:ext uri="{C572A759-6A51-4108-AA02-DFA0A04FC94B}">
-              <ma14:wrappingTextBoxFlag xmlns="" xmlns:m="http://schemas.openxmlformats.org/officeDocument/2006/math" xmlns:a14="http://schemas.microsoft.com/office/drawing/2010/main" xmlns:ma14="http://schemas.microsoft.com/office/mac/drawingml/2011/main" val="1"/>
-            </a:ext>
-          </a:extLst>
-        </p:spPr>
-        <p:txBody>
-          <a:bodyPr wrap="square" lIns="50800" tIns="50800" rIns="50800" bIns="50800" numCol="1" anchor="ctr">
-            <a:noAutofit/>
-          </a:bodyPr>
-          <a:lstStyle>
-            <a:lvl1pPr>
-              <a:defRPr b="0">
-                <a:solidFill>
-                  <a:srgbClr val="FFFFFF"/>
-                </a:solidFill>
-                <a:latin typeface="Helvetica Light"/>
-                <a:ea typeface="Helvetica Light"/>
-                <a:cs typeface="Helvetica Light"/>
-                <a:sym typeface="Helvetica Light"/>
-              </a:defRPr>
-            </a:lvl1pPr>
-          </a:lstStyle>
-          <a:p>
-            <a:r>
-              <a:rPr lang="en-US" sz="1200" dirty="0">
-                <a:solidFill>
-                  <a:schemeClr val="bg1"/>
-                </a:solidFill>
-                <a:latin typeface="微软雅黑" panose="020B0503020204020204" pitchFamily="34" charset="-122"/>
-                <a:ea typeface="微软雅黑" panose="020B0503020204020204" pitchFamily="34" charset="-122"/>
-              </a:rPr>
-              <a:t>…</a:t>
-            </a:r>
-            <a:endParaRPr sz="1200" dirty="0">
-              <a:solidFill>
-                <a:schemeClr val="bg1"/>
-              </a:solidFill>
-              <a:latin typeface="微软雅黑" panose="020B0503020204020204" pitchFamily="34" charset="-122"/>
-              <a:ea typeface="微软雅黑" panose="020B0503020204020204" pitchFamily="34" charset="-122"/>
-            </a:endParaRPr>
-          </a:p>
-        </p:txBody>
-      </p:sp>
-      <p:sp>
-        <p:nvSpPr>
-          <p:cNvPr id="165" name="zk">
-            <a:extLst>
-              <a:ext uri="{FF2B5EF4-FFF2-40B4-BE49-F238E27FC236}">
-                <a16:creationId xmlns:a16="http://schemas.microsoft.com/office/drawing/2014/main" id="{71566939-962E-43E1-8DD9-8FA47259F816}"/>
-              </a:ext>
-            </a:extLst>
-          </p:cNvPr>
-          <p:cNvSpPr/>
-          <p:nvPr/>
-        </p:nvSpPr>
-        <p:spPr>
-          <a:xfrm>
-            <a:off x="13294986" y="4728963"/>
-            <a:ext cx="890337" cy="313529"/>
-          </a:xfrm>
-          <a:prstGeom prst="roundRect">
-            <a:avLst/>
-          </a:prstGeom>
           <a:solidFill>
-            <a:schemeClr val="tx2">
-              <a:lumMod val="75000"/>
-            </a:schemeClr>
+            <a:srgbClr val="17242F"/>
           </a:solidFill>
           <a:ln w="19050" cap="flat">
             <a:solidFill>
@@ -15119,7 +15017,7 @@
           </a:effectLst>
           <a:extLst>
             <a:ext uri="{C572A759-6A51-4108-AA02-DFA0A04FC94B}">
-              <ma14:wrappingTextBoxFlag xmlns="" xmlns:m="http://schemas.openxmlformats.org/officeDocument/2006/math" xmlns:a14="http://schemas.microsoft.com/office/drawing/2010/main" xmlns:ma14="http://schemas.microsoft.com/office/mac/drawingml/2011/main" val="1"/>
+              <ma14:wrappingTextBoxFlag xmlns:ma14="http://schemas.microsoft.com/office/mac/drawingml/2011/main" xmlns:a14="http://schemas.microsoft.com/office/drawing/2010/main" xmlns:m="http://schemas.openxmlformats.org/officeDocument/2006/math" xmlns="" val="1"/>
             </a:ext>
           </a:extLst>
         </p:spPr>
@@ -15149,7 +15047,7 @@
                 <a:latin typeface="微软雅黑" panose="020B0503020204020204" pitchFamily="34" charset="-122"/>
                 <a:ea typeface="微软雅黑" panose="020B0503020204020204" pitchFamily="34" charset="-122"/>
               </a:rPr>
-              <a:t>service`1</a:t>
+              <a:t>…</a:t>
             </a:r>
             <a:endParaRPr sz="1200" dirty="0">
               <a:solidFill>
@@ -15163,10 +15061,10 @@
       </p:sp>
       <p:sp>
         <p:nvSpPr>
-          <p:cNvPr id="166" name="zk">
+          <p:cNvPr id="165" name="zk">
             <a:extLst>
               <a:ext uri="{FF2B5EF4-FFF2-40B4-BE49-F238E27FC236}">
-                <a16:creationId xmlns:a16="http://schemas.microsoft.com/office/drawing/2014/main" id="{5542E580-5AC7-40B5-AF85-DEEEDDE6F7E5}"/>
+                <a16:creationId xmlns:a16="http://schemas.microsoft.com/office/drawing/2014/main" id="{71566939-962E-43E1-8DD9-8FA47259F816}"/>
               </a:ext>
             </a:extLst>
           </p:cNvPr>
@@ -15175,16 +15073,14 @@
         </p:nvSpPr>
         <p:spPr>
           <a:xfrm>
-            <a:off x="13294986" y="5196742"/>
+            <a:off x="13294986" y="4728963"/>
             <a:ext cx="890337" cy="313529"/>
           </a:xfrm>
           <a:prstGeom prst="roundRect">
             <a:avLst/>
           </a:prstGeom>
           <a:solidFill>
-            <a:schemeClr val="tx2">
-              <a:lumMod val="75000"/>
-            </a:schemeClr>
+            <a:srgbClr val="175154"/>
           </a:solidFill>
           <a:ln w="19050" cap="flat">
             <a:solidFill>
@@ -15204,7 +15100,7 @@
           </a:effectLst>
           <a:extLst>
             <a:ext uri="{C572A759-6A51-4108-AA02-DFA0A04FC94B}">
-              <ma14:wrappingTextBoxFlag xmlns="" xmlns:m="http://schemas.openxmlformats.org/officeDocument/2006/math" xmlns:a14="http://schemas.microsoft.com/office/drawing/2010/main" xmlns:ma14="http://schemas.microsoft.com/office/mac/drawingml/2011/main" val="1"/>
+              <ma14:wrappingTextBoxFlag xmlns:ma14="http://schemas.microsoft.com/office/mac/drawingml/2011/main" xmlns:a14="http://schemas.microsoft.com/office/drawing/2010/main" xmlns:m="http://schemas.openxmlformats.org/officeDocument/2006/math" xmlns="" val="1"/>
             </a:ext>
           </a:extLst>
         </p:spPr>
@@ -15227,16 +15123,16 @@
           </a:lstStyle>
           <a:p>
             <a:r>
-              <a:rPr lang="en-US" sz="1200" dirty="0">
+              <a:rPr lang="en-US" sz="1200" b="1" dirty="0">
                 <a:solidFill>
                   <a:schemeClr val="bg1"/>
                 </a:solidFill>
                 <a:latin typeface="微软雅黑" panose="020B0503020204020204" pitchFamily="34" charset="-122"/>
                 <a:ea typeface="微软雅黑" panose="020B0503020204020204" pitchFamily="34" charset="-122"/>
               </a:rPr>
-              <a:t>service2</a:t>
+              <a:t>service1</a:t>
             </a:r>
-            <a:endParaRPr sz="1200" dirty="0">
+            <a:endParaRPr sz="1200" b="1" dirty="0">
               <a:solidFill>
                 <a:schemeClr val="bg1"/>
               </a:solidFill>
@@ -15248,10 +15144,10 @@
       </p:sp>
       <p:sp>
         <p:nvSpPr>
-          <p:cNvPr id="167" name="zk">
+          <p:cNvPr id="166" name="zk">
             <a:extLst>
               <a:ext uri="{FF2B5EF4-FFF2-40B4-BE49-F238E27FC236}">
-                <a16:creationId xmlns:a16="http://schemas.microsoft.com/office/drawing/2014/main" id="{F386B0CD-92B8-4CB3-BDD8-49C77528718C}"/>
+                <a16:creationId xmlns:a16="http://schemas.microsoft.com/office/drawing/2014/main" id="{5542E580-5AC7-40B5-AF85-DEEEDDE6F7E5}"/>
               </a:ext>
             </a:extLst>
           </p:cNvPr>
@@ -15260,13 +15156,15 @@
         </p:nvSpPr>
         <p:spPr>
           <a:xfrm>
-            <a:off x="13294986" y="5649268"/>
+            <a:off x="13294986" y="5196742"/>
             <a:ext cx="890337" cy="313529"/>
           </a:xfrm>
           <a:prstGeom prst="roundRect">
             <a:avLst/>
           </a:prstGeom>
-          <a:noFill/>
+          <a:solidFill>
+            <a:srgbClr val="175154"/>
+          </a:solidFill>
           <a:ln w="19050" cap="flat">
             <a:solidFill>
               <a:schemeClr val="tx2">
@@ -15285,7 +15183,90 @@
           </a:effectLst>
           <a:extLst>
             <a:ext uri="{C572A759-6A51-4108-AA02-DFA0A04FC94B}">
-              <ma14:wrappingTextBoxFlag xmlns="" xmlns:m="http://schemas.openxmlformats.org/officeDocument/2006/math" xmlns:a14="http://schemas.microsoft.com/office/drawing/2010/main" xmlns:ma14="http://schemas.microsoft.com/office/mac/drawingml/2011/main" val="1"/>
+              <ma14:wrappingTextBoxFlag xmlns:ma14="http://schemas.microsoft.com/office/mac/drawingml/2011/main" xmlns:a14="http://schemas.microsoft.com/office/drawing/2010/main" xmlns:m="http://schemas.openxmlformats.org/officeDocument/2006/math" xmlns="" val="1"/>
+            </a:ext>
+          </a:extLst>
+        </p:spPr>
+        <p:txBody>
+          <a:bodyPr wrap="square" lIns="50800" tIns="50800" rIns="50800" bIns="50800" numCol="1" anchor="ctr">
+            <a:noAutofit/>
+          </a:bodyPr>
+          <a:lstStyle>
+            <a:lvl1pPr>
+              <a:defRPr b="0">
+                <a:solidFill>
+                  <a:srgbClr val="FFFFFF"/>
+                </a:solidFill>
+                <a:latin typeface="Helvetica Light"/>
+                <a:ea typeface="Helvetica Light"/>
+                <a:cs typeface="Helvetica Light"/>
+                <a:sym typeface="Helvetica Light"/>
+              </a:defRPr>
+            </a:lvl1pPr>
+          </a:lstStyle>
+          <a:p>
+            <a:r>
+              <a:rPr lang="en-US" sz="1200" b="1" dirty="0">
+                <a:solidFill>
+                  <a:schemeClr val="bg1"/>
+                </a:solidFill>
+                <a:latin typeface="微软雅黑" panose="020B0503020204020204" pitchFamily="34" charset="-122"/>
+                <a:ea typeface="微软雅黑" panose="020B0503020204020204" pitchFamily="34" charset="-122"/>
+              </a:rPr>
+              <a:t>service2</a:t>
+            </a:r>
+            <a:endParaRPr sz="1200" b="1" dirty="0">
+              <a:solidFill>
+                <a:schemeClr val="bg1"/>
+              </a:solidFill>
+              <a:latin typeface="微软雅黑" panose="020B0503020204020204" pitchFamily="34" charset="-122"/>
+              <a:ea typeface="微软雅黑" panose="020B0503020204020204" pitchFamily="34" charset="-122"/>
+            </a:endParaRPr>
+          </a:p>
+        </p:txBody>
+      </p:sp>
+      <p:sp>
+        <p:nvSpPr>
+          <p:cNvPr id="167" name="zk">
+            <a:extLst>
+              <a:ext uri="{FF2B5EF4-FFF2-40B4-BE49-F238E27FC236}">
+                <a16:creationId xmlns:a16="http://schemas.microsoft.com/office/drawing/2014/main" id="{F386B0CD-92B8-4CB3-BDD8-49C77528718C}"/>
+              </a:ext>
+            </a:extLst>
+          </p:cNvPr>
+          <p:cNvSpPr/>
+          <p:nvPr/>
+        </p:nvSpPr>
+        <p:spPr>
+          <a:xfrm>
+            <a:off x="13294986" y="5649268"/>
+            <a:ext cx="890337" cy="313529"/>
+          </a:xfrm>
+          <a:prstGeom prst="roundRect">
+            <a:avLst/>
+          </a:prstGeom>
+          <a:solidFill>
+            <a:srgbClr val="17242F"/>
+          </a:solidFill>
+          <a:ln w="19050" cap="flat">
+            <a:solidFill>
+              <a:schemeClr val="tx2">
+                <a:lumMod val="60000"/>
+                <a:lumOff val="40000"/>
+              </a:schemeClr>
+            </a:solidFill>
+            <a:miter lim="400000"/>
+          </a:ln>
+          <a:effectLst>
+            <a:outerShdw blurRad="38100" dist="25400" dir="5400000" rotWithShape="0">
+              <a:srgbClr val="000000">
+                <a:alpha val="50000"/>
+              </a:srgbClr>
+            </a:outerShdw>
+          </a:effectLst>
+          <a:extLst>
+            <a:ext uri="{C572A759-6A51-4108-AA02-DFA0A04FC94B}">
+              <ma14:wrappingTextBoxFlag xmlns:ma14="http://schemas.microsoft.com/office/mac/drawingml/2011/main" xmlns:a14="http://schemas.microsoft.com/office/drawing/2010/main" xmlns:m="http://schemas.openxmlformats.org/officeDocument/2006/math" xmlns="" val="1"/>
             </a:ext>
           </a:extLst>
         </p:spPr>
@@ -15368,7 +15349,7 @@
           </a:effectLst>
           <a:extLst>
             <a:ext uri="{C572A759-6A51-4108-AA02-DFA0A04FC94B}">
-              <ma14:wrappingTextBoxFlag xmlns="" xmlns:m="http://schemas.openxmlformats.org/officeDocument/2006/math" xmlns:a14="http://schemas.microsoft.com/office/drawing/2010/main" xmlns:ma14="http://schemas.microsoft.com/office/mac/drawingml/2011/main" val="1"/>
+              <ma14:wrappingTextBoxFlag xmlns:ma14="http://schemas.microsoft.com/office/mac/drawingml/2011/main" xmlns:a14="http://schemas.microsoft.com/office/drawing/2010/main" xmlns:m="http://schemas.openxmlformats.org/officeDocument/2006/math" xmlns="" val="1"/>
             </a:ext>
           </a:extLst>
         </p:spPr>
@@ -15411,9 +15392,7 @@
             <a:avLst/>
           </a:prstGeom>
           <a:solidFill>
-            <a:schemeClr val="accent3">
-              <a:lumMod val="75000"/>
-            </a:schemeClr>
+            <a:srgbClr val="2FA6AD"/>
           </a:solidFill>
           <a:ln w="19050" cap="flat">
             <a:solidFill>
@@ -15433,7 +15412,7 @@
           </a:effectLst>
           <a:extLst>
             <a:ext uri="{C572A759-6A51-4108-AA02-DFA0A04FC94B}">
-              <ma14:wrappingTextBoxFlag xmlns="" xmlns:m="http://schemas.openxmlformats.org/officeDocument/2006/math" xmlns:a14="http://schemas.microsoft.com/office/drawing/2010/main" xmlns:ma14="http://schemas.microsoft.com/office/mac/drawingml/2011/main" val="1"/>
+              <ma14:wrappingTextBoxFlag xmlns:ma14="http://schemas.microsoft.com/office/mac/drawingml/2011/main" xmlns:a14="http://schemas.microsoft.com/office/drawing/2010/main" xmlns:m="http://schemas.openxmlformats.org/officeDocument/2006/math" xmlns="" val="1"/>
             </a:ext>
           </a:extLst>
         </p:spPr>
@@ -15456,7 +15435,7 @@
           </a:lstStyle>
           <a:p>
             <a:r>
-              <a:rPr lang="en-US" altLang="zh-CN" sz="1200" dirty="0">
+              <a:rPr lang="en-US" altLang="zh-CN" sz="1200" b="1" dirty="0">
                 <a:solidFill>
                   <a:schemeClr val="bg1"/>
                 </a:solidFill>
@@ -15465,7 +15444,7 @@
               </a:rPr>
               <a:t>tracing</a:t>
             </a:r>
-            <a:endParaRPr sz="1200" dirty="0">
+            <a:endParaRPr sz="1200" b="1" dirty="0">
               <a:solidFill>
                 <a:schemeClr val="bg1"/>
               </a:solidFill>
@@ -15496,9 +15475,7 @@
             <a:avLst/>
           </a:prstGeom>
           <a:solidFill>
-            <a:schemeClr val="accent3">
-              <a:lumMod val="75000"/>
-            </a:schemeClr>
+            <a:srgbClr val="2FA6AD"/>
           </a:solidFill>
           <a:ln w="19050" cap="flat">
             <a:solidFill>
@@ -15518,7 +15495,7 @@
           </a:effectLst>
           <a:extLst>
             <a:ext uri="{C572A759-6A51-4108-AA02-DFA0A04FC94B}">
-              <ma14:wrappingTextBoxFlag xmlns="" xmlns:m="http://schemas.openxmlformats.org/officeDocument/2006/math" xmlns:a14="http://schemas.microsoft.com/office/drawing/2010/main" xmlns:ma14="http://schemas.microsoft.com/office/mac/drawingml/2011/main" val="1"/>
+              <ma14:wrappingTextBoxFlag xmlns:ma14="http://schemas.microsoft.com/office/mac/drawingml/2011/main" xmlns:a14="http://schemas.microsoft.com/office/drawing/2010/main" xmlns:m="http://schemas.openxmlformats.org/officeDocument/2006/math" xmlns="" val="1"/>
             </a:ext>
           </a:extLst>
         </p:spPr>
@@ -15541,7 +15518,7 @@
           </a:lstStyle>
           <a:p>
             <a:r>
-              <a:rPr lang="en-US" altLang="zh-CN" sz="1200" dirty="0">
+              <a:rPr lang="en-US" altLang="zh-CN" sz="1200" b="1" dirty="0">
                 <a:solidFill>
                   <a:schemeClr val="bg1"/>
                 </a:solidFill>
@@ -15550,7 +15527,7 @@
               </a:rPr>
               <a:t>config</a:t>
             </a:r>
-            <a:endParaRPr sz="1200" dirty="0">
+            <a:endParaRPr sz="1200" b="1" dirty="0">
               <a:solidFill>
                 <a:schemeClr val="bg1"/>
               </a:solidFill>
@@ -15761,9 +15738,7 @@
             <a:avLst/>
           </a:prstGeom>
           <a:solidFill>
-            <a:schemeClr val="tx2">
-              <a:lumMod val="75000"/>
-            </a:schemeClr>
+            <a:schemeClr val="tx1"/>
           </a:solidFill>
           <a:ln w="19050" cap="flat">
             <a:solidFill>
@@ -15783,7 +15758,7 @@
           </a:effectLst>
           <a:extLst>
             <a:ext uri="{C572A759-6A51-4108-AA02-DFA0A04FC94B}">
-              <ma14:wrappingTextBoxFlag xmlns="" xmlns:m="http://schemas.openxmlformats.org/officeDocument/2006/math" xmlns:a14="http://schemas.microsoft.com/office/drawing/2010/main" xmlns:ma14="http://schemas.microsoft.com/office/mac/drawingml/2011/main" val="1"/>
+              <ma14:wrappingTextBoxFlag xmlns:ma14="http://schemas.microsoft.com/office/mac/drawingml/2011/main" xmlns:a14="http://schemas.microsoft.com/office/drawing/2010/main" xmlns:m="http://schemas.openxmlformats.org/officeDocument/2006/math" xmlns="" val="1"/>
             </a:ext>
           </a:extLst>
         </p:spPr>
@@ -15805,7 +15780,7 @@
             </a:lvl1pPr>
           </a:lstStyle>
           <a:p>
-            <a:endParaRPr lang="en-US" altLang="zh-CN" sz="1200" dirty="0">
+            <a:endParaRPr lang="en-US" altLang="zh-CN" sz="1200" b="1" dirty="0">
               <a:solidFill>
                 <a:schemeClr val="bg1"/>
               </a:solidFill>
@@ -15815,7 +15790,7 @@
           </a:p>
           <a:p>
             <a:r>
-              <a:rPr lang="en-US" altLang="zh-CN" sz="1200" dirty="0">
+              <a:rPr lang="en-US" altLang="zh-CN" sz="1200" b="1" dirty="0">
                 <a:solidFill>
                   <a:schemeClr val="bg1"/>
                 </a:solidFill>
@@ -15826,7 +15801,7 @@
             </a:r>
           </a:p>
           <a:p>
-            <a:endParaRPr lang="zh-CN" altLang="en-US" sz="1200" dirty="0">
+            <a:endParaRPr lang="zh-CN" altLang="en-US" sz="1200" b="1" dirty="0">
               <a:solidFill>
                 <a:schemeClr val="bg1"/>
               </a:solidFill>
@@ -15850,8 +15825,8 @@
         </p:nvSpPr>
         <p:spPr>
           <a:xfrm>
-            <a:off x="3154714" y="9262583"/>
-            <a:ext cx="3215960" cy="318036"/>
+            <a:off x="3154713" y="9154862"/>
+            <a:ext cx="11331307" cy="533479"/>
           </a:xfrm>
           <a:prstGeom prst="rect">
             <a:avLst/>
@@ -15882,6 +15857,7 @@
           </a:bodyPr>
           <a:lstStyle/>
           <a:p>
+            <a:pPr algn="l"/>
             <a:r>
               <a:rPr lang="en-US" altLang="zh-CN" sz="1400" b="0" dirty="0">
                 <a:solidFill>
@@ -15891,7 +15867,21 @@
                 <a:ea typeface="Verdana" panose="020B0604030504040204" pitchFamily="34" charset="0"/>
                 <a:cs typeface="Helvetica Light"/>
               </a:rPr>
-              <a:t>Hlty Inst -&gt; </a:t>
+              <a:t> RR 	     -&gt; Round Robin  </a:t>
+            </a:r>
+          </a:p>
+          <a:p>
+            <a:pPr algn="l"/>
+            <a:r>
+              <a:rPr lang="en-US" altLang="zh-CN" sz="1400" b="0" dirty="0">
+                <a:solidFill>
+                  <a:schemeClr val="bg1"/>
+                </a:solidFill>
+                <a:latin typeface="Verdana" panose="020B0604030504040204" pitchFamily="34" charset="0"/>
+                <a:ea typeface="Verdana" panose="020B0604030504040204" pitchFamily="34" charset="0"/>
+                <a:cs typeface="Helvetica Light"/>
+              </a:rPr>
+              <a:t> Hlty Inst -&gt; </a:t>
             </a:r>
             <a:r>
               <a:rPr lang="en-US" altLang="zh-CN" sz="1400" b="0" dirty="0">
@@ -15903,14 +15893,6 @@
               </a:rPr>
               <a:t>Healthy instance first</a:t>
             </a:r>
-            <a:endParaRPr lang="en-US" altLang="zh-CN" sz="1400" b="0" dirty="0">
-              <a:solidFill>
-                <a:schemeClr val="bg1"/>
-              </a:solidFill>
-              <a:latin typeface="Verdana" panose="020B0604030504040204" pitchFamily="34" charset="0"/>
-              <a:ea typeface="Verdana" panose="020B0604030504040204" pitchFamily="34" charset="0"/>
-              <a:cs typeface="Helvetica Light"/>
-            </a:endParaRPr>
           </a:p>
         </p:txBody>
       </p:sp>

</xml_diff>